<commit_message>
Added a picture for the ad
</commit_message>
<xml_diff>
--- a/baseProject/presentation/Presentation-Team8.pptx
+++ b/baseProject/presentation/Presentation-Team8.pptx
@@ -158,7 +158,7 @@
       </p14:sectionLst>
     </p:ext>
     <p:ext uri="{EFAFB233-063F-42B5-8137-9DF3F51BA10A}">
-      <p15:sldGuideLst xmlns:p15="http://schemas.microsoft.com/office/powerpoint/2012/main" xmlns="">
+      <p15:sldGuideLst xmlns="" xmlns:p15="http://schemas.microsoft.com/office/powerpoint/2012/main">
         <p15:guide id="1" orient="horz" pos="2160">
           <p15:clr>
             <a:srgbClr val="A4A3A4"/>
@@ -10227,11 +10227,7 @@
             </a:r>
             <a:r>
               <a:rPr lang="de-DE" dirty="0" smtClean="0"/>
-              <a:t> </a:t>
-            </a:r>
-            <a:r>
-              <a:rPr lang="de-DE" dirty="0" smtClean="0"/>
-              <a:t>a </a:t>
+              <a:t> a </a:t>
             </a:r>
             <a:r>
               <a:rPr lang="de-DE" dirty="0" err="1" smtClean="0"/>
@@ -12586,11 +12582,7 @@
             </a:r>
             <a:r>
               <a:rPr lang="de-CH" dirty="0" err="1" smtClean="0"/>
-              <a:t>fo</a:t>
-            </a:r>
-            <a:r>
-              <a:rPr lang="de-CH" dirty="0" err="1" smtClean="0"/>
-              <a:t>r</a:t>
+              <a:t>for</a:t>
             </a:r>
             <a:r>
               <a:rPr lang="de-CH" dirty="0" smtClean="0"/>
@@ -13600,7 +13592,7 @@
   <a:extraClrSchemeLst/>
   <a:extLst>
     <a:ext uri="{05A4C25C-085E-4340-85A3-A5531E510DB2}">
-      <thm15:themeFamily xmlns:thm15="http://schemas.microsoft.com/office/thememl/2012/main" xmlns="" name="Parallax" id="{3388167B-A2EB-4685-9635-1831D9AEF8C4}" vid="{4F7A876A-7598-49CA-AFC8-8EDA2551E4A7}"/>
+      <thm15:themeFamily xmlns="" xmlns:thm15="http://schemas.microsoft.com/office/thememl/2012/main" name="Parallax" id="{3388167B-A2EB-4685-9635-1831D9AEF8C4}" vid="{4F7A876A-7598-49CA-AFC8-8EDA2551E4A7}"/>
     </a:ext>
   </a:extLst>
 </a:theme>

</xml_diff>

<commit_message>
added a page for the part of ryan in the presentation
</commit_message>
<xml_diff>
--- a/baseProject/presentation/Presentation-Team8.pptx
+++ b/baseProject/presentation/Presentation-Team8.pptx
@@ -17,8 +17,8 @@
     <p:sldId id="267" r:id="rId8"/>
     <p:sldId id="268" r:id="rId9"/>
     <p:sldId id="269" r:id="rId10"/>
-    <p:sldId id="263" r:id="rId11"/>
-    <p:sldId id="266" r:id="rId12"/>
+    <p:sldId id="274" r:id="rId11"/>
+    <p:sldId id="263" r:id="rId12"/>
   </p:sldIdLst>
   <p:sldSz cx="12192000" cy="6858000"/>
   <p:notesSz cx="6858000" cy="9144000"/>
@@ -145,20 +145,20 @@
             <p14:sldId id="269"/>
           </p14:sldIdLst>
         </p14:section>
+        <p14:section name="Why us" id="{BE86CB87-125B-42C6-9C31-F3CD9D8CE1DC}">
+          <p14:sldIdLst>
+            <p14:sldId id="274"/>
+          </p14:sldIdLst>
+        </p14:section>
         <p14:section name="Questions" id="{58102800-2E6E-4D72-AC91-8B0151A06D05}">
           <p14:sldIdLst>
             <p14:sldId id="263"/>
           </p14:sldIdLst>
         </p14:section>
-        <p14:section name="Dank Memes" id="{67DA4D25-9C61-4763-B889-0128106A1106}">
-          <p14:sldIdLst>
-            <p14:sldId id="266"/>
-          </p14:sldIdLst>
-        </p14:section>
       </p14:sectionLst>
     </p:ext>
     <p:ext uri="{EFAFB233-063F-42B5-8137-9DF3F51BA10A}">
-      <p15:sldGuideLst xmlns="" xmlns:p15="http://schemas.microsoft.com/office/powerpoint/2012/main">
+      <p15:sldGuideLst xmlns:p15="http://schemas.microsoft.com/office/powerpoint/2012/main">
         <p15:guide id="1" orient="horz" pos="2160">
           <p15:clr>
             <a:srgbClr val="A4A3A4"/>
@@ -257,7 +257,7 @@
           <a:p>
             <a:fld id="{AD788536-914B-4640-862E-1D3DAE36BE3D}" type="datetimeFigureOut">
               <a:rPr lang="de-DE" smtClean="0"/>
-              <a:t>12.12.16</a:t>
+              <a:t>12.12.2016</a:t>
             </a:fld>
             <a:endParaRPr lang="de-DE"/>
           </a:p>
@@ -1684,6 +1684,90 @@
     <p:extLst>
       <p:ext uri="{BB962C8B-B14F-4D97-AF65-F5344CB8AC3E}">
         <p14:creationId xmlns:p14="http://schemas.microsoft.com/office/powerpoint/2010/main" val="3137078353"/>
+      </p:ext>
+    </p:extLst>
+  </p:cSld>
+  <p:clrMapOvr>
+    <a:masterClrMapping/>
+  </p:clrMapOvr>
+</p:notes>
+</file>
+
+<file path=ppt/notesSlides/notesSlide6.xml><?xml version="1.0" encoding="utf-8"?>
+<p:notes xmlns:a="http://schemas.openxmlformats.org/drawingml/2006/main" xmlns:r="http://schemas.openxmlformats.org/officeDocument/2006/relationships" xmlns:p="http://schemas.openxmlformats.org/presentationml/2006/main">
+  <p:cSld>
+    <p:spTree>
+      <p:nvGrpSpPr>
+        <p:cNvPr id="1" name=""/>
+        <p:cNvGrpSpPr/>
+        <p:nvPr/>
+      </p:nvGrpSpPr>
+      <p:grpSpPr>
+        <a:xfrm>
+          <a:off x="0" y="0"/>
+          <a:ext cx="0" cy="0"/>
+          <a:chOff x="0" y="0"/>
+          <a:chExt cx="0" cy="0"/>
+        </a:xfrm>
+      </p:grpSpPr>
+      <p:sp>
+        <p:nvSpPr>
+          <p:cNvPr id="2" name="Folienbildplatzhalter 1"/>
+          <p:cNvSpPr>
+            <a:spLocks noGrp="1" noRot="1" noChangeAspect="1"/>
+          </p:cNvSpPr>
+          <p:nvPr>
+            <p:ph type="sldImg"/>
+          </p:nvPr>
+        </p:nvSpPr>
+        <p:spPr/>
+      </p:sp>
+      <p:sp>
+        <p:nvSpPr>
+          <p:cNvPr id="3" name="Notizenplatzhalter 2"/>
+          <p:cNvSpPr>
+            <a:spLocks noGrp="1"/>
+          </p:cNvSpPr>
+          <p:nvPr>
+            <p:ph type="body" idx="1"/>
+          </p:nvPr>
+        </p:nvSpPr>
+        <p:spPr/>
+        <p:txBody>
+          <a:bodyPr/>
+          <a:lstStyle/>
+          <a:p>
+            <a:endParaRPr lang="de-CH" dirty="0"/>
+          </a:p>
+        </p:txBody>
+      </p:sp>
+      <p:sp>
+        <p:nvSpPr>
+          <p:cNvPr id="4" name="Foliennummernplatzhalter 3"/>
+          <p:cNvSpPr>
+            <a:spLocks noGrp="1"/>
+          </p:cNvSpPr>
+          <p:nvPr>
+            <p:ph type="sldNum" sz="quarter" idx="10"/>
+          </p:nvPr>
+        </p:nvSpPr>
+        <p:spPr/>
+        <p:txBody>
+          <a:bodyPr/>
+          <a:lstStyle/>
+          <a:p>
+            <a:fld id="{2F2847E0-1D0A-0F4B-99C8-E51199A5987D}" type="slidenum">
+              <a:rPr lang="de-DE" smtClean="0"/>
+              <a:t>10</a:t>
+            </a:fld>
+            <a:endParaRPr lang="de-DE"/>
+          </a:p>
+        </p:txBody>
+      </p:sp>
+    </p:spTree>
+    <p:extLst>
+      <p:ext uri="{BB962C8B-B14F-4D97-AF65-F5344CB8AC3E}">
+        <p14:creationId xmlns:p14="http://schemas.microsoft.com/office/powerpoint/2010/main" val="4134227325"/>
       </p:ext>
     </p:extLst>
   </p:cSld>
@@ -2196,7 +2280,7 @@
             <a:fld id="{B61BEF0D-F0BB-DE4B-95CE-6DB70DBA9567}" type="datetimeFigureOut">
               <a:rPr lang="en-US" dirty="0"/>
               <a:pPr/>
-              <a:t>12.12.16</a:t>
+              <a:t>12/12/2016</a:t>
             </a:fld>
             <a:endParaRPr lang="en-US" dirty="0"/>
           </a:p>
@@ -2489,7 +2573,7 @@
             <a:fld id="{B61BEF0D-F0BB-DE4B-95CE-6DB70DBA9567}" type="datetimeFigureOut">
               <a:rPr lang="en-US" dirty="0"/>
               <a:pPr/>
-              <a:t>12.12.16</a:t>
+              <a:t>12/12/2016</a:t>
             </a:fld>
             <a:endParaRPr lang="en-US" dirty="0"/>
           </a:p>
@@ -2734,7 +2818,7 @@
             <a:fld id="{B61BEF0D-F0BB-DE4B-95CE-6DB70DBA9567}" type="datetimeFigureOut">
               <a:rPr lang="en-US" dirty="0"/>
               <a:pPr/>
-              <a:t>12.12.16</a:t>
+              <a:t>12/12/2016</a:t>
             </a:fld>
             <a:endParaRPr lang="en-US" dirty="0"/>
           </a:p>
@@ -3271,7 +3355,7 @@
             <a:fld id="{B61BEF0D-F0BB-DE4B-95CE-6DB70DBA9567}" type="datetimeFigureOut">
               <a:rPr lang="en-US" dirty="0"/>
               <a:pPr/>
-              <a:t>12.12.16</a:t>
+              <a:t>12/12/2016</a:t>
             </a:fld>
             <a:endParaRPr lang="en-US" dirty="0"/>
           </a:p>
@@ -3516,7 +3600,7 @@
             <a:fld id="{B61BEF0D-F0BB-DE4B-95CE-6DB70DBA9567}" type="datetimeFigureOut">
               <a:rPr lang="en-US" dirty="0"/>
               <a:pPr/>
-              <a:t>12.12.16</a:t>
+              <a:t>12/12/2016</a:t>
             </a:fld>
             <a:endParaRPr lang="en-US" dirty="0"/>
           </a:p>
@@ -4045,7 +4129,7 @@
             <a:fld id="{B61BEF0D-F0BB-DE4B-95CE-6DB70DBA9567}" type="datetimeFigureOut">
               <a:rPr lang="en-US" dirty="0"/>
               <a:pPr/>
-              <a:t>12.12.16</a:t>
+              <a:t>12/12/2016</a:t>
             </a:fld>
             <a:endParaRPr lang="en-US" dirty="0"/>
           </a:p>
@@ -4339,7 +4423,7 @@
             <a:fld id="{B61BEF0D-F0BB-DE4B-95CE-6DB70DBA9567}" type="datetimeFigureOut">
               <a:rPr lang="en-US" dirty="0"/>
               <a:pPr/>
-              <a:t>12.12.16</a:t>
+              <a:t>12/12/2016</a:t>
             </a:fld>
             <a:endParaRPr lang="en-US" dirty="0"/>
           </a:p>
@@ -4510,7 +4594,7 @@
             <a:fld id="{B61BEF0D-F0BB-DE4B-95CE-6DB70DBA9567}" type="datetimeFigureOut">
               <a:rPr lang="en-US" dirty="0"/>
               <a:pPr/>
-              <a:t>12.12.16</a:t>
+              <a:t>12/12/2016</a:t>
             </a:fld>
             <a:endParaRPr lang="en-US" dirty="0"/>
           </a:p>
@@ -4687,7 +4771,7 @@
             <a:fld id="{B61BEF0D-F0BB-DE4B-95CE-6DB70DBA9567}" type="datetimeFigureOut">
               <a:rPr lang="en-US" dirty="0"/>
               <a:pPr/>
-              <a:t>12.12.16</a:t>
+              <a:t>12/12/2016</a:t>
             </a:fld>
             <a:endParaRPr lang="en-US" dirty="0"/>
           </a:p>
@@ -4854,7 +4938,7 @@
             <a:fld id="{B61BEF0D-F0BB-DE4B-95CE-6DB70DBA9567}" type="datetimeFigureOut">
               <a:rPr lang="en-US" dirty="0"/>
               <a:pPr/>
-              <a:t>12.12.16</a:t>
+              <a:t>12/12/2016</a:t>
             </a:fld>
             <a:endParaRPr lang="en-US" dirty="0"/>
           </a:p>
@@ -5102,7 +5186,7 @@
             <a:fld id="{B61BEF0D-F0BB-DE4B-95CE-6DB70DBA9567}" type="datetimeFigureOut">
               <a:rPr lang="en-US" dirty="0"/>
               <a:pPr/>
-              <a:t>12.12.16</a:t>
+              <a:t>12/12/2016</a:t>
             </a:fld>
             <a:endParaRPr lang="en-US" dirty="0"/>
           </a:p>
@@ -5396,7 +5480,7 @@
             <a:fld id="{B61BEF0D-F0BB-DE4B-95CE-6DB70DBA9567}" type="datetimeFigureOut">
               <a:rPr lang="en-US" dirty="0"/>
               <a:pPr/>
-              <a:t>12.12.16</a:t>
+              <a:t>12/12/2016</a:t>
             </a:fld>
             <a:endParaRPr lang="en-US" dirty="0"/>
           </a:p>
@@ -5835,7 +5919,7 @@
             <a:fld id="{B61BEF0D-F0BB-DE4B-95CE-6DB70DBA9567}" type="datetimeFigureOut">
               <a:rPr lang="en-US" dirty="0"/>
               <a:pPr/>
-              <a:t>12.12.16</a:t>
+              <a:t>12/12/2016</a:t>
             </a:fld>
             <a:endParaRPr lang="en-US" dirty="0"/>
           </a:p>
@@ -5950,7 +6034,7 @@
             <a:fld id="{B61BEF0D-F0BB-DE4B-95CE-6DB70DBA9567}" type="datetimeFigureOut">
               <a:rPr lang="en-US" dirty="0"/>
               <a:pPr/>
-              <a:t>12.12.16</a:t>
+              <a:t>12/12/2016</a:t>
             </a:fld>
             <a:endParaRPr lang="en-US" dirty="0"/>
           </a:p>
@@ -6042,7 +6126,7 @@
             <a:fld id="{B61BEF0D-F0BB-DE4B-95CE-6DB70DBA9567}" type="datetimeFigureOut">
               <a:rPr lang="en-US" dirty="0"/>
               <a:pPr/>
-              <a:t>12.12.16</a:t>
+              <a:t>12/12/2016</a:t>
             </a:fld>
             <a:endParaRPr lang="en-US" dirty="0"/>
           </a:p>
@@ -6322,7 +6406,7 @@
             <a:fld id="{B61BEF0D-F0BB-DE4B-95CE-6DB70DBA9567}" type="datetimeFigureOut">
               <a:rPr lang="en-US" dirty="0"/>
               <a:pPr/>
-              <a:t>12.12.16</a:t>
+              <a:t>12/12/2016</a:t>
             </a:fld>
             <a:endParaRPr lang="en-US" dirty="0"/>
           </a:p>
@@ -6610,7 +6694,7 @@
             <a:fld id="{B61BEF0D-F0BB-DE4B-95CE-6DB70DBA9567}" type="datetimeFigureOut">
               <a:rPr lang="en-US" dirty="0"/>
               <a:pPr/>
-              <a:t>12.12.16</a:t>
+              <a:t>12/12/2016</a:t>
             </a:fld>
             <a:endParaRPr lang="en-US" dirty="0"/>
           </a:p>
@@ -7137,7 +7221,7 @@
             <a:fld id="{B61BEF0D-F0BB-DE4B-95CE-6DB70DBA9567}" type="datetimeFigureOut">
               <a:rPr lang="en-US" dirty="0"/>
               <a:pPr/>
-              <a:t>12.12.16</a:t>
+              <a:t>12/12/2016</a:t>
             </a:fld>
             <a:endParaRPr lang="en-US" dirty="0"/>
           </a:p>
@@ -8079,7 +8163,7 @@
   <p:timing>
     <p:tnLst>
       <p:par>
-        <p:cTn xmlns:p14="http://schemas.microsoft.com/office/powerpoint/2010/main" id="1" dur="indefinite" restart="never" nodeType="tmRoot"/>
+        <p:cTn id="1" dur="indefinite" restart="never" nodeType="tmRoot"/>
       </p:par>
     </p:tnLst>
   </p:timing>
@@ -8087,6 +8171,472 @@
 </file>
 
 <file path=ppt/slides/slide10.xml><?xml version="1.0" encoding="utf-8"?>
+<p:sld xmlns:a="http://schemas.openxmlformats.org/drawingml/2006/main" xmlns:r="http://schemas.openxmlformats.org/officeDocument/2006/relationships" xmlns:p="http://schemas.openxmlformats.org/presentationml/2006/main">
+  <p:cSld>
+    <p:spTree>
+      <p:nvGrpSpPr>
+        <p:cNvPr id="1" name=""/>
+        <p:cNvGrpSpPr/>
+        <p:nvPr/>
+      </p:nvGrpSpPr>
+      <p:grpSpPr>
+        <a:xfrm>
+          <a:off x="0" y="0"/>
+          <a:ext cx="0" cy="0"/>
+          <a:chOff x="0" y="0"/>
+          <a:chExt cx="0" cy="0"/>
+        </a:xfrm>
+      </p:grpSpPr>
+      <p:sp>
+        <p:nvSpPr>
+          <p:cNvPr id="2" name="Titel 1"/>
+          <p:cNvSpPr>
+            <a:spLocks noGrp="1"/>
+          </p:cNvSpPr>
+          <p:nvPr>
+            <p:ph type="title"/>
+          </p:nvPr>
+        </p:nvSpPr>
+        <p:spPr>
+          <a:xfrm>
+            <a:off x="810915" y="691116"/>
+            <a:ext cx="10018713" cy="1752599"/>
+          </a:xfrm>
+        </p:spPr>
+        <p:txBody>
+          <a:bodyPr/>
+          <a:lstStyle/>
+          <a:p>
+            <a:r>
+              <a:rPr lang="de-DE" dirty="0" err="1" smtClean="0"/>
+              <a:t>Why</a:t>
+            </a:r>
+            <a:r>
+              <a:rPr lang="de-DE" dirty="0" smtClean="0"/>
+              <a:t> </a:t>
+            </a:r>
+            <a:r>
+              <a:rPr lang="de-DE" dirty="0" err="1" smtClean="0"/>
+              <a:t>us</a:t>
+            </a:r>
+            <a:r>
+              <a:rPr lang="de-DE" dirty="0" smtClean="0"/>
+              <a:t>?</a:t>
+            </a:r>
+            <a:endParaRPr lang="de-DE" dirty="0"/>
+          </a:p>
+        </p:txBody>
+      </p:sp>
+      <p:sp>
+        <p:nvSpPr>
+          <p:cNvPr id="6" name="Inhaltsplatzhalter 2"/>
+          <p:cNvSpPr txBox="1">
+            <a:spLocks/>
+          </p:cNvSpPr>
+          <p:nvPr/>
+        </p:nvSpPr>
+        <p:spPr>
+          <a:xfrm>
+            <a:off x="8137451" y="-41565"/>
+            <a:ext cx="4054549" cy="370610"/>
+          </a:xfrm>
+          <a:prstGeom prst="rect">
+            <a:avLst/>
+          </a:prstGeom>
+        </p:spPr>
+        <p:txBody>
+          <a:bodyPr vert="horz" lIns="91440" tIns="45720" rIns="91440" bIns="45720" rtlCol="0" anchor="ctr">
+            <a:normAutofit/>
+          </a:bodyPr>
+          <a:lstStyle>
+            <a:lvl1pPr marL="285750" indent="-285750" algn="l" defTabSz="457200" rtl="0" eaLnBrk="1" latinLnBrk="0" hangingPunct="1">
+              <a:spcBef>
+                <a:spcPct val="20000"/>
+              </a:spcBef>
+              <a:spcAft>
+                <a:spcPts val="600"/>
+              </a:spcAft>
+              <a:buClr>
+                <a:schemeClr val="accent1">
+                  <a:lumMod val="75000"/>
+                </a:schemeClr>
+              </a:buClr>
+              <a:buSzPct val="145000"/>
+              <a:buFont typeface="Arial"/>
+              <a:buChar char="•"/>
+              <a:defRPr sz="2400" kern="1200" cap="none">
+                <a:solidFill>
+                  <a:schemeClr val="tx1"/>
+                </a:solidFill>
+                <a:effectLst/>
+                <a:latin typeface="+mn-lt"/>
+                <a:ea typeface="+mn-ea"/>
+                <a:cs typeface="+mn-cs"/>
+              </a:defRPr>
+            </a:lvl1pPr>
+            <a:lvl2pPr marL="742950" indent="-285750" algn="l" defTabSz="457200" rtl="0" eaLnBrk="1" latinLnBrk="0" hangingPunct="1">
+              <a:spcBef>
+                <a:spcPct val="20000"/>
+              </a:spcBef>
+              <a:spcAft>
+                <a:spcPts val="600"/>
+              </a:spcAft>
+              <a:buClr>
+                <a:schemeClr val="accent1">
+                  <a:lumMod val="75000"/>
+                </a:schemeClr>
+              </a:buClr>
+              <a:buSzPct val="145000"/>
+              <a:buFont typeface="Arial"/>
+              <a:buChar char="•"/>
+              <a:defRPr sz="2000" kern="1200" cap="none">
+                <a:solidFill>
+                  <a:schemeClr val="tx1"/>
+                </a:solidFill>
+                <a:effectLst/>
+                <a:latin typeface="+mn-lt"/>
+                <a:ea typeface="+mn-ea"/>
+                <a:cs typeface="+mn-cs"/>
+              </a:defRPr>
+            </a:lvl2pPr>
+            <a:lvl3pPr marL="1200150" indent="-285750" algn="l" defTabSz="457200" rtl="0" eaLnBrk="1" latinLnBrk="0" hangingPunct="1">
+              <a:spcBef>
+                <a:spcPct val="20000"/>
+              </a:spcBef>
+              <a:spcAft>
+                <a:spcPts val="600"/>
+              </a:spcAft>
+              <a:buClr>
+                <a:schemeClr val="accent1">
+                  <a:lumMod val="75000"/>
+                </a:schemeClr>
+              </a:buClr>
+              <a:buSzPct val="145000"/>
+              <a:buFont typeface="Arial"/>
+              <a:buChar char="•"/>
+              <a:defRPr sz="1800" kern="1200" cap="none">
+                <a:solidFill>
+                  <a:schemeClr val="tx1"/>
+                </a:solidFill>
+                <a:effectLst/>
+                <a:latin typeface="+mn-lt"/>
+                <a:ea typeface="+mn-ea"/>
+                <a:cs typeface="+mn-cs"/>
+              </a:defRPr>
+            </a:lvl3pPr>
+            <a:lvl4pPr marL="1543050" indent="-171450" algn="l" defTabSz="457200" rtl="0" eaLnBrk="1" latinLnBrk="0" hangingPunct="1">
+              <a:spcBef>
+                <a:spcPct val="20000"/>
+              </a:spcBef>
+              <a:spcAft>
+                <a:spcPts val="600"/>
+              </a:spcAft>
+              <a:buClr>
+                <a:schemeClr val="accent1">
+                  <a:lumMod val="75000"/>
+                </a:schemeClr>
+              </a:buClr>
+              <a:buSzPct val="145000"/>
+              <a:buFont typeface="Arial"/>
+              <a:buChar char="•"/>
+              <a:defRPr sz="1600" kern="1200" cap="none">
+                <a:solidFill>
+                  <a:schemeClr val="tx1"/>
+                </a:solidFill>
+                <a:effectLst/>
+                <a:latin typeface="+mn-lt"/>
+                <a:ea typeface="+mn-ea"/>
+                <a:cs typeface="+mn-cs"/>
+              </a:defRPr>
+            </a:lvl4pPr>
+            <a:lvl5pPr marL="2000250" indent="-171450" algn="l" defTabSz="457200" rtl="0" eaLnBrk="1" latinLnBrk="0" hangingPunct="1">
+              <a:spcBef>
+                <a:spcPct val="20000"/>
+              </a:spcBef>
+              <a:spcAft>
+                <a:spcPts val="600"/>
+              </a:spcAft>
+              <a:buClr>
+                <a:schemeClr val="accent1">
+                  <a:lumMod val="75000"/>
+                </a:schemeClr>
+              </a:buClr>
+              <a:buSzPct val="145000"/>
+              <a:buFont typeface="Arial"/>
+              <a:buChar char="•"/>
+              <a:defRPr sz="1400" kern="1200" cap="none">
+                <a:solidFill>
+                  <a:schemeClr val="tx1"/>
+                </a:solidFill>
+                <a:effectLst/>
+                <a:latin typeface="+mn-lt"/>
+                <a:ea typeface="+mn-ea"/>
+                <a:cs typeface="+mn-cs"/>
+              </a:defRPr>
+            </a:lvl5pPr>
+            <a:lvl6pPr marL="2514600" indent="-228600" algn="l" defTabSz="457200" rtl="0" eaLnBrk="1" latinLnBrk="0" hangingPunct="1">
+              <a:spcBef>
+                <a:spcPct val="20000"/>
+              </a:spcBef>
+              <a:spcAft>
+                <a:spcPts val="600"/>
+              </a:spcAft>
+              <a:buClr>
+                <a:schemeClr val="accent1">
+                  <a:lumMod val="75000"/>
+                </a:schemeClr>
+              </a:buClr>
+              <a:buSzPct val="145000"/>
+              <a:buFont typeface="Arial"/>
+              <a:buChar char="•"/>
+              <a:defRPr sz="1400" kern="1200" cap="none">
+                <a:solidFill>
+                  <a:schemeClr val="tx1"/>
+                </a:solidFill>
+                <a:effectLst/>
+                <a:latin typeface="+mn-lt"/>
+                <a:ea typeface="+mn-ea"/>
+                <a:cs typeface="+mn-cs"/>
+              </a:defRPr>
+            </a:lvl6pPr>
+            <a:lvl7pPr marL="2971800" indent="-228600" algn="l" defTabSz="457200" rtl="0" eaLnBrk="1" latinLnBrk="0" hangingPunct="1">
+              <a:spcBef>
+                <a:spcPct val="20000"/>
+              </a:spcBef>
+              <a:spcAft>
+                <a:spcPts val="600"/>
+              </a:spcAft>
+              <a:buClr>
+                <a:schemeClr val="accent1">
+                  <a:lumMod val="75000"/>
+                </a:schemeClr>
+              </a:buClr>
+              <a:buSzPct val="145000"/>
+              <a:buFont typeface="Arial"/>
+              <a:buChar char="•"/>
+              <a:defRPr sz="1400" kern="1200" cap="none">
+                <a:solidFill>
+                  <a:schemeClr val="tx1"/>
+                </a:solidFill>
+                <a:effectLst/>
+                <a:latin typeface="+mn-lt"/>
+                <a:ea typeface="+mn-ea"/>
+                <a:cs typeface="+mn-cs"/>
+              </a:defRPr>
+            </a:lvl7pPr>
+            <a:lvl8pPr marL="3429000" indent="-228600" algn="l" defTabSz="457200" rtl="0" eaLnBrk="1" latinLnBrk="0" hangingPunct="1">
+              <a:spcBef>
+                <a:spcPct val="20000"/>
+              </a:spcBef>
+              <a:spcAft>
+                <a:spcPts val="600"/>
+              </a:spcAft>
+              <a:buClr>
+                <a:schemeClr val="accent1">
+                  <a:lumMod val="75000"/>
+                </a:schemeClr>
+              </a:buClr>
+              <a:buSzPct val="145000"/>
+              <a:buFont typeface="Arial"/>
+              <a:buChar char="•"/>
+              <a:defRPr sz="1400" kern="1200" cap="none">
+                <a:solidFill>
+                  <a:schemeClr val="tx1"/>
+                </a:solidFill>
+                <a:effectLst/>
+                <a:latin typeface="+mn-lt"/>
+                <a:ea typeface="+mn-ea"/>
+                <a:cs typeface="+mn-cs"/>
+              </a:defRPr>
+            </a:lvl8pPr>
+            <a:lvl9pPr marL="3886200" indent="-228600" algn="l" defTabSz="457200" rtl="0" eaLnBrk="1" latinLnBrk="0" hangingPunct="1">
+              <a:spcBef>
+                <a:spcPct val="20000"/>
+              </a:spcBef>
+              <a:spcAft>
+                <a:spcPts val="600"/>
+              </a:spcAft>
+              <a:buClr>
+                <a:schemeClr val="accent1">
+                  <a:lumMod val="75000"/>
+                </a:schemeClr>
+              </a:buClr>
+              <a:buSzPct val="145000"/>
+              <a:buFont typeface="Arial"/>
+              <a:buChar char="•"/>
+              <a:defRPr sz="1400" kern="1200" cap="none">
+                <a:solidFill>
+                  <a:schemeClr val="tx1"/>
+                </a:solidFill>
+                <a:effectLst/>
+                <a:latin typeface="+mn-lt"/>
+                <a:ea typeface="+mn-ea"/>
+                <a:cs typeface="+mn-cs"/>
+              </a:defRPr>
+            </a:lvl9pPr>
+          </a:lstStyle>
+          <a:p>
+            <a:pPr marL="0" indent="0">
+              <a:buNone/>
+            </a:pPr>
+            <a:r>
+              <a:rPr lang="de-DE" sz="1000" dirty="0" smtClean="0"/>
+              <a:t>Rem0 Röthlisberger, Eric </a:t>
+            </a:r>
+            <a:r>
+              <a:rPr lang="de-DE" sz="1000" dirty="0" err="1" smtClean="0"/>
+              <a:t>Lagger</a:t>
+            </a:r>
+            <a:r>
+              <a:rPr lang="de-DE" sz="1000" dirty="0" smtClean="0"/>
+              <a:t>, Vincent Hofer, Dean Klopsch, Aebi Ryan</a:t>
+            </a:r>
+            <a:endParaRPr lang="de-DE" sz="1000" dirty="0"/>
+          </a:p>
+        </p:txBody>
+      </p:sp>
+      <p:sp>
+        <p:nvSpPr>
+          <p:cNvPr id="7" name="Inhaltsplatzhalter 2"/>
+          <p:cNvSpPr>
+            <a:spLocks noGrp="1"/>
+          </p:cNvSpPr>
+          <p:nvPr>
+            <p:ph idx="1"/>
+          </p:nvPr>
+        </p:nvSpPr>
+        <p:spPr>
+          <a:xfrm>
+            <a:off x="762552" y="2065420"/>
+            <a:ext cx="10115438" cy="3937001"/>
+          </a:xfrm>
+        </p:spPr>
+        <p:txBody>
+          <a:bodyPr>
+            <a:normAutofit/>
+          </a:bodyPr>
+          <a:lstStyle/>
+          <a:p>
+            <a:pPr algn="ctr"/>
+            <a:r>
+              <a:rPr lang="de-DE" sz="3200" dirty="0" err="1" smtClean="0"/>
+              <a:t>Our</a:t>
+            </a:r>
+            <a:r>
+              <a:rPr lang="de-DE" sz="3200" dirty="0" smtClean="0"/>
+              <a:t> </a:t>
+            </a:r>
+            <a:r>
+              <a:rPr lang="de-DE" sz="3200" dirty="0" err="1" smtClean="0"/>
+              <a:t>team</a:t>
+            </a:r>
+            <a:endParaRPr lang="de-DE" sz="3200" dirty="0" smtClean="0"/>
+          </a:p>
+          <a:p>
+            <a:pPr algn="ctr"/>
+            <a:r>
+              <a:rPr lang="de-DE" sz="3200" dirty="0" smtClean="0"/>
+              <a:t>The </a:t>
+            </a:r>
+            <a:r>
+              <a:rPr lang="de-DE" sz="3200" dirty="0" err="1" smtClean="0"/>
+              <a:t>products</a:t>
+            </a:r>
+            <a:r>
+              <a:rPr lang="de-DE" sz="3200" dirty="0" smtClean="0"/>
+              <a:t/>
+            </a:r>
+            <a:br>
+              <a:rPr lang="de-DE" sz="3200" dirty="0" smtClean="0"/>
+            </a:br>
+            <a:r>
+              <a:rPr lang="de-DE" sz="3200" dirty="0" smtClean="0"/>
+              <a:t>-&gt; The </a:t>
+            </a:r>
+            <a:r>
+              <a:rPr lang="de-DE" sz="3200" dirty="0" err="1" smtClean="0"/>
+              <a:t>client</a:t>
+            </a:r>
+            <a:r>
+              <a:rPr lang="de-DE" sz="3200" dirty="0" smtClean="0"/>
+              <a:t/>
+            </a:r>
+            <a:br>
+              <a:rPr lang="de-DE" sz="3200" dirty="0" smtClean="0"/>
+            </a:br>
+            <a:r>
+              <a:rPr lang="de-DE" sz="3200" dirty="0" smtClean="0"/>
+              <a:t>-&gt; The </a:t>
+            </a:r>
+            <a:r>
+              <a:rPr lang="de-DE" sz="3200" dirty="0" err="1" smtClean="0"/>
+              <a:t>developers</a:t>
+            </a:r>
+            <a:endParaRPr lang="de-DE" sz="3200" dirty="0" smtClean="0"/>
+          </a:p>
+          <a:p>
+            <a:pPr algn="ctr"/>
+            <a:r>
+              <a:rPr lang="de-DE" sz="3200" dirty="0" err="1" smtClean="0"/>
+              <a:t>Ask</a:t>
+            </a:r>
+            <a:r>
+              <a:rPr lang="de-DE" sz="3200" dirty="0" smtClean="0"/>
+              <a:t> </a:t>
+            </a:r>
+            <a:r>
+              <a:rPr lang="de-DE" sz="3200" dirty="0" err="1" smtClean="0"/>
+              <a:t>us</a:t>
+            </a:r>
+            <a:r>
+              <a:rPr lang="de-DE" sz="3200" dirty="0" smtClean="0"/>
+              <a:t>!</a:t>
+            </a:r>
+            <a:endParaRPr lang="de-DE" sz="3200" dirty="0" smtClean="0"/>
+          </a:p>
+          <a:p>
+            <a:pPr algn="ctr"/>
+            <a:r>
+              <a:rPr lang="de-DE" sz="3200" dirty="0" err="1" smtClean="0"/>
+              <a:t>Contact</a:t>
+            </a:r>
+            <a:r>
+              <a:rPr lang="de-DE" sz="3200" dirty="0" smtClean="0"/>
+              <a:t> </a:t>
+            </a:r>
+            <a:r>
+              <a:rPr lang="de-DE" sz="3200" dirty="0" err="1" smtClean="0"/>
+              <a:t>us</a:t>
+            </a:r>
+            <a:r>
+              <a:rPr lang="de-DE" sz="3200" dirty="0" smtClean="0"/>
+              <a:t>!</a:t>
+            </a:r>
+            <a:endParaRPr lang="de-DE" sz="3200" dirty="0" smtClean="0"/>
+          </a:p>
+        </p:txBody>
+      </p:sp>
+    </p:spTree>
+    <p:extLst>
+      <p:ext uri="{BB962C8B-B14F-4D97-AF65-F5344CB8AC3E}">
+        <p14:creationId xmlns:p14="http://schemas.microsoft.com/office/powerpoint/2010/main" val="3931874477"/>
+      </p:ext>
+    </p:extLst>
+  </p:cSld>
+  <p:clrMapOvr>
+    <a:masterClrMapping/>
+  </p:clrMapOvr>
+  <p:timing>
+    <p:tnLst>
+      <p:par>
+        <p:cTn id="1" dur="indefinite" restart="never" nodeType="tmRoot"/>
+      </p:par>
+    </p:tnLst>
+  </p:timing>
+</p:sld>
+</file>
+
+<file path=ppt/slides/slide11.xml><?xml version="1.0" encoding="utf-8"?>
 <p:sld xmlns:a="http://schemas.openxmlformats.org/drawingml/2006/main" xmlns:r="http://schemas.openxmlformats.org/officeDocument/2006/relationships" xmlns:p="http://schemas.openxmlformats.org/presentationml/2006/main">
   <p:cSld>
     <p:spTree>
@@ -8163,7 +8713,7 @@
           <a:noFill/>
           <a:extLst>
             <a:ext uri="{909E8E84-426E-40dd-AFC4-6F175D3DCCD1}">
-              <a14:hiddenFill xmlns:a14="http://schemas.microsoft.com/office/drawing/2010/main">
+              <a14:hiddenFill xmlns:a14="http://schemas.microsoft.com/office/drawing/2010/main" xmlns="">
                 <a:solidFill>
                   <a:srgbClr val="FFFFFF"/>
                 </a:solidFill>
@@ -8204,7 +8754,7 @@
           <a:noFill/>
           <a:extLst>
             <a:ext uri="{909E8E84-426E-40dd-AFC4-6F175D3DCCD1}">
-              <a14:hiddenFill xmlns:a14="http://schemas.microsoft.com/office/drawing/2010/main">
+              <a14:hiddenFill xmlns:a14="http://schemas.microsoft.com/office/drawing/2010/main" xmlns="">
                 <a:solidFill>
                   <a:srgbClr val="FFFFFF"/>
                 </a:solidFill>
@@ -8494,341 +9044,7 @@
   <p:timing>
     <p:tnLst>
       <p:par>
-        <p:cTn xmlns:p14="http://schemas.microsoft.com/office/powerpoint/2010/main" id="1" dur="indefinite" restart="never" nodeType="tmRoot"/>
-      </p:par>
-    </p:tnLst>
-  </p:timing>
-</p:sld>
-</file>
-
-<file path=ppt/slides/slide11.xml><?xml version="1.0" encoding="utf-8"?>
-<p:sld xmlns:a="http://schemas.openxmlformats.org/drawingml/2006/main" xmlns:r="http://schemas.openxmlformats.org/officeDocument/2006/relationships" xmlns:p="http://schemas.openxmlformats.org/presentationml/2006/main">
-  <p:cSld>
-    <p:spTree>
-      <p:nvGrpSpPr>
-        <p:cNvPr id="1" name=""/>
-        <p:cNvGrpSpPr/>
-        <p:nvPr/>
-      </p:nvGrpSpPr>
-      <p:grpSpPr>
-        <a:xfrm>
-          <a:off x="0" y="0"/>
-          <a:ext cx="0" cy="0"/>
-          <a:chOff x="0" y="0"/>
-          <a:chExt cx="0" cy="0"/>
-        </a:xfrm>
-      </p:grpSpPr>
-      <p:pic>
-        <p:nvPicPr>
-          <p:cNvPr id="4" name="Inhaltsplatzhalter 3"/>
-          <p:cNvPicPr>
-            <a:picLocks noGrp="1" noChangeAspect="1"/>
-          </p:cNvPicPr>
-          <p:nvPr>
-            <p:ph idx="1"/>
-          </p:nvPr>
-        </p:nvPicPr>
-        <p:blipFill>
-          <a:blip r:embed="rId2">
-            <a:extLst>
-              <a:ext uri="{28A0092B-C50C-407E-A947-70E740481C1C}">
-                <a14:useLocalDpi xmlns:a14="http://schemas.microsoft.com/office/drawing/2010/main" val="0"/>
-              </a:ext>
-            </a:extLst>
-          </a:blip>
-          <a:stretch>
-            <a:fillRect/>
-          </a:stretch>
-        </p:blipFill>
-        <p:spPr>
-          <a:xfrm>
-            <a:off x="3325091" y="589467"/>
-            <a:ext cx="5458042" cy="5458042"/>
-          </a:xfrm>
-        </p:spPr>
-      </p:pic>
-      <p:sp>
-        <p:nvSpPr>
-          <p:cNvPr id="6" name="Inhaltsplatzhalter 2"/>
-          <p:cNvSpPr txBox="1">
-            <a:spLocks/>
-          </p:cNvSpPr>
-          <p:nvPr/>
-        </p:nvSpPr>
-        <p:spPr>
-          <a:xfrm>
-            <a:off x="8137451" y="-41565"/>
-            <a:ext cx="4054549" cy="370610"/>
-          </a:xfrm>
-          <a:prstGeom prst="rect">
-            <a:avLst/>
-          </a:prstGeom>
-        </p:spPr>
-        <p:txBody>
-          <a:bodyPr vert="horz" lIns="91440" tIns="45720" rIns="91440" bIns="45720" rtlCol="0" anchor="ctr">
-            <a:normAutofit/>
-          </a:bodyPr>
-          <a:lstStyle>
-            <a:lvl1pPr marL="285750" indent="-285750" algn="l" defTabSz="457200" rtl="0" eaLnBrk="1" latinLnBrk="0" hangingPunct="1">
-              <a:spcBef>
-                <a:spcPct val="20000"/>
-              </a:spcBef>
-              <a:spcAft>
-                <a:spcPts val="600"/>
-              </a:spcAft>
-              <a:buClr>
-                <a:schemeClr val="accent1">
-                  <a:lumMod val="75000"/>
-                </a:schemeClr>
-              </a:buClr>
-              <a:buSzPct val="145000"/>
-              <a:buFont typeface="Arial"/>
-              <a:buChar char="•"/>
-              <a:defRPr sz="2400" kern="1200" cap="none">
-                <a:solidFill>
-                  <a:schemeClr val="tx1"/>
-                </a:solidFill>
-                <a:effectLst/>
-                <a:latin typeface="+mn-lt"/>
-                <a:ea typeface="+mn-ea"/>
-                <a:cs typeface="+mn-cs"/>
-              </a:defRPr>
-            </a:lvl1pPr>
-            <a:lvl2pPr marL="742950" indent="-285750" algn="l" defTabSz="457200" rtl="0" eaLnBrk="1" latinLnBrk="0" hangingPunct="1">
-              <a:spcBef>
-                <a:spcPct val="20000"/>
-              </a:spcBef>
-              <a:spcAft>
-                <a:spcPts val="600"/>
-              </a:spcAft>
-              <a:buClr>
-                <a:schemeClr val="accent1">
-                  <a:lumMod val="75000"/>
-                </a:schemeClr>
-              </a:buClr>
-              <a:buSzPct val="145000"/>
-              <a:buFont typeface="Arial"/>
-              <a:buChar char="•"/>
-              <a:defRPr sz="2000" kern="1200" cap="none">
-                <a:solidFill>
-                  <a:schemeClr val="tx1"/>
-                </a:solidFill>
-                <a:effectLst/>
-                <a:latin typeface="+mn-lt"/>
-                <a:ea typeface="+mn-ea"/>
-                <a:cs typeface="+mn-cs"/>
-              </a:defRPr>
-            </a:lvl2pPr>
-            <a:lvl3pPr marL="1200150" indent="-285750" algn="l" defTabSz="457200" rtl="0" eaLnBrk="1" latinLnBrk="0" hangingPunct="1">
-              <a:spcBef>
-                <a:spcPct val="20000"/>
-              </a:spcBef>
-              <a:spcAft>
-                <a:spcPts val="600"/>
-              </a:spcAft>
-              <a:buClr>
-                <a:schemeClr val="accent1">
-                  <a:lumMod val="75000"/>
-                </a:schemeClr>
-              </a:buClr>
-              <a:buSzPct val="145000"/>
-              <a:buFont typeface="Arial"/>
-              <a:buChar char="•"/>
-              <a:defRPr sz="1800" kern="1200" cap="none">
-                <a:solidFill>
-                  <a:schemeClr val="tx1"/>
-                </a:solidFill>
-                <a:effectLst/>
-                <a:latin typeface="+mn-lt"/>
-                <a:ea typeface="+mn-ea"/>
-                <a:cs typeface="+mn-cs"/>
-              </a:defRPr>
-            </a:lvl3pPr>
-            <a:lvl4pPr marL="1543050" indent="-171450" algn="l" defTabSz="457200" rtl="0" eaLnBrk="1" latinLnBrk="0" hangingPunct="1">
-              <a:spcBef>
-                <a:spcPct val="20000"/>
-              </a:spcBef>
-              <a:spcAft>
-                <a:spcPts val="600"/>
-              </a:spcAft>
-              <a:buClr>
-                <a:schemeClr val="accent1">
-                  <a:lumMod val="75000"/>
-                </a:schemeClr>
-              </a:buClr>
-              <a:buSzPct val="145000"/>
-              <a:buFont typeface="Arial"/>
-              <a:buChar char="•"/>
-              <a:defRPr sz="1600" kern="1200" cap="none">
-                <a:solidFill>
-                  <a:schemeClr val="tx1"/>
-                </a:solidFill>
-                <a:effectLst/>
-                <a:latin typeface="+mn-lt"/>
-                <a:ea typeface="+mn-ea"/>
-                <a:cs typeface="+mn-cs"/>
-              </a:defRPr>
-            </a:lvl4pPr>
-            <a:lvl5pPr marL="2000250" indent="-171450" algn="l" defTabSz="457200" rtl="0" eaLnBrk="1" latinLnBrk="0" hangingPunct="1">
-              <a:spcBef>
-                <a:spcPct val="20000"/>
-              </a:spcBef>
-              <a:spcAft>
-                <a:spcPts val="600"/>
-              </a:spcAft>
-              <a:buClr>
-                <a:schemeClr val="accent1">
-                  <a:lumMod val="75000"/>
-                </a:schemeClr>
-              </a:buClr>
-              <a:buSzPct val="145000"/>
-              <a:buFont typeface="Arial"/>
-              <a:buChar char="•"/>
-              <a:defRPr sz="1400" kern="1200" cap="none">
-                <a:solidFill>
-                  <a:schemeClr val="tx1"/>
-                </a:solidFill>
-                <a:effectLst/>
-                <a:latin typeface="+mn-lt"/>
-                <a:ea typeface="+mn-ea"/>
-                <a:cs typeface="+mn-cs"/>
-              </a:defRPr>
-            </a:lvl5pPr>
-            <a:lvl6pPr marL="2514600" indent="-228600" algn="l" defTabSz="457200" rtl="0" eaLnBrk="1" latinLnBrk="0" hangingPunct="1">
-              <a:spcBef>
-                <a:spcPct val="20000"/>
-              </a:spcBef>
-              <a:spcAft>
-                <a:spcPts val="600"/>
-              </a:spcAft>
-              <a:buClr>
-                <a:schemeClr val="accent1">
-                  <a:lumMod val="75000"/>
-                </a:schemeClr>
-              </a:buClr>
-              <a:buSzPct val="145000"/>
-              <a:buFont typeface="Arial"/>
-              <a:buChar char="•"/>
-              <a:defRPr sz="1400" kern="1200" cap="none">
-                <a:solidFill>
-                  <a:schemeClr val="tx1"/>
-                </a:solidFill>
-                <a:effectLst/>
-                <a:latin typeface="+mn-lt"/>
-                <a:ea typeface="+mn-ea"/>
-                <a:cs typeface="+mn-cs"/>
-              </a:defRPr>
-            </a:lvl6pPr>
-            <a:lvl7pPr marL="2971800" indent="-228600" algn="l" defTabSz="457200" rtl="0" eaLnBrk="1" latinLnBrk="0" hangingPunct="1">
-              <a:spcBef>
-                <a:spcPct val="20000"/>
-              </a:spcBef>
-              <a:spcAft>
-                <a:spcPts val="600"/>
-              </a:spcAft>
-              <a:buClr>
-                <a:schemeClr val="accent1">
-                  <a:lumMod val="75000"/>
-                </a:schemeClr>
-              </a:buClr>
-              <a:buSzPct val="145000"/>
-              <a:buFont typeface="Arial"/>
-              <a:buChar char="•"/>
-              <a:defRPr sz="1400" kern="1200" cap="none">
-                <a:solidFill>
-                  <a:schemeClr val="tx1"/>
-                </a:solidFill>
-                <a:effectLst/>
-                <a:latin typeface="+mn-lt"/>
-                <a:ea typeface="+mn-ea"/>
-                <a:cs typeface="+mn-cs"/>
-              </a:defRPr>
-            </a:lvl7pPr>
-            <a:lvl8pPr marL="3429000" indent="-228600" algn="l" defTabSz="457200" rtl="0" eaLnBrk="1" latinLnBrk="0" hangingPunct="1">
-              <a:spcBef>
-                <a:spcPct val="20000"/>
-              </a:spcBef>
-              <a:spcAft>
-                <a:spcPts val="600"/>
-              </a:spcAft>
-              <a:buClr>
-                <a:schemeClr val="accent1">
-                  <a:lumMod val="75000"/>
-                </a:schemeClr>
-              </a:buClr>
-              <a:buSzPct val="145000"/>
-              <a:buFont typeface="Arial"/>
-              <a:buChar char="•"/>
-              <a:defRPr sz="1400" kern="1200" cap="none">
-                <a:solidFill>
-                  <a:schemeClr val="tx1"/>
-                </a:solidFill>
-                <a:effectLst/>
-                <a:latin typeface="+mn-lt"/>
-                <a:ea typeface="+mn-ea"/>
-                <a:cs typeface="+mn-cs"/>
-              </a:defRPr>
-            </a:lvl8pPr>
-            <a:lvl9pPr marL="3886200" indent="-228600" algn="l" defTabSz="457200" rtl="0" eaLnBrk="1" latinLnBrk="0" hangingPunct="1">
-              <a:spcBef>
-                <a:spcPct val="20000"/>
-              </a:spcBef>
-              <a:spcAft>
-                <a:spcPts val="600"/>
-              </a:spcAft>
-              <a:buClr>
-                <a:schemeClr val="accent1">
-                  <a:lumMod val="75000"/>
-                </a:schemeClr>
-              </a:buClr>
-              <a:buSzPct val="145000"/>
-              <a:buFont typeface="Arial"/>
-              <a:buChar char="•"/>
-              <a:defRPr sz="1400" kern="1200" cap="none">
-                <a:solidFill>
-                  <a:schemeClr val="tx1"/>
-                </a:solidFill>
-                <a:effectLst/>
-                <a:latin typeface="+mn-lt"/>
-                <a:ea typeface="+mn-ea"/>
-                <a:cs typeface="+mn-cs"/>
-              </a:defRPr>
-            </a:lvl9pPr>
-          </a:lstStyle>
-          <a:p>
-            <a:pPr marL="0" indent="0">
-              <a:buNone/>
-            </a:pPr>
-            <a:r>
-              <a:rPr lang="de-DE" sz="1000" dirty="0" smtClean="0"/>
-              <a:t>Rem0 Röthlisberger, Eric </a:t>
-            </a:r>
-            <a:r>
-              <a:rPr lang="de-DE" sz="1000" dirty="0" err="1" smtClean="0"/>
-              <a:t>Lagger</a:t>
-            </a:r>
-            <a:r>
-              <a:rPr lang="de-DE" sz="1000" dirty="0" smtClean="0"/>
-              <a:t>, Vincent Hofer, Dean Klopsch, Aebi Ryan</a:t>
-            </a:r>
-            <a:endParaRPr lang="de-DE" sz="1000" dirty="0"/>
-          </a:p>
-        </p:txBody>
-      </p:sp>
-    </p:spTree>
-    <p:extLst>
-      <p:ext uri="{BB962C8B-B14F-4D97-AF65-F5344CB8AC3E}">
-        <p14:creationId xmlns:p14="http://schemas.microsoft.com/office/powerpoint/2010/main" val="4059518843"/>
-      </p:ext>
-    </p:extLst>
-  </p:cSld>
-  <p:clrMapOvr>
-    <a:masterClrMapping/>
-  </p:clrMapOvr>
-  <p:timing>
-    <p:tnLst>
-      <p:par>
-        <p:cTn xmlns:p14="http://schemas.microsoft.com/office/powerpoint/2010/main" id="1" dur="indefinite" restart="never" nodeType="tmRoot"/>
+        <p:cTn id="1" dur="indefinite" restart="never" nodeType="tmRoot"/>
       </p:par>
     </p:tnLst>
   </p:timing>
@@ -9280,7 +9496,7 @@
   <p:timing>
     <p:tnLst>
       <p:par>
-        <p:cTn xmlns:p14="http://schemas.microsoft.com/office/powerpoint/2010/main" id="1" dur="indefinite" restart="never" nodeType="tmRoot"/>
+        <p:cTn id="1" dur="indefinite" restart="never" nodeType="tmRoot"/>
       </p:par>
     </p:tnLst>
   </p:timing>
@@ -9518,6 +9734,13 @@
   <p:clrMapOvr>
     <a:masterClrMapping/>
   </p:clrMapOvr>
+  <p:timing>
+    <p:tnLst>
+      <p:par>
+        <p:cTn id="1" dur="indefinite" restart="never" nodeType="tmRoot"/>
+      </p:par>
+    </p:tnLst>
+  </p:timing>
 </p:sld>
 </file>
 
@@ -9578,6 +9801,13 @@
   <p:clrMapOvr>
     <a:masterClrMapping/>
   </p:clrMapOvr>
+  <p:timing>
+    <p:tnLst>
+      <p:par>
+        <p:cTn id="1" dur="indefinite" restart="never" nodeType="tmRoot"/>
+      </p:par>
+    </p:tnLst>
+  </p:timing>
 </p:sld>
 </file>
 
@@ -10166,7 +10396,7 @@
   <p:timing>
     <p:tnLst>
       <p:par>
-        <p:cTn xmlns:p14="http://schemas.microsoft.com/office/powerpoint/2010/main" id="1" dur="indefinite" restart="never" nodeType="tmRoot"/>
+        <p:cTn id="1" dur="indefinite" restart="never" nodeType="tmRoot"/>
       </p:par>
     </p:tnLst>
   </p:timing>
@@ -10956,7 +11186,7 @@
   <p:timing>
     <p:tnLst>
       <p:par>
-        <p:cTn xmlns:p14="http://schemas.microsoft.com/office/powerpoint/2010/main" id="1" dur="indefinite" restart="never" nodeType="tmRoot"/>
+        <p:cTn id="1" dur="indefinite" restart="never" nodeType="tmRoot"/>
       </p:par>
     </p:tnLst>
   </p:timing>
@@ -11724,7 +11954,7 @@
   <p:timing>
     <p:tnLst>
       <p:par>
-        <p:cTn xmlns:p14="http://schemas.microsoft.com/office/powerpoint/2010/main" id="1" dur="indefinite" restart="never" nodeType="tmRoot"/>
+        <p:cTn id="1" dur="indefinite" restart="never" nodeType="tmRoot"/>
       </p:par>
     </p:tnLst>
   </p:timing>
@@ -12486,7 +12716,7 @@
   <p:timing>
     <p:tnLst>
       <p:par>
-        <p:cTn xmlns:p14="http://schemas.microsoft.com/office/powerpoint/2010/main" id="1" dur="indefinite" restart="never" nodeType="tmRoot"/>
+        <p:cTn id="1" dur="indefinite" restart="never" nodeType="tmRoot"/>
       </p:par>
     </p:tnLst>
   </p:timing>
@@ -13335,7 +13565,7 @@
   <p:timing>
     <p:tnLst>
       <p:par>
-        <p:cTn xmlns:p14="http://schemas.microsoft.com/office/powerpoint/2010/main" id="1" dur="indefinite" restart="never" nodeType="tmRoot"/>
+        <p:cTn id="1" dur="indefinite" restart="never" nodeType="tmRoot"/>
       </p:par>
     </p:tnLst>
   </p:timing>
@@ -13592,7 +13822,7 @@
   <a:extraClrSchemeLst/>
   <a:extLst>
     <a:ext uri="{05A4C25C-085E-4340-85A3-A5531E510DB2}">
-      <thm15:themeFamily xmlns="" xmlns:thm15="http://schemas.microsoft.com/office/thememl/2012/main" name="Parallax" id="{3388167B-A2EB-4685-9635-1831D9AEF8C4}" vid="{4F7A876A-7598-49CA-AFC8-8EDA2551E4A7}"/>
+      <thm15:themeFamily xmlns:thm15="http://schemas.microsoft.com/office/thememl/2012/main" name="Parallax" id="{3388167B-A2EB-4685-9635-1831D9AEF8C4}" vid="{4F7A876A-7598-49CA-AFC8-8EDA2551E4A7}"/>
     </a:ext>
   </a:extLst>
 </a:theme>

</xml_diff>

<commit_message>
added a few pictures to the presentation and in the presentation folder
</commit_message>
<xml_diff>
--- a/baseProject/presentation/Presentation-Team8.pptx
+++ b/baseProject/presentation/Presentation-Team8.pptx
@@ -5,7 +5,7 @@
     <p:sldMasterId id="2147483648" r:id="rId1"/>
   </p:sldMasterIdLst>
   <p:notesMasterIdLst>
-    <p:notesMasterId r:id="rId13"/>
+    <p:notesMasterId r:id="rId20"/>
   </p:notesMasterIdLst>
   <p:sldIdLst>
     <p:sldId id="256" r:id="rId2"/>
@@ -18,7 +18,14 @@
     <p:sldId id="268" r:id="rId9"/>
     <p:sldId id="269" r:id="rId10"/>
     <p:sldId id="274" r:id="rId11"/>
-    <p:sldId id="263" r:id="rId12"/>
+    <p:sldId id="275" r:id="rId12"/>
+    <p:sldId id="277" r:id="rId13"/>
+    <p:sldId id="278" r:id="rId14"/>
+    <p:sldId id="279" r:id="rId15"/>
+    <p:sldId id="280" r:id="rId16"/>
+    <p:sldId id="281" r:id="rId17"/>
+    <p:sldId id="276" r:id="rId18"/>
+    <p:sldId id="263" r:id="rId19"/>
   </p:sldIdLst>
   <p:sldSz cx="12192000" cy="6858000"/>
   <p:notesSz cx="6858000" cy="9144000"/>
@@ -148,6 +155,13 @@
         <p14:section name="Why us" id="{BE86CB87-125B-42C6-9C31-F3CD9D8CE1DC}">
           <p14:sldIdLst>
             <p14:sldId id="274"/>
+            <p14:sldId id="275"/>
+            <p14:sldId id="277"/>
+            <p14:sldId id="278"/>
+            <p14:sldId id="279"/>
+            <p14:sldId id="280"/>
+            <p14:sldId id="281"/>
+            <p14:sldId id="276"/>
           </p14:sldIdLst>
         </p14:section>
         <p14:section name="Questions" id="{58102800-2E6E-4D72-AC91-8B0151A06D05}">
@@ -257,7 +271,7 @@
           <a:p>
             <a:fld id="{AD788536-914B-4640-862E-1D3DAE36BE3D}" type="datetimeFigureOut">
               <a:rPr lang="de-DE" smtClean="0"/>
-              <a:t>12.12.2016</a:t>
+              <a:t>13.12.2016</a:t>
             </a:fld>
             <a:endParaRPr lang="de-DE"/>
           </a:p>
@@ -613,6 +627,342 @@
 </p:notes>
 </file>
 
+<file path=ppt/notesSlides/notesSlide10.xml><?xml version="1.0" encoding="utf-8"?>
+<p:notes xmlns:a="http://schemas.openxmlformats.org/drawingml/2006/main" xmlns:r="http://schemas.openxmlformats.org/officeDocument/2006/relationships" xmlns:p="http://schemas.openxmlformats.org/presentationml/2006/main">
+  <p:cSld>
+    <p:spTree>
+      <p:nvGrpSpPr>
+        <p:cNvPr id="1" name=""/>
+        <p:cNvGrpSpPr/>
+        <p:nvPr/>
+      </p:nvGrpSpPr>
+      <p:grpSpPr>
+        <a:xfrm>
+          <a:off x="0" y="0"/>
+          <a:ext cx="0" cy="0"/>
+          <a:chOff x="0" y="0"/>
+          <a:chExt cx="0" cy="0"/>
+        </a:xfrm>
+      </p:grpSpPr>
+      <p:sp>
+        <p:nvSpPr>
+          <p:cNvPr id="2" name="Folienbildplatzhalter 1"/>
+          <p:cNvSpPr>
+            <a:spLocks noGrp="1" noRot="1" noChangeAspect="1"/>
+          </p:cNvSpPr>
+          <p:nvPr>
+            <p:ph type="sldImg"/>
+          </p:nvPr>
+        </p:nvSpPr>
+        <p:spPr/>
+      </p:sp>
+      <p:sp>
+        <p:nvSpPr>
+          <p:cNvPr id="3" name="Notizenplatzhalter 2"/>
+          <p:cNvSpPr>
+            <a:spLocks noGrp="1"/>
+          </p:cNvSpPr>
+          <p:nvPr>
+            <p:ph type="body" idx="1"/>
+          </p:nvPr>
+        </p:nvSpPr>
+        <p:spPr/>
+        <p:txBody>
+          <a:bodyPr/>
+          <a:lstStyle/>
+          <a:p>
+            <a:endParaRPr lang="de-CH" dirty="0"/>
+          </a:p>
+        </p:txBody>
+      </p:sp>
+      <p:sp>
+        <p:nvSpPr>
+          <p:cNvPr id="4" name="Foliennummernplatzhalter 3"/>
+          <p:cNvSpPr>
+            <a:spLocks noGrp="1"/>
+          </p:cNvSpPr>
+          <p:nvPr>
+            <p:ph type="sldNum" sz="quarter" idx="10"/>
+          </p:nvPr>
+        </p:nvSpPr>
+        <p:spPr/>
+        <p:txBody>
+          <a:bodyPr/>
+          <a:lstStyle/>
+          <a:p>
+            <a:fld id="{2F2847E0-1D0A-0F4B-99C8-E51199A5987D}" type="slidenum">
+              <a:rPr lang="de-DE" smtClean="0"/>
+              <a:t>14</a:t>
+            </a:fld>
+            <a:endParaRPr lang="de-DE"/>
+          </a:p>
+        </p:txBody>
+      </p:sp>
+    </p:spTree>
+    <p:extLst>
+      <p:ext uri="{BB962C8B-B14F-4D97-AF65-F5344CB8AC3E}">
+        <p14:creationId xmlns:p14="http://schemas.microsoft.com/office/powerpoint/2010/main" val="596410252"/>
+      </p:ext>
+    </p:extLst>
+  </p:cSld>
+  <p:clrMapOvr>
+    <a:masterClrMapping/>
+  </p:clrMapOvr>
+</p:notes>
+</file>
+
+<file path=ppt/notesSlides/notesSlide11.xml><?xml version="1.0" encoding="utf-8"?>
+<p:notes xmlns:a="http://schemas.openxmlformats.org/drawingml/2006/main" xmlns:r="http://schemas.openxmlformats.org/officeDocument/2006/relationships" xmlns:p="http://schemas.openxmlformats.org/presentationml/2006/main">
+  <p:cSld>
+    <p:spTree>
+      <p:nvGrpSpPr>
+        <p:cNvPr id="1" name=""/>
+        <p:cNvGrpSpPr/>
+        <p:nvPr/>
+      </p:nvGrpSpPr>
+      <p:grpSpPr>
+        <a:xfrm>
+          <a:off x="0" y="0"/>
+          <a:ext cx="0" cy="0"/>
+          <a:chOff x="0" y="0"/>
+          <a:chExt cx="0" cy="0"/>
+        </a:xfrm>
+      </p:grpSpPr>
+      <p:sp>
+        <p:nvSpPr>
+          <p:cNvPr id="2" name="Folienbildplatzhalter 1"/>
+          <p:cNvSpPr>
+            <a:spLocks noGrp="1" noRot="1" noChangeAspect="1"/>
+          </p:cNvSpPr>
+          <p:nvPr>
+            <p:ph type="sldImg"/>
+          </p:nvPr>
+        </p:nvSpPr>
+        <p:spPr/>
+      </p:sp>
+      <p:sp>
+        <p:nvSpPr>
+          <p:cNvPr id="3" name="Notizenplatzhalter 2"/>
+          <p:cNvSpPr>
+            <a:spLocks noGrp="1"/>
+          </p:cNvSpPr>
+          <p:nvPr>
+            <p:ph type="body" idx="1"/>
+          </p:nvPr>
+        </p:nvSpPr>
+        <p:spPr/>
+        <p:txBody>
+          <a:bodyPr/>
+          <a:lstStyle/>
+          <a:p>
+            <a:endParaRPr lang="de-CH" dirty="0"/>
+          </a:p>
+        </p:txBody>
+      </p:sp>
+      <p:sp>
+        <p:nvSpPr>
+          <p:cNvPr id="4" name="Foliennummernplatzhalter 3"/>
+          <p:cNvSpPr>
+            <a:spLocks noGrp="1"/>
+          </p:cNvSpPr>
+          <p:nvPr>
+            <p:ph type="sldNum" sz="quarter" idx="10"/>
+          </p:nvPr>
+        </p:nvSpPr>
+        <p:spPr/>
+        <p:txBody>
+          <a:bodyPr/>
+          <a:lstStyle/>
+          <a:p>
+            <a:fld id="{2F2847E0-1D0A-0F4B-99C8-E51199A5987D}" type="slidenum">
+              <a:rPr lang="de-DE" smtClean="0"/>
+              <a:t>15</a:t>
+            </a:fld>
+            <a:endParaRPr lang="de-DE"/>
+          </a:p>
+        </p:txBody>
+      </p:sp>
+    </p:spTree>
+    <p:extLst>
+      <p:ext uri="{BB962C8B-B14F-4D97-AF65-F5344CB8AC3E}">
+        <p14:creationId xmlns:p14="http://schemas.microsoft.com/office/powerpoint/2010/main" val="3498534147"/>
+      </p:ext>
+    </p:extLst>
+  </p:cSld>
+  <p:clrMapOvr>
+    <a:masterClrMapping/>
+  </p:clrMapOvr>
+</p:notes>
+</file>
+
+<file path=ppt/notesSlides/notesSlide12.xml><?xml version="1.0" encoding="utf-8"?>
+<p:notes xmlns:a="http://schemas.openxmlformats.org/drawingml/2006/main" xmlns:r="http://schemas.openxmlformats.org/officeDocument/2006/relationships" xmlns:p="http://schemas.openxmlformats.org/presentationml/2006/main">
+  <p:cSld>
+    <p:spTree>
+      <p:nvGrpSpPr>
+        <p:cNvPr id="1" name=""/>
+        <p:cNvGrpSpPr/>
+        <p:nvPr/>
+      </p:nvGrpSpPr>
+      <p:grpSpPr>
+        <a:xfrm>
+          <a:off x="0" y="0"/>
+          <a:ext cx="0" cy="0"/>
+          <a:chOff x="0" y="0"/>
+          <a:chExt cx="0" cy="0"/>
+        </a:xfrm>
+      </p:grpSpPr>
+      <p:sp>
+        <p:nvSpPr>
+          <p:cNvPr id="2" name="Folienbildplatzhalter 1"/>
+          <p:cNvSpPr>
+            <a:spLocks noGrp="1" noRot="1" noChangeAspect="1"/>
+          </p:cNvSpPr>
+          <p:nvPr>
+            <p:ph type="sldImg"/>
+          </p:nvPr>
+        </p:nvSpPr>
+        <p:spPr/>
+      </p:sp>
+      <p:sp>
+        <p:nvSpPr>
+          <p:cNvPr id="3" name="Notizenplatzhalter 2"/>
+          <p:cNvSpPr>
+            <a:spLocks noGrp="1"/>
+          </p:cNvSpPr>
+          <p:nvPr>
+            <p:ph type="body" idx="1"/>
+          </p:nvPr>
+        </p:nvSpPr>
+        <p:spPr/>
+        <p:txBody>
+          <a:bodyPr/>
+          <a:lstStyle/>
+          <a:p>
+            <a:endParaRPr lang="de-CH" dirty="0"/>
+          </a:p>
+        </p:txBody>
+      </p:sp>
+      <p:sp>
+        <p:nvSpPr>
+          <p:cNvPr id="4" name="Foliennummernplatzhalter 3"/>
+          <p:cNvSpPr>
+            <a:spLocks noGrp="1"/>
+          </p:cNvSpPr>
+          <p:nvPr>
+            <p:ph type="sldNum" sz="quarter" idx="10"/>
+          </p:nvPr>
+        </p:nvSpPr>
+        <p:spPr/>
+        <p:txBody>
+          <a:bodyPr/>
+          <a:lstStyle/>
+          <a:p>
+            <a:fld id="{2F2847E0-1D0A-0F4B-99C8-E51199A5987D}" type="slidenum">
+              <a:rPr lang="de-DE" smtClean="0"/>
+              <a:t>16</a:t>
+            </a:fld>
+            <a:endParaRPr lang="de-DE"/>
+          </a:p>
+        </p:txBody>
+      </p:sp>
+    </p:spTree>
+    <p:extLst>
+      <p:ext uri="{BB962C8B-B14F-4D97-AF65-F5344CB8AC3E}">
+        <p14:creationId xmlns:p14="http://schemas.microsoft.com/office/powerpoint/2010/main" val="3271108938"/>
+      </p:ext>
+    </p:extLst>
+  </p:cSld>
+  <p:clrMapOvr>
+    <a:masterClrMapping/>
+  </p:clrMapOvr>
+</p:notes>
+</file>
+
+<file path=ppt/notesSlides/notesSlide13.xml><?xml version="1.0" encoding="utf-8"?>
+<p:notes xmlns:a="http://schemas.openxmlformats.org/drawingml/2006/main" xmlns:r="http://schemas.openxmlformats.org/officeDocument/2006/relationships" xmlns:p="http://schemas.openxmlformats.org/presentationml/2006/main">
+  <p:cSld>
+    <p:spTree>
+      <p:nvGrpSpPr>
+        <p:cNvPr id="1" name=""/>
+        <p:cNvGrpSpPr/>
+        <p:nvPr/>
+      </p:nvGrpSpPr>
+      <p:grpSpPr>
+        <a:xfrm>
+          <a:off x="0" y="0"/>
+          <a:ext cx="0" cy="0"/>
+          <a:chOff x="0" y="0"/>
+          <a:chExt cx="0" cy="0"/>
+        </a:xfrm>
+      </p:grpSpPr>
+      <p:sp>
+        <p:nvSpPr>
+          <p:cNvPr id="2" name="Folienbildplatzhalter 1"/>
+          <p:cNvSpPr>
+            <a:spLocks noGrp="1" noRot="1" noChangeAspect="1"/>
+          </p:cNvSpPr>
+          <p:nvPr>
+            <p:ph type="sldImg"/>
+          </p:nvPr>
+        </p:nvSpPr>
+        <p:spPr/>
+      </p:sp>
+      <p:sp>
+        <p:nvSpPr>
+          <p:cNvPr id="3" name="Notizenplatzhalter 2"/>
+          <p:cNvSpPr>
+            <a:spLocks noGrp="1"/>
+          </p:cNvSpPr>
+          <p:nvPr>
+            <p:ph type="body" idx="1"/>
+          </p:nvPr>
+        </p:nvSpPr>
+        <p:spPr/>
+        <p:txBody>
+          <a:bodyPr/>
+          <a:lstStyle/>
+          <a:p>
+            <a:endParaRPr lang="de-CH" dirty="0"/>
+          </a:p>
+        </p:txBody>
+      </p:sp>
+      <p:sp>
+        <p:nvSpPr>
+          <p:cNvPr id="4" name="Foliennummernplatzhalter 3"/>
+          <p:cNvSpPr>
+            <a:spLocks noGrp="1"/>
+          </p:cNvSpPr>
+          <p:nvPr>
+            <p:ph type="sldNum" sz="quarter" idx="10"/>
+          </p:nvPr>
+        </p:nvSpPr>
+        <p:spPr/>
+        <p:txBody>
+          <a:bodyPr/>
+          <a:lstStyle/>
+          <a:p>
+            <a:fld id="{2F2847E0-1D0A-0F4B-99C8-E51199A5987D}" type="slidenum">
+              <a:rPr lang="de-DE" smtClean="0"/>
+              <a:t>17</a:t>
+            </a:fld>
+            <a:endParaRPr lang="de-DE"/>
+          </a:p>
+        </p:txBody>
+      </p:sp>
+    </p:spTree>
+    <p:extLst>
+      <p:ext uri="{BB962C8B-B14F-4D97-AF65-F5344CB8AC3E}">
+        <p14:creationId xmlns:p14="http://schemas.microsoft.com/office/powerpoint/2010/main" val="752542909"/>
+      </p:ext>
+    </p:extLst>
+  </p:cSld>
+  <p:clrMapOvr>
+    <a:masterClrMapping/>
+  </p:clrMapOvr>
+</p:notes>
+</file>
+
 <file path=ppt/notesSlides/notesSlide2.xml><?xml version="1.0" encoding="utf-8"?>
 <p:notes xmlns:a="http://schemas.openxmlformats.org/drawingml/2006/main" xmlns:r="http://schemas.openxmlformats.org/officeDocument/2006/relationships" xmlns:p="http://schemas.openxmlformats.org/presentationml/2006/main">
   <p:cSld>
@@ -1768,6 +2118,258 @@
     <p:extLst>
       <p:ext uri="{BB962C8B-B14F-4D97-AF65-F5344CB8AC3E}">
         <p14:creationId xmlns:p14="http://schemas.microsoft.com/office/powerpoint/2010/main" val="4134227325"/>
+      </p:ext>
+    </p:extLst>
+  </p:cSld>
+  <p:clrMapOvr>
+    <a:masterClrMapping/>
+  </p:clrMapOvr>
+</p:notes>
+</file>
+
+<file path=ppt/notesSlides/notesSlide7.xml><?xml version="1.0" encoding="utf-8"?>
+<p:notes xmlns:a="http://schemas.openxmlformats.org/drawingml/2006/main" xmlns:r="http://schemas.openxmlformats.org/officeDocument/2006/relationships" xmlns:p="http://schemas.openxmlformats.org/presentationml/2006/main">
+  <p:cSld>
+    <p:spTree>
+      <p:nvGrpSpPr>
+        <p:cNvPr id="1" name=""/>
+        <p:cNvGrpSpPr/>
+        <p:nvPr/>
+      </p:nvGrpSpPr>
+      <p:grpSpPr>
+        <a:xfrm>
+          <a:off x="0" y="0"/>
+          <a:ext cx="0" cy="0"/>
+          <a:chOff x="0" y="0"/>
+          <a:chExt cx="0" cy="0"/>
+        </a:xfrm>
+      </p:grpSpPr>
+      <p:sp>
+        <p:nvSpPr>
+          <p:cNvPr id="2" name="Folienbildplatzhalter 1"/>
+          <p:cNvSpPr>
+            <a:spLocks noGrp="1" noRot="1" noChangeAspect="1"/>
+          </p:cNvSpPr>
+          <p:nvPr>
+            <p:ph type="sldImg"/>
+          </p:nvPr>
+        </p:nvSpPr>
+        <p:spPr/>
+      </p:sp>
+      <p:sp>
+        <p:nvSpPr>
+          <p:cNvPr id="3" name="Notizenplatzhalter 2"/>
+          <p:cNvSpPr>
+            <a:spLocks noGrp="1"/>
+          </p:cNvSpPr>
+          <p:nvPr>
+            <p:ph type="body" idx="1"/>
+          </p:nvPr>
+        </p:nvSpPr>
+        <p:spPr/>
+        <p:txBody>
+          <a:bodyPr/>
+          <a:lstStyle/>
+          <a:p>
+            <a:endParaRPr lang="de-CH" dirty="0"/>
+          </a:p>
+        </p:txBody>
+      </p:sp>
+      <p:sp>
+        <p:nvSpPr>
+          <p:cNvPr id="4" name="Foliennummernplatzhalter 3"/>
+          <p:cNvSpPr>
+            <a:spLocks noGrp="1"/>
+          </p:cNvSpPr>
+          <p:nvPr>
+            <p:ph type="sldNum" sz="quarter" idx="10"/>
+          </p:nvPr>
+        </p:nvSpPr>
+        <p:spPr/>
+        <p:txBody>
+          <a:bodyPr/>
+          <a:lstStyle/>
+          <a:p>
+            <a:fld id="{2F2847E0-1D0A-0F4B-99C8-E51199A5987D}" type="slidenum">
+              <a:rPr lang="de-DE" smtClean="0"/>
+              <a:t>11</a:t>
+            </a:fld>
+            <a:endParaRPr lang="de-DE"/>
+          </a:p>
+        </p:txBody>
+      </p:sp>
+    </p:spTree>
+    <p:extLst>
+      <p:ext uri="{BB962C8B-B14F-4D97-AF65-F5344CB8AC3E}">
+        <p14:creationId xmlns:p14="http://schemas.microsoft.com/office/powerpoint/2010/main" val="3158891875"/>
+      </p:ext>
+    </p:extLst>
+  </p:cSld>
+  <p:clrMapOvr>
+    <a:masterClrMapping/>
+  </p:clrMapOvr>
+</p:notes>
+</file>
+
+<file path=ppt/notesSlides/notesSlide8.xml><?xml version="1.0" encoding="utf-8"?>
+<p:notes xmlns:a="http://schemas.openxmlformats.org/drawingml/2006/main" xmlns:r="http://schemas.openxmlformats.org/officeDocument/2006/relationships" xmlns:p="http://schemas.openxmlformats.org/presentationml/2006/main">
+  <p:cSld>
+    <p:spTree>
+      <p:nvGrpSpPr>
+        <p:cNvPr id="1" name=""/>
+        <p:cNvGrpSpPr/>
+        <p:nvPr/>
+      </p:nvGrpSpPr>
+      <p:grpSpPr>
+        <a:xfrm>
+          <a:off x="0" y="0"/>
+          <a:ext cx="0" cy="0"/>
+          <a:chOff x="0" y="0"/>
+          <a:chExt cx="0" cy="0"/>
+        </a:xfrm>
+      </p:grpSpPr>
+      <p:sp>
+        <p:nvSpPr>
+          <p:cNvPr id="2" name="Folienbildplatzhalter 1"/>
+          <p:cNvSpPr>
+            <a:spLocks noGrp="1" noRot="1" noChangeAspect="1"/>
+          </p:cNvSpPr>
+          <p:nvPr>
+            <p:ph type="sldImg"/>
+          </p:nvPr>
+        </p:nvSpPr>
+        <p:spPr/>
+      </p:sp>
+      <p:sp>
+        <p:nvSpPr>
+          <p:cNvPr id="3" name="Notizenplatzhalter 2"/>
+          <p:cNvSpPr>
+            <a:spLocks noGrp="1"/>
+          </p:cNvSpPr>
+          <p:nvPr>
+            <p:ph type="body" idx="1"/>
+          </p:nvPr>
+        </p:nvSpPr>
+        <p:spPr/>
+        <p:txBody>
+          <a:bodyPr/>
+          <a:lstStyle/>
+          <a:p>
+            <a:endParaRPr lang="de-CH" dirty="0"/>
+          </a:p>
+        </p:txBody>
+      </p:sp>
+      <p:sp>
+        <p:nvSpPr>
+          <p:cNvPr id="4" name="Foliennummernplatzhalter 3"/>
+          <p:cNvSpPr>
+            <a:spLocks noGrp="1"/>
+          </p:cNvSpPr>
+          <p:nvPr>
+            <p:ph type="sldNum" sz="quarter" idx="10"/>
+          </p:nvPr>
+        </p:nvSpPr>
+        <p:spPr/>
+        <p:txBody>
+          <a:bodyPr/>
+          <a:lstStyle/>
+          <a:p>
+            <a:fld id="{2F2847E0-1D0A-0F4B-99C8-E51199A5987D}" type="slidenum">
+              <a:rPr lang="de-DE" smtClean="0"/>
+              <a:t>12</a:t>
+            </a:fld>
+            <a:endParaRPr lang="de-DE"/>
+          </a:p>
+        </p:txBody>
+      </p:sp>
+    </p:spTree>
+    <p:extLst>
+      <p:ext uri="{BB962C8B-B14F-4D97-AF65-F5344CB8AC3E}">
+        <p14:creationId xmlns:p14="http://schemas.microsoft.com/office/powerpoint/2010/main" val="3346829843"/>
+      </p:ext>
+    </p:extLst>
+  </p:cSld>
+  <p:clrMapOvr>
+    <a:masterClrMapping/>
+  </p:clrMapOvr>
+</p:notes>
+</file>
+
+<file path=ppt/notesSlides/notesSlide9.xml><?xml version="1.0" encoding="utf-8"?>
+<p:notes xmlns:a="http://schemas.openxmlformats.org/drawingml/2006/main" xmlns:r="http://schemas.openxmlformats.org/officeDocument/2006/relationships" xmlns:p="http://schemas.openxmlformats.org/presentationml/2006/main">
+  <p:cSld>
+    <p:spTree>
+      <p:nvGrpSpPr>
+        <p:cNvPr id="1" name=""/>
+        <p:cNvGrpSpPr/>
+        <p:nvPr/>
+      </p:nvGrpSpPr>
+      <p:grpSpPr>
+        <a:xfrm>
+          <a:off x="0" y="0"/>
+          <a:ext cx="0" cy="0"/>
+          <a:chOff x="0" y="0"/>
+          <a:chExt cx="0" cy="0"/>
+        </a:xfrm>
+      </p:grpSpPr>
+      <p:sp>
+        <p:nvSpPr>
+          <p:cNvPr id="2" name="Folienbildplatzhalter 1"/>
+          <p:cNvSpPr>
+            <a:spLocks noGrp="1" noRot="1" noChangeAspect="1"/>
+          </p:cNvSpPr>
+          <p:nvPr>
+            <p:ph type="sldImg"/>
+          </p:nvPr>
+        </p:nvSpPr>
+        <p:spPr/>
+      </p:sp>
+      <p:sp>
+        <p:nvSpPr>
+          <p:cNvPr id="3" name="Notizenplatzhalter 2"/>
+          <p:cNvSpPr>
+            <a:spLocks noGrp="1"/>
+          </p:cNvSpPr>
+          <p:nvPr>
+            <p:ph type="body" idx="1"/>
+          </p:nvPr>
+        </p:nvSpPr>
+        <p:spPr/>
+        <p:txBody>
+          <a:bodyPr/>
+          <a:lstStyle/>
+          <a:p>
+            <a:endParaRPr lang="de-CH" dirty="0"/>
+          </a:p>
+        </p:txBody>
+      </p:sp>
+      <p:sp>
+        <p:nvSpPr>
+          <p:cNvPr id="4" name="Foliennummernplatzhalter 3"/>
+          <p:cNvSpPr>
+            <a:spLocks noGrp="1"/>
+          </p:cNvSpPr>
+          <p:nvPr>
+            <p:ph type="sldNum" sz="quarter" idx="10"/>
+          </p:nvPr>
+        </p:nvSpPr>
+        <p:spPr/>
+        <p:txBody>
+          <a:bodyPr/>
+          <a:lstStyle/>
+          <a:p>
+            <a:fld id="{2F2847E0-1D0A-0F4B-99C8-E51199A5987D}" type="slidenum">
+              <a:rPr lang="de-DE" smtClean="0"/>
+              <a:t>13</a:t>
+            </a:fld>
+            <a:endParaRPr lang="de-DE"/>
+          </a:p>
+        </p:txBody>
+      </p:sp>
+    </p:spTree>
+    <p:extLst>
+      <p:ext uri="{BB962C8B-B14F-4D97-AF65-F5344CB8AC3E}">
+        <p14:creationId xmlns:p14="http://schemas.microsoft.com/office/powerpoint/2010/main" val="328781153"/>
       </p:ext>
     </p:extLst>
   </p:cSld>
@@ -2280,7 +2882,7 @@
             <a:fld id="{B61BEF0D-F0BB-DE4B-95CE-6DB70DBA9567}" type="datetimeFigureOut">
               <a:rPr lang="en-US" dirty="0"/>
               <a:pPr/>
-              <a:t>12/12/2016</a:t>
+              <a:t>12/13/2016</a:t>
             </a:fld>
             <a:endParaRPr lang="en-US" dirty="0"/>
           </a:p>
@@ -2573,7 +3175,7 @@
             <a:fld id="{B61BEF0D-F0BB-DE4B-95CE-6DB70DBA9567}" type="datetimeFigureOut">
               <a:rPr lang="en-US" dirty="0"/>
               <a:pPr/>
-              <a:t>12/12/2016</a:t>
+              <a:t>12/13/2016</a:t>
             </a:fld>
             <a:endParaRPr lang="en-US" dirty="0"/>
           </a:p>
@@ -2818,7 +3420,7 @@
             <a:fld id="{B61BEF0D-F0BB-DE4B-95CE-6DB70DBA9567}" type="datetimeFigureOut">
               <a:rPr lang="en-US" dirty="0"/>
               <a:pPr/>
-              <a:t>12/12/2016</a:t>
+              <a:t>12/13/2016</a:t>
             </a:fld>
             <a:endParaRPr lang="en-US" dirty="0"/>
           </a:p>
@@ -3355,7 +3957,7 @@
             <a:fld id="{B61BEF0D-F0BB-DE4B-95CE-6DB70DBA9567}" type="datetimeFigureOut">
               <a:rPr lang="en-US" dirty="0"/>
               <a:pPr/>
-              <a:t>12/12/2016</a:t>
+              <a:t>12/13/2016</a:t>
             </a:fld>
             <a:endParaRPr lang="en-US" dirty="0"/>
           </a:p>
@@ -3600,7 +4202,7 @@
             <a:fld id="{B61BEF0D-F0BB-DE4B-95CE-6DB70DBA9567}" type="datetimeFigureOut">
               <a:rPr lang="en-US" dirty="0"/>
               <a:pPr/>
-              <a:t>12/12/2016</a:t>
+              <a:t>12/13/2016</a:t>
             </a:fld>
             <a:endParaRPr lang="en-US" dirty="0"/>
           </a:p>
@@ -4129,7 +4731,7 @@
             <a:fld id="{B61BEF0D-F0BB-DE4B-95CE-6DB70DBA9567}" type="datetimeFigureOut">
               <a:rPr lang="en-US" dirty="0"/>
               <a:pPr/>
-              <a:t>12/12/2016</a:t>
+              <a:t>12/13/2016</a:t>
             </a:fld>
             <a:endParaRPr lang="en-US" dirty="0"/>
           </a:p>
@@ -4423,7 +5025,7 @@
             <a:fld id="{B61BEF0D-F0BB-DE4B-95CE-6DB70DBA9567}" type="datetimeFigureOut">
               <a:rPr lang="en-US" dirty="0"/>
               <a:pPr/>
-              <a:t>12/12/2016</a:t>
+              <a:t>12/13/2016</a:t>
             </a:fld>
             <a:endParaRPr lang="en-US" dirty="0"/>
           </a:p>
@@ -4594,7 +5196,7 @@
             <a:fld id="{B61BEF0D-F0BB-DE4B-95CE-6DB70DBA9567}" type="datetimeFigureOut">
               <a:rPr lang="en-US" dirty="0"/>
               <a:pPr/>
-              <a:t>12/12/2016</a:t>
+              <a:t>12/13/2016</a:t>
             </a:fld>
             <a:endParaRPr lang="en-US" dirty="0"/>
           </a:p>
@@ -4771,7 +5373,7 @@
             <a:fld id="{B61BEF0D-F0BB-DE4B-95CE-6DB70DBA9567}" type="datetimeFigureOut">
               <a:rPr lang="en-US" dirty="0"/>
               <a:pPr/>
-              <a:t>12/12/2016</a:t>
+              <a:t>12/13/2016</a:t>
             </a:fld>
             <a:endParaRPr lang="en-US" dirty="0"/>
           </a:p>
@@ -4938,7 +5540,7 @@
             <a:fld id="{B61BEF0D-F0BB-DE4B-95CE-6DB70DBA9567}" type="datetimeFigureOut">
               <a:rPr lang="en-US" dirty="0"/>
               <a:pPr/>
-              <a:t>12/12/2016</a:t>
+              <a:t>12/13/2016</a:t>
             </a:fld>
             <a:endParaRPr lang="en-US" dirty="0"/>
           </a:p>
@@ -5186,7 +5788,7 @@
             <a:fld id="{B61BEF0D-F0BB-DE4B-95CE-6DB70DBA9567}" type="datetimeFigureOut">
               <a:rPr lang="en-US" dirty="0"/>
               <a:pPr/>
-              <a:t>12/12/2016</a:t>
+              <a:t>12/13/2016</a:t>
             </a:fld>
             <a:endParaRPr lang="en-US" dirty="0"/>
           </a:p>
@@ -5480,7 +6082,7 @@
             <a:fld id="{B61BEF0D-F0BB-DE4B-95CE-6DB70DBA9567}" type="datetimeFigureOut">
               <a:rPr lang="en-US" dirty="0"/>
               <a:pPr/>
-              <a:t>12/12/2016</a:t>
+              <a:t>12/13/2016</a:t>
             </a:fld>
             <a:endParaRPr lang="en-US" dirty="0"/>
           </a:p>
@@ -5919,7 +6521,7 @@
             <a:fld id="{B61BEF0D-F0BB-DE4B-95CE-6DB70DBA9567}" type="datetimeFigureOut">
               <a:rPr lang="en-US" dirty="0"/>
               <a:pPr/>
-              <a:t>12/12/2016</a:t>
+              <a:t>12/13/2016</a:t>
             </a:fld>
             <a:endParaRPr lang="en-US" dirty="0"/>
           </a:p>
@@ -6034,7 +6636,7 @@
             <a:fld id="{B61BEF0D-F0BB-DE4B-95CE-6DB70DBA9567}" type="datetimeFigureOut">
               <a:rPr lang="en-US" dirty="0"/>
               <a:pPr/>
-              <a:t>12/12/2016</a:t>
+              <a:t>12/13/2016</a:t>
             </a:fld>
             <a:endParaRPr lang="en-US" dirty="0"/>
           </a:p>
@@ -6126,7 +6728,7 @@
             <a:fld id="{B61BEF0D-F0BB-DE4B-95CE-6DB70DBA9567}" type="datetimeFigureOut">
               <a:rPr lang="en-US" dirty="0"/>
               <a:pPr/>
-              <a:t>12/12/2016</a:t>
+              <a:t>12/13/2016</a:t>
             </a:fld>
             <a:endParaRPr lang="en-US" dirty="0"/>
           </a:p>
@@ -6406,7 +7008,7 @@
             <a:fld id="{B61BEF0D-F0BB-DE4B-95CE-6DB70DBA9567}" type="datetimeFigureOut">
               <a:rPr lang="en-US" dirty="0"/>
               <a:pPr/>
-              <a:t>12/12/2016</a:t>
+              <a:t>12/13/2016</a:t>
             </a:fld>
             <a:endParaRPr lang="en-US" dirty="0"/>
           </a:p>
@@ -6694,7 +7296,7 @@
             <a:fld id="{B61BEF0D-F0BB-DE4B-95CE-6DB70DBA9567}" type="datetimeFigureOut">
               <a:rPr lang="en-US" dirty="0"/>
               <a:pPr/>
-              <a:t>12/12/2016</a:t>
+              <a:t>12/13/2016</a:t>
             </a:fld>
             <a:endParaRPr lang="en-US" dirty="0"/>
           </a:p>
@@ -7221,7 +7823,7 @@
             <a:fld id="{B61BEF0D-F0BB-DE4B-95CE-6DB70DBA9567}" type="datetimeFigureOut">
               <a:rPr lang="en-US" dirty="0"/>
               <a:pPr/>
-              <a:t>12/12/2016</a:t>
+              <a:t>12/13/2016</a:t>
             </a:fld>
             <a:endParaRPr lang="en-US" dirty="0"/>
           </a:p>
@@ -8592,7 +9194,6 @@
               <a:rPr lang="de-DE" sz="3200" dirty="0" smtClean="0"/>
               <a:t>!</a:t>
             </a:r>
-            <a:endParaRPr lang="de-DE" sz="3200" dirty="0" smtClean="0"/>
           </a:p>
           <a:p>
             <a:pPr algn="ctr"/>
@@ -8612,7 +9213,6 @@
               <a:rPr lang="de-DE" sz="3200" dirty="0" smtClean="0"/>
               <a:t>!</a:t>
             </a:r>
-            <a:endParaRPr lang="de-DE" sz="3200" dirty="0" smtClean="0"/>
           </a:p>
         </p:txBody>
       </p:sp>
@@ -8675,6 +9275,2814 @@
           <a:p>
             <a:r>
               <a:rPr lang="de-DE" dirty="0" err="1" smtClean="0"/>
+              <a:t>Good</a:t>
+            </a:r>
+            <a:r>
+              <a:rPr lang="de-DE" dirty="0" smtClean="0"/>
+              <a:t> </a:t>
+            </a:r>
+            <a:r>
+              <a:rPr lang="de-DE" dirty="0" err="1" smtClean="0"/>
+              <a:t>code</a:t>
+            </a:r>
+            <a:endParaRPr lang="de-DE" dirty="0"/>
+          </a:p>
+        </p:txBody>
+      </p:sp>
+      <p:sp>
+        <p:nvSpPr>
+          <p:cNvPr id="6" name="Inhaltsplatzhalter 2"/>
+          <p:cNvSpPr txBox="1">
+            <a:spLocks/>
+          </p:cNvSpPr>
+          <p:nvPr/>
+        </p:nvSpPr>
+        <p:spPr>
+          <a:xfrm>
+            <a:off x="8137451" y="-41565"/>
+            <a:ext cx="4054549" cy="370610"/>
+          </a:xfrm>
+          <a:prstGeom prst="rect">
+            <a:avLst/>
+          </a:prstGeom>
+        </p:spPr>
+        <p:txBody>
+          <a:bodyPr vert="horz" lIns="91440" tIns="45720" rIns="91440" bIns="45720" rtlCol="0" anchor="ctr">
+            <a:normAutofit/>
+          </a:bodyPr>
+          <a:lstStyle>
+            <a:lvl1pPr marL="285750" indent="-285750" algn="l" defTabSz="457200" rtl="0" eaLnBrk="1" latinLnBrk="0" hangingPunct="1">
+              <a:spcBef>
+                <a:spcPct val="20000"/>
+              </a:spcBef>
+              <a:spcAft>
+                <a:spcPts val="600"/>
+              </a:spcAft>
+              <a:buClr>
+                <a:schemeClr val="accent1">
+                  <a:lumMod val="75000"/>
+                </a:schemeClr>
+              </a:buClr>
+              <a:buSzPct val="145000"/>
+              <a:buFont typeface="Arial"/>
+              <a:buChar char="•"/>
+              <a:defRPr sz="2400" kern="1200" cap="none">
+                <a:solidFill>
+                  <a:schemeClr val="tx1"/>
+                </a:solidFill>
+                <a:effectLst/>
+                <a:latin typeface="+mn-lt"/>
+                <a:ea typeface="+mn-ea"/>
+                <a:cs typeface="+mn-cs"/>
+              </a:defRPr>
+            </a:lvl1pPr>
+            <a:lvl2pPr marL="742950" indent="-285750" algn="l" defTabSz="457200" rtl="0" eaLnBrk="1" latinLnBrk="0" hangingPunct="1">
+              <a:spcBef>
+                <a:spcPct val="20000"/>
+              </a:spcBef>
+              <a:spcAft>
+                <a:spcPts val="600"/>
+              </a:spcAft>
+              <a:buClr>
+                <a:schemeClr val="accent1">
+                  <a:lumMod val="75000"/>
+                </a:schemeClr>
+              </a:buClr>
+              <a:buSzPct val="145000"/>
+              <a:buFont typeface="Arial"/>
+              <a:buChar char="•"/>
+              <a:defRPr sz="2000" kern="1200" cap="none">
+                <a:solidFill>
+                  <a:schemeClr val="tx1"/>
+                </a:solidFill>
+                <a:effectLst/>
+                <a:latin typeface="+mn-lt"/>
+                <a:ea typeface="+mn-ea"/>
+                <a:cs typeface="+mn-cs"/>
+              </a:defRPr>
+            </a:lvl2pPr>
+            <a:lvl3pPr marL="1200150" indent="-285750" algn="l" defTabSz="457200" rtl="0" eaLnBrk="1" latinLnBrk="0" hangingPunct="1">
+              <a:spcBef>
+                <a:spcPct val="20000"/>
+              </a:spcBef>
+              <a:spcAft>
+                <a:spcPts val="600"/>
+              </a:spcAft>
+              <a:buClr>
+                <a:schemeClr val="accent1">
+                  <a:lumMod val="75000"/>
+                </a:schemeClr>
+              </a:buClr>
+              <a:buSzPct val="145000"/>
+              <a:buFont typeface="Arial"/>
+              <a:buChar char="•"/>
+              <a:defRPr sz="1800" kern="1200" cap="none">
+                <a:solidFill>
+                  <a:schemeClr val="tx1"/>
+                </a:solidFill>
+                <a:effectLst/>
+                <a:latin typeface="+mn-lt"/>
+                <a:ea typeface="+mn-ea"/>
+                <a:cs typeface="+mn-cs"/>
+              </a:defRPr>
+            </a:lvl3pPr>
+            <a:lvl4pPr marL="1543050" indent="-171450" algn="l" defTabSz="457200" rtl="0" eaLnBrk="1" latinLnBrk="0" hangingPunct="1">
+              <a:spcBef>
+                <a:spcPct val="20000"/>
+              </a:spcBef>
+              <a:spcAft>
+                <a:spcPts val="600"/>
+              </a:spcAft>
+              <a:buClr>
+                <a:schemeClr val="accent1">
+                  <a:lumMod val="75000"/>
+                </a:schemeClr>
+              </a:buClr>
+              <a:buSzPct val="145000"/>
+              <a:buFont typeface="Arial"/>
+              <a:buChar char="•"/>
+              <a:defRPr sz="1600" kern="1200" cap="none">
+                <a:solidFill>
+                  <a:schemeClr val="tx1"/>
+                </a:solidFill>
+                <a:effectLst/>
+                <a:latin typeface="+mn-lt"/>
+                <a:ea typeface="+mn-ea"/>
+                <a:cs typeface="+mn-cs"/>
+              </a:defRPr>
+            </a:lvl4pPr>
+            <a:lvl5pPr marL="2000250" indent="-171450" algn="l" defTabSz="457200" rtl="0" eaLnBrk="1" latinLnBrk="0" hangingPunct="1">
+              <a:spcBef>
+                <a:spcPct val="20000"/>
+              </a:spcBef>
+              <a:spcAft>
+                <a:spcPts val="600"/>
+              </a:spcAft>
+              <a:buClr>
+                <a:schemeClr val="accent1">
+                  <a:lumMod val="75000"/>
+                </a:schemeClr>
+              </a:buClr>
+              <a:buSzPct val="145000"/>
+              <a:buFont typeface="Arial"/>
+              <a:buChar char="•"/>
+              <a:defRPr sz="1400" kern="1200" cap="none">
+                <a:solidFill>
+                  <a:schemeClr val="tx1"/>
+                </a:solidFill>
+                <a:effectLst/>
+                <a:latin typeface="+mn-lt"/>
+                <a:ea typeface="+mn-ea"/>
+                <a:cs typeface="+mn-cs"/>
+              </a:defRPr>
+            </a:lvl5pPr>
+            <a:lvl6pPr marL="2514600" indent="-228600" algn="l" defTabSz="457200" rtl="0" eaLnBrk="1" latinLnBrk="0" hangingPunct="1">
+              <a:spcBef>
+                <a:spcPct val="20000"/>
+              </a:spcBef>
+              <a:spcAft>
+                <a:spcPts val="600"/>
+              </a:spcAft>
+              <a:buClr>
+                <a:schemeClr val="accent1">
+                  <a:lumMod val="75000"/>
+                </a:schemeClr>
+              </a:buClr>
+              <a:buSzPct val="145000"/>
+              <a:buFont typeface="Arial"/>
+              <a:buChar char="•"/>
+              <a:defRPr sz="1400" kern="1200" cap="none">
+                <a:solidFill>
+                  <a:schemeClr val="tx1"/>
+                </a:solidFill>
+                <a:effectLst/>
+                <a:latin typeface="+mn-lt"/>
+                <a:ea typeface="+mn-ea"/>
+                <a:cs typeface="+mn-cs"/>
+              </a:defRPr>
+            </a:lvl6pPr>
+            <a:lvl7pPr marL="2971800" indent="-228600" algn="l" defTabSz="457200" rtl="0" eaLnBrk="1" latinLnBrk="0" hangingPunct="1">
+              <a:spcBef>
+                <a:spcPct val="20000"/>
+              </a:spcBef>
+              <a:spcAft>
+                <a:spcPts val="600"/>
+              </a:spcAft>
+              <a:buClr>
+                <a:schemeClr val="accent1">
+                  <a:lumMod val="75000"/>
+                </a:schemeClr>
+              </a:buClr>
+              <a:buSzPct val="145000"/>
+              <a:buFont typeface="Arial"/>
+              <a:buChar char="•"/>
+              <a:defRPr sz="1400" kern="1200" cap="none">
+                <a:solidFill>
+                  <a:schemeClr val="tx1"/>
+                </a:solidFill>
+                <a:effectLst/>
+                <a:latin typeface="+mn-lt"/>
+                <a:ea typeface="+mn-ea"/>
+                <a:cs typeface="+mn-cs"/>
+              </a:defRPr>
+            </a:lvl7pPr>
+            <a:lvl8pPr marL="3429000" indent="-228600" algn="l" defTabSz="457200" rtl="0" eaLnBrk="1" latinLnBrk="0" hangingPunct="1">
+              <a:spcBef>
+                <a:spcPct val="20000"/>
+              </a:spcBef>
+              <a:spcAft>
+                <a:spcPts val="600"/>
+              </a:spcAft>
+              <a:buClr>
+                <a:schemeClr val="accent1">
+                  <a:lumMod val="75000"/>
+                </a:schemeClr>
+              </a:buClr>
+              <a:buSzPct val="145000"/>
+              <a:buFont typeface="Arial"/>
+              <a:buChar char="•"/>
+              <a:defRPr sz="1400" kern="1200" cap="none">
+                <a:solidFill>
+                  <a:schemeClr val="tx1"/>
+                </a:solidFill>
+                <a:effectLst/>
+                <a:latin typeface="+mn-lt"/>
+                <a:ea typeface="+mn-ea"/>
+                <a:cs typeface="+mn-cs"/>
+              </a:defRPr>
+            </a:lvl8pPr>
+            <a:lvl9pPr marL="3886200" indent="-228600" algn="l" defTabSz="457200" rtl="0" eaLnBrk="1" latinLnBrk="0" hangingPunct="1">
+              <a:spcBef>
+                <a:spcPct val="20000"/>
+              </a:spcBef>
+              <a:spcAft>
+                <a:spcPts val="600"/>
+              </a:spcAft>
+              <a:buClr>
+                <a:schemeClr val="accent1">
+                  <a:lumMod val="75000"/>
+                </a:schemeClr>
+              </a:buClr>
+              <a:buSzPct val="145000"/>
+              <a:buFont typeface="Arial"/>
+              <a:buChar char="•"/>
+              <a:defRPr sz="1400" kern="1200" cap="none">
+                <a:solidFill>
+                  <a:schemeClr val="tx1"/>
+                </a:solidFill>
+                <a:effectLst/>
+                <a:latin typeface="+mn-lt"/>
+                <a:ea typeface="+mn-ea"/>
+                <a:cs typeface="+mn-cs"/>
+              </a:defRPr>
+            </a:lvl9pPr>
+          </a:lstStyle>
+          <a:p>
+            <a:pPr marL="0" indent="0">
+              <a:buNone/>
+            </a:pPr>
+            <a:r>
+              <a:rPr lang="de-DE" sz="1000" dirty="0" smtClean="0"/>
+              <a:t>Rem0 Röthlisberger, Eric </a:t>
+            </a:r>
+            <a:r>
+              <a:rPr lang="de-DE" sz="1000" dirty="0" err="1" smtClean="0"/>
+              <a:t>Lagger</a:t>
+            </a:r>
+            <a:r>
+              <a:rPr lang="de-DE" sz="1000" dirty="0" smtClean="0"/>
+              <a:t>, Vincent Hofer, Dean Klopsch, Aebi Ryan</a:t>
+            </a:r>
+            <a:endParaRPr lang="de-DE" sz="1000" dirty="0"/>
+          </a:p>
+        </p:txBody>
+      </p:sp>
+      <p:pic>
+        <p:nvPicPr>
+          <p:cNvPr id="3" name="Inhaltsplatzhalter 2"/>
+          <p:cNvPicPr>
+            <a:picLocks noGrp="1" noChangeAspect="1"/>
+          </p:cNvPicPr>
+          <p:nvPr>
+            <p:ph idx="1"/>
+          </p:nvPr>
+        </p:nvPicPr>
+        <p:blipFill>
+          <a:blip r:embed="rId3">
+            <a:extLst>
+              <a:ext uri="{28A0092B-C50C-407E-A947-70E740481C1C}">
+                <a14:useLocalDpi xmlns:a14="http://schemas.microsoft.com/office/drawing/2010/main" val="0"/>
+              </a:ext>
+            </a:extLst>
+          </a:blip>
+          <a:stretch>
+            <a:fillRect/>
+          </a:stretch>
+        </p:blipFill>
+        <p:spPr>
+          <a:xfrm>
+            <a:off x="1115053" y="4404742"/>
+            <a:ext cx="1781424" cy="990738"/>
+          </a:xfrm>
+        </p:spPr>
+      </p:pic>
+    </p:spTree>
+    <p:extLst>
+      <p:ext uri="{BB962C8B-B14F-4D97-AF65-F5344CB8AC3E}">
+        <p14:creationId xmlns:p14="http://schemas.microsoft.com/office/powerpoint/2010/main" val="349518544"/>
+      </p:ext>
+    </p:extLst>
+  </p:cSld>
+  <p:clrMapOvr>
+    <a:masterClrMapping/>
+  </p:clrMapOvr>
+  <p:timing>
+    <p:tnLst>
+      <p:par>
+        <p:cTn id="1" dur="indefinite" restart="never" nodeType="tmRoot"/>
+      </p:par>
+    </p:tnLst>
+  </p:timing>
+</p:sld>
+</file>
+
+<file path=ppt/slides/slide12.xml><?xml version="1.0" encoding="utf-8"?>
+<p:sld xmlns:a="http://schemas.openxmlformats.org/drawingml/2006/main" xmlns:r="http://schemas.openxmlformats.org/officeDocument/2006/relationships" xmlns:p="http://schemas.openxmlformats.org/presentationml/2006/main">
+  <p:cSld>
+    <p:spTree>
+      <p:nvGrpSpPr>
+        <p:cNvPr id="1" name=""/>
+        <p:cNvGrpSpPr/>
+        <p:nvPr/>
+      </p:nvGrpSpPr>
+      <p:grpSpPr>
+        <a:xfrm>
+          <a:off x="0" y="0"/>
+          <a:ext cx="0" cy="0"/>
+          <a:chOff x="0" y="0"/>
+          <a:chExt cx="0" cy="0"/>
+        </a:xfrm>
+      </p:grpSpPr>
+      <p:sp>
+        <p:nvSpPr>
+          <p:cNvPr id="2" name="Titel 1"/>
+          <p:cNvSpPr>
+            <a:spLocks noGrp="1"/>
+          </p:cNvSpPr>
+          <p:nvPr>
+            <p:ph type="title"/>
+          </p:nvPr>
+        </p:nvSpPr>
+        <p:spPr>
+          <a:xfrm>
+            <a:off x="810915" y="691116"/>
+            <a:ext cx="10018713" cy="1752599"/>
+          </a:xfrm>
+        </p:spPr>
+        <p:txBody>
+          <a:bodyPr/>
+          <a:lstStyle/>
+          <a:p>
+            <a:r>
+              <a:rPr lang="de-DE" dirty="0" err="1" smtClean="0"/>
+              <a:t>Good</a:t>
+            </a:r>
+            <a:r>
+              <a:rPr lang="de-DE" dirty="0" smtClean="0"/>
+              <a:t> </a:t>
+            </a:r>
+            <a:r>
+              <a:rPr lang="de-DE" dirty="0" err="1" smtClean="0"/>
+              <a:t>code</a:t>
+            </a:r>
+            <a:endParaRPr lang="de-DE" dirty="0"/>
+          </a:p>
+        </p:txBody>
+      </p:sp>
+      <p:sp>
+        <p:nvSpPr>
+          <p:cNvPr id="6" name="Inhaltsplatzhalter 2"/>
+          <p:cNvSpPr txBox="1">
+            <a:spLocks/>
+          </p:cNvSpPr>
+          <p:nvPr/>
+        </p:nvSpPr>
+        <p:spPr>
+          <a:xfrm>
+            <a:off x="8137451" y="-41565"/>
+            <a:ext cx="4054549" cy="370610"/>
+          </a:xfrm>
+          <a:prstGeom prst="rect">
+            <a:avLst/>
+          </a:prstGeom>
+        </p:spPr>
+        <p:txBody>
+          <a:bodyPr vert="horz" lIns="91440" tIns="45720" rIns="91440" bIns="45720" rtlCol="0" anchor="ctr">
+            <a:normAutofit/>
+          </a:bodyPr>
+          <a:lstStyle>
+            <a:lvl1pPr marL="285750" indent="-285750" algn="l" defTabSz="457200" rtl="0" eaLnBrk="1" latinLnBrk="0" hangingPunct="1">
+              <a:spcBef>
+                <a:spcPct val="20000"/>
+              </a:spcBef>
+              <a:spcAft>
+                <a:spcPts val="600"/>
+              </a:spcAft>
+              <a:buClr>
+                <a:schemeClr val="accent1">
+                  <a:lumMod val="75000"/>
+                </a:schemeClr>
+              </a:buClr>
+              <a:buSzPct val="145000"/>
+              <a:buFont typeface="Arial"/>
+              <a:buChar char="•"/>
+              <a:defRPr sz="2400" kern="1200" cap="none">
+                <a:solidFill>
+                  <a:schemeClr val="tx1"/>
+                </a:solidFill>
+                <a:effectLst/>
+                <a:latin typeface="+mn-lt"/>
+                <a:ea typeface="+mn-ea"/>
+                <a:cs typeface="+mn-cs"/>
+              </a:defRPr>
+            </a:lvl1pPr>
+            <a:lvl2pPr marL="742950" indent="-285750" algn="l" defTabSz="457200" rtl="0" eaLnBrk="1" latinLnBrk="0" hangingPunct="1">
+              <a:spcBef>
+                <a:spcPct val="20000"/>
+              </a:spcBef>
+              <a:spcAft>
+                <a:spcPts val="600"/>
+              </a:spcAft>
+              <a:buClr>
+                <a:schemeClr val="accent1">
+                  <a:lumMod val="75000"/>
+                </a:schemeClr>
+              </a:buClr>
+              <a:buSzPct val="145000"/>
+              <a:buFont typeface="Arial"/>
+              <a:buChar char="•"/>
+              <a:defRPr sz="2000" kern="1200" cap="none">
+                <a:solidFill>
+                  <a:schemeClr val="tx1"/>
+                </a:solidFill>
+                <a:effectLst/>
+                <a:latin typeface="+mn-lt"/>
+                <a:ea typeface="+mn-ea"/>
+                <a:cs typeface="+mn-cs"/>
+              </a:defRPr>
+            </a:lvl2pPr>
+            <a:lvl3pPr marL="1200150" indent="-285750" algn="l" defTabSz="457200" rtl="0" eaLnBrk="1" latinLnBrk="0" hangingPunct="1">
+              <a:spcBef>
+                <a:spcPct val="20000"/>
+              </a:spcBef>
+              <a:spcAft>
+                <a:spcPts val="600"/>
+              </a:spcAft>
+              <a:buClr>
+                <a:schemeClr val="accent1">
+                  <a:lumMod val="75000"/>
+                </a:schemeClr>
+              </a:buClr>
+              <a:buSzPct val="145000"/>
+              <a:buFont typeface="Arial"/>
+              <a:buChar char="•"/>
+              <a:defRPr sz="1800" kern="1200" cap="none">
+                <a:solidFill>
+                  <a:schemeClr val="tx1"/>
+                </a:solidFill>
+                <a:effectLst/>
+                <a:latin typeface="+mn-lt"/>
+                <a:ea typeface="+mn-ea"/>
+                <a:cs typeface="+mn-cs"/>
+              </a:defRPr>
+            </a:lvl3pPr>
+            <a:lvl4pPr marL="1543050" indent="-171450" algn="l" defTabSz="457200" rtl="0" eaLnBrk="1" latinLnBrk="0" hangingPunct="1">
+              <a:spcBef>
+                <a:spcPct val="20000"/>
+              </a:spcBef>
+              <a:spcAft>
+                <a:spcPts val="600"/>
+              </a:spcAft>
+              <a:buClr>
+                <a:schemeClr val="accent1">
+                  <a:lumMod val="75000"/>
+                </a:schemeClr>
+              </a:buClr>
+              <a:buSzPct val="145000"/>
+              <a:buFont typeface="Arial"/>
+              <a:buChar char="•"/>
+              <a:defRPr sz="1600" kern="1200" cap="none">
+                <a:solidFill>
+                  <a:schemeClr val="tx1"/>
+                </a:solidFill>
+                <a:effectLst/>
+                <a:latin typeface="+mn-lt"/>
+                <a:ea typeface="+mn-ea"/>
+                <a:cs typeface="+mn-cs"/>
+              </a:defRPr>
+            </a:lvl4pPr>
+            <a:lvl5pPr marL="2000250" indent="-171450" algn="l" defTabSz="457200" rtl="0" eaLnBrk="1" latinLnBrk="0" hangingPunct="1">
+              <a:spcBef>
+                <a:spcPct val="20000"/>
+              </a:spcBef>
+              <a:spcAft>
+                <a:spcPts val="600"/>
+              </a:spcAft>
+              <a:buClr>
+                <a:schemeClr val="accent1">
+                  <a:lumMod val="75000"/>
+                </a:schemeClr>
+              </a:buClr>
+              <a:buSzPct val="145000"/>
+              <a:buFont typeface="Arial"/>
+              <a:buChar char="•"/>
+              <a:defRPr sz="1400" kern="1200" cap="none">
+                <a:solidFill>
+                  <a:schemeClr val="tx1"/>
+                </a:solidFill>
+                <a:effectLst/>
+                <a:latin typeface="+mn-lt"/>
+                <a:ea typeface="+mn-ea"/>
+                <a:cs typeface="+mn-cs"/>
+              </a:defRPr>
+            </a:lvl5pPr>
+            <a:lvl6pPr marL="2514600" indent="-228600" algn="l" defTabSz="457200" rtl="0" eaLnBrk="1" latinLnBrk="0" hangingPunct="1">
+              <a:spcBef>
+                <a:spcPct val="20000"/>
+              </a:spcBef>
+              <a:spcAft>
+                <a:spcPts val="600"/>
+              </a:spcAft>
+              <a:buClr>
+                <a:schemeClr val="accent1">
+                  <a:lumMod val="75000"/>
+                </a:schemeClr>
+              </a:buClr>
+              <a:buSzPct val="145000"/>
+              <a:buFont typeface="Arial"/>
+              <a:buChar char="•"/>
+              <a:defRPr sz="1400" kern="1200" cap="none">
+                <a:solidFill>
+                  <a:schemeClr val="tx1"/>
+                </a:solidFill>
+                <a:effectLst/>
+                <a:latin typeface="+mn-lt"/>
+                <a:ea typeface="+mn-ea"/>
+                <a:cs typeface="+mn-cs"/>
+              </a:defRPr>
+            </a:lvl6pPr>
+            <a:lvl7pPr marL="2971800" indent="-228600" algn="l" defTabSz="457200" rtl="0" eaLnBrk="1" latinLnBrk="0" hangingPunct="1">
+              <a:spcBef>
+                <a:spcPct val="20000"/>
+              </a:spcBef>
+              <a:spcAft>
+                <a:spcPts val="600"/>
+              </a:spcAft>
+              <a:buClr>
+                <a:schemeClr val="accent1">
+                  <a:lumMod val="75000"/>
+                </a:schemeClr>
+              </a:buClr>
+              <a:buSzPct val="145000"/>
+              <a:buFont typeface="Arial"/>
+              <a:buChar char="•"/>
+              <a:defRPr sz="1400" kern="1200" cap="none">
+                <a:solidFill>
+                  <a:schemeClr val="tx1"/>
+                </a:solidFill>
+                <a:effectLst/>
+                <a:latin typeface="+mn-lt"/>
+                <a:ea typeface="+mn-ea"/>
+                <a:cs typeface="+mn-cs"/>
+              </a:defRPr>
+            </a:lvl7pPr>
+            <a:lvl8pPr marL="3429000" indent="-228600" algn="l" defTabSz="457200" rtl="0" eaLnBrk="1" latinLnBrk="0" hangingPunct="1">
+              <a:spcBef>
+                <a:spcPct val="20000"/>
+              </a:spcBef>
+              <a:spcAft>
+                <a:spcPts val="600"/>
+              </a:spcAft>
+              <a:buClr>
+                <a:schemeClr val="accent1">
+                  <a:lumMod val="75000"/>
+                </a:schemeClr>
+              </a:buClr>
+              <a:buSzPct val="145000"/>
+              <a:buFont typeface="Arial"/>
+              <a:buChar char="•"/>
+              <a:defRPr sz="1400" kern="1200" cap="none">
+                <a:solidFill>
+                  <a:schemeClr val="tx1"/>
+                </a:solidFill>
+                <a:effectLst/>
+                <a:latin typeface="+mn-lt"/>
+                <a:ea typeface="+mn-ea"/>
+                <a:cs typeface="+mn-cs"/>
+              </a:defRPr>
+            </a:lvl8pPr>
+            <a:lvl9pPr marL="3886200" indent="-228600" algn="l" defTabSz="457200" rtl="0" eaLnBrk="1" latinLnBrk="0" hangingPunct="1">
+              <a:spcBef>
+                <a:spcPct val="20000"/>
+              </a:spcBef>
+              <a:spcAft>
+                <a:spcPts val="600"/>
+              </a:spcAft>
+              <a:buClr>
+                <a:schemeClr val="accent1">
+                  <a:lumMod val="75000"/>
+                </a:schemeClr>
+              </a:buClr>
+              <a:buSzPct val="145000"/>
+              <a:buFont typeface="Arial"/>
+              <a:buChar char="•"/>
+              <a:defRPr sz="1400" kern="1200" cap="none">
+                <a:solidFill>
+                  <a:schemeClr val="tx1"/>
+                </a:solidFill>
+                <a:effectLst/>
+                <a:latin typeface="+mn-lt"/>
+                <a:ea typeface="+mn-ea"/>
+                <a:cs typeface="+mn-cs"/>
+              </a:defRPr>
+            </a:lvl9pPr>
+          </a:lstStyle>
+          <a:p>
+            <a:pPr marL="0" indent="0">
+              <a:buNone/>
+            </a:pPr>
+            <a:r>
+              <a:rPr lang="de-DE" sz="1000" dirty="0" smtClean="0"/>
+              <a:t>Rem0 Röthlisberger, Eric </a:t>
+            </a:r>
+            <a:r>
+              <a:rPr lang="de-DE" sz="1000" dirty="0" err="1" smtClean="0"/>
+              <a:t>Lagger</a:t>
+            </a:r>
+            <a:r>
+              <a:rPr lang="de-DE" sz="1000" dirty="0" smtClean="0"/>
+              <a:t>, Vincent Hofer, Dean Klopsch, Aebi Ryan</a:t>
+            </a:r>
+            <a:endParaRPr lang="de-DE" sz="1000" dirty="0"/>
+          </a:p>
+        </p:txBody>
+      </p:sp>
+      <p:pic>
+        <p:nvPicPr>
+          <p:cNvPr id="3" name="Inhaltsplatzhalter 2"/>
+          <p:cNvPicPr>
+            <a:picLocks noGrp="1" noChangeAspect="1"/>
+          </p:cNvPicPr>
+          <p:nvPr>
+            <p:ph idx="1"/>
+          </p:nvPr>
+        </p:nvPicPr>
+        <p:blipFill>
+          <a:blip r:embed="rId3">
+            <a:extLst>
+              <a:ext uri="{28A0092B-C50C-407E-A947-70E740481C1C}">
+                <a14:useLocalDpi xmlns:a14="http://schemas.microsoft.com/office/drawing/2010/main" val="0"/>
+              </a:ext>
+            </a:extLst>
+          </a:blip>
+          <a:stretch>
+            <a:fillRect/>
+          </a:stretch>
+        </p:blipFill>
+        <p:spPr>
+          <a:xfrm>
+            <a:off x="1115053" y="4384029"/>
+            <a:ext cx="1781424" cy="990738"/>
+          </a:xfrm>
+        </p:spPr>
+      </p:pic>
+      <p:pic>
+        <p:nvPicPr>
+          <p:cNvPr id="4" name="Grafik 3"/>
+          <p:cNvPicPr>
+            <a:picLocks noChangeAspect="1"/>
+          </p:cNvPicPr>
+          <p:nvPr/>
+        </p:nvPicPr>
+        <p:blipFill>
+          <a:blip r:embed="rId4">
+            <a:extLst>
+              <a:ext uri="{28A0092B-C50C-407E-A947-70E740481C1C}">
+                <a14:useLocalDpi xmlns:a14="http://schemas.microsoft.com/office/drawing/2010/main" val="0"/>
+              </a:ext>
+            </a:extLst>
+          </a:blip>
+          <a:stretch>
+            <a:fillRect/>
+          </a:stretch>
+        </p:blipFill>
+        <p:spPr>
+          <a:xfrm>
+            <a:off x="5093427" y="3128211"/>
+            <a:ext cx="1453688" cy="3502374"/>
+          </a:xfrm>
+          <a:prstGeom prst="rect">
+            <a:avLst/>
+          </a:prstGeom>
+        </p:spPr>
+      </p:pic>
+    </p:spTree>
+    <p:extLst>
+      <p:ext uri="{BB962C8B-B14F-4D97-AF65-F5344CB8AC3E}">
+        <p14:creationId xmlns:p14="http://schemas.microsoft.com/office/powerpoint/2010/main" val="4205133750"/>
+      </p:ext>
+    </p:extLst>
+  </p:cSld>
+  <p:clrMapOvr>
+    <a:masterClrMapping/>
+  </p:clrMapOvr>
+  <p:timing>
+    <p:tnLst>
+      <p:par>
+        <p:cTn id="1" dur="indefinite" restart="never" nodeType="tmRoot"/>
+      </p:par>
+    </p:tnLst>
+  </p:timing>
+</p:sld>
+</file>
+
+<file path=ppt/slides/slide13.xml><?xml version="1.0" encoding="utf-8"?>
+<p:sld xmlns:a="http://schemas.openxmlformats.org/drawingml/2006/main" xmlns:r="http://schemas.openxmlformats.org/officeDocument/2006/relationships" xmlns:p="http://schemas.openxmlformats.org/presentationml/2006/main">
+  <p:cSld>
+    <p:spTree>
+      <p:nvGrpSpPr>
+        <p:cNvPr id="1" name=""/>
+        <p:cNvGrpSpPr/>
+        <p:nvPr/>
+      </p:nvGrpSpPr>
+      <p:grpSpPr>
+        <a:xfrm>
+          <a:off x="0" y="0"/>
+          <a:ext cx="0" cy="0"/>
+          <a:chOff x="0" y="0"/>
+          <a:chExt cx="0" cy="0"/>
+        </a:xfrm>
+      </p:grpSpPr>
+      <p:sp>
+        <p:nvSpPr>
+          <p:cNvPr id="2" name="Titel 1"/>
+          <p:cNvSpPr>
+            <a:spLocks noGrp="1"/>
+          </p:cNvSpPr>
+          <p:nvPr>
+            <p:ph type="title"/>
+          </p:nvPr>
+        </p:nvSpPr>
+        <p:spPr>
+          <a:xfrm>
+            <a:off x="810915" y="691116"/>
+            <a:ext cx="10018713" cy="1752599"/>
+          </a:xfrm>
+        </p:spPr>
+        <p:txBody>
+          <a:bodyPr/>
+          <a:lstStyle/>
+          <a:p>
+            <a:r>
+              <a:rPr lang="de-DE" dirty="0" err="1" smtClean="0"/>
+              <a:t>Good</a:t>
+            </a:r>
+            <a:r>
+              <a:rPr lang="de-DE" dirty="0" smtClean="0"/>
+              <a:t> </a:t>
+            </a:r>
+            <a:r>
+              <a:rPr lang="de-DE" dirty="0" err="1" smtClean="0"/>
+              <a:t>code</a:t>
+            </a:r>
+            <a:endParaRPr lang="de-DE" dirty="0"/>
+          </a:p>
+        </p:txBody>
+      </p:sp>
+      <p:sp>
+        <p:nvSpPr>
+          <p:cNvPr id="6" name="Inhaltsplatzhalter 2"/>
+          <p:cNvSpPr txBox="1">
+            <a:spLocks/>
+          </p:cNvSpPr>
+          <p:nvPr/>
+        </p:nvSpPr>
+        <p:spPr>
+          <a:xfrm>
+            <a:off x="8137451" y="-41565"/>
+            <a:ext cx="4054549" cy="370610"/>
+          </a:xfrm>
+          <a:prstGeom prst="rect">
+            <a:avLst/>
+          </a:prstGeom>
+        </p:spPr>
+        <p:txBody>
+          <a:bodyPr vert="horz" lIns="91440" tIns="45720" rIns="91440" bIns="45720" rtlCol="0" anchor="ctr">
+            <a:normAutofit/>
+          </a:bodyPr>
+          <a:lstStyle>
+            <a:lvl1pPr marL="285750" indent="-285750" algn="l" defTabSz="457200" rtl="0" eaLnBrk="1" latinLnBrk="0" hangingPunct="1">
+              <a:spcBef>
+                <a:spcPct val="20000"/>
+              </a:spcBef>
+              <a:spcAft>
+                <a:spcPts val="600"/>
+              </a:spcAft>
+              <a:buClr>
+                <a:schemeClr val="accent1">
+                  <a:lumMod val="75000"/>
+                </a:schemeClr>
+              </a:buClr>
+              <a:buSzPct val="145000"/>
+              <a:buFont typeface="Arial"/>
+              <a:buChar char="•"/>
+              <a:defRPr sz="2400" kern="1200" cap="none">
+                <a:solidFill>
+                  <a:schemeClr val="tx1"/>
+                </a:solidFill>
+                <a:effectLst/>
+                <a:latin typeface="+mn-lt"/>
+                <a:ea typeface="+mn-ea"/>
+                <a:cs typeface="+mn-cs"/>
+              </a:defRPr>
+            </a:lvl1pPr>
+            <a:lvl2pPr marL="742950" indent="-285750" algn="l" defTabSz="457200" rtl="0" eaLnBrk="1" latinLnBrk="0" hangingPunct="1">
+              <a:spcBef>
+                <a:spcPct val="20000"/>
+              </a:spcBef>
+              <a:spcAft>
+                <a:spcPts val="600"/>
+              </a:spcAft>
+              <a:buClr>
+                <a:schemeClr val="accent1">
+                  <a:lumMod val="75000"/>
+                </a:schemeClr>
+              </a:buClr>
+              <a:buSzPct val="145000"/>
+              <a:buFont typeface="Arial"/>
+              <a:buChar char="•"/>
+              <a:defRPr sz="2000" kern="1200" cap="none">
+                <a:solidFill>
+                  <a:schemeClr val="tx1"/>
+                </a:solidFill>
+                <a:effectLst/>
+                <a:latin typeface="+mn-lt"/>
+                <a:ea typeface="+mn-ea"/>
+                <a:cs typeface="+mn-cs"/>
+              </a:defRPr>
+            </a:lvl2pPr>
+            <a:lvl3pPr marL="1200150" indent="-285750" algn="l" defTabSz="457200" rtl="0" eaLnBrk="1" latinLnBrk="0" hangingPunct="1">
+              <a:spcBef>
+                <a:spcPct val="20000"/>
+              </a:spcBef>
+              <a:spcAft>
+                <a:spcPts val="600"/>
+              </a:spcAft>
+              <a:buClr>
+                <a:schemeClr val="accent1">
+                  <a:lumMod val="75000"/>
+                </a:schemeClr>
+              </a:buClr>
+              <a:buSzPct val="145000"/>
+              <a:buFont typeface="Arial"/>
+              <a:buChar char="•"/>
+              <a:defRPr sz="1800" kern="1200" cap="none">
+                <a:solidFill>
+                  <a:schemeClr val="tx1"/>
+                </a:solidFill>
+                <a:effectLst/>
+                <a:latin typeface="+mn-lt"/>
+                <a:ea typeface="+mn-ea"/>
+                <a:cs typeface="+mn-cs"/>
+              </a:defRPr>
+            </a:lvl3pPr>
+            <a:lvl4pPr marL="1543050" indent="-171450" algn="l" defTabSz="457200" rtl="0" eaLnBrk="1" latinLnBrk="0" hangingPunct="1">
+              <a:spcBef>
+                <a:spcPct val="20000"/>
+              </a:spcBef>
+              <a:spcAft>
+                <a:spcPts val="600"/>
+              </a:spcAft>
+              <a:buClr>
+                <a:schemeClr val="accent1">
+                  <a:lumMod val="75000"/>
+                </a:schemeClr>
+              </a:buClr>
+              <a:buSzPct val="145000"/>
+              <a:buFont typeface="Arial"/>
+              <a:buChar char="•"/>
+              <a:defRPr sz="1600" kern="1200" cap="none">
+                <a:solidFill>
+                  <a:schemeClr val="tx1"/>
+                </a:solidFill>
+                <a:effectLst/>
+                <a:latin typeface="+mn-lt"/>
+                <a:ea typeface="+mn-ea"/>
+                <a:cs typeface="+mn-cs"/>
+              </a:defRPr>
+            </a:lvl4pPr>
+            <a:lvl5pPr marL="2000250" indent="-171450" algn="l" defTabSz="457200" rtl="0" eaLnBrk="1" latinLnBrk="0" hangingPunct="1">
+              <a:spcBef>
+                <a:spcPct val="20000"/>
+              </a:spcBef>
+              <a:spcAft>
+                <a:spcPts val="600"/>
+              </a:spcAft>
+              <a:buClr>
+                <a:schemeClr val="accent1">
+                  <a:lumMod val="75000"/>
+                </a:schemeClr>
+              </a:buClr>
+              <a:buSzPct val="145000"/>
+              <a:buFont typeface="Arial"/>
+              <a:buChar char="•"/>
+              <a:defRPr sz="1400" kern="1200" cap="none">
+                <a:solidFill>
+                  <a:schemeClr val="tx1"/>
+                </a:solidFill>
+                <a:effectLst/>
+                <a:latin typeface="+mn-lt"/>
+                <a:ea typeface="+mn-ea"/>
+                <a:cs typeface="+mn-cs"/>
+              </a:defRPr>
+            </a:lvl5pPr>
+            <a:lvl6pPr marL="2514600" indent="-228600" algn="l" defTabSz="457200" rtl="0" eaLnBrk="1" latinLnBrk="0" hangingPunct="1">
+              <a:spcBef>
+                <a:spcPct val="20000"/>
+              </a:spcBef>
+              <a:spcAft>
+                <a:spcPts val="600"/>
+              </a:spcAft>
+              <a:buClr>
+                <a:schemeClr val="accent1">
+                  <a:lumMod val="75000"/>
+                </a:schemeClr>
+              </a:buClr>
+              <a:buSzPct val="145000"/>
+              <a:buFont typeface="Arial"/>
+              <a:buChar char="•"/>
+              <a:defRPr sz="1400" kern="1200" cap="none">
+                <a:solidFill>
+                  <a:schemeClr val="tx1"/>
+                </a:solidFill>
+                <a:effectLst/>
+                <a:latin typeface="+mn-lt"/>
+                <a:ea typeface="+mn-ea"/>
+                <a:cs typeface="+mn-cs"/>
+              </a:defRPr>
+            </a:lvl6pPr>
+            <a:lvl7pPr marL="2971800" indent="-228600" algn="l" defTabSz="457200" rtl="0" eaLnBrk="1" latinLnBrk="0" hangingPunct="1">
+              <a:spcBef>
+                <a:spcPct val="20000"/>
+              </a:spcBef>
+              <a:spcAft>
+                <a:spcPts val="600"/>
+              </a:spcAft>
+              <a:buClr>
+                <a:schemeClr val="accent1">
+                  <a:lumMod val="75000"/>
+                </a:schemeClr>
+              </a:buClr>
+              <a:buSzPct val="145000"/>
+              <a:buFont typeface="Arial"/>
+              <a:buChar char="•"/>
+              <a:defRPr sz="1400" kern="1200" cap="none">
+                <a:solidFill>
+                  <a:schemeClr val="tx1"/>
+                </a:solidFill>
+                <a:effectLst/>
+                <a:latin typeface="+mn-lt"/>
+                <a:ea typeface="+mn-ea"/>
+                <a:cs typeface="+mn-cs"/>
+              </a:defRPr>
+            </a:lvl7pPr>
+            <a:lvl8pPr marL="3429000" indent="-228600" algn="l" defTabSz="457200" rtl="0" eaLnBrk="1" latinLnBrk="0" hangingPunct="1">
+              <a:spcBef>
+                <a:spcPct val="20000"/>
+              </a:spcBef>
+              <a:spcAft>
+                <a:spcPts val="600"/>
+              </a:spcAft>
+              <a:buClr>
+                <a:schemeClr val="accent1">
+                  <a:lumMod val="75000"/>
+                </a:schemeClr>
+              </a:buClr>
+              <a:buSzPct val="145000"/>
+              <a:buFont typeface="Arial"/>
+              <a:buChar char="•"/>
+              <a:defRPr sz="1400" kern="1200" cap="none">
+                <a:solidFill>
+                  <a:schemeClr val="tx1"/>
+                </a:solidFill>
+                <a:effectLst/>
+                <a:latin typeface="+mn-lt"/>
+                <a:ea typeface="+mn-ea"/>
+                <a:cs typeface="+mn-cs"/>
+              </a:defRPr>
+            </a:lvl8pPr>
+            <a:lvl9pPr marL="3886200" indent="-228600" algn="l" defTabSz="457200" rtl="0" eaLnBrk="1" latinLnBrk="0" hangingPunct="1">
+              <a:spcBef>
+                <a:spcPct val="20000"/>
+              </a:spcBef>
+              <a:spcAft>
+                <a:spcPts val="600"/>
+              </a:spcAft>
+              <a:buClr>
+                <a:schemeClr val="accent1">
+                  <a:lumMod val="75000"/>
+                </a:schemeClr>
+              </a:buClr>
+              <a:buSzPct val="145000"/>
+              <a:buFont typeface="Arial"/>
+              <a:buChar char="•"/>
+              <a:defRPr sz="1400" kern="1200" cap="none">
+                <a:solidFill>
+                  <a:schemeClr val="tx1"/>
+                </a:solidFill>
+                <a:effectLst/>
+                <a:latin typeface="+mn-lt"/>
+                <a:ea typeface="+mn-ea"/>
+                <a:cs typeface="+mn-cs"/>
+              </a:defRPr>
+            </a:lvl9pPr>
+          </a:lstStyle>
+          <a:p>
+            <a:pPr marL="0" indent="0">
+              <a:buNone/>
+            </a:pPr>
+            <a:r>
+              <a:rPr lang="de-DE" sz="1000" dirty="0" smtClean="0"/>
+              <a:t>Rem0 Röthlisberger, Eric </a:t>
+            </a:r>
+            <a:r>
+              <a:rPr lang="de-DE" sz="1000" dirty="0" err="1" smtClean="0"/>
+              <a:t>Lagger</a:t>
+            </a:r>
+            <a:r>
+              <a:rPr lang="de-DE" sz="1000" dirty="0" smtClean="0"/>
+              <a:t>, Vincent Hofer, Dean Klopsch, Aebi Ryan</a:t>
+            </a:r>
+            <a:endParaRPr lang="de-DE" sz="1000" dirty="0"/>
+          </a:p>
+        </p:txBody>
+      </p:sp>
+      <p:pic>
+        <p:nvPicPr>
+          <p:cNvPr id="5" name="Grafik 4"/>
+          <p:cNvPicPr>
+            <a:picLocks noChangeAspect="1"/>
+          </p:cNvPicPr>
+          <p:nvPr/>
+        </p:nvPicPr>
+        <p:blipFill>
+          <a:blip r:embed="rId3">
+            <a:extLst>
+              <a:ext uri="{28A0092B-C50C-407E-A947-70E740481C1C}">
+                <a14:useLocalDpi xmlns:a14="http://schemas.microsoft.com/office/drawing/2010/main" val="0"/>
+              </a:ext>
+            </a:extLst>
+          </a:blip>
+          <a:stretch>
+            <a:fillRect/>
+          </a:stretch>
+        </p:blipFill>
+        <p:spPr>
+          <a:xfrm>
+            <a:off x="1821905" y="2017293"/>
+            <a:ext cx="5731136" cy="4191001"/>
+          </a:xfrm>
+          <a:prstGeom prst="rect">
+            <a:avLst/>
+          </a:prstGeom>
+        </p:spPr>
+      </p:pic>
+    </p:spTree>
+    <p:extLst>
+      <p:ext uri="{BB962C8B-B14F-4D97-AF65-F5344CB8AC3E}">
+        <p14:creationId xmlns:p14="http://schemas.microsoft.com/office/powerpoint/2010/main" val="920759846"/>
+      </p:ext>
+    </p:extLst>
+  </p:cSld>
+  <p:clrMapOvr>
+    <a:masterClrMapping/>
+  </p:clrMapOvr>
+  <p:timing>
+    <p:tnLst>
+      <p:par>
+        <p:cTn id="1" dur="indefinite" restart="never" nodeType="tmRoot"/>
+      </p:par>
+    </p:tnLst>
+  </p:timing>
+</p:sld>
+</file>
+
+<file path=ppt/slides/slide14.xml><?xml version="1.0" encoding="utf-8"?>
+<p:sld xmlns:a="http://schemas.openxmlformats.org/drawingml/2006/main" xmlns:r="http://schemas.openxmlformats.org/officeDocument/2006/relationships" xmlns:p="http://schemas.openxmlformats.org/presentationml/2006/main">
+  <p:cSld>
+    <p:spTree>
+      <p:nvGrpSpPr>
+        <p:cNvPr id="1" name=""/>
+        <p:cNvGrpSpPr/>
+        <p:nvPr/>
+      </p:nvGrpSpPr>
+      <p:grpSpPr>
+        <a:xfrm>
+          <a:off x="0" y="0"/>
+          <a:ext cx="0" cy="0"/>
+          <a:chOff x="0" y="0"/>
+          <a:chExt cx="0" cy="0"/>
+        </a:xfrm>
+      </p:grpSpPr>
+      <p:sp>
+        <p:nvSpPr>
+          <p:cNvPr id="2" name="Titel 1"/>
+          <p:cNvSpPr>
+            <a:spLocks noGrp="1"/>
+          </p:cNvSpPr>
+          <p:nvPr>
+            <p:ph type="title"/>
+          </p:nvPr>
+        </p:nvSpPr>
+        <p:spPr>
+          <a:xfrm>
+            <a:off x="810915" y="691116"/>
+            <a:ext cx="10018713" cy="1752599"/>
+          </a:xfrm>
+        </p:spPr>
+        <p:txBody>
+          <a:bodyPr/>
+          <a:lstStyle/>
+          <a:p>
+            <a:r>
+              <a:rPr lang="de-DE" dirty="0" err="1" smtClean="0"/>
+              <a:t>Good</a:t>
+            </a:r>
+            <a:r>
+              <a:rPr lang="de-DE" dirty="0" smtClean="0"/>
+              <a:t> </a:t>
+            </a:r>
+            <a:r>
+              <a:rPr lang="de-DE" dirty="0" err="1" smtClean="0"/>
+              <a:t>code</a:t>
+            </a:r>
+            <a:endParaRPr lang="de-DE" dirty="0"/>
+          </a:p>
+        </p:txBody>
+      </p:sp>
+      <p:sp>
+        <p:nvSpPr>
+          <p:cNvPr id="6" name="Inhaltsplatzhalter 2"/>
+          <p:cNvSpPr txBox="1">
+            <a:spLocks/>
+          </p:cNvSpPr>
+          <p:nvPr/>
+        </p:nvSpPr>
+        <p:spPr>
+          <a:xfrm>
+            <a:off x="8137451" y="-41565"/>
+            <a:ext cx="4054549" cy="370610"/>
+          </a:xfrm>
+          <a:prstGeom prst="rect">
+            <a:avLst/>
+          </a:prstGeom>
+        </p:spPr>
+        <p:txBody>
+          <a:bodyPr vert="horz" lIns="91440" tIns="45720" rIns="91440" bIns="45720" rtlCol="0" anchor="ctr">
+            <a:normAutofit/>
+          </a:bodyPr>
+          <a:lstStyle>
+            <a:lvl1pPr marL="285750" indent="-285750" algn="l" defTabSz="457200" rtl="0" eaLnBrk="1" latinLnBrk="0" hangingPunct="1">
+              <a:spcBef>
+                <a:spcPct val="20000"/>
+              </a:spcBef>
+              <a:spcAft>
+                <a:spcPts val="600"/>
+              </a:spcAft>
+              <a:buClr>
+                <a:schemeClr val="accent1">
+                  <a:lumMod val="75000"/>
+                </a:schemeClr>
+              </a:buClr>
+              <a:buSzPct val="145000"/>
+              <a:buFont typeface="Arial"/>
+              <a:buChar char="•"/>
+              <a:defRPr sz="2400" kern="1200" cap="none">
+                <a:solidFill>
+                  <a:schemeClr val="tx1"/>
+                </a:solidFill>
+                <a:effectLst/>
+                <a:latin typeface="+mn-lt"/>
+                <a:ea typeface="+mn-ea"/>
+                <a:cs typeface="+mn-cs"/>
+              </a:defRPr>
+            </a:lvl1pPr>
+            <a:lvl2pPr marL="742950" indent="-285750" algn="l" defTabSz="457200" rtl="0" eaLnBrk="1" latinLnBrk="0" hangingPunct="1">
+              <a:spcBef>
+                <a:spcPct val="20000"/>
+              </a:spcBef>
+              <a:spcAft>
+                <a:spcPts val="600"/>
+              </a:spcAft>
+              <a:buClr>
+                <a:schemeClr val="accent1">
+                  <a:lumMod val="75000"/>
+                </a:schemeClr>
+              </a:buClr>
+              <a:buSzPct val="145000"/>
+              <a:buFont typeface="Arial"/>
+              <a:buChar char="•"/>
+              <a:defRPr sz="2000" kern="1200" cap="none">
+                <a:solidFill>
+                  <a:schemeClr val="tx1"/>
+                </a:solidFill>
+                <a:effectLst/>
+                <a:latin typeface="+mn-lt"/>
+                <a:ea typeface="+mn-ea"/>
+                <a:cs typeface="+mn-cs"/>
+              </a:defRPr>
+            </a:lvl2pPr>
+            <a:lvl3pPr marL="1200150" indent="-285750" algn="l" defTabSz="457200" rtl="0" eaLnBrk="1" latinLnBrk="0" hangingPunct="1">
+              <a:spcBef>
+                <a:spcPct val="20000"/>
+              </a:spcBef>
+              <a:spcAft>
+                <a:spcPts val="600"/>
+              </a:spcAft>
+              <a:buClr>
+                <a:schemeClr val="accent1">
+                  <a:lumMod val="75000"/>
+                </a:schemeClr>
+              </a:buClr>
+              <a:buSzPct val="145000"/>
+              <a:buFont typeface="Arial"/>
+              <a:buChar char="•"/>
+              <a:defRPr sz="1800" kern="1200" cap="none">
+                <a:solidFill>
+                  <a:schemeClr val="tx1"/>
+                </a:solidFill>
+                <a:effectLst/>
+                <a:latin typeface="+mn-lt"/>
+                <a:ea typeface="+mn-ea"/>
+                <a:cs typeface="+mn-cs"/>
+              </a:defRPr>
+            </a:lvl3pPr>
+            <a:lvl4pPr marL="1543050" indent="-171450" algn="l" defTabSz="457200" rtl="0" eaLnBrk="1" latinLnBrk="0" hangingPunct="1">
+              <a:spcBef>
+                <a:spcPct val="20000"/>
+              </a:spcBef>
+              <a:spcAft>
+                <a:spcPts val="600"/>
+              </a:spcAft>
+              <a:buClr>
+                <a:schemeClr val="accent1">
+                  <a:lumMod val="75000"/>
+                </a:schemeClr>
+              </a:buClr>
+              <a:buSzPct val="145000"/>
+              <a:buFont typeface="Arial"/>
+              <a:buChar char="•"/>
+              <a:defRPr sz="1600" kern="1200" cap="none">
+                <a:solidFill>
+                  <a:schemeClr val="tx1"/>
+                </a:solidFill>
+                <a:effectLst/>
+                <a:latin typeface="+mn-lt"/>
+                <a:ea typeface="+mn-ea"/>
+                <a:cs typeface="+mn-cs"/>
+              </a:defRPr>
+            </a:lvl4pPr>
+            <a:lvl5pPr marL="2000250" indent="-171450" algn="l" defTabSz="457200" rtl="0" eaLnBrk="1" latinLnBrk="0" hangingPunct="1">
+              <a:spcBef>
+                <a:spcPct val="20000"/>
+              </a:spcBef>
+              <a:spcAft>
+                <a:spcPts val="600"/>
+              </a:spcAft>
+              <a:buClr>
+                <a:schemeClr val="accent1">
+                  <a:lumMod val="75000"/>
+                </a:schemeClr>
+              </a:buClr>
+              <a:buSzPct val="145000"/>
+              <a:buFont typeface="Arial"/>
+              <a:buChar char="•"/>
+              <a:defRPr sz="1400" kern="1200" cap="none">
+                <a:solidFill>
+                  <a:schemeClr val="tx1"/>
+                </a:solidFill>
+                <a:effectLst/>
+                <a:latin typeface="+mn-lt"/>
+                <a:ea typeface="+mn-ea"/>
+                <a:cs typeface="+mn-cs"/>
+              </a:defRPr>
+            </a:lvl5pPr>
+            <a:lvl6pPr marL="2514600" indent="-228600" algn="l" defTabSz="457200" rtl="0" eaLnBrk="1" latinLnBrk="0" hangingPunct="1">
+              <a:spcBef>
+                <a:spcPct val="20000"/>
+              </a:spcBef>
+              <a:spcAft>
+                <a:spcPts val="600"/>
+              </a:spcAft>
+              <a:buClr>
+                <a:schemeClr val="accent1">
+                  <a:lumMod val="75000"/>
+                </a:schemeClr>
+              </a:buClr>
+              <a:buSzPct val="145000"/>
+              <a:buFont typeface="Arial"/>
+              <a:buChar char="•"/>
+              <a:defRPr sz="1400" kern="1200" cap="none">
+                <a:solidFill>
+                  <a:schemeClr val="tx1"/>
+                </a:solidFill>
+                <a:effectLst/>
+                <a:latin typeface="+mn-lt"/>
+                <a:ea typeface="+mn-ea"/>
+                <a:cs typeface="+mn-cs"/>
+              </a:defRPr>
+            </a:lvl6pPr>
+            <a:lvl7pPr marL="2971800" indent="-228600" algn="l" defTabSz="457200" rtl="0" eaLnBrk="1" latinLnBrk="0" hangingPunct="1">
+              <a:spcBef>
+                <a:spcPct val="20000"/>
+              </a:spcBef>
+              <a:spcAft>
+                <a:spcPts val="600"/>
+              </a:spcAft>
+              <a:buClr>
+                <a:schemeClr val="accent1">
+                  <a:lumMod val="75000"/>
+                </a:schemeClr>
+              </a:buClr>
+              <a:buSzPct val="145000"/>
+              <a:buFont typeface="Arial"/>
+              <a:buChar char="•"/>
+              <a:defRPr sz="1400" kern="1200" cap="none">
+                <a:solidFill>
+                  <a:schemeClr val="tx1"/>
+                </a:solidFill>
+                <a:effectLst/>
+                <a:latin typeface="+mn-lt"/>
+                <a:ea typeface="+mn-ea"/>
+                <a:cs typeface="+mn-cs"/>
+              </a:defRPr>
+            </a:lvl7pPr>
+            <a:lvl8pPr marL="3429000" indent="-228600" algn="l" defTabSz="457200" rtl="0" eaLnBrk="1" latinLnBrk="0" hangingPunct="1">
+              <a:spcBef>
+                <a:spcPct val="20000"/>
+              </a:spcBef>
+              <a:spcAft>
+                <a:spcPts val="600"/>
+              </a:spcAft>
+              <a:buClr>
+                <a:schemeClr val="accent1">
+                  <a:lumMod val="75000"/>
+                </a:schemeClr>
+              </a:buClr>
+              <a:buSzPct val="145000"/>
+              <a:buFont typeface="Arial"/>
+              <a:buChar char="•"/>
+              <a:defRPr sz="1400" kern="1200" cap="none">
+                <a:solidFill>
+                  <a:schemeClr val="tx1"/>
+                </a:solidFill>
+                <a:effectLst/>
+                <a:latin typeface="+mn-lt"/>
+                <a:ea typeface="+mn-ea"/>
+                <a:cs typeface="+mn-cs"/>
+              </a:defRPr>
+            </a:lvl8pPr>
+            <a:lvl9pPr marL="3886200" indent="-228600" algn="l" defTabSz="457200" rtl="0" eaLnBrk="1" latinLnBrk="0" hangingPunct="1">
+              <a:spcBef>
+                <a:spcPct val="20000"/>
+              </a:spcBef>
+              <a:spcAft>
+                <a:spcPts val="600"/>
+              </a:spcAft>
+              <a:buClr>
+                <a:schemeClr val="accent1">
+                  <a:lumMod val="75000"/>
+                </a:schemeClr>
+              </a:buClr>
+              <a:buSzPct val="145000"/>
+              <a:buFont typeface="Arial"/>
+              <a:buChar char="•"/>
+              <a:defRPr sz="1400" kern="1200" cap="none">
+                <a:solidFill>
+                  <a:schemeClr val="tx1"/>
+                </a:solidFill>
+                <a:effectLst/>
+                <a:latin typeface="+mn-lt"/>
+                <a:ea typeface="+mn-ea"/>
+                <a:cs typeface="+mn-cs"/>
+              </a:defRPr>
+            </a:lvl9pPr>
+          </a:lstStyle>
+          <a:p>
+            <a:pPr marL="0" indent="0">
+              <a:buNone/>
+            </a:pPr>
+            <a:r>
+              <a:rPr lang="de-DE" sz="1000" dirty="0" smtClean="0"/>
+              <a:t>Rem0 Röthlisberger, Eric </a:t>
+            </a:r>
+            <a:r>
+              <a:rPr lang="de-DE" sz="1000" dirty="0" err="1" smtClean="0"/>
+              <a:t>Lagger</a:t>
+            </a:r>
+            <a:r>
+              <a:rPr lang="de-DE" sz="1000" dirty="0" smtClean="0"/>
+              <a:t>, Vincent Hofer, Dean Klopsch, Aebi Ryan</a:t>
+            </a:r>
+            <a:endParaRPr lang="de-DE" sz="1000" dirty="0"/>
+          </a:p>
+        </p:txBody>
+      </p:sp>
+      <p:pic>
+        <p:nvPicPr>
+          <p:cNvPr id="5" name="Grafik 4"/>
+          <p:cNvPicPr>
+            <a:picLocks noChangeAspect="1"/>
+          </p:cNvPicPr>
+          <p:nvPr/>
+        </p:nvPicPr>
+        <p:blipFill>
+          <a:blip r:embed="rId3">
+            <a:extLst>
+              <a:ext uri="{28A0092B-C50C-407E-A947-70E740481C1C}">
+                <a14:useLocalDpi xmlns:a14="http://schemas.microsoft.com/office/drawing/2010/main" val="0"/>
+              </a:ext>
+            </a:extLst>
+          </a:blip>
+          <a:stretch>
+            <a:fillRect/>
+          </a:stretch>
+        </p:blipFill>
+        <p:spPr>
+          <a:xfrm>
+            <a:off x="1821905" y="2017293"/>
+            <a:ext cx="5731136" cy="4191001"/>
+          </a:xfrm>
+          <a:prstGeom prst="rect">
+            <a:avLst/>
+          </a:prstGeom>
+        </p:spPr>
+      </p:pic>
+    </p:spTree>
+    <p:extLst>
+      <p:ext uri="{BB962C8B-B14F-4D97-AF65-F5344CB8AC3E}">
+        <p14:creationId xmlns:p14="http://schemas.microsoft.com/office/powerpoint/2010/main" val="551476405"/>
+      </p:ext>
+    </p:extLst>
+  </p:cSld>
+  <p:clrMapOvr>
+    <a:masterClrMapping/>
+  </p:clrMapOvr>
+  <p:timing>
+    <p:tnLst>
+      <p:par>
+        <p:cTn id="1" dur="indefinite" restart="never" nodeType="tmRoot"/>
+      </p:par>
+    </p:tnLst>
+  </p:timing>
+</p:sld>
+</file>
+
+<file path=ppt/slides/slide15.xml><?xml version="1.0" encoding="utf-8"?>
+<p:sld xmlns:a="http://schemas.openxmlformats.org/drawingml/2006/main" xmlns:r="http://schemas.openxmlformats.org/officeDocument/2006/relationships" xmlns:p="http://schemas.openxmlformats.org/presentationml/2006/main">
+  <p:cSld>
+    <p:spTree>
+      <p:nvGrpSpPr>
+        <p:cNvPr id="1" name=""/>
+        <p:cNvGrpSpPr/>
+        <p:nvPr/>
+      </p:nvGrpSpPr>
+      <p:grpSpPr>
+        <a:xfrm>
+          <a:off x="0" y="0"/>
+          <a:ext cx="0" cy="0"/>
+          <a:chOff x="0" y="0"/>
+          <a:chExt cx="0" cy="0"/>
+        </a:xfrm>
+      </p:grpSpPr>
+      <p:sp>
+        <p:nvSpPr>
+          <p:cNvPr id="2" name="Titel 1"/>
+          <p:cNvSpPr>
+            <a:spLocks noGrp="1"/>
+          </p:cNvSpPr>
+          <p:nvPr>
+            <p:ph type="title"/>
+          </p:nvPr>
+        </p:nvSpPr>
+        <p:spPr>
+          <a:xfrm>
+            <a:off x="810915" y="691116"/>
+            <a:ext cx="10018713" cy="1752599"/>
+          </a:xfrm>
+        </p:spPr>
+        <p:txBody>
+          <a:bodyPr/>
+          <a:lstStyle/>
+          <a:p>
+            <a:r>
+              <a:rPr lang="de-DE" dirty="0" err="1" smtClean="0"/>
+              <a:t>Good</a:t>
+            </a:r>
+            <a:r>
+              <a:rPr lang="de-DE" dirty="0" smtClean="0"/>
+              <a:t> </a:t>
+            </a:r>
+            <a:r>
+              <a:rPr lang="de-DE" dirty="0" err="1" smtClean="0"/>
+              <a:t>code</a:t>
+            </a:r>
+            <a:endParaRPr lang="de-DE" dirty="0"/>
+          </a:p>
+        </p:txBody>
+      </p:sp>
+      <p:sp>
+        <p:nvSpPr>
+          <p:cNvPr id="6" name="Inhaltsplatzhalter 2"/>
+          <p:cNvSpPr txBox="1">
+            <a:spLocks/>
+          </p:cNvSpPr>
+          <p:nvPr/>
+        </p:nvSpPr>
+        <p:spPr>
+          <a:xfrm>
+            <a:off x="8137451" y="-41565"/>
+            <a:ext cx="4054549" cy="370610"/>
+          </a:xfrm>
+          <a:prstGeom prst="rect">
+            <a:avLst/>
+          </a:prstGeom>
+        </p:spPr>
+        <p:txBody>
+          <a:bodyPr vert="horz" lIns="91440" tIns="45720" rIns="91440" bIns="45720" rtlCol="0" anchor="ctr">
+            <a:normAutofit/>
+          </a:bodyPr>
+          <a:lstStyle>
+            <a:lvl1pPr marL="285750" indent="-285750" algn="l" defTabSz="457200" rtl="0" eaLnBrk="1" latinLnBrk="0" hangingPunct="1">
+              <a:spcBef>
+                <a:spcPct val="20000"/>
+              </a:spcBef>
+              <a:spcAft>
+                <a:spcPts val="600"/>
+              </a:spcAft>
+              <a:buClr>
+                <a:schemeClr val="accent1">
+                  <a:lumMod val="75000"/>
+                </a:schemeClr>
+              </a:buClr>
+              <a:buSzPct val="145000"/>
+              <a:buFont typeface="Arial"/>
+              <a:buChar char="•"/>
+              <a:defRPr sz="2400" kern="1200" cap="none">
+                <a:solidFill>
+                  <a:schemeClr val="tx1"/>
+                </a:solidFill>
+                <a:effectLst/>
+                <a:latin typeface="+mn-lt"/>
+                <a:ea typeface="+mn-ea"/>
+                <a:cs typeface="+mn-cs"/>
+              </a:defRPr>
+            </a:lvl1pPr>
+            <a:lvl2pPr marL="742950" indent="-285750" algn="l" defTabSz="457200" rtl="0" eaLnBrk="1" latinLnBrk="0" hangingPunct="1">
+              <a:spcBef>
+                <a:spcPct val="20000"/>
+              </a:spcBef>
+              <a:spcAft>
+                <a:spcPts val="600"/>
+              </a:spcAft>
+              <a:buClr>
+                <a:schemeClr val="accent1">
+                  <a:lumMod val="75000"/>
+                </a:schemeClr>
+              </a:buClr>
+              <a:buSzPct val="145000"/>
+              <a:buFont typeface="Arial"/>
+              <a:buChar char="•"/>
+              <a:defRPr sz="2000" kern="1200" cap="none">
+                <a:solidFill>
+                  <a:schemeClr val="tx1"/>
+                </a:solidFill>
+                <a:effectLst/>
+                <a:latin typeface="+mn-lt"/>
+                <a:ea typeface="+mn-ea"/>
+                <a:cs typeface="+mn-cs"/>
+              </a:defRPr>
+            </a:lvl2pPr>
+            <a:lvl3pPr marL="1200150" indent="-285750" algn="l" defTabSz="457200" rtl="0" eaLnBrk="1" latinLnBrk="0" hangingPunct="1">
+              <a:spcBef>
+                <a:spcPct val="20000"/>
+              </a:spcBef>
+              <a:spcAft>
+                <a:spcPts val="600"/>
+              </a:spcAft>
+              <a:buClr>
+                <a:schemeClr val="accent1">
+                  <a:lumMod val="75000"/>
+                </a:schemeClr>
+              </a:buClr>
+              <a:buSzPct val="145000"/>
+              <a:buFont typeface="Arial"/>
+              <a:buChar char="•"/>
+              <a:defRPr sz="1800" kern="1200" cap="none">
+                <a:solidFill>
+                  <a:schemeClr val="tx1"/>
+                </a:solidFill>
+                <a:effectLst/>
+                <a:latin typeface="+mn-lt"/>
+                <a:ea typeface="+mn-ea"/>
+                <a:cs typeface="+mn-cs"/>
+              </a:defRPr>
+            </a:lvl3pPr>
+            <a:lvl4pPr marL="1543050" indent="-171450" algn="l" defTabSz="457200" rtl="0" eaLnBrk="1" latinLnBrk="0" hangingPunct="1">
+              <a:spcBef>
+                <a:spcPct val="20000"/>
+              </a:spcBef>
+              <a:spcAft>
+                <a:spcPts val="600"/>
+              </a:spcAft>
+              <a:buClr>
+                <a:schemeClr val="accent1">
+                  <a:lumMod val="75000"/>
+                </a:schemeClr>
+              </a:buClr>
+              <a:buSzPct val="145000"/>
+              <a:buFont typeface="Arial"/>
+              <a:buChar char="•"/>
+              <a:defRPr sz="1600" kern="1200" cap="none">
+                <a:solidFill>
+                  <a:schemeClr val="tx1"/>
+                </a:solidFill>
+                <a:effectLst/>
+                <a:latin typeface="+mn-lt"/>
+                <a:ea typeface="+mn-ea"/>
+                <a:cs typeface="+mn-cs"/>
+              </a:defRPr>
+            </a:lvl4pPr>
+            <a:lvl5pPr marL="2000250" indent="-171450" algn="l" defTabSz="457200" rtl="0" eaLnBrk="1" latinLnBrk="0" hangingPunct="1">
+              <a:spcBef>
+                <a:spcPct val="20000"/>
+              </a:spcBef>
+              <a:spcAft>
+                <a:spcPts val="600"/>
+              </a:spcAft>
+              <a:buClr>
+                <a:schemeClr val="accent1">
+                  <a:lumMod val="75000"/>
+                </a:schemeClr>
+              </a:buClr>
+              <a:buSzPct val="145000"/>
+              <a:buFont typeface="Arial"/>
+              <a:buChar char="•"/>
+              <a:defRPr sz="1400" kern="1200" cap="none">
+                <a:solidFill>
+                  <a:schemeClr val="tx1"/>
+                </a:solidFill>
+                <a:effectLst/>
+                <a:latin typeface="+mn-lt"/>
+                <a:ea typeface="+mn-ea"/>
+                <a:cs typeface="+mn-cs"/>
+              </a:defRPr>
+            </a:lvl5pPr>
+            <a:lvl6pPr marL="2514600" indent="-228600" algn="l" defTabSz="457200" rtl="0" eaLnBrk="1" latinLnBrk="0" hangingPunct="1">
+              <a:spcBef>
+                <a:spcPct val="20000"/>
+              </a:spcBef>
+              <a:spcAft>
+                <a:spcPts val="600"/>
+              </a:spcAft>
+              <a:buClr>
+                <a:schemeClr val="accent1">
+                  <a:lumMod val="75000"/>
+                </a:schemeClr>
+              </a:buClr>
+              <a:buSzPct val="145000"/>
+              <a:buFont typeface="Arial"/>
+              <a:buChar char="•"/>
+              <a:defRPr sz="1400" kern="1200" cap="none">
+                <a:solidFill>
+                  <a:schemeClr val="tx1"/>
+                </a:solidFill>
+                <a:effectLst/>
+                <a:latin typeface="+mn-lt"/>
+                <a:ea typeface="+mn-ea"/>
+                <a:cs typeface="+mn-cs"/>
+              </a:defRPr>
+            </a:lvl6pPr>
+            <a:lvl7pPr marL="2971800" indent="-228600" algn="l" defTabSz="457200" rtl="0" eaLnBrk="1" latinLnBrk="0" hangingPunct="1">
+              <a:spcBef>
+                <a:spcPct val="20000"/>
+              </a:spcBef>
+              <a:spcAft>
+                <a:spcPts val="600"/>
+              </a:spcAft>
+              <a:buClr>
+                <a:schemeClr val="accent1">
+                  <a:lumMod val="75000"/>
+                </a:schemeClr>
+              </a:buClr>
+              <a:buSzPct val="145000"/>
+              <a:buFont typeface="Arial"/>
+              <a:buChar char="•"/>
+              <a:defRPr sz="1400" kern="1200" cap="none">
+                <a:solidFill>
+                  <a:schemeClr val="tx1"/>
+                </a:solidFill>
+                <a:effectLst/>
+                <a:latin typeface="+mn-lt"/>
+                <a:ea typeface="+mn-ea"/>
+                <a:cs typeface="+mn-cs"/>
+              </a:defRPr>
+            </a:lvl7pPr>
+            <a:lvl8pPr marL="3429000" indent="-228600" algn="l" defTabSz="457200" rtl="0" eaLnBrk="1" latinLnBrk="0" hangingPunct="1">
+              <a:spcBef>
+                <a:spcPct val="20000"/>
+              </a:spcBef>
+              <a:spcAft>
+                <a:spcPts val="600"/>
+              </a:spcAft>
+              <a:buClr>
+                <a:schemeClr val="accent1">
+                  <a:lumMod val="75000"/>
+                </a:schemeClr>
+              </a:buClr>
+              <a:buSzPct val="145000"/>
+              <a:buFont typeface="Arial"/>
+              <a:buChar char="•"/>
+              <a:defRPr sz="1400" kern="1200" cap="none">
+                <a:solidFill>
+                  <a:schemeClr val="tx1"/>
+                </a:solidFill>
+                <a:effectLst/>
+                <a:latin typeface="+mn-lt"/>
+                <a:ea typeface="+mn-ea"/>
+                <a:cs typeface="+mn-cs"/>
+              </a:defRPr>
+            </a:lvl8pPr>
+            <a:lvl9pPr marL="3886200" indent="-228600" algn="l" defTabSz="457200" rtl="0" eaLnBrk="1" latinLnBrk="0" hangingPunct="1">
+              <a:spcBef>
+                <a:spcPct val="20000"/>
+              </a:spcBef>
+              <a:spcAft>
+                <a:spcPts val="600"/>
+              </a:spcAft>
+              <a:buClr>
+                <a:schemeClr val="accent1">
+                  <a:lumMod val="75000"/>
+                </a:schemeClr>
+              </a:buClr>
+              <a:buSzPct val="145000"/>
+              <a:buFont typeface="Arial"/>
+              <a:buChar char="•"/>
+              <a:defRPr sz="1400" kern="1200" cap="none">
+                <a:solidFill>
+                  <a:schemeClr val="tx1"/>
+                </a:solidFill>
+                <a:effectLst/>
+                <a:latin typeface="+mn-lt"/>
+                <a:ea typeface="+mn-ea"/>
+                <a:cs typeface="+mn-cs"/>
+              </a:defRPr>
+            </a:lvl9pPr>
+          </a:lstStyle>
+          <a:p>
+            <a:pPr marL="0" indent="0">
+              <a:buNone/>
+            </a:pPr>
+            <a:r>
+              <a:rPr lang="de-DE" sz="1000" dirty="0" smtClean="0"/>
+              <a:t>Rem0 Röthlisberger, Eric </a:t>
+            </a:r>
+            <a:r>
+              <a:rPr lang="de-DE" sz="1000" dirty="0" err="1" smtClean="0"/>
+              <a:t>Lagger</a:t>
+            </a:r>
+            <a:r>
+              <a:rPr lang="de-DE" sz="1000" dirty="0" smtClean="0"/>
+              <a:t>, Vincent Hofer, Dean Klopsch, Aebi Ryan</a:t>
+            </a:r>
+            <a:endParaRPr lang="de-DE" sz="1000" dirty="0"/>
+          </a:p>
+        </p:txBody>
+      </p:sp>
+      <p:pic>
+        <p:nvPicPr>
+          <p:cNvPr id="5" name="Grafik 4"/>
+          <p:cNvPicPr>
+            <a:picLocks noChangeAspect="1"/>
+          </p:cNvPicPr>
+          <p:nvPr/>
+        </p:nvPicPr>
+        <p:blipFill>
+          <a:blip r:embed="rId3">
+            <a:extLst>
+              <a:ext uri="{28A0092B-C50C-407E-A947-70E740481C1C}">
+                <a14:useLocalDpi xmlns:a14="http://schemas.microsoft.com/office/drawing/2010/main" val="0"/>
+              </a:ext>
+            </a:extLst>
+          </a:blip>
+          <a:stretch>
+            <a:fillRect/>
+          </a:stretch>
+        </p:blipFill>
+        <p:spPr>
+          <a:xfrm>
+            <a:off x="1821905" y="2017293"/>
+            <a:ext cx="5731136" cy="4191001"/>
+          </a:xfrm>
+          <a:prstGeom prst="rect">
+            <a:avLst/>
+          </a:prstGeom>
+        </p:spPr>
+      </p:pic>
+      <p:pic>
+        <p:nvPicPr>
+          <p:cNvPr id="3" name="Grafik 2"/>
+          <p:cNvPicPr>
+            <a:picLocks noChangeAspect="1"/>
+          </p:cNvPicPr>
+          <p:nvPr/>
+        </p:nvPicPr>
+        <p:blipFill>
+          <a:blip r:embed="rId4">
+            <a:extLst>
+              <a:ext uri="{28A0092B-C50C-407E-A947-70E740481C1C}">
+                <a14:useLocalDpi xmlns:a14="http://schemas.microsoft.com/office/drawing/2010/main" val="0"/>
+              </a:ext>
+            </a:extLst>
+          </a:blip>
+          <a:stretch>
+            <a:fillRect/>
+          </a:stretch>
+        </p:blipFill>
+        <p:spPr>
+          <a:xfrm>
+            <a:off x="1821905" y="2017293"/>
+            <a:ext cx="7707106" cy="4555299"/>
+          </a:xfrm>
+          <a:prstGeom prst="rect">
+            <a:avLst/>
+          </a:prstGeom>
+        </p:spPr>
+      </p:pic>
+    </p:spTree>
+    <p:extLst>
+      <p:ext uri="{BB962C8B-B14F-4D97-AF65-F5344CB8AC3E}">
+        <p14:creationId xmlns:p14="http://schemas.microsoft.com/office/powerpoint/2010/main" val="3408486566"/>
+      </p:ext>
+    </p:extLst>
+  </p:cSld>
+  <p:clrMapOvr>
+    <a:masterClrMapping/>
+  </p:clrMapOvr>
+  <p:timing>
+    <p:tnLst>
+      <p:par>
+        <p:cTn id="1" dur="indefinite" restart="never" nodeType="tmRoot"/>
+      </p:par>
+    </p:tnLst>
+  </p:timing>
+</p:sld>
+</file>
+
+<file path=ppt/slides/slide16.xml><?xml version="1.0" encoding="utf-8"?>
+<p:sld xmlns:a="http://schemas.openxmlformats.org/drawingml/2006/main" xmlns:r="http://schemas.openxmlformats.org/officeDocument/2006/relationships" xmlns:p="http://schemas.openxmlformats.org/presentationml/2006/main">
+  <p:cSld>
+    <p:spTree>
+      <p:nvGrpSpPr>
+        <p:cNvPr id="1" name=""/>
+        <p:cNvGrpSpPr/>
+        <p:nvPr/>
+      </p:nvGrpSpPr>
+      <p:grpSpPr>
+        <a:xfrm>
+          <a:off x="0" y="0"/>
+          <a:ext cx="0" cy="0"/>
+          <a:chOff x="0" y="0"/>
+          <a:chExt cx="0" cy="0"/>
+        </a:xfrm>
+      </p:grpSpPr>
+      <p:sp>
+        <p:nvSpPr>
+          <p:cNvPr id="2" name="Titel 1"/>
+          <p:cNvSpPr>
+            <a:spLocks noGrp="1"/>
+          </p:cNvSpPr>
+          <p:nvPr>
+            <p:ph type="title"/>
+          </p:nvPr>
+        </p:nvSpPr>
+        <p:spPr>
+          <a:xfrm>
+            <a:off x="810915" y="691116"/>
+            <a:ext cx="10018713" cy="1752599"/>
+          </a:xfrm>
+        </p:spPr>
+        <p:txBody>
+          <a:bodyPr/>
+          <a:lstStyle/>
+          <a:p>
+            <a:r>
+              <a:rPr lang="de-DE" dirty="0" err="1" smtClean="0"/>
+              <a:t>Good</a:t>
+            </a:r>
+            <a:r>
+              <a:rPr lang="de-DE" dirty="0" smtClean="0"/>
+              <a:t> </a:t>
+            </a:r>
+            <a:r>
+              <a:rPr lang="de-DE" dirty="0" err="1" smtClean="0"/>
+              <a:t>code</a:t>
+            </a:r>
+            <a:endParaRPr lang="de-DE" dirty="0"/>
+          </a:p>
+        </p:txBody>
+      </p:sp>
+      <p:sp>
+        <p:nvSpPr>
+          <p:cNvPr id="6" name="Inhaltsplatzhalter 2"/>
+          <p:cNvSpPr txBox="1">
+            <a:spLocks/>
+          </p:cNvSpPr>
+          <p:nvPr/>
+        </p:nvSpPr>
+        <p:spPr>
+          <a:xfrm>
+            <a:off x="8137451" y="-41565"/>
+            <a:ext cx="4054549" cy="370610"/>
+          </a:xfrm>
+          <a:prstGeom prst="rect">
+            <a:avLst/>
+          </a:prstGeom>
+        </p:spPr>
+        <p:txBody>
+          <a:bodyPr vert="horz" lIns="91440" tIns="45720" rIns="91440" bIns="45720" rtlCol="0" anchor="ctr">
+            <a:normAutofit/>
+          </a:bodyPr>
+          <a:lstStyle>
+            <a:lvl1pPr marL="285750" indent="-285750" algn="l" defTabSz="457200" rtl="0" eaLnBrk="1" latinLnBrk="0" hangingPunct="1">
+              <a:spcBef>
+                <a:spcPct val="20000"/>
+              </a:spcBef>
+              <a:spcAft>
+                <a:spcPts val="600"/>
+              </a:spcAft>
+              <a:buClr>
+                <a:schemeClr val="accent1">
+                  <a:lumMod val="75000"/>
+                </a:schemeClr>
+              </a:buClr>
+              <a:buSzPct val="145000"/>
+              <a:buFont typeface="Arial"/>
+              <a:buChar char="•"/>
+              <a:defRPr sz="2400" kern="1200" cap="none">
+                <a:solidFill>
+                  <a:schemeClr val="tx1"/>
+                </a:solidFill>
+                <a:effectLst/>
+                <a:latin typeface="+mn-lt"/>
+                <a:ea typeface="+mn-ea"/>
+                <a:cs typeface="+mn-cs"/>
+              </a:defRPr>
+            </a:lvl1pPr>
+            <a:lvl2pPr marL="742950" indent="-285750" algn="l" defTabSz="457200" rtl="0" eaLnBrk="1" latinLnBrk="0" hangingPunct="1">
+              <a:spcBef>
+                <a:spcPct val="20000"/>
+              </a:spcBef>
+              <a:spcAft>
+                <a:spcPts val="600"/>
+              </a:spcAft>
+              <a:buClr>
+                <a:schemeClr val="accent1">
+                  <a:lumMod val="75000"/>
+                </a:schemeClr>
+              </a:buClr>
+              <a:buSzPct val="145000"/>
+              <a:buFont typeface="Arial"/>
+              <a:buChar char="•"/>
+              <a:defRPr sz="2000" kern="1200" cap="none">
+                <a:solidFill>
+                  <a:schemeClr val="tx1"/>
+                </a:solidFill>
+                <a:effectLst/>
+                <a:latin typeface="+mn-lt"/>
+                <a:ea typeface="+mn-ea"/>
+                <a:cs typeface="+mn-cs"/>
+              </a:defRPr>
+            </a:lvl2pPr>
+            <a:lvl3pPr marL="1200150" indent="-285750" algn="l" defTabSz="457200" rtl="0" eaLnBrk="1" latinLnBrk="0" hangingPunct="1">
+              <a:spcBef>
+                <a:spcPct val="20000"/>
+              </a:spcBef>
+              <a:spcAft>
+                <a:spcPts val="600"/>
+              </a:spcAft>
+              <a:buClr>
+                <a:schemeClr val="accent1">
+                  <a:lumMod val="75000"/>
+                </a:schemeClr>
+              </a:buClr>
+              <a:buSzPct val="145000"/>
+              <a:buFont typeface="Arial"/>
+              <a:buChar char="•"/>
+              <a:defRPr sz="1800" kern="1200" cap="none">
+                <a:solidFill>
+                  <a:schemeClr val="tx1"/>
+                </a:solidFill>
+                <a:effectLst/>
+                <a:latin typeface="+mn-lt"/>
+                <a:ea typeface="+mn-ea"/>
+                <a:cs typeface="+mn-cs"/>
+              </a:defRPr>
+            </a:lvl3pPr>
+            <a:lvl4pPr marL="1543050" indent="-171450" algn="l" defTabSz="457200" rtl="0" eaLnBrk="1" latinLnBrk="0" hangingPunct="1">
+              <a:spcBef>
+                <a:spcPct val="20000"/>
+              </a:spcBef>
+              <a:spcAft>
+                <a:spcPts val="600"/>
+              </a:spcAft>
+              <a:buClr>
+                <a:schemeClr val="accent1">
+                  <a:lumMod val="75000"/>
+                </a:schemeClr>
+              </a:buClr>
+              <a:buSzPct val="145000"/>
+              <a:buFont typeface="Arial"/>
+              <a:buChar char="•"/>
+              <a:defRPr sz="1600" kern="1200" cap="none">
+                <a:solidFill>
+                  <a:schemeClr val="tx1"/>
+                </a:solidFill>
+                <a:effectLst/>
+                <a:latin typeface="+mn-lt"/>
+                <a:ea typeface="+mn-ea"/>
+                <a:cs typeface="+mn-cs"/>
+              </a:defRPr>
+            </a:lvl4pPr>
+            <a:lvl5pPr marL="2000250" indent="-171450" algn="l" defTabSz="457200" rtl="0" eaLnBrk="1" latinLnBrk="0" hangingPunct="1">
+              <a:spcBef>
+                <a:spcPct val="20000"/>
+              </a:spcBef>
+              <a:spcAft>
+                <a:spcPts val="600"/>
+              </a:spcAft>
+              <a:buClr>
+                <a:schemeClr val="accent1">
+                  <a:lumMod val="75000"/>
+                </a:schemeClr>
+              </a:buClr>
+              <a:buSzPct val="145000"/>
+              <a:buFont typeface="Arial"/>
+              <a:buChar char="•"/>
+              <a:defRPr sz="1400" kern="1200" cap="none">
+                <a:solidFill>
+                  <a:schemeClr val="tx1"/>
+                </a:solidFill>
+                <a:effectLst/>
+                <a:latin typeface="+mn-lt"/>
+                <a:ea typeface="+mn-ea"/>
+                <a:cs typeface="+mn-cs"/>
+              </a:defRPr>
+            </a:lvl5pPr>
+            <a:lvl6pPr marL="2514600" indent="-228600" algn="l" defTabSz="457200" rtl="0" eaLnBrk="1" latinLnBrk="0" hangingPunct="1">
+              <a:spcBef>
+                <a:spcPct val="20000"/>
+              </a:spcBef>
+              <a:spcAft>
+                <a:spcPts val="600"/>
+              </a:spcAft>
+              <a:buClr>
+                <a:schemeClr val="accent1">
+                  <a:lumMod val="75000"/>
+                </a:schemeClr>
+              </a:buClr>
+              <a:buSzPct val="145000"/>
+              <a:buFont typeface="Arial"/>
+              <a:buChar char="•"/>
+              <a:defRPr sz="1400" kern="1200" cap="none">
+                <a:solidFill>
+                  <a:schemeClr val="tx1"/>
+                </a:solidFill>
+                <a:effectLst/>
+                <a:latin typeface="+mn-lt"/>
+                <a:ea typeface="+mn-ea"/>
+                <a:cs typeface="+mn-cs"/>
+              </a:defRPr>
+            </a:lvl6pPr>
+            <a:lvl7pPr marL="2971800" indent="-228600" algn="l" defTabSz="457200" rtl="0" eaLnBrk="1" latinLnBrk="0" hangingPunct="1">
+              <a:spcBef>
+                <a:spcPct val="20000"/>
+              </a:spcBef>
+              <a:spcAft>
+                <a:spcPts val="600"/>
+              </a:spcAft>
+              <a:buClr>
+                <a:schemeClr val="accent1">
+                  <a:lumMod val="75000"/>
+                </a:schemeClr>
+              </a:buClr>
+              <a:buSzPct val="145000"/>
+              <a:buFont typeface="Arial"/>
+              <a:buChar char="•"/>
+              <a:defRPr sz="1400" kern="1200" cap="none">
+                <a:solidFill>
+                  <a:schemeClr val="tx1"/>
+                </a:solidFill>
+                <a:effectLst/>
+                <a:latin typeface="+mn-lt"/>
+                <a:ea typeface="+mn-ea"/>
+                <a:cs typeface="+mn-cs"/>
+              </a:defRPr>
+            </a:lvl7pPr>
+            <a:lvl8pPr marL="3429000" indent="-228600" algn="l" defTabSz="457200" rtl="0" eaLnBrk="1" latinLnBrk="0" hangingPunct="1">
+              <a:spcBef>
+                <a:spcPct val="20000"/>
+              </a:spcBef>
+              <a:spcAft>
+                <a:spcPts val="600"/>
+              </a:spcAft>
+              <a:buClr>
+                <a:schemeClr val="accent1">
+                  <a:lumMod val="75000"/>
+                </a:schemeClr>
+              </a:buClr>
+              <a:buSzPct val="145000"/>
+              <a:buFont typeface="Arial"/>
+              <a:buChar char="•"/>
+              <a:defRPr sz="1400" kern="1200" cap="none">
+                <a:solidFill>
+                  <a:schemeClr val="tx1"/>
+                </a:solidFill>
+                <a:effectLst/>
+                <a:latin typeface="+mn-lt"/>
+                <a:ea typeface="+mn-ea"/>
+                <a:cs typeface="+mn-cs"/>
+              </a:defRPr>
+            </a:lvl8pPr>
+            <a:lvl9pPr marL="3886200" indent="-228600" algn="l" defTabSz="457200" rtl="0" eaLnBrk="1" latinLnBrk="0" hangingPunct="1">
+              <a:spcBef>
+                <a:spcPct val="20000"/>
+              </a:spcBef>
+              <a:spcAft>
+                <a:spcPts val="600"/>
+              </a:spcAft>
+              <a:buClr>
+                <a:schemeClr val="accent1">
+                  <a:lumMod val="75000"/>
+                </a:schemeClr>
+              </a:buClr>
+              <a:buSzPct val="145000"/>
+              <a:buFont typeface="Arial"/>
+              <a:buChar char="•"/>
+              <a:defRPr sz="1400" kern="1200" cap="none">
+                <a:solidFill>
+                  <a:schemeClr val="tx1"/>
+                </a:solidFill>
+                <a:effectLst/>
+                <a:latin typeface="+mn-lt"/>
+                <a:ea typeface="+mn-ea"/>
+                <a:cs typeface="+mn-cs"/>
+              </a:defRPr>
+            </a:lvl9pPr>
+          </a:lstStyle>
+          <a:p>
+            <a:pPr marL="0" indent="0">
+              <a:buNone/>
+            </a:pPr>
+            <a:r>
+              <a:rPr lang="de-DE" sz="1000" dirty="0" smtClean="0"/>
+              <a:t>Rem0 Röthlisberger, Eric </a:t>
+            </a:r>
+            <a:r>
+              <a:rPr lang="de-DE" sz="1000" dirty="0" err="1" smtClean="0"/>
+              <a:t>Lagger</a:t>
+            </a:r>
+            <a:r>
+              <a:rPr lang="de-DE" sz="1000" dirty="0" smtClean="0"/>
+              <a:t>, Vincent Hofer, Dean Klopsch, Aebi Ryan</a:t>
+            </a:r>
+            <a:endParaRPr lang="de-DE" sz="1000" dirty="0"/>
+          </a:p>
+        </p:txBody>
+      </p:sp>
+      <p:pic>
+        <p:nvPicPr>
+          <p:cNvPr id="5" name="Grafik 4"/>
+          <p:cNvPicPr>
+            <a:picLocks noChangeAspect="1"/>
+          </p:cNvPicPr>
+          <p:nvPr/>
+        </p:nvPicPr>
+        <p:blipFill>
+          <a:blip r:embed="rId3">
+            <a:extLst>
+              <a:ext uri="{28A0092B-C50C-407E-A947-70E740481C1C}">
+                <a14:useLocalDpi xmlns:a14="http://schemas.microsoft.com/office/drawing/2010/main" val="0"/>
+              </a:ext>
+            </a:extLst>
+          </a:blip>
+          <a:stretch>
+            <a:fillRect/>
+          </a:stretch>
+        </p:blipFill>
+        <p:spPr>
+          <a:xfrm>
+            <a:off x="1821905" y="2017293"/>
+            <a:ext cx="5731136" cy="4191001"/>
+          </a:xfrm>
+          <a:prstGeom prst="rect">
+            <a:avLst/>
+          </a:prstGeom>
+        </p:spPr>
+      </p:pic>
+      <p:pic>
+        <p:nvPicPr>
+          <p:cNvPr id="3" name="Grafik 2"/>
+          <p:cNvPicPr>
+            <a:picLocks noChangeAspect="1"/>
+          </p:cNvPicPr>
+          <p:nvPr/>
+        </p:nvPicPr>
+        <p:blipFill>
+          <a:blip r:embed="rId4">
+            <a:extLst>
+              <a:ext uri="{28A0092B-C50C-407E-A947-70E740481C1C}">
+                <a14:useLocalDpi xmlns:a14="http://schemas.microsoft.com/office/drawing/2010/main" val="0"/>
+              </a:ext>
+            </a:extLst>
+          </a:blip>
+          <a:stretch>
+            <a:fillRect/>
+          </a:stretch>
+        </p:blipFill>
+        <p:spPr>
+          <a:xfrm>
+            <a:off x="1821905" y="2017293"/>
+            <a:ext cx="7090751" cy="4191001"/>
+          </a:xfrm>
+          <a:prstGeom prst="rect">
+            <a:avLst/>
+          </a:prstGeom>
+        </p:spPr>
+      </p:pic>
+      <p:pic>
+        <p:nvPicPr>
+          <p:cNvPr id="4" name="Grafik 3"/>
+          <p:cNvPicPr>
+            <a:picLocks noChangeAspect="1"/>
+          </p:cNvPicPr>
+          <p:nvPr/>
+        </p:nvPicPr>
+        <p:blipFill>
+          <a:blip r:embed="rId5">
+            <a:extLst>
+              <a:ext uri="{28A0092B-C50C-407E-A947-70E740481C1C}">
+                <a14:useLocalDpi xmlns:a14="http://schemas.microsoft.com/office/drawing/2010/main" val="0"/>
+              </a:ext>
+            </a:extLst>
+          </a:blip>
+          <a:stretch>
+            <a:fillRect/>
+          </a:stretch>
+        </p:blipFill>
+        <p:spPr>
+          <a:xfrm>
+            <a:off x="1821905" y="2017292"/>
+            <a:ext cx="7695074" cy="4191001"/>
+          </a:xfrm>
+          <a:prstGeom prst="rect">
+            <a:avLst/>
+          </a:prstGeom>
+        </p:spPr>
+      </p:pic>
+    </p:spTree>
+    <p:extLst>
+      <p:ext uri="{BB962C8B-B14F-4D97-AF65-F5344CB8AC3E}">
+        <p14:creationId xmlns:p14="http://schemas.microsoft.com/office/powerpoint/2010/main" val="3224049448"/>
+      </p:ext>
+    </p:extLst>
+  </p:cSld>
+  <p:clrMapOvr>
+    <a:masterClrMapping/>
+  </p:clrMapOvr>
+  <p:timing>
+    <p:tnLst>
+      <p:par>
+        <p:cTn id="1" dur="indefinite" restart="never" nodeType="tmRoot"/>
+      </p:par>
+    </p:tnLst>
+  </p:timing>
+</p:sld>
+</file>
+
+<file path=ppt/slides/slide17.xml><?xml version="1.0" encoding="utf-8"?>
+<p:sld xmlns:a="http://schemas.openxmlformats.org/drawingml/2006/main" xmlns:r="http://schemas.openxmlformats.org/officeDocument/2006/relationships" xmlns:p="http://schemas.openxmlformats.org/presentationml/2006/main">
+  <p:cSld>
+    <p:spTree>
+      <p:nvGrpSpPr>
+        <p:cNvPr id="1" name=""/>
+        <p:cNvGrpSpPr/>
+        <p:nvPr/>
+      </p:nvGrpSpPr>
+      <p:grpSpPr>
+        <a:xfrm>
+          <a:off x="0" y="0"/>
+          <a:ext cx="0" cy="0"/>
+          <a:chOff x="0" y="0"/>
+          <a:chExt cx="0" cy="0"/>
+        </a:xfrm>
+      </p:grpSpPr>
+      <p:sp>
+        <p:nvSpPr>
+          <p:cNvPr id="2" name="Titel 1"/>
+          <p:cNvSpPr>
+            <a:spLocks noGrp="1"/>
+          </p:cNvSpPr>
+          <p:nvPr>
+            <p:ph type="title"/>
+          </p:nvPr>
+        </p:nvSpPr>
+        <p:spPr>
+          <a:xfrm>
+            <a:off x="810915" y="691116"/>
+            <a:ext cx="10018713" cy="1752599"/>
+          </a:xfrm>
+        </p:spPr>
+        <p:txBody>
+          <a:bodyPr/>
+          <a:lstStyle/>
+          <a:p>
+            <a:r>
+              <a:rPr lang="de-DE" dirty="0" err="1" smtClean="0"/>
+              <a:t>Why</a:t>
+            </a:r>
+            <a:r>
+              <a:rPr lang="de-DE" dirty="0" smtClean="0"/>
+              <a:t> </a:t>
+            </a:r>
+            <a:r>
+              <a:rPr lang="de-DE" dirty="0" err="1" smtClean="0"/>
+              <a:t>us</a:t>
+            </a:r>
+            <a:r>
+              <a:rPr lang="de-DE" dirty="0" smtClean="0"/>
+              <a:t>?</a:t>
+            </a:r>
+            <a:endParaRPr lang="de-DE" dirty="0"/>
+          </a:p>
+        </p:txBody>
+      </p:sp>
+      <p:sp>
+        <p:nvSpPr>
+          <p:cNvPr id="6" name="Inhaltsplatzhalter 2"/>
+          <p:cNvSpPr txBox="1">
+            <a:spLocks/>
+          </p:cNvSpPr>
+          <p:nvPr/>
+        </p:nvSpPr>
+        <p:spPr>
+          <a:xfrm>
+            <a:off x="8137451" y="-41565"/>
+            <a:ext cx="4054549" cy="370610"/>
+          </a:xfrm>
+          <a:prstGeom prst="rect">
+            <a:avLst/>
+          </a:prstGeom>
+        </p:spPr>
+        <p:txBody>
+          <a:bodyPr vert="horz" lIns="91440" tIns="45720" rIns="91440" bIns="45720" rtlCol="0" anchor="ctr">
+            <a:normAutofit/>
+          </a:bodyPr>
+          <a:lstStyle>
+            <a:lvl1pPr marL="285750" indent="-285750" algn="l" defTabSz="457200" rtl="0" eaLnBrk="1" latinLnBrk="0" hangingPunct="1">
+              <a:spcBef>
+                <a:spcPct val="20000"/>
+              </a:spcBef>
+              <a:spcAft>
+                <a:spcPts val="600"/>
+              </a:spcAft>
+              <a:buClr>
+                <a:schemeClr val="accent1">
+                  <a:lumMod val="75000"/>
+                </a:schemeClr>
+              </a:buClr>
+              <a:buSzPct val="145000"/>
+              <a:buFont typeface="Arial"/>
+              <a:buChar char="•"/>
+              <a:defRPr sz="2400" kern="1200" cap="none">
+                <a:solidFill>
+                  <a:schemeClr val="tx1"/>
+                </a:solidFill>
+                <a:effectLst/>
+                <a:latin typeface="+mn-lt"/>
+                <a:ea typeface="+mn-ea"/>
+                <a:cs typeface="+mn-cs"/>
+              </a:defRPr>
+            </a:lvl1pPr>
+            <a:lvl2pPr marL="742950" indent="-285750" algn="l" defTabSz="457200" rtl="0" eaLnBrk="1" latinLnBrk="0" hangingPunct="1">
+              <a:spcBef>
+                <a:spcPct val="20000"/>
+              </a:spcBef>
+              <a:spcAft>
+                <a:spcPts val="600"/>
+              </a:spcAft>
+              <a:buClr>
+                <a:schemeClr val="accent1">
+                  <a:lumMod val="75000"/>
+                </a:schemeClr>
+              </a:buClr>
+              <a:buSzPct val="145000"/>
+              <a:buFont typeface="Arial"/>
+              <a:buChar char="•"/>
+              <a:defRPr sz="2000" kern="1200" cap="none">
+                <a:solidFill>
+                  <a:schemeClr val="tx1"/>
+                </a:solidFill>
+                <a:effectLst/>
+                <a:latin typeface="+mn-lt"/>
+                <a:ea typeface="+mn-ea"/>
+                <a:cs typeface="+mn-cs"/>
+              </a:defRPr>
+            </a:lvl2pPr>
+            <a:lvl3pPr marL="1200150" indent="-285750" algn="l" defTabSz="457200" rtl="0" eaLnBrk="1" latinLnBrk="0" hangingPunct="1">
+              <a:spcBef>
+                <a:spcPct val="20000"/>
+              </a:spcBef>
+              <a:spcAft>
+                <a:spcPts val="600"/>
+              </a:spcAft>
+              <a:buClr>
+                <a:schemeClr val="accent1">
+                  <a:lumMod val="75000"/>
+                </a:schemeClr>
+              </a:buClr>
+              <a:buSzPct val="145000"/>
+              <a:buFont typeface="Arial"/>
+              <a:buChar char="•"/>
+              <a:defRPr sz="1800" kern="1200" cap="none">
+                <a:solidFill>
+                  <a:schemeClr val="tx1"/>
+                </a:solidFill>
+                <a:effectLst/>
+                <a:latin typeface="+mn-lt"/>
+                <a:ea typeface="+mn-ea"/>
+                <a:cs typeface="+mn-cs"/>
+              </a:defRPr>
+            </a:lvl3pPr>
+            <a:lvl4pPr marL="1543050" indent="-171450" algn="l" defTabSz="457200" rtl="0" eaLnBrk="1" latinLnBrk="0" hangingPunct="1">
+              <a:spcBef>
+                <a:spcPct val="20000"/>
+              </a:spcBef>
+              <a:spcAft>
+                <a:spcPts val="600"/>
+              </a:spcAft>
+              <a:buClr>
+                <a:schemeClr val="accent1">
+                  <a:lumMod val="75000"/>
+                </a:schemeClr>
+              </a:buClr>
+              <a:buSzPct val="145000"/>
+              <a:buFont typeface="Arial"/>
+              <a:buChar char="•"/>
+              <a:defRPr sz="1600" kern="1200" cap="none">
+                <a:solidFill>
+                  <a:schemeClr val="tx1"/>
+                </a:solidFill>
+                <a:effectLst/>
+                <a:latin typeface="+mn-lt"/>
+                <a:ea typeface="+mn-ea"/>
+                <a:cs typeface="+mn-cs"/>
+              </a:defRPr>
+            </a:lvl4pPr>
+            <a:lvl5pPr marL="2000250" indent="-171450" algn="l" defTabSz="457200" rtl="0" eaLnBrk="1" latinLnBrk="0" hangingPunct="1">
+              <a:spcBef>
+                <a:spcPct val="20000"/>
+              </a:spcBef>
+              <a:spcAft>
+                <a:spcPts val="600"/>
+              </a:spcAft>
+              <a:buClr>
+                <a:schemeClr val="accent1">
+                  <a:lumMod val="75000"/>
+                </a:schemeClr>
+              </a:buClr>
+              <a:buSzPct val="145000"/>
+              <a:buFont typeface="Arial"/>
+              <a:buChar char="•"/>
+              <a:defRPr sz="1400" kern="1200" cap="none">
+                <a:solidFill>
+                  <a:schemeClr val="tx1"/>
+                </a:solidFill>
+                <a:effectLst/>
+                <a:latin typeface="+mn-lt"/>
+                <a:ea typeface="+mn-ea"/>
+                <a:cs typeface="+mn-cs"/>
+              </a:defRPr>
+            </a:lvl5pPr>
+            <a:lvl6pPr marL="2514600" indent="-228600" algn="l" defTabSz="457200" rtl="0" eaLnBrk="1" latinLnBrk="0" hangingPunct="1">
+              <a:spcBef>
+                <a:spcPct val="20000"/>
+              </a:spcBef>
+              <a:spcAft>
+                <a:spcPts val="600"/>
+              </a:spcAft>
+              <a:buClr>
+                <a:schemeClr val="accent1">
+                  <a:lumMod val="75000"/>
+                </a:schemeClr>
+              </a:buClr>
+              <a:buSzPct val="145000"/>
+              <a:buFont typeface="Arial"/>
+              <a:buChar char="•"/>
+              <a:defRPr sz="1400" kern="1200" cap="none">
+                <a:solidFill>
+                  <a:schemeClr val="tx1"/>
+                </a:solidFill>
+                <a:effectLst/>
+                <a:latin typeface="+mn-lt"/>
+                <a:ea typeface="+mn-ea"/>
+                <a:cs typeface="+mn-cs"/>
+              </a:defRPr>
+            </a:lvl6pPr>
+            <a:lvl7pPr marL="2971800" indent="-228600" algn="l" defTabSz="457200" rtl="0" eaLnBrk="1" latinLnBrk="0" hangingPunct="1">
+              <a:spcBef>
+                <a:spcPct val="20000"/>
+              </a:spcBef>
+              <a:spcAft>
+                <a:spcPts val="600"/>
+              </a:spcAft>
+              <a:buClr>
+                <a:schemeClr val="accent1">
+                  <a:lumMod val="75000"/>
+                </a:schemeClr>
+              </a:buClr>
+              <a:buSzPct val="145000"/>
+              <a:buFont typeface="Arial"/>
+              <a:buChar char="•"/>
+              <a:defRPr sz="1400" kern="1200" cap="none">
+                <a:solidFill>
+                  <a:schemeClr val="tx1"/>
+                </a:solidFill>
+                <a:effectLst/>
+                <a:latin typeface="+mn-lt"/>
+                <a:ea typeface="+mn-ea"/>
+                <a:cs typeface="+mn-cs"/>
+              </a:defRPr>
+            </a:lvl7pPr>
+            <a:lvl8pPr marL="3429000" indent="-228600" algn="l" defTabSz="457200" rtl="0" eaLnBrk="1" latinLnBrk="0" hangingPunct="1">
+              <a:spcBef>
+                <a:spcPct val="20000"/>
+              </a:spcBef>
+              <a:spcAft>
+                <a:spcPts val="600"/>
+              </a:spcAft>
+              <a:buClr>
+                <a:schemeClr val="accent1">
+                  <a:lumMod val="75000"/>
+                </a:schemeClr>
+              </a:buClr>
+              <a:buSzPct val="145000"/>
+              <a:buFont typeface="Arial"/>
+              <a:buChar char="•"/>
+              <a:defRPr sz="1400" kern="1200" cap="none">
+                <a:solidFill>
+                  <a:schemeClr val="tx1"/>
+                </a:solidFill>
+                <a:effectLst/>
+                <a:latin typeface="+mn-lt"/>
+                <a:ea typeface="+mn-ea"/>
+                <a:cs typeface="+mn-cs"/>
+              </a:defRPr>
+            </a:lvl8pPr>
+            <a:lvl9pPr marL="3886200" indent="-228600" algn="l" defTabSz="457200" rtl="0" eaLnBrk="1" latinLnBrk="0" hangingPunct="1">
+              <a:spcBef>
+                <a:spcPct val="20000"/>
+              </a:spcBef>
+              <a:spcAft>
+                <a:spcPts val="600"/>
+              </a:spcAft>
+              <a:buClr>
+                <a:schemeClr val="accent1">
+                  <a:lumMod val="75000"/>
+                </a:schemeClr>
+              </a:buClr>
+              <a:buSzPct val="145000"/>
+              <a:buFont typeface="Arial"/>
+              <a:buChar char="•"/>
+              <a:defRPr sz="1400" kern="1200" cap="none">
+                <a:solidFill>
+                  <a:schemeClr val="tx1"/>
+                </a:solidFill>
+                <a:effectLst/>
+                <a:latin typeface="+mn-lt"/>
+                <a:ea typeface="+mn-ea"/>
+                <a:cs typeface="+mn-cs"/>
+              </a:defRPr>
+            </a:lvl9pPr>
+          </a:lstStyle>
+          <a:p>
+            <a:pPr marL="0" indent="0">
+              <a:buNone/>
+            </a:pPr>
+            <a:r>
+              <a:rPr lang="de-DE" sz="1000" dirty="0" smtClean="0"/>
+              <a:t>Rem0 Röthlisberger, Eric </a:t>
+            </a:r>
+            <a:r>
+              <a:rPr lang="de-DE" sz="1000" dirty="0" err="1" smtClean="0"/>
+              <a:t>Lagger</a:t>
+            </a:r>
+            <a:r>
+              <a:rPr lang="de-DE" sz="1000" dirty="0" smtClean="0"/>
+              <a:t>, Vincent Hofer, Dean Klopsch, Aebi Ryan</a:t>
+            </a:r>
+            <a:endParaRPr lang="de-DE" sz="1000" dirty="0"/>
+          </a:p>
+        </p:txBody>
+      </p:sp>
+      <p:sp>
+        <p:nvSpPr>
+          <p:cNvPr id="7" name="Inhaltsplatzhalter 2"/>
+          <p:cNvSpPr>
+            <a:spLocks noGrp="1"/>
+          </p:cNvSpPr>
+          <p:nvPr>
+            <p:ph idx="1"/>
+          </p:nvPr>
+        </p:nvSpPr>
+        <p:spPr>
+          <a:xfrm>
+            <a:off x="762552" y="2065420"/>
+            <a:ext cx="10115438" cy="3937001"/>
+          </a:xfrm>
+        </p:spPr>
+        <p:txBody>
+          <a:bodyPr>
+            <a:normAutofit/>
+          </a:bodyPr>
+          <a:lstStyle/>
+          <a:p>
+            <a:pPr algn="ctr"/>
+            <a:r>
+              <a:rPr lang="de-DE" sz="3200" dirty="0" err="1" smtClean="0"/>
+              <a:t>Our</a:t>
+            </a:r>
+            <a:r>
+              <a:rPr lang="de-DE" sz="3200" dirty="0" smtClean="0"/>
+              <a:t> </a:t>
+            </a:r>
+            <a:r>
+              <a:rPr lang="de-DE" sz="3200" dirty="0" err="1" smtClean="0"/>
+              <a:t>team</a:t>
+            </a:r>
+            <a:endParaRPr lang="de-DE" sz="3200" dirty="0" smtClean="0"/>
+          </a:p>
+          <a:p>
+            <a:pPr algn="ctr"/>
+            <a:r>
+              <a:rPr lang="de-DE" sz="3200" dirty="0" smtClean="0"/>
+              <a:t>The </a:t>
+            </a:r>
+            <a:r>
+              <a:rPr lang="de-DE" sz="3200" dirty="0" err="1" smtClean="0"/>
+              <a:t>products</a:t>
+            </a:r>
+            <a:r>
+              <a:rPr lang="de-DE" sz="3200" dirty="0" smtClean="0"/>
+              <a:t/>
+            </a:r>
+            <a:br>
+              <a:rPr lang="de-DE" sz="3200" dirty="0" smtClean="0"/>
+            </a:br>
+            <a:r>
+              <a:rPr lang="de-DE" sz="3200" dirty="0" smtClean="0"/>
+              <a:t>-&gt; The </a:t>
+            </a:r>
+            <a:r>
+              <a:rPr lang="de-DE" sz="3200" dirty="0" err="1" smtClean="0"/>
+              <a:t>client</a:t>
+            </a:r>
+            <a:r>
+              <a:rPr lang="de-DE" sz="3200" dirty="0" smtClean="0"/>
+              <a:t/>
+            </a:r>
+            <a:br>
+              <a:rPr lang="de-DE" sz="3200" dirty="0" smtClean="0"/>
+            </a:br>
+            <a:r>
+              <a:rPr lang="de-DE" sz="3200" dirty="0" smtClean="0"/>
+              <a:t>-&gt; The </a:t>
+            </a:r>
+            <a:r>
+              <a:rPr lang="de-DE" sz="3200" dirty="0" err="1" smtClean="0"/>
+              <a:t>developers</a:t>
+            </a:r>
+            <a:endParaRPr lang="de-DE" sz="3200" dirty="0" smtClean="0"/>
+          </a:p>
+          <a:p>
+            <a:pPr algn="ctr"/>
+            <a:r>
+              <a:rPr lang="de-DE" sz="3200" dirty="0" err="1" smtClean="0"/>
+              <a:t>Ask</a:t>
+            </a:r>
+            <a:r>
+              <a:rPr lang="de-DE" sz="3200" dirty="0" smtClean="0"/>
+              <a:t> </a:t>
+            </a:r>
+            <a:r>
+              <a:rPr lang="de-DE" sz="3200" dirty="0" err="1" smtClean="0"/>
+              <a:t>us</a:t>
+            </a:r>
+            <a:r>
+              <a:rPr lang="de-DE" sz="3200" dirty="0" smtClean="0"/>
+              <a:t>!</a:t>
+            </a:r>
+          </a:p>
+          <a:p>
+            <a:pPr algn="ctr"/>
+            <a:r>
+              <a:rPr lang="de-DE" sz="3200" dirty="0" err="1" smtClean="0"/>
+              <a:t>Contact</a:t>
+            </a:r>
+            <a:r>
+              <a:rPr lang="de-DE" sz="3200" dirty="0" smtClean="0"/>
+              <a:t> </a:t>
+            </a:r>
+            <a:r>
+              <a:rPr lang="de-DE" sz="3200" dirty="0" err="1" smtClean="0"/>
+              <a:t>us</a:t>
+            </a:r>
+            <a:r>
+              <a:rPr lang="de-DE" sz="3200" dirty="0" smtClean="0"/>
+              <a:t>!</a:t>
+            </a:r>
+          </a:p>
+        </p:txBody>
+      </p:sp>
+    </p:spTree>
+    <p:extLst>
+      <p:ext uri="{BB962C8B-B14F-4D97-AF65-F5344CB8AC3E}">
+        <p14:creationId xmlns:p14="http://schemas.microsoft.com/office/powerpoint/2010/main" val="776772405"/>
+      </p:ext>
+    </p:extLst>
+  </p:cSld>
+  <p:clrMapOvr>
+    <a:masterClrMapping/>
+  </p:clrMapOvr>
+  <p:timing>
+    <p:tnLst>
+      <p:par>
+        <p:cTn id="1" dur="indefinite" restart="never" nodeType="tmRoot"/>
+      </p:par>
+    </p:tnLst>
+  </p:timing>
+</p:sld>
+</file>
+
+<file path=ppt/slides/slide18.xml><?xml version="1.0" encoding="utf-8"?>
+<p:sld xmlns:a="http://schemas.openxmlformats.org/drawingml/2006/main" xmlns:r="http://schemas.openxmlformats.org/officeDocument/2006/relationships" xmlns:p="http://schemas.openxmlformats.org/presentationml/2006/main">
+  <p:cSld>
+    <p:spTree>
+      <p:nvGrpSpPr>
+        <p:cNvPr id="1" name=""/>
+        <p:cNvGrpSpPr/>
+        <p:nvPr/>
+      </p:nvGrpSpPr>
+      <p:grpSpPr>
+        <a:xfrm>
+          <a:off x="0" y="0"/>
+          <a:ext cx="0" cy="0"/>
+          <a:chOff x="0" y="0"/>
+          <a:chExt cx="0" cy="0"/>
+        </a:xfrm>
+      </p:grpSpPr>
+      <p:sp>
+        <p:nvSpPr>
+          <p:cNvPr id="2" name="Titel 1"/>
+          <p:cNvSpPr>
+            <a:spLocks noGrp="1"/>
+          </p:cNvSpPr>
+          <p:nvPr>
+            <p:ph type="title"/>
+          </p:nvPr>
+        </p:nvSpPr>
+        <p:spPr>
+          <a:xfrm>
+            <a:off x="810915" y="691116"/>
+            <a:ext cx="10018713" cy="1752599"/>
+          </a:xfrm>
+        </p:spPr>
+        <p:txBody>
+          <a:bodyPr/>
+          <a:lstStyle/>
+          <a:p>
+            <a:r>
+              <a:rPr lang="de-DE" dirty="0" err="1" smtClean="0"/>
               <a:t>Questions</a:t>
             </a:r>
             <a:endParaRPr lang="de-DE" dirty="0"/>
@@ -8713,7 +12121,7 @@
           <a:noFill/>
           <a:extLst>
             <a:ext uri="{909E8E84-426E-40dd-AFC4-6F175D3DCCD1}">
-              <a14:hiddenFill xmlns:a14="http://schemas.microsoft.com/office/drawing/2010/main" xmlns="">
+              <a14:hiddenFill xmlns="" xmlns:a14="http://schemas.microsoft.com/office/drawing/2010/main">
                 <a:solidFill>
                   <a:srgbClr val="FFFFFF"/>
                 </a:solidFill>
@@ -8754,7 +12162,7 @@
           <a:noFill/>
           <a:extLst>
             <a:ext uri="{909E8E84-426E-40dd-AFC4-6F175D3DCCD1}">
-              <a14:hiddenFill xmlns:a14="http://schemas.microsoft.com/office/drawing/2010/main" xmlns="">
+              <a14:hiddenFill xmlns="" xmlns:a14="http://schemas.microsoft.com/office/drawing/2010/main">
                 <a:solidFill>
                   <a:srgbClr val="FFFFFF"/>
                 </a:solidFill>

</xml_diff>

<commit_message>
crteated images for the presentation and put them into the presentation
</commit_message>
<xml_diff>
--- a/baseProject/presentation/Presentation-Team8.pptx
+++ b/baseProject/presentation/Presentation-Team8.pptx
@@ -5,7 +5,7 @@
     <p:sldMasterId id="2147483648" r:id="rId1"/>
   </p:sldMasterIdLst>
   <p:notesMasterIdLst>
-    <p:notesMasterId r:id="rId25"/>
+    <p:notesMasterId r:id="rId24"/>
   </p:notesMasterIdLst>
   <p:sldIdLst>
     <p:sldId id="256" r:id="rId2"/>
@@ -24,13 +24,12 @@
     <p:sldId id="274" r:id="rId15"/>
     <p:sldId id="279" r:id="rId16"/>
     <p:sldId id="280" r:id="rId17"/>
-    <p:sldId id="281" r:id="rId18"/>
-    <p:sldId id="282" r:id="rId19"/>
-    <p:sldId id="283" r:id="rId20"/>
-    <p:sldId id="284" r:id="rId21"/>
-    <p:sldId id="285" r:id="rId22"/>
-    <p:sldId id="286" r:id="rId23"/>
-    <p:sldId id="263" r:id="rId24"/>
+    <p:sldId id="287" r:id="rId18"/>
+    <p:sldId id="288" r:id="rId19"/>
+    <p:sldId id="289" r:id="rId20"/>
+    <p:sldId id="290" r:id="rId21"/>
+    <p:sldId id="286" r:id="rId22"/>
+    <p:sldId id="263" r:id="rId23"/>
   </p:sldIdLst>
   <p:sldSz cx="12192000" cy="6858000"/>
   <p:notesSz cx="6858000" cy="9144000"/>
@@ -170,11 +169,10 @@
             <p14:sldId id="274"/>
             <p14:sldId id="279"/>
             <p14:sldId id="280"/>
-            <p14:sldId id="281"/>
-            <p14:sldId id="282"/>
-            <p14:sldId id="283"/>
-            <p14:sldId id="284"/>
-            <p14:sldId id="285"/>
+            <p14:sldId id="287"/>
+            <p14:sldId id="288"/>
+            <p14:sldId id="289"/>
+            <p14:sldId id="290"/>
             <p14:sldId id="286"/>
           </p14:sldIdLst>
         </p14:section>
@@ -795,7 +793,7 @@
     </p:spTree>
     <p:extLst>
       <p:ext uri="{BB962C8B-B14F-4D97-AF65-F5344CB8AC3E}">
-        <p14:creationId xmlns:p14="http://schemas.microsoft.com/office/powerpoint/2010/main" val="2313737348"/>
+        <p14:creationId xmlns:p14="http://schemas.microsoft.com/office/powerpoint/2010/main" val="1657977333"/>
       </p:ext>
     </p:extLst>
   </p:cSld>
@@ -879,7 +877,7 @@
     </p:spTree>
     <p:extLst>
       <p:ext uri="{BB962C8B-B14F-4D97-AF65-F5344CB8AC3E}">
-        <p14:creationId xmlns:p14="http://schemas.microsoft.com/office/powerpoint/2010/main" val="2735554588"/>
+        <p14:creationId xmlns:p14="http://schemas.microsoft.com/office/powerpoint/2010/main" val="201347693"/>
       </p:ext>
     </p:extLst>
   </p:cSld>
@@ -963,7 +961,7 @@
     </p:spTree>
     <p:extLst>
       <p:ext uri="{BB962C8B-B14F-4D97-AF65-F5344CB8AC3E}">
-        <p14:creationId xmlns:p14="http://schemas.microsoft.com/office/powerpoint/2010/main" val="2929037761"/>
+        <p14:creationId xmlns:p14="http://schemas.microsoft.com/office/powerpoint/2010/main" val="715993072"/>
       </p:ext>
     </p:extLst>
   </p:cSld>
@@ -1047,7 +1045,7 @@
     </p:spTree>
     <p:extLst>
       <p:ext uri="{BB962C8B-B14F-4D97-AF65-F5344CB8AC3E}">
-        <p14:creationId xmlns:p14="http://schemas.microsoft.com/office/powerpoint/2010/main" val="3234085166"/>
+        <p14:creationId xmlns:p14="http://schemas.microsoft.com/office/powerpoint/2010/main" val="4112710545"/>
       </p:ext>
     </p:extLst>
   </p:cSld>
@@ -1123,90 +1121,6 @@
             <a:fld id="{2F2847E0-1D0A-0F4B-99C8-E51199A5987D}" type="slidenum">
               <a:rPr lang="de-DE" smtClean="0"/>
               <a:t>21</a:t>
-            </a:fld>
-            <a:endParaRPr lang="de-DE"/>
-          </a:p>
-        </p:txBody>
-      </p:sp>
-    </p:spTree>
-    <p:extLst>
-      <p:ext uri="{BB962C8B-B14F-4D97-AF65-F5344CB8AC3E}">
-        <p14:creationId xmlns:p14="http://schemas.microsoft.com/office/powerpoint/2010/main" val="2342513368"/>
-      </p:ext>
-    </p:extLst>
-  </p:cSld>
-  <p:clrMapOvr>
-    <a:masterClrMapping/>
-  </p:clrMapOvr>
-</p:notes>
-</file>
-
-<file path=ppt/notesSlides/notesSlide16.xml><?xml version="1.0" encoding="utf-8"?>
-<p:notes xmlns:a="http://schemas.openxmlformats.org/drawingml/2006/main" xmlns:r="http://schemas.openxmlformats.org/officeDocument/2006/relationships" xmlns:p="http://schemas.openxmlformats.org/presentationml/2006/main">
-  <p:cSld>
-    <p:spTree>
-      <p:nvGrpSpPr>
-        <p:cNvPr id="1" name=""/>
-        <p:cNvGrpSpPr/>
-        <p:nvPr/>
-      </p:nvGrpSpPr>
-      <p:grpSpPr>
-        <a:xfrm>
-          <a:off x="0" y="0"/>
-          <a:ext cx="0" cy="0"/>
-          <a:chOff x="0" y="0"/>
-          <a:chExt cx="0" cy="0"/>
-        </a:xfrm>
-      </p:grpSpPr>
-      <p:sp>
-        <p:nvSpPr>
-          <p:cNvPr id="2" name="Folienbildplatzhalter 1"/>
-          <p:cNvSpPr>
-            <a:spLocks noGrp="1" noRot="1" noChangeAspect="1"/>
-          </p:cNvSpPr>
-          <p:nvPr>
-            <p:ph type="sldImg"/>
-          </p:nvPr>
-        </p:nvSpPr>
-        <p:spPr/>
-      </p:sp>
-      <p:sp>
-        <p:nvSpPr>
-          <p:cNvPr id="3" name="Notizenplatzhalter 2"/>
-          <p:cNvSpPr>
-            <a:spLocks noGrp="1"/>
-          </p:cNvSpPr>
-          <p:nvPr>
-            <p:ph type="body" idx="1"/>
-          </p:nvPr>
-        </p:nvSpPr>
-        <p:spPr/>
-        <p:txBody>
-          <a:bodyPr/>
-          <a:lstStyle/>
-          <a:p>
-            <a:endParaRPr lang="de-CH" dirty="0"/>
-          </a:p>
-        </p:txBody>
-      </p:sp>
-      <p:sp>
-        <p:nvSpPr>
-          <p:cNvPr id="4" name="Foliennummernplatzhalter 3"/>
-          <p:cNvSpPr>
-            <a:spLocks noGrp="1"/>
-          </p:cNvSpPr>
-          <p:nvPr>
-            <p:ph type="sldNum" sz="quarter" idx="10"/>
-          </p:nvPr>
-        </p:nvSpPr>
-        <p:spPr/>
-        <p:txBody>
-          <a:bodyPr/>
-          <a:lstStyle/>
-          <a:p>
-            <a:fld id="{2F2847E0-1D0A-0F4B-99C8-E51199A5987D}" type="slidenum">
-              <a:rPr lang="de-DE" smtClean="0"/>
-              <a:t>22</a:t>
             </a:fld>
             <a:endParaRPr lang="de-DE"/>
           </a:p>
@@ -9010,7 +8924,7 @@
         <p:spPr>
           <a:xfrm>
             <a:off x="2372304" y="2126513"/>
-            <a:ext cx="1444495" cy="1027814"/>
+            <a:ext cx="1444494" cy="1027814"/>
           </a:xfrm>
           <a:prstGeom prst="rect">
             <a:avLst/>
@@ -9027,6 +8941,13 @@
   <p:clrMapOvr>
     <a:masterClrMapping/>
   </p:clrMapOvr>
+  <p:timing>
+    <p:tnLst>
+      <p:par>
+        <p:cTn id="1" dur="indefinite" restart="never" nodeType="tmRoot"/>
+      </p:par>
+    </p:tnLst>
+  </p:timing>
 </p:sld>
 </file>
 
@@ -9805,6 +9726,13 @@
   <p:clrMapOvr>
     <a:masterClrMapping/>
   </p:clrMapOvr>
+  <p:timing>
+    <p:tnLst>
+      <p:par>
+        <p:cTn id="1" dur="indefinite" restart="never" nodeType="tmRoot"/>
+      </p:par>
+    </p:tnLst>
+  </p:timing>
 </p:sld>
 </file>
 
@@ -10565,6 +10493,13 @@
   <p:clrMapOvr>
     <a:masterClrMapping/>
   </p:clrMapOvr>
+  <p:timing>
+    <p:tnLst>
+      <p:par>
+        <p:cTn id="1" dur="indefinite" restart="never" nodeType="tmRoot"/>
+      </p:par>
+    </p:tnLst>
+  </p:timing>
 </p:sld>
 </file>
 
@@ -11318,6 +11253,13 @@
   <p:clrMapOvr>
     <a:masterClrMapping/>
   </p:clrMapOvr>
+  <p:timing>
+    <p:tnLst>
+      <p:par>
+        <p:cTn id="1" dur="indefinite" restart="never" nodeType="tmRoot"/>
+      </p:par>
+    </p:tnLst>
+  </p:timing>
 </p:sld>
 </file>
 
@@ -12159,6 +12101,13 @@
   <p:clrMapOvr>
     <a:masterClrMapping/>
   </p:clrMapOvr>
+  <p:timing>
+    <p:tnLst>
+      <p:par>
+        <p:cTn id="1" dur="indefinite" restart="never" nodeType="tmRoot"/>
+      </p:par>
+    </p:tnLst>
+  </p:timing>
 </p:sld>
 </file>
 
@@ -12614,6 +12563,13 @@
   <p:clrMapOvr>
     <a:masterClrMapping/>
   </p:clrMapOvr>
+  <p:timing>
+    <p:tnLst>
+      <p:par>
+        <p:cTn id="1" dur="indefinite" restart="never" nodeType="tmRoot"/>
+      </p:par>
+    </p:tnLst>
+  </p:timing>
 </p:sld>
 </file>
 
@@ -13404,7 +13360,7 @@
       </p:sp>
       <p:pic>
         <p:nvPicPr>
-          <p:cNvPr id="3" name="Inhaltsplatzhalter 2"/>
+          <p:cNvPr id="8" name="Inhaltsplatzhalter 7"/>
           <p:cNvPicPr>
             <a:picLocks noGrp="1" noChangeAspect="1"/>
           </p:cNvPicPr>
@@ -13426,8 +13382,8 @@
         </p:blipFill>
         <p:spPr>
           <a:xfrm>
-            <a:off x="1115053" y="4404742"/>
-            <a:ext cx="1781424" cy="990738"/>
+            <a:off x="1950555" y="1945172"/>
+            <a:ext cx="7739431" cy="4407501"/>
           </a:xfrm>
         </p:spPr>
       </p:pic>
@@ -13774,7 +13730,7 @@
       </p:sp>
       <p:pic>
         <p:nvPicPr>
-          <p:cNvPr id="3" name="Inhaltsplatzhalter 2"/>
+          <p:cNvPr id="8" name="Inhaltsplatzhalter 7"/>
           <p:cNvPicPr>
             <a:picLocks noGrp="1" noChangeAspect="1"/>
           </p:cNvPicPr>
@@ -13796,45 +13752,15 @@
         </p:blipFill>
         <p:spPr>
           <a:xfrm>
-            <a:off x="1115053" y="4384029"/>
-            <a:ext cx="1781424" cy="990738"/>
+            <a:off x="1950555" y="1945172"/>
+            <a:ext cx="7739431" cy="4407501"/>
           </a:xfrm>
-        </p:spPr>
-      </p:pic>
-      <p:pic>
-        <p:nvPicPr>
-          <p:cNvPr id="4" name="Grafik 3"/>
-          <p:cNvPicPr>
-            <a:picLocks noChangeAspect="1"/>
-          </p:cNvPicPr>
-          <p:nvPr/>
-        </p:nvPicPr>
-        <p:blipFill>
-          <a:blip r:embed="rId4">
-            <a:extLst>
-              <a:ext uri="{28A0092B-C50C-407E-A947-70E740481C1C}">
-                <a14:useLocalDpi xmlns:a14="http://schemas.microsoft.com/office/drawing/2010/main" val="0"/>
-              </a:ext>
-            </a:extLst>
-          </a:blip>
-          <a:stretch>
-            <a:fillRect/>
-          </a:stretch>
-        </p:blipFill>
-        <p:spPr>
-          <a:xfrm>
-            <a:off x="5093427" y="3128211"/>
-            <a:ext cx="1453688" cy="3502374"/>
-          </a:xfrm>
-          <a:prstGeom prst="rect">
-            <a:avLst/>
-          </a:prstGeom>
         </p:spPr>
       </p:pic>
     </p:spTree>
     <p:extLst>
       <p:ext uri="{BB962C8B-B14F-4D97-AF65-F5344CB8AC3E}">
-        <p14:creationId xmlns:p14="http://schemas.microsoft.com/office/powerpoint/2010/main" val="1376868967"/>
+        <p14:creationId xmlns:p14="http://schemas.microsoft.com/office/powerpoint/2010/main" val="2052808245"/>
       </p:ext>
     </p:extLst>
   </p:cSld>
@@ -14174,11 +14100,13 @@
       </p:sp>
       <p:pic>
         <p:nvPicPr>
-          <p:cNvPr id="5" name="Grafik 4"/>
+          <p:cNvPr id="8" name="Inhaltsplatzhalter 7"/>
           <p:cNvPicPr>
-            <a:picLocks noChangeAspect="1"/>
+            <a:picLocks noGrp="1" noChangeAspect="1"/>
           </p:cNvPicPr>
-          <p:nvPr/>
+          <p:nvPr>
+            <p:ph idx="1"/>
+          </p:nvPr>
         </p:nvPicPr>
         <p:blipFill>
           <a:blip r:embed="rId3">
@@ -14194,18 +14122,15 @@
         </p:blipFill>
         <p:spPr>
           <a:xfrm>
-            <a:off x="1821905" y="2017293"/>
-            <a:ext cx="5731136" cy="4191001"/>
+            <a:off x="1950555" y="1945172"/>
+            <a:ext cx="7739431" cy="4407501"/>
           </a:xfrm>
-          <a:prstGeom prst="rect">
-            <a:avLst/>
-          </a:prstGeom>
         </p:spPr>
       </p:pic>
     </p:spTree>
     <p:extLst>
       <p:ext uri="{BB962C8B-B14F-4D97-AF65-F5344CB8AC3E}">
-        <p14:creationId xmlns:p14="http://schemas.microsoft.com/office/powerpoint/2010/main" val="1635030909"/>
+        <p14:creationId xmlns:p14="http://schemas.microsoft.com/office/powerpoint/2010/main" val="872929570"/>
       </p:ext>
     </p:extLst>
   </p:cSld>
@@ -14545,11 +14470,13 @@
       </p:sp>
       <p:pic>
         <p:nvPicPr>
-          <p:cNvPr id="5" name="Grafik 4"/>
+          <p:cNvPr id="8" name="Inhaltsplatzhalter 7"/>
           <p:cNvPicPr>
-            <a:picLocks noChangeAspect="1"/>
+            <a:picLocks noGrp="1" noChangeAspect="1"/>
           </p:cNvPicPr>
-          <p:nvPr/>
+          <p:nvPr>
+            <p:ph idx="1"/>
+          </p:nvPr>
         </p:nvPicPr>
         <p:blipFill>
           <a:blip r:embed="rId3">
@@ -14565,18 +14492,15 @@
         </p:blipFill>
         <p:spPr>
           <a:xfrm>
-            <a:off x="1821905" y="2017293"/>
-            <a:ext cx="5731136" cy="4191001"/>
+            <a:off x="1950555" y="1945172"/>
+            <a:ext cx="7739431" cy="4407501"/>
           </a:xfrm>
-          <a:prstGeom prst="rect">
-            <a:avLst/>
-          </a:prstGeom>
         </p:spPr>
       </p:pic>
     </p:spTree>
     <p:extLst>
       <p:ext uri="{BB962C8B-B14F-4D97-AF65-F5344CB8AC3E}">
-        <p14:creationId xmlns:p14="http://schemas.microsoft.com/office/powerpoint/2010/main" val="2888768366"/>
+        <p14:creationId xmlns:p14="http://schemas.microsoft.com/office/powerpoint/2010/main" val="3528280995"/>
       </p:ext>
     </p:extLst>
   </p:cSld>
@@ -15032,6 +14956,13 @@
   <p:clrMapOvr>
     <a:masterClrMapping/>
   </p:clrMapOvr>
+  <p:timing>
+    <p:tnLst>
+      <p:par>
+        <p:cTn id="1" dur="indefinite" restart="never" nodeType="tmRoot"/>
+      </p:par>
+    </p:tnLst>
+  </p:timing>
 </p:sld>
 </file>
 
@@ -15358,11 +15289,13 @@
       </p:sp>
       <p:pic>
         <p:nvPicPr>
-          <p:cNvPr id="5" name="Grafik 4"/>
+          <p:cNvPr id="8" name="Inhaltsplatzhalter 7"/>
           <p:cNvPicPr>
-            <a:picLocks noChangeAspect="1"/>
+            <a:picLocks noGrp="1" noChangeAspect="1"/>
           </p:cNvPicPr>
-          <p:nvPr/>
+          <p:nvPr>
+            <p:ph idx="1"/>
+          </p:nvPr>
         </p:nvPicPr>
         <p:blipFill>
           <a:blip r:embed="rId3">
@@ -15378,48 +15311,15 @@
         </p:blipFill>
         <p:spPr>
           <a:xfrm>
-            <a:off x="1821905" y="2017293"/>
-            <a:ext cx="5731136" cy="4191001"/>
+            <a:off x="1916024" y="1945172"/>
+            <a:ext cx="7808494" cy="4407501"/>
           </a:xfrm>
-          <a:prstGeom prst="rect">
-            <a:avLst/>
-          </a:prstGeom>
-        </p:spPr>
-      </p:pic>
-      <p:pic>
-        <p:nvPicPr>
-          <p:cNvPr id="3" name="Grafik 2"/>
-          <p:cNvPicPr>
-            <a:picLocks noChangeAspect="1"/>
-          </p:cNvPicPr>
-          <p:nvPr/>
-        </p:nvPicPr>
-        <p:blipFill>
-          <a:blip r:embed="rId4">
-            <a:extLst>
-              <a:ext uri="{28A0092B-C50C-407E-A947-70E740481C1C}">
-                <a14:useLocalDpi xmlns:a14="http://schemas.microsoft.com/office/drawing/2010/main" val="0"/>
-              </a:ext>
-            </a:extLst>
-          </a:blip>
-          <a:stretch>
-            <a:fillRect/>
-          </a:stretch>
-        </p:blipFill>
-        <p:spPr>
-          <a:xfrm>
-            <a:off x="1821905" y="2017293"/>
-            <a:ext cx="7707106" cy="4555299"/>
-          </a:xfrm>
-          <a:prstGeom prst="rect">
-            <a:avLst/>
-          </a:prstGeom>
         </p:spPr>
       </p:pic>
     </p:spTree>
     <p:extLst>
       <p:ext uri="{BB962C8B-B14F-4D97-AF65-F5344CB8AC3E}">
-        <p14:creationId xmlns:p14="http://schemas.microsoft.com/office/powerpoint/2010/main" val="1067886690"/>
+        <p14:creationId xmlns:p14="http://schemas.microsoft.com/office/powerpoint/2010/main" val="896141722"/>
       </p:ext>
     </p:extLst>
   </p:cSld>
@@ -15475,7 +15375,7 @@
           <a:p>
             <a:r>
               <a:rPr lang="de-DE" dirty="0" err="1" smtClean="0"/>
-              <a:t>Good</a:t>
+              <a:t>Why</a:t>
             </a:r>
             <a:r>
               <a:rPr lang="de-DE" dirty="0" smtClean="0"/>
@@ -15483,7 +15383,11 @@
             </a:r>
             <a:r>
               <a:rPr lang="de-DE" dirty="0" err="1" smtClean="0"/>
-              <a:t>code</a:t>
+              <a:t>us</a:t>
+            </a:r>
+            <a:r>
+              <a:rPr lang="de-DE" dirty="0" smtClean="0"/>
+              <a:t>?</a:t>
             </a:r>
             <a:endParaRPr lang="de-DE" dirty="0"/>
           </a:p>
@@ -15757,100 +15661,129 @@
           </a:p>
         </p:txBody>
       </p:sp>
-      <p:pic>
-        <p:nvPicPr>
-          <p:cNvPr id="5" name="Grafik 4"/>
-          <p:cNvPicPr>
-            <a:picLocks noChangeAspect="1"/>
-          </p:cNvPicPr>
-          <p:nvPr/>
-        </p:nvPicPr>
-        <p:blipFill>
-          <a:blip r:embed="rId3">
-            <a:extLst>
-              <a:ext uri="{28A0092B-C50C-407E-A947-70E740481C1C}">
-                <a14:useLocalDpi xmlns:a14="http://schemas.microsoft.com/office/drawing/2010/main" val="0"/>
-              </a:ext>
-            </a:extLst>
-          </a:blip>
-          <a:stretch>
-            <a:fillRect/>
-          </a:stretch>
-        </p:blipFill>
+      <p:sp>
+        <p:nvSpPr>
+          <p:cNvPr id="7" name="Inhaltsplatzhalter 2"/>
+          <p:cNvSpPr>
+            <a:spLocks noGrp="1"/>
+          </p:cNvSpPr>
+          <p:nvPr>
+            <p:ph idx="1"/>
+          </p:nvPr>
+        </p:nvSpPr>
         <p:spPr>
           <a:xfrm>
-            <a:off x="1821905" y="2017293"/>
-            <a:ext cx="5731136" cy="4191001"/>
+            <a:off x="762552" y="2065420"/>
+            <a:ext cx="10115438" cy="3937001"/>
           </a:xfrm>
-          <a:prstGeom prst="rect">
-            <a:avLst/>
-          </a:prstGeom>
         </p:spPr>
-      </p:pic>
-      <p:pic>
-        <p:nvPicPr>
-          <p:cNvPr id="3" name="Grafik 2"/>
-          <p:cNvPicPr>
-            <a:picLocks noChangeAspect="1"/>
-          </p:cNvPicPr>
-          <p:nvPr/>
-        </p:nvPicPr>
-        <p:blipFill>
-          <a:blip r:embed="rId4">
-            <a:extLst>
-              <a:ext uri="{28A0092B-C50C-407E-A947-70E740481C1C}">
-                <a14:useLocalDpi xmlns:a14="http://schemas.microsoft.com/office/drawing/2010/main" val="0"/>
-              </a:ext>
-            </a:extLst>
-          </a:blip>
-          <a:stretch>
-            <a:fillRect/>
-          </a:stretch>
-        </p:blipFill>
-        <p:spPr>
-          <a:xfrm>
-            <a:off x="1821905" y="2017293"/>
-            <a:ext cx="7090751" cy="4191001"/>
-          </a:xfrm>
-          <a:prstGeom prst="rect">
-            <a:avLst/>
-          </a:prstGeom>
-        </p:spPr>
-      </p:pic>
-      <p:pic>
-        <p:nvPicPr>
-          <p:cNvPr id="4" name="Grafik 3"/>
-          <p:cNvPicPr>
-            <a:picLocks noChangeAspect="1"/>
-          </p:cNvPicPr>
-          <p:nvPr/>
-        </p:nvPicPr>
-        <p:blipFill>
-          <a:blip r:embed="rId5">
-            <a:extLst>
-              <a:ext uri="{28A0092B-C50C-407E-A947-70E740481C1C}">
-                <a14:useLocalDpi xmlns:a14="http://schemas.microsoft.com/office/drawing/2010/main" val="0"/>
-              </a:ext>
-            </a:extLst>
-          </a:blip>
-          <a:stretch>
-            <a:fillRect/>
-          </a:stretch>
-        </p:blipFill>
-        <p:spPr>
-          <a:xfrm>
-            <a:off x="1821905" y="2017292"/>
-            <a:ext cx="7695074" cy="4191001"/>
-          </a:xfrm>
-          <a:prstGeom prst="rect">
-            <a:avLst/>
-          </a:prstGeom>
-        </p:spPr>
-      </p:pic>
+        <p:txBody>
+          <a:bodyPr>
+            <a:normAutofit/>
+          </a:bodyPr>
+          <a:lstStyle/>
+          <a:p>
+            <a:pPr algn="ctr"/>
+            <a:r>
+              <a:rPr lang="de-DE" sz="3200" dirty="0" err="1" smtClean="0"/>
+              <a:t>Our</a:t>
+            </a:r>
+            <a:r>
+              <a:rPr lang="de-DE" sz="3200" dirty="0" smtClean="0"/>
+              <a:t> </a:t>
+            </a:r>
+            <a:r>
+              <a:rPr lang="de-DE" sz="3200" dirty="0" err="1" smtClean="0"/>
+              <a:t>team</a:t>
+            </a:r>
+            <a:endParaRPr lang="de-DE" sz="3200" dirty="0" smtClean="0"/>
+          </a:p>
+          <a:p>
+            <a:pPr algn="ctr"/>
+            <a:r>
+              <a:rPr lang="de-DE" sz="3200" dirty="0" smtClean="0"/>
+              <a:t>The </a:t>
+            </a:r>
+            <a:r>
+              <a:rPr lang="de-DE" sz="3200" dirty="0" err="1" smtClean="0"/>
+              <a:t>products</a:t>
+            </a:r>
+            <a:r>
+              <a:rPr lang="de-DE" sz="3200" dirty="0" smtClean="0"/>
+              <a:t/>
+            </a:r>
+            <a:br>
+              <a:rPr lang="de-DE" sz="3200" dirty="0" smtClean="0"/>
+            </a:br>
+            <a:r>
+              <a:rPr lang="de-DE" sz="3200" dirty="0" smtClean="0"/>
+              <a:t>-&gt; The </a:t>
+            </a:r>
+            <a:r>
+              <a:rPr lang="de-DE" sz="3200" dirty="0" err="1" smtClean="0"/>
+              <a:t>client</a:t>
+            </a:r>
+            <a:r>
+              <a:rPr lang="de-DE" sz="3200" dirty="0" smtClean="0"/>
+              <a:t/>
+            </a:r>
+            <a:br>
+              <a:rPr lang="de-DE" sz="3200" dirty="0" smtClean="0"/>
+            </a:br>
+            <a:r>
+              <a:rPr lang="de-DE" sz="3200" dirty="0" smtClean="0"/>
+              <a:t>-&gt; The </a:t>
+            </a:r>
+            <a:r>
+              <a:rPr lang="de-DE" sz="3200" dirty="0" err="1" smtClean="0"/>
+              <a:t>developers</a:t>
+            </a:r>
+            <a:endParaRPr lang="de-DE" sz="3200" dirty="0" smtClean="0"/>
+          </a:p>
+          <a:p>
+            <a:pPr algn="ctr"/>
+            <a:r>
+              <a:rPr lang="de-DE" sz="3200" dirty="0" err="1" smtClean="0"/>
+              <a:t>Ask</a:t>
+            </a:r>
+            <a:r>
+              <a:rPr lang="de-DE" sz="3200" dirty="0" smtClean="0"/>
+              <a:t> </a:t>
+            </a:r>
+            <a:r>
+              <a:rPr lang="de-DE" sz="3200" dirty="0" err="1" smtClean="0"/>
+              <a:t>us</a:t>
+            </a:r>
+            <a:r>
+              <a:rPr lang="de-DE" sz="3200" dirty="0" smtClean="0"/>
+              <a:t>!</a:t>
+            </a:r>
+          </a:p>
+          <a:p>
+            <a:pPr algn="ctr"/>
+            <a:r>
+              <a:rPr lang="de-DE" sz="3200" dirty="0" err="1" smtClean="0"/>
+              <a:t>Contact</a:t>
+            </a:r>
+            <a:r>
+              <a:rPr lang="de-DE" sz="3200" dirty="0" smtClean="0"/>
+              <a:t> </a:t>
+            </a:r>
+            <a:r>
+              <a:rPr lang="de-DE" sz="3200" dirty="0" err="1" smtClean="0"/>
+              <a:t>us</a:t>
+            </a:r>
+            <a:r>
+              <a:rPr lang="de-DE" sz="3200" dirty="0" smtClean="0"/>
+              <a:t>!</a:t>
+            </a:r>
+          </a:p>
+        </p:txBody>
+      </p:sp>
     </p:spTree>
     <p:extLst>
       <p:ext uri="{BB962C8B-B14F-4D97-AF65-F5344CB8AC3E}">
-        <p14:creationId xmlns:p14="http://schemas.microsoft.com/office/powerpoint/2010/main" val="3128535238"/>
+        <p14:creationId xmlns:p14="http://schemas.microsoft.com/office/powerpoint/2010/main" val="1459151704"/>
       </p:ext>
     </p:extLst>
   </p:cSld>
@@ -15905,470 +15838,6 @@
           <a:lstStyle/>
           <a:p>
             <a:r>
-              <a:rPr lang="de-DE" dirty="0" err="1" smtClean="0"/>
-              <a:t>Why</a:t>
-            </a:r>
-            <a:r>
-              <a:rPr lang="de-DE" dirty="0" smtClean="0"/>
-              <a:t> </a:t>
-            </a:r>
-            <a:r>
-              <a:rPr lang="de-DE" dirty="0" err="1" smtClean="0"/>
-              <a:t>us</a:t>
-            </a:r>
-            <a:r>
-              <a:rPr lang="de-DE" dirty="0" smtClean="0"/>
-              <a:t>?</a:t>
-            </a:r>
-            <a:endParaRPr lang="de-DE" dirty="0"/>
-          </a:p>
-        </p:txBody>
-      </p:sp>
-      <p:sp>
-        <p:nvSpPr>
-          <p:cNvPr id="6" name="Inhaltsplatzhalter 2"/>
-          <p:cNvSpPr txBox="1">
-            <a:spLocks/>
-          </p:cNvSpPr>
-          <p:nvPr/>
-        </p:nvSpPr>
-        <p:spPr>
-          <a:xfrm>
-            <a:off x="8137451" y="-41565"/>
-            <a:ext cx="4054549" cy="370610"/>
-          </a:xfrm>
-          <a:prstGeom prst="rect">
-            <a:avLst/>
-          </a:prstGeom>
-        </p:spPr>
-        <p:txBody>
-          <a:bodyPr vert="horz" lIns="91440" tIns="45720" rIns="91440" bIns="45720" rtlCol="0" anchor="ctr">
-            <a:normAutofit/>
-          </a:bodyPr>
-          <a:lstStyle>
-            <a:lvl1pPr marL="285750" indent="-285750" algn="l" defTabSz="457200" rtl="0" eaLnBrk="1" latinLnBrk="0" hangingPunct="1">
-              <a:spcBef>
-                <a:spcPct val="20000"/>
-              </a:spcBef>
-              <a:spcAft>
-                <a:spcPts val="600"/>
-              </a:spcAft>
-              <a:buClr>
-                <a:schemeClr val="accent1">
-                  <a:lumMod val="75000"/>
-                </a:schemeClr>
-              </a:buClr>
-              <a:buSzPct val="145000"/>
-              <a:buFont typeface="Arial"/>
-              <a:buChar char="•"/>
-              <a:defRPr sz="2400" kern="1200" cap="none">
-                <a:solidFill>
-                  <a:schemeClr val="tx1"/>
-                </a:solidFill>
-                <a:effectLst/>
-                <a:latin typeface="+mn-lt"/>
-                <a:ea typeface="+mn-ea"/>
-                <a:cs typeface="+mn-cs"/>
-              </a:defRPr>
-            </a:lvl1pPr>
-            <a:lvl2pPr marL="742950" indent="-285750" algn="l" defTabSz="457200" rtl="0" eaLnBrk="1" latinLnBrk="0" hangingPunct="1">
-              <a:spcBef>
-                <a:spcPct val="20000"/>
-              </a:spcBef>
-              <a:spcAft>
-                <a:spcPts val="600"/>
-              </a:spcAft>
-              <a:buClr>
-                <a:schemeClr val="accent1">
-                  <a:lumMod val="75000"/>
-                </a:schemeClr>
-              </a:buClr>
-              <a:buSzPct val="145000"/>
-              <a:buFont typeface="Arial"/>
-              <a:buChar char="•"/>
-              <a:defRPr sz="2000" kern="1200" cap="none">
-                <a:solidFill>
-                  <a:schemeClr val="tx1"/>
-                </a:solidFill>
-                <a:effectLst/>
-                <a:latin typeface="+mn-lt"/>
-                <a:ea typeface="+mn-ea"/>
-                <a:cs typeface="+mn-cs"/>
-              </a:defRPr>
-            </a:lvl2pPr>
-            <a:lvl3pPr marL="1200150" indent="-285750" algn="l" defTabSz="457200" rtl="0" eaLnBrk="1" latinLnBrk="0" hangingPunct="1">
-              <a:spcBef>
-                <a:spcPct val="20000"/>
-              </a:spcBef>
-              <a:spcAft>
-                <a:spcPts val="600"/>
-              </a:spcAft>
-              <a:buClr>
-                <a:schemeClr val="accent1">
-                  <a:lumMod val="75000"/>
-                </a:schemeClr>
-              </a:buClr>
-              <a:buSzPct val="145000"/>
-              <a:buFont typeface="Arial"/>
-              <a:buChar char="•"/>
-              <a:defRPr sz="1800" kern="1200" cap="none">
-                <a:solidFill>
-                  <a:schemeClr val="tx1"/>
-                </a:solidFill>
-                <a:effectLst/>
-                <a:latin typeface="+mn-lt"/>
-                <a:ea typeface="+mn-ea"/>
-                <a:cs typeface="+mn-cs"/>
-              </a:defRPr>
-            </a:lvl3pPr>
-            <a:lvl4pPr marL="1543050" indent="-171450" algn="l" defTabSz="457200" rtl="0" eaLnBrk="1" latinLnBrk="0" hangingPunct="1">
-              <a:spcBef>
-                <a:spcPct val="20000"/>
-              </a:spcBef>
-              <a:spcAft>
-                <a:spcPts val="600"/>
-              </a:spcAft>
-              <a:buClr>
-                <a:schemeClr val="accent1">
-                  <a:lumMod val="75000"/>
-                </a:schemeClr>
-              </a:buClr>
-              <a:buSzPct val="145000"/>
-              <a:buFont typeface="Arial"/>
-              <a:buChar char="•"/>
-              <a:defRPr sz="1600" kern="1200" cap="none">
-                <a:solidFill>
-                  <a:schemeClr val="tx1"/>
-                </a:solidFill>
-                <a:effectLst/>
-                <a:latin typeface="+mn-lt"/>
-                <a:ea typeface="+mn-ea"/>
-                <a:cs typeface="+mn-cs"/>
-              </a:defRPr>
-            </a:lvl4pPr>
-            <a:lvl5pPr marL="2000250" indent="-171450" algn="l" defTabSz="457200" rtl="0" eaLnBrk="1" latinLnBrk="0" hangingPunct="1">
-              <a:spcBef>
-                <a:spcPct val="20000"/>
-              </a:spcBef>
-              <a:spcAft>
-                <a:spcPts val="600"/>
-              </a:spcAft>
-              <a:buClr>
-                <a:schemeClr val="accent1">
-                  <a:lumMod val="75000"/>
-                </a:schemeClr>
-              </a:buClr>
-              <a:buSzPct val="145000"/>
-              <a:buFont typeface="Arial"/>
-              <a:buChar char="•"/>
-              <a:defRPr sz="1400" kern="1200" cap="none">
-                <a:solidFill>
-                  <a:schemeClr val="tx1"/>
-                </a:solidFill>
-                <a:effectLst/>
-                <a:latin typeface="+mn-lt"/>
-                <a:ea typeface="+mn-ea"/>
-                <a:cs typeface="+mn-cs"/>
-              </a:defRPr>
-            </a:lvl5pPr>
-            <a:lvl6pPr marL="2514600" indent="-228600" algn="l" defTabSz="457200" rtl="0" eaLnBrk="1" latinLnBrk="0" hangingPunct="1">
-              <a:spcBef>
-                <a:spcPct val="20000"/>
-              </a:spcBef>
-              <a:spcAft>
-                <a:spcPts val="600"/>
-              </a:spcAft>
-              <a:buClr>
-                <a:schemeClr val="accent1">
-                  <a:lumMod val="75000"/>
-                </a:schemeClr>
-              </a:buClr>
-              <a:buSzPct val="145000"/>
-              <a:buFont typeface="Arial"/>
-              <a:buChar char="•"/>
-              <a:defRPr sz="1400" kern="1200" cap="none">
-                <a:solidFill>
-                  <a:schemeClr val="tx1"/>
-                </a:solidFill>
-                <a:effectLst/>
-                <a:latin typeface="+mn-lt"/>
-                <a:ea typeface="+mn-ea"/>
-                <a:cs typeface="+mn-cs"/>
-              </a:defRPr>
-            </a:lvl6pPr>
-            <a:lvl7pPr marL="2971800" indent="-228600" algn="l" defTabSz="457200" rtl="0" eaLnBrk="1" latinLnBrk="0" hangingPunct="1">
-              <a:spcBef>
-                <a:spcPct val="20000"/>
-              </a:spcBef>
-              <a:spcAft>
-                <a:spcPts val="600"/>
-              </a:spcAft>
-              <a:buClr>
-                <a:schemeClr val="accent1">
-                  <a:lumMod val="75000"/>
-                </a:schemeClr>
-              </a:buClr>
-              <a:buSzPct val="145000"/>
-              <a:buFont typeface="Arial"/>
-              <a:buChar char="•"/>
-              <a:defRPr sz="1400" kern="1200" cap="none">
-                <a:solidFill>
-                  <a:schemeClr val="tx1"/>
-                </a:solidFill>
-                <a:effectLst/>
-                <a:latin typeface="+mn-lt"/>
-                <a:ea typeface="+mn-ea"/>
-                <a:cs typeface="+mn-cs"/>
-              </a:defRPr>
-            </a:lvl7pPr>
-            <a:lvl8pPr marL="3429000" indent="-228600" algn="l" defTabSz="457200" rtl="0" eaLnBrk="1" latinLnBrk="0" hangingPunct="1">
-              <a:spcBef>
-                <a:spcPct val="20000"/>
-              </a:spcBef>
-              <a:spcAft>
-                <a:spcPts val="600"/>
-              </a:spcAft>
-              <a:buClr>
-                <a:schemeClr val="accent1">
-                  <a:lumMod val="75000"/>
-                </a:schemeClr>
-              </a:buClr>
-              <a:buSzPct val="145000"/>
-              <a:buFont typeface="Arial"/>
-              <a:buChar char="•"/>
-              <a:defRPr sz="1400" kern="1200" cap="none">
-                <a:solidFill>
-                  <a:schemeClr val="tx1"/>
-                </a:solidFill>
-                <a:effectLst/>
-                <a:latin typeface="+mn-lt"/>
-                <a:ea typeface="+mn-ea"/>
-                <a:cs typeface="+mn-cs"/>
-              </a:defRPr>
-            </a:lvl8pPr>
-            <a:lvl9pPr marL="3886200" indent="-228600" algn="l" defTabSz="457200" rtl="0" eaLnBrk="1" latinLnBrk="0" hangingPunct="1">
-              <a:spcBef>
-                <a:spcPct val="20000"/>
-              </a:spcBef>
-              <a:spcAft>
-                <a:spcPts val="600"/>
-              </a:spcAft>
-              <a:buClr>
-                <a:schemeClr val="accent1">
-                  <a:lumMod val="75000"/>
-                </a:schemeClr>
-              </a:buClr>
-              <a:buSzPct val="145000"/>
-              <a:buFont typeface="Arial"/>
-              <a:buChar char="•"/>
-              <a:defRPr sz="1400" kern="1200" cap="none">
-                <a:solidFill>
-                  <a:schemeClr val="tx1"/>
-                </a:solidFill>
-                <a:effectLst/>
-                <a:latin typeface="+mn-lt"/>
-                <a:ea typeface="+mn-ea"/>
-                <a:cs typeface="+mn-cs"/>
-              </a:defRPr>
-            </a:lvl9pPr>
-          </a:lstStyle>
-          <a:p>
-            <a:pPr marL="0" indent="0">
-              <a:buNone/>
-            </a:pPr>
-            <a:r>
-              <a:rPr lang="de-DE" sz="1000" dirty="0" smtClean="0"/>
-              <a:t>Rem0 Röthlisberger, Eric </a:t>
-            </a:r>
-            <a:r>
-              <a:rPr lang="de-DE" sz="1000" dirty="0" err="1" smtClean="0"/>
-              <a:t>Lagger</a:t>
-            </a:r>
-            <a:r>
-              <a:rPr lang="de-DE" sz="1000" dirty="0" smtClean="0"/>
-              <a:t>, Vincent Hofer, Dean Klopsch, Aebi Ryan</a:t>
-            </a:r>
-            <a:endParaRPr lang="de-DE" sz="1000" dirty="0"/>
-          </a:p>
-        </p:txBody>
-      </p:sp>
-      <p:sp>
-        <p:nvSpPr>
-          <p:cNvPr id="7" name="Inhaltsplatzhalter 2"/>
-          <p:cNvSpPr>
-            <a:spLocks noGrp="1"/>
-          </p:cNvSpPr>
-          <p:nvPr>
-            <p:ph idx="1"/>
-          </p:nvPr>
-        </p:nvSpPr>
-        <p:spPr>
-          <a:xfrm>
-            <a:off x="762552" y="2065420"/>
-            <a:ext cx="10115438" cy="3937001"/>
-          </a:xfrm>
-        </p:spPr>
-        <p:txBody>
-          <a:bodyPr>
-            <a:normAutofit/>
-          </a:bodyPr>
-          <a:lstStyle/>
-          <a:p>
-            <a:pPr algn="ctr"/>
-            <a:r>
-              <a:rPr lang="de-DE" sz="3200" dirty="0" err="1" smtClean="0"/>
-              <a:t>Our</a:t>
-            </a:r>
-            <a:r>
-              <a:rPr lang="de-DE" sz="3200" dirty="0" smtClean="0"/>
-              <a:t> </a:t>
-            </a:r>
-            <a:r>
-              <a:rPr lang="de-DE" sz="3200" dirty="0" err="1" smtClean="0"/>
-              <a:t>team</a:t>
-            </a:r>
-            <a:endParaRPr lang="de-DE" sz="3200" dirty="0" smtClean="0"/>
-          </a:p>
-          <a:p>
-            <a:pPr algn="ctr"/>
-            <a:r>
-              <a:rPr lang="de-DE" sz="3200" dirty="0" smtClean="0"/>
-              <a:t>The </a:t>
-            </a:r>
-            <a:r>
-              <a:rPr lang="de-DE" sz="3200" dirty="0" err="1" smtClean="0"/>
-              <a:t>products</a:t>
-            </a:r>
-            <a:r>
-              <a:rPr lang="de-DE" sz="3200" dirty="0" smtClean="0"/>
-              <a:t/>
-            </a:r>
-            <a:br>
-              <a:rPr lang="de-DE" sz="3200" dirty="0" smtClean="0"/>
-            </a:br>
-            <a:r>
-              <a:rPr lang="de-DE" sz="3200" dirty="0" smtClean="0"/>
-              <a:t>-&gt; The </a:t>
-            </a:r>
-            <a:r>
-              <a:rPr lang="de-DE" sz="3200" dirty="0" err="1" smtClean="0"/>
-              <a:t>client</a:t>
-            </a:r>
-            <a:r>
-              <a:rPr lang="de-DE" sz="3200" dirty="0" smtClean="0"/>
-              <a:t/>
-            </a:r>
-            <a:br>
-              <a:rPr lang="de-DE" sz="3200" dirty="0" smtClean="0"/>
-            </a:br>
-            <a:r>
-              <a:rPr lang="de-DE" sz="3200" dirty="0" smtClean="0"/>
-              <a:t>-&gt; The </a:t>
-            </a:r>
-            <a:r>
-              <a:rPr lang="de-DE" sz="3200" dirty="0" err="1" smtClean="0"/>
-              <a:t>developers</a:t>
-            </a:r>
-            <a:endParaRPr lang="de-DE" sz="3200" dirty="0" smtClean="0"/>
-          </a:p>
-          <a:p>
-            <a:pPr algn="ctr"/>
-            <a:r>
-              <a:rPr lang="de-DE" sz="3200" dirty="0" err="1" smtClean="0"/>
-              <a:t>Ask</a:t>
-            </a:r>
-            <a:r>
-              <a:rPr lang="de-DE" sz="3200" dirty="0" smtClean="0"/>
-              <a:t> </a:t>
-            </a:r>
-            <a:r>
-              <a:rPr lang="de-DE" sz="3200" dirty="0" err="1" smtClean="0"/>
-              <a:t>us</a:t>
-            </a:r>
-            <a:r>
-              <a:rPr lang="de-DE" sz="3200" dirty="0" smtClean="0"/>
-              <a:t>!</a:t>
-            </a:r>
-          </a:p>
-          <a:p>
-            <a:pPr algn="ctr"/>
-            <a:r>
-              <a:rPr lang="de-DE" sz="3200" dirty="0" err="1" smtClean="0"/>
-              <a:t>Contact</a:t>
-            </a:r>
-            <a:r>
-              <a:rPr lang="de-DE" sz="3200" dirty="0" smtClean="0"/>
-              <a:t> </a:t>
-            </a:r>
-            <a:r>
-              <a:rPr lang="de-DE" sz="3200" dirty="0" err="1" smtClean="0"/>
-              <a:t>us</a:t>
-            </a:r>
-            <a:r>
-              <a:rPr lang="de-DE" sz="3200" dirty="0" smtClean="0"/>
-              <a:t>!</a:t>
-            </a:r>
-          </a:p>
-        </p:txBody>
-      </p:sp>
-    </p:spTree>
-    <p:extLst>
-      <p:ext uri="{BB962C8B-B14F-4D97-AF65-F5344CB8AC3E}">
-        <p14:creationId xmlns:p14="http://schemas.microsoft.com/office/powerpoint/2010/main" val="1459151704"/>
-      </p:ext>
-    </p:extLst>
-  </p:cSld>
-  <p:clrMapOvr>
-    <a:masterClrMapping/>
-  </p:clrMapOvr>
-  <p:timing>
-    <p:tnLst>
-      <p:par>
-        <p:cTn id="1" dur="indefinite" restart="never" nodeType="tmRoot"/>
-      </p:par>
-    </p:tnLst>
-  </p:timing>
-</p:sld>
-</file>
-
-<file path=ppt/slides/slide23.xml><?xml version="1.0" encoding="utf-8"?>
-<p:sld xmlns:a="http://schemas.openxmlformats.org/drawingml/2006/main" xmlns:r="http://schemas.openxmlformats.org/officeDocument/2006/relationships" xmlns:p="http://schemas.openxmlformats.org/presentationml/2006/main">
-  <p:cSld>
-    <p:spTree>
-      <p:nvGrpSpPr>
-        <p:cNvPr id="1" name=""/>
-        <p:cNvGrpSpPr/>
-        <p:nvPr/>
-      </p:nvGrpSpPr>
-      <p:grpSpPr>
-        <a:xfrm>
-          <a:off x="0" y="0"/>
-          <a:ext cx="0" cy="0"/>
-          <a:chOff x="0" y="0"/>
-          <a:chExt cx="0" cy="0"/>
-        </a:xfrm>
-      </p:grpSpPr>
-      <p:sp>
-        <p:nvSpPr>
-          <p:cNvPr id="2" name="Titel 1"/>
-          <p:cNvSpPr>
-            <a:spLocks noGrp="1"/>
-          </p:cNvSpPr>
-          <p:nvPr>
-            <p:ph type="title"/>
-          </p:nvPr>
-        </p:nvSpPr>
-        <p:spPr>
-          <a:xfrm>
-            <a:off x="810915" y="691116"/>
-            <a:ext cx="10018713" cy="1752599"/>
-          </a:xfrm>
-        </p:spPr>
-        <p:txBody>
-          <a:bodyPr/>
-          <a:lstStyle/>
-          <a:p>
-            <a:r>
               <a:rPr lang="de-DE" dirty="0" err="1"/>
               <a:t>Questions</a:t>
             </a:r>
@@ -16408,7 +15877,7 @@
           <a:noFill/>
           <a:extLst>
             <a:ext uri="{909E8E84-426E-40dd-AFC4-6F175D3DCCD1}">
-              <a14:hiddenFill xmlns:a14="http://schemas.microsoft.com/office/drawing/2010/main" xmlns="">
+              <a14:hiddenFill xmlns="" xmlns:a14="http://schemas.microsoft.com/office/drawing/2010/main">
                 <a:solidFill>
                   <a:srgbClr val="FFFFFF"/>
                 </a:solidFill>
@@ -16449,7 +15918,7 @@
           <a:noFill/>
           <a:extLst>
             <a:ext uri="{909E8E84-426E-40dd-AFC4-6F175D3DCCD1}">
-              <a14:hiddenFill xmlns:a14="http://schemas.microsoft.com/office/drawing/2010/main" xmlns="">
+              <a14:hiddenFill xmlns="" xmlns:a14="http://schemas.microsoft.com/office/drawing/2010/main">
                 <a:solidFill>
                   <a:srgbClr val="FFFFFF"/>
                 </a:solidFill>
@@ -16735,6 +16204,13 @@
   <p:clrMapOvr>
     <a:masterClrMapping/>
   </p:clrMapOvr>
+  <p:timing>
+    <p:tnLst>
+      <p:par>
+        <p:cTn id="1" dur="indefinite" restart="never" nodeType="tmRoot"/>
+      </p:par>
+    </p:tnLst>
+  </p:timing>
 </p:sld>
 </file>
 
@@ -16859,6 +16335,13 @@
   <p:clrMapOvr>
     <a:masterClrMapping/>
   </p:clrMapOvr>
+  <p:timing>
+    <p:tnLst>
+      <p:par>
+        <p:cTn id="1" dur="indefinite" restart="never" nodeType="tmRoot"/>
+      </p:par>
+    </p:tnLst>
+  </p:timing>
 </p:sld>
 </file>
 
@@ -17009,6 +16492,13 @@
   <p:clrMapOvr>
     <a:masterClrMapping/>
   </p:clrMapOvr>
+  <p:timing>
+    <p:tnLst>
+      <p:par>
+        <p:cTn id="1" dur="indefinite" restart="never" nodeType="tmRoot"/>
+      </p:par>
+    </p:tnLst>
+  </p:timing>
 </p:sld>
 </file>
 
@@ -17133,6 +16623,13 @@
   <p:clrMapOvr>
     <a:masterClrMapping/>
   </p:clrMapOvr>
+  <p:timing>
+    <p:tnLst>
+      <p:par>
+        <p:cTn id="1" dur="indefinite" restart="never" nodeType="tmRoot"/>
+      </p:par>
+    </p:tnLst>
+  </p:timing>
 </p:sld>
 </file>
 
@@ -17205,6 +16702,13 @@
   <p:clrMapOvr>
     <a:masterClrMapping/>
   </p:clrMapOvr>
+  <p:timing>
+    <p:tnLst>
+      <p:par>
+        <p:cTn id="1" dur="indefinite" restart="never" nodeType="tmRoot"/>
+      </p:par>
+    </p:tnLst>
+  </p:timing>
 </p:sld>
 </file>
 
@@ -17439,6 +16943,13 @@
   <p:clrMapOvr>
     <a:masterClrMapping/>
   </p:clrMapOvr>
+  <p:timing>
+    <p:tnLst>
+      <p:par>
+        <p:cTn id="1" dur="indefinite" restart="never" nodeType="tmRoot"/>
+      </p:par>
+    </p:tnLst>
+  </p:timing>
 </p:sld>
 </file>
 
@@ -17499,6 +17010,13 @@
   <p:clrMapOvr>
     <a:masterClrMapping/>
   </p:clrMapOvr>
+  <p:timing>
+    <p:tnLst>
+      <p:par>
+        <p:cTn id="1" dur="indefinite" restart="never" nodeType="tmRoot"/>
+      </p:par>
+    </p:tnLst>
+  </p:timing>
 </p:sld>
 </file>
 
@@ -18083,6 +17601,13 @@
   <p:clrMapOvr>
     <a:masterClrMapping/>
   </p:clrMapOvr>
+  <p:timing>
+    <p:tnLst>
+      <p:par>
+        <p:cTn id="1" dur="indefinite" restart="never" nodeType="tmRoot"/>
+      </p:par>
+    </p:tnLst>
+  </p:timing>
 </p:sld>
 </file>
 

</xml_diff>

<commit_message>
minor modifications in the presentation
</commit_message>
<xml_diff>
--- a/baseProject/presentation/Presentation-Team8.pptx
+++ b/baseProject/presentation/Presentation-Team8.pptx
@@ -5,7 +5,7 @@
     <p:sldMasterId id="2147483648" r:id="rId1"/>
   </p:sldMasterIdLst>
   <p:notesMasterIdLst>
-    <p:notesMasterId r:id="rId24"/>
+    <p:notesMasterId r:id="rId23"/>
   </p:notesMasterIdLst>
   <p:sldIdLst>
     <p:sldId id="256" r:id="rId2"/>
@@ -22,14 +22,13 @@
     <p:sldId id="268" r:id="rId13"/>
     <p:sldId id="269" r:id="rId14"/>
     <p:sldId id="274" r:id="rId15"/>
-    <p:sldId id="279" r:id="rId16"/>
-    <p:sldId id="280" r:id="rId17"/>
-    <p:sldId id="287" r:id="rId18"/>
-    <p:sldId id="288" r:id="rId19"/>
-    <p:sldId id="289" r:id="rId20"/>
-    <p:sldId id="290" r:id="rId21"/>
-    <p:sldId id="286" r:id="rId22"/>
-    <p:sldId id="263" r:id="rId23"/>
+    <p:sldId id="280" r:id="rId16"/>
+    <p:sldId id="287" r:id="rId17"/>
+    <p:sldId id="288" r:id="rId18"/>
+    <p:sldId id="289" r:id="rId19"/>
+    <p:sldId id="290" r:id="rId20"/>
+    <p:sldId id="286" r:id="rId21"/>
+    <p:sldId id="263" r:id="rId22"/>
   </p:sldIdLst>
   <p:sldSz cx="12192000" cy="6858000"/>
   <p:notesSz cx="6858000" cy="9144000"/>
@@ -167,7 +166,6 @@
         <p14:section name="Why us" id="{BE86CB87-125B-42C6-9C31-F3CD9D8CE1DC}">
           <p14:sldIdLst>
             <p14:sldId id="274"/>
-            <p14:sldId id="279"/>
             <p14:sldId id="280"/>
             <p14:sldId id="287"/>
             <p14:sldId id="288"/>
@@ -709,7 +707,7 @@
     </p:spTree>
     <p:extLst>
       <p:ext uri="{BB962C8B-B14F-4D97-AF65-F5344CB8AC3E}">
-        <p14:creationId xmlns:p14="http://schemas.microsoft.com/office/powerpoint/2010/main" val="1478642370"/>
+        <p14:creationId xmlns:p14="http://schemas.microsoft.com/office/powerpoint/2010/main" val="1657977333"/>
       </p:ext>
     </p:extLst>
   </p:cSld>
@@ -793,7 +791,7 @@
     </p:spTree>
     <p:extLst>
       <p:ext uri="{BB962C8B-B14F-4D97-AF65-F5344CB8AC3E}">
-        <p14:creationId xmlns:p14="http://schemas.microsoft.com/office/powerpoint/2010/main" val="1657977333"/>
+        <p14:creationId xmlns:p14="http://schemas.microsoft.com/office/powerpoint/2010/main" val="201347693"/>
       </p:ext>
     </p:extLst>
   </p:cSld>
@@ -877,7 +875,7 @@
     </p:spTree>
     <p:extLst>
       <p:ext uri="{BB962C8B-B14F-4D97-AF65-F5344CB8AC3E}">
-        <p14:creationId xmlns:p14="http://schemas.microsoft.com/office/powerpoint/2010/main" val="201347693"/>
+        <p14:creationId xmlns:p14="http://schemas.microsoft.com/office/powerpoint/2010/main" val="715993072"/>
       </p:ext>
     </p:extLst>
   </p:cSld>
@@ -961,7 +959,7 @@
     </p:spTree>
     <p:extLst>
       <p:ext uri="{BB962C8B-B14F-4D97-AF65-F5344CB8AC3E}">
-        <p14:creationId xmlns:p14="http://schemas.microsoft.com/office/powerpoint/2010/main" val="715993072"/>
+        <p14:creationId xmlns:p14="http://schemas.microsoft.com/office/powerpoint/2010/main" val="4112710545"/>
       </p:ext>
     </p:extLst>
   </p:cSld>
@@ -1037,90 +1035,6 @@
             <a:fld id="{2F2847E0-1D0A-0F4B-99C8-E51199A5987D}" type="slidenum">
               <a:rPr lang="de-DE" smtClean="0"/>
               <a:t>20</a:t>
-            </a:fld>
-            <a:endParaRPr lang="de-DE"/>
-          </a:p>
-        </p:txBody>
-      </p:sp>
-    </p:spTree>
-    <p:extLst>
-      <p:ext uri="{BB962C8B-B14F-4D97-AF65-F5344CB8AC3E}">
-        <p14:creationId xmlns:p14="http://schemas.microsoft.com/office/powerpoint/2010/main" val="4112710545"/>
-      </p:ext>
-    </p:extLst>
-  </p:cSld>
-  <p:clrMapOvr>
-    <a:masterClrMapping/>
-  </p:clrMapOvr>
-</p:notes>
-</file>
-
-<file path=ppt/notesSlides/notesSlide15.xml><?xml version="1.0" encoding="utf-8"?>
-<p:notes xmlns:a="http://schemas.openxmlformats.org/drawingml/2006/main" xmlns:r="http://schemas.openxmlformats.org/officeDocument/2006/relationships" xmlns:p="http://schemas.openxmlformats.org/presentationml/2006/main">
-  <p:cSld>
-    <p:spTree>
-      <p:nvGrpSpPr>
-        <p:cNvPr id="1" name=""/>
-        <p:cNvGrpSpPr/>
-        <p:nvPr/>
-      </p:nvGrpSpPr>
-      <p:grpSpPr>
-        <a:xfrm>
-          <a:off x="0" y="0"/>
-          <a:ext cx="0" cy="0"/>
-          <a:chOff x="0" y="0"/>
-          <a:chExt cx="0" cy="0"/>
-        </a:xfrm>
-      </p:grpSpPr>
-      <p:sp>
-        <p:nvSpPr>
-          <p:cNvPr id="2" name="Folienbildplatzhalter 1"/>
-          <p:cNvSpPr>
-            <a:spLocks noGrp="1" noRot="1" noChangeAspect="1"/>
-          </p:cNvSpPr>
-          <p:nvPr>
-            <p:ph type="sldImg"/>
-          </p:nvPr>
-        </p:nvSpPr>
-        <p:spPr/>
-      </p:sp>
-      <p:sp>
-        <p:nvSpPr>
-          <p:cNvPr id="3" name="Notizenplatzhalter 2"/>
-          <p:cNvSpPr>
-            <a:spLocks noGrp="1"/>
-          </p:cNvSpPr>
-          <p:nvPr>
-            <p:ph type="body" idx="1"/>
-          </p:nvPr>
-        </p:nvSpPr>
-        <p:spPr/>
-        <p:txBody>
-          <a:bodyPr/>
-          <a:lstStyle/>
-          <a:p>
-            <a:endParaRPr lang="de-CH" dirty="0"/>
-          </a:p>
-        </p:txBody>
-      </p:sp>
-      <p:sp>
-        <p:nvSpPr>
-          <p:cNvPr id="4" name="Foliennummernplatzhalter 3"/>
-          <p:cNvSpPr>
-            <a:spLocks noGrp="1"/>
-          </p:cNvSpPr>
-          <p:nvPr>
-            <p:ph type="sldNum" sz="quarter" idx="10"/>
-          </p:nvPr>
-        </p:nvSpPr>
-        <p:spPr/>
-        <p:txBody>
-          <a:bodyPr/>
-          <a:lstStyle/>
-          <a:p>
-            <a:fld id="{2F2847E0-1D0A-0F4B-99C8-E51199A5987D}" type="slidenum">
-              <a:rPr lang="de-DE" smtClean="0"/>
-              <a:t>21</a:t>
             </a:fld>
             <a:endParaRPr lang="de-DE"/>
           </a:p>
@@ -2549,7 +2463,7 @@
     </p:spTree>
     <p:extLst>
       <p:ext uri="{BB962C8B-B14F-4D97-AF65-F5344CB8AC3E}">
-        <p14:creationId xmlns:p14="http://schemas.microsoft.com/office/powerpoint/2010/main" val="3234084027"/>
+        <p14:creationId xmlns:p14="http://schemas.microsoft.com/office/powerpoint/2010/main" val="1478642370"/>
       </p:ext>
     </p:extLst>
   </p:cSld>
@@ -12612,470 +12526,6 @@
           <a:p>
             <a:r>
               <a:rPr lang="de-DE" dirty="0" err="1" smtClean="0"/>
-              <a:t>Why</a:t>
-            </a:r>
-            <a:r>
-              <a:rPr lang="de-DE" dirty="0" smtClean="0"/>
-              <a:t> </a:t>
-            </a:r>
-            <a:r>
-              <a:rPr lang="de-DE" dirty="0" err="1" smtClean="0"/>
-              <a:t>us</a:t>
-            </a:r>
-            <a:r>
-              <a:rPr lang="de-DE" dirty="0" smtClean="0"/>
-              <a:t>?</a:t>
-            </a:r>
-            <a:endParaRPr lang="de-DE" dirty="0"/>
-          </a:p>
-        </p:txBody>
-      </p:sp>
-      <p:sp>
-        <p:nvSpPr>
-          <p:cNvPr id="6" name="Inhaltsplatzhalter 2"/>
-          <p:cNvSpPr txBox="1">
-            <a:spLocks/>
-          </p:cNvSpPr>
-          <p:nvPr/>
-        </p:nvSpPr>
-        <p:spPr>
-          <a:xfrm>
-            <a:off x="8137451" y="-41565"/>
-            <a:ext cx="4054549" cy="370610"/>
-          </a:xfrm>
-          <a:prstGeom prst="rect">
-            <a:avLst/>
-          </a:prstGeom>
-        </p:spPr>
-        <p:txBody>
-          <a:bodyPr vert="horz" lIns="91440" tIns="45720" rIns="91440" bIns="45720" rtlCol="0" anchor="ctr">
-            <a:normAutofit/>
-          </a:bodyPr>
-          <a:lstStyle>
-            <a:lvl1pPr marL="285750" indent="-285750" algn="l" defTabSz="457200" rtl="0" eaLnBrk="1" latinLnBrk="0" hangingPunct="1">
-              <a:spcBef>
-                <a:spcPct val="20000"/>
-              </a:spcBef>
-              <a:spcAft>
-                <a:spcPts val="600"/>
-              </a:spcAft>
-              <a:buClr>
-                <a:schemeClr val="accent1">
-                  <a:lumMod val="75000"/>
-                </a:schemeClr>
-              </a:buClr>
-              <a:buSzPct val="145000"/>
-              <a:buFont typeface="Arial"/>
-              <a:buChar char="•"/>
-              <a:defRPr sz="2400" kern="1200" cap="none">
-                <a:solidFill>
-                  <a:schemeClr val="tx1"/>
-                </a:solidFill>
-                <a:effectLst/>
-                <a:latin typeface="+mn-lt"/>
-                <a:ea typeface="+mn-ea"/>
-                <a:cs typeface="+mn-cs"/>
-              </a:defRPr>
-            </a:lvl1pPr>
-            <a:lvl2pPr marL="742950" indent="-285750" algn="l" defTabSz="457200" rtl="0" eaLnBrk="1" latinLnBrk="0" hangingPunct="1">
-              <a:spcBef>
-                <a:spcPct val="20000"/>
-              </a:spcBef>
-              <a:spcAft>
-                <a:spcPts val="600"/>
-              </a:spcAft>
-              <a:buClr>
-                <a:schemeClr val="accent1">
-                  <a:lumMod val="75000"/>
-                </a:schemeClr>
-              </a:buClr>
-              <a:buSzPct val="145000"/>
-              <a:buFont typeface="Arial"/>
-              <a:buChar char="•"/>
-              <a:defRPr sz="2000" kern="1200" cap="none">
-                <a:solidFill>
-                  <a:schemeClr val="tx1"/>
-                </a:solidFill>
-                <a:effectLst/>
-                <a:latin typeface="+mn-lt"/>
-                <a:ea typeface="+mn-ea"/>
-                <a:cs typeface="+mn-cs"/>
-              </a:defRPr>
-            </a:lvl2pPr>
-            <a:lvl3pPr marL="1200150" indent="-285750" algn="l" defTabSz="457200" rtl="0" eaLnBrk="1" latinLnBrk="0" hangingPunct="1">
-              <a:spcBef>
-                <a:spcPct val="20000"/>
-              </a:spcBef>
-              <a:spcAft>
-                <a:spcPts val="600"/>
-              </a:spcAft>
-              <a:buClr>
-                <a:schemeClr val="accent1">
-                  <a:lumMod val="75000"/>
-                </a:schemeClr>
-              </a:buClr>
-              <a:buSzPct val="145000"/>
-              <a:buFont typeface="Arial"/>
-              <a:buChar char="•"/>
-              <a:defRPr sz="1800" kern="1200" cap="none">
-                <a:solidFill>
-                  <a:schemeClr val="tx1"/>
-                </a:solidFill>
-                <a:effectLst/>
-                <a:latin typeface="+mn-lt"/>
-                <a:ea typeface="+mn-ea"/>
-                <a:cs typeface="+mn-cs"/>
-              </a:defRPr>
-            </a:lvl3pPr>
-            <a:lvl4pPr marL="1543050" indent="-171450" algn="l" defTabSz="457200" rtl="0" eaLnBrk="1" latinLnBrk="0" hangingPunct="1">
-              <a:spcBef>
-                <a:spcPct val="20000"/>
-              </a:spcBef>
-              <a:spcAft>
-                <a:spcPts val="600"/>
-              </a:spcAft>
-              <a:buClr>
-                <a:schemeClr val="accent1">
-                  <a:lumMod val="75000"/>
-                </a:schemeClr>
-              </a:buClr>
-              <a:buSzPct val="145000"/>
-              <a:buFont typeface="Arial"/>
-              <a:buChar char="•"/>
-              <a:defRPr sz="1600" kern="1200" cap="none">
-                <a:solidFill>
-                  <a:schemeClr val="tx1"/>
-                </a:solidFill>
-                <a:effectLst/>
-                <a:latin typeface="+mn-lt"/>
-                <a:ea typeface="+mn-ea"/>
-                <a:cs typeface="+mn-cs"/>
-              </a:defRPr>
-            </a:lvl4pPr>
-            <a:lvl5pPr marL="2000250" indent="-171450" algn="l" defTabSz="457200" rtl="0" eaLnBrk="1" latinLnBrk="0" hangingPunct="1">
-              <a:spcBef>
-                <a:spcPct val="20000"/>
-              </a:spcBef>
-              <a:spcAft>
-                <a:spcPts val="600"/>
-              </a:spcAft>
-              <a:buClr>
-                <a:schemeClr val="accent1">
-                  <a:lumMod val="75000"/>
-                </a:schemeClr>
-              </a:buClr>
-              <a:buSzPct val="145000"/>
-              <a:buFont typeface="Arial"/>
-              <a:buChar char="•"/>
-              <a:defRPr sz="1400" kern="1200" cap="none">
-                <a:solidFill>
-                  <a:schemeClr val="tx1"/>
-                </a:solidFill>
-                <a:effectLst/>
-                <a:latin typeface="+mn-lt"/>
-                <a:ea typeface="+mn-ea"/>
-                <a:cs typeface="+mn-cs"/>
-              </a:defRPr>
-            </a:lvl5pPr>
-            <a:lvl6pPr marL="2514600" indent="-228600" algn="l" defTabSz="457200" rtl="0" eaLnBrk="1" latinLnBrk="0" hangingPunct="1">
-              <a:spcBef>
-                <a:spcPct val="20000"/>
-              </a:spcBef>
-              <a:spcAft>
-                <a:spcPts val="600"/>
-              </a:spcAft>
-              <a:buClr>
-                <a:schemeClr val="accent1">
-                  <a:lumMod val="75000"/>
-                </a:schemeClr>
-              </a:buClr>
-              <a:buSzPct val="145000"/>
-              <a:buFont typeface="Arial"/>
-              <a:buChar char="•"/>
-              <a:defRPr sz="1400" kern="1200" cap="none">
-                <a:solidFill>
-                  <a:schemeClr val="tx1"/>
-                </a:solidFill>
-                <a:effectLst/>
-                <a:latin typeface="+mn-lt"/>
-                <a:ea typeface="+mn-ea"/>
-                <a:cs typeface="+mn-cs"/>
-              </a:defRPr>
-            </a:lvl6pPr>
-            <a:lvl7pPr marL="2971800" indent="-228600" algn="l" defTabSz="457200" rtl="0" eaLnBrk="1" latinLnBrk="0" hangingPunct="1">
-              <a:spcBef>
-                <a:spcPct val="20000"/>
-              </a:spcBef>
-              <a:spcAft>
-                <a:spcPts val="600"/>
-              </a:spcAft>
-              <a:buClr>
-                <a:schemeClr val="accent1">
-                  <a:lumMod val="75000"/>
-                </a:schemeClr>
-              </a:buClr>
-              <a:buSzPct val="145000"/>
-              <a:buFont typeface="Arial"/>
-              <a:buChar char="•"/>
-              <a:defRPr sz="1400" kern="1200" cap="none">
-                <a:solidFill>
-                  <a:schemeClr val="tx1"/>
-                </a:solidFill>
-                <a:effectLst/>
-                <a:latin typeface="+mn-lt"/>
-                <a:ea typeface="+mn-ea"/>
-                <a:cs typeface="+mn-cs"/>
-              </a:defRPr>
-            </a:lvl7pPr>
-            <a:lvl8pPr marL="3429000" indent="-228600" algn="l" defTabSz="457200" rtl="0" eaLnBrk="1" latinLnBrk="0" hangingPunct="1">
-              <a:spcBef>
-                <a:spcPct val="20000"/>
-              </a:spcBef>
-              <a:spcAft>
-                <a:spcPts val="600"/>
-              </a:spcAft>
-              <a:buClr>
-                <a:schemeClr val="accent1">
-                  <a:lumMod val="75000"/>
-                </a:schemeClr>
-              </a:buClr>
-              <a:buSzPct val="145000"/>
-              <a:buFont typeface="Arial"/>
-              <a:buChar char="•"/>
-              <a:defRPr sz="1400" kern="1200" cap="none">
-                <a:solidFill>
-                  <a:schemeClr val="tx1"/>
-                </a:solidFill>
-                <a:effectLst/>
-                <a:latin typeface="+mn-lt"/>
-                <a:ea typeface="+mn-ea"/>
-                <a:cs typeface="+mn-cs"/>
-              </a:defRPr>
-            </a:lvl8pPr>
-            <a:lvl9pPr marL="3886200" indent="-228600" algn="l" defTabSz="457200" rtl="0" eaLnBrk="1" latinLnBrk="0" hangingPunct="1">
-              <a:spcBef>
-                <a:spcPct val="20000"/>
-              </a:spcBef>
-              <a:spcAft>
-                <a:spcPts val="600"/>
-              </a:spcAft>
-              <a:buClr>
-                <a:schemeClr val="accent1">
-                  <a:lumMod val="75000"/>
-                </a:schemeClr>
-              </a:buClr>
-              <a:buSzPct val="145000"/>
-              <a:buFont typeface="Arial"/>
-              <a:buChar char="•"/>
-              <a:defRPr sz="1400" kern="1200" cap="none">
-                <a:solidFill>
-                  <a:schemeClr val="tx1"/>
-                </a:solidFill>
-                <a:effectLst/>
-                <a:latin typeface="+mn-lt"/>
-                <a:ea typeface="+mn-ea"/>
-                <a:cs typeface="+mn-cs"/>
-              </a:defRPr>
-            </a:lvl9pPr>
-          </a:lstStyle>
-          <a:p>
-            <a:pPr marL="0" indent="0">
-              <a:buNone/>
-            </a:pPr>
-            <a:r>
-              <a:rPr lang="de-DE" sz="1000" dirty="0" smtClean="0"/>
-              <a:t>Rem0 Röthlisberger, Eric </a:t>
-            </a:r>
-            <a:r>
-              <a:rPr lang="de-DE" sz="1000" dirty="0" err="1" smtClean="0"/>
-              <a:t>Lagger</a:t>
-            </a:r>
-            <a:r>
-              <a:rPr lang="de-DE" sz="1000" dirty="0" smtClean="0"/>
-              <a:t>, Vincent Hofer, Dean Klopsch, Aebi Ryan</a:t>
-            </a:r>
-            <a:endParaRPr lang="de-DE" sz="1000" dirty="0"/>
-          </a:p>
-        </p:txBody>
-      </p:sp>
-      <p:sp>
-        <p:nvSpPr>
-          <p:cNvPr id="7" name="Inhaltsplatzhalter 2"/>
-          <p:cNvSpPr>
-            <a:spLocks noGrp="1"/>
-          </p:cNvSpPr>
-          <p:nvPr>
-            <p:ph idx="1"/>
-          </p:nvPr>
-        </p:nvSpPr>
-        <p:spPr>
-          <a:xfrm>
-            <a:off x="762552" y="2065420"/>
-            <a:ext cx="10115438" cy="3937001"/>
-          </a:xfrm>
-        </p:spPr>
-        <p:txBody>
-          <a:bodyPr>
-            <a:normAutofit/>
-          </a:bodyPr>
-          <a:lstStyle/>
-          <a:p>
-            <a:pPr algn="ctr"/>
-            <a:r>
-              <a:rPr lang="de-DE" sz="3200" dirty="0" err="1" smtClean="0"/>
-              <a:t>Our</a:t>
-            </a:r>
-            <a:r>
-              <a:rPr lang="de-DE" sz="3200" dirty="0" smtClean="0"/>
-              <a:t> </a:t>
-            </a:r>
-            <a:r>
-              <a:rPr lang="de-DE" sz="3200" dirty="0" err="1" smtClean="0"/>
-              <a:t>team</a:t>
-            </a:r>
-            <a:endParaRPr lang="de-DE" sz="3200" dirty="0" smtClean="0"/>
-          </a:p>
-          <a:p>
-            <a:pPr algn="ctr"/>
-            <a:r>
-              <a:rPr lang="de-DE" sz="3200" dirty="0" smtClean="0"/>
-              <a:t>The </a:t>
-            </a:r>
-            <a:r>
-              <a:rPr lang="de-DE" sz="3200" dirty="0" err="1" smtClean="0"/>
-              <a:t>products</a:t>
-            </a:r>
-            <a:r>
-              <a:rPr lang="de-DE" sz="3200" dirty="0" smtClean="0"/>
-              <a:t/>
-            </a:r>
-            <a:br>
-              <a:rPr lang="de-DE" sz="3200" dirty="0" smtClean="0"/>
-            </a:br>
-            <a:r>
-              <a:rPr lang="de-DE" sz="3200" dirty="0" smtClean="0"/>
-              <a:t>-&gt; The </a:t>
-            </a:r>
-            <a:r>
-              <a:rPr lang="de-DE" sz="3200" dirty="0" err="1" smtClean="0"/>
-              <a:t>client</a:t>
-            </a:r>
-            <a:r>
-              <a:rPr lang="de-DE" sz="3200" dirty="0" smtClean="0"/>
-              <a:t/>
-            </a:r>
-            <a:br>
-              <a:rPr lang="de-DE" sz="3200" dirty="0" smtClean="0"/>
-            </a:br>
-            <a:r>
-              <a:rPr lang="de-DE" sz="3200" dirty="0" smtClean="0"/>
-              <a:t>-&gt; The </a:t>
-            </a:r>
-            <a:r>
-              <a:rPr lang="de-DE" sz="3200" dirty="0" err="1" smtClean="0"/>
-              <a:t>developers</a:t>
-            </a:r>
-            <a:endParaRPr lang="de-DE" sz="3200" dirty="0" smtClean="0"/>
-          </a:p>
-          <a:p>
-            <a:pPr algn="ctr"/>
-            <a:r>
-              <a:rPr lang="de-DE" sz="3200" dirty="0" err="1" smtClean="0"/>
-              <a:t>Ask</a:t>
-            </a:r>
-            <a:r>
-              <a:rPr lang="de-DE" sz="3200" dirty="0" smtClean="0"/>
-              <a:t> </a:t>
-            </a:r>
-            <a:r>
-              <a:rPr lang="de-DE" sz="3200" dirty="0" err="1" smtClean="0"/>
-              <a:t>us</a:t>
-            </a:r>
-            <a:r>
-              <a:rPr lang="de-DE" sz="3200" dirty="0" smtClean="0"/>
-              <a:t>!</a:t>
-            </a:r>
-          </a:p>
-          <a:p>
-            <a:pPr algn="ctr"/>
-            <a:r>
-              <a:rPr lang="de-DE" sz="3200" dirty="0" err="1" smtClean="0"/>
-              <a:t>Contact</a:t>
-            </a:r>
-            <a:r>
-              <a:rPr lang="de-DE" sz="3200" dirty="0" smtClean="0"/>
-              <a:t> </a:t>
-            </a:r>
-            <a:r>
-              <a:rPr lang="de-DE" sz="3200" dirty="0" err="1" smtClean="0"/>
-              <a:t>us</a:t>
-            </a:r>
-            <a:r>
-              <a:rPr lang="de-DE" sz="3200" dirty="0" smtClean="0"/>
-              <a:t>!</a:t>
-            </a:r>
-          </a:p>
-        </p:txBody>
-      </p:sp>
-    </p:spTree>
-    <p:extLst>
-      <p:ext uri="{BB962C8B-B14F-4D97-AF65-F5344CB8AC3E}">
-        <p14:creationId xmlns:p14="http://schemas.microsoft.com/office/powerpoint/2010/main" val="3339796951"/>
-      </p:ext>
-    </p:extLst>
-  </p:cSld>
-  <p:clrMapOvr>
-    <a:masterClrMapping/>
-  </p:clrMapOvr>
-  <p:timing>
-    <p:tnLst>
-      <p:par>
-        <p:cTn id="1" dur="indefinite" restart="never" nodeType="tmRoot"/>
-      </p:par>
-    </p:tnLst>
-  </p:timing>
-</p:sld>
-</file>
-
-<file path=ppt/slides/slide16.xml><?xml version="1.0" encoding="utf-8"?>
-<p:sld xmlns:a="http://schemas.openxmlformats.org/drawingml/2006/main" xmlns:r="http://schemas.openxmlformats.org/officeDocument/2006/relationships" xmlns:p="http://schemas.openxmlformats.org/presentationml/2006/main">
-  <p:cSld>
-    <p:spTree>
-      <p:nvGrpSpPr>
-        <p:cNvPr id="1" name=""/>
-        <p:cNvGrpSpPr/>
-        <p:nvPr/>
-      </p:nvGrpSpPr>
-      <p:grpSpPr>
-        <a:xfrm>
-          <a:off x="0" y="0"/>
-          <a:ext cx="0" cy="0"/>
-          <a:chOff x="0" y="0"/>
-          <a:chExt cx="0" cy="0"/>
-        </a:xfrm>
-      </p:grpSpPr>
-      <p:sp>
-        <p:nvSpPr>
-          <p:cNvPr id="2" name="Titel 1"/>
-          <p:cNvSpPr>
-            <a:spLocks noGrp="1"/>
-          </p:cNvSpPr>
-          <p:nvPr>
-            <p:ph type="title"/>
-          </p:nvPr>
-        </p:nvSpPr>
-        <p:spPr>
-          <a:xfrm>
-            <a:off x="810915" y="691116"/>
-            <a:ext cx="10018713" cy="1752599"/>
-          </a:xfrm>
-        </p:spPr>
-        <p:txBody>
-          <a:bodyPr/>
-          <a:lstStyle/>
-          <a:p>
-            <a:r>
-              <a:rPr lang="de-DE" dirty="0" err="1" smtClean="0"/>
               <a:t>Good</a:t>
             </a:r>
             <a:r>
@@ -13407,7 +12857,7 @@
 </p:sld>
 </file>
 
-<file path=ppt/slides/slide17.xml><?xml version="1.0" encoding="utf-8"?>
+<file path=ppt/slides/slide16.xml><?xml version="1.0" encoding="utf-8"?>
 <p:sld xmlns:a="http://schemas.openxmlformats.org/drawingml/2006/main" xmlns:r="http://schemas.openxmlformats.org/officeDocument/2006/relationships" xmlns:p="http://schemas.openxmlformats.org/presentationml/2006/main">
   <p:cSld>
     <p:spTree>
@@ -13777,7 +13227,7 @@
 </p:sld>
 </file>
 
-<file path=ppt/slides/slide18.xml><?xml version="1.0" encoding="utf-8"?>
+<file path=ppt/slides/slide17.xml><?xml version="1.0" encoding="utf-8"?>
 <p:sld xmlns:a="http://schemas.openxmlformats.org/drawingml/2006/main" xmlns:r="http://schemas.openxmlformats.org/officeDocument/2006/relationships" xmlns:p="http://schemas.openxmlformats.org/presentationml/2006/main">
   <p:cSld>
     <p:spTree>
@@ -14147,7 +13597,7 @@
 </p:sld>
 </file>
 
-<file path=ppt/slides/slide19.xml><?xml version="1.0" encoding="utf-8"?>
+<file path=ppt/slides/slide18.xml><?xml version="1.0" encoding="utf-8"?>
 <p:sld xmlns:a="http://schemas.openxmlformats.org/drawingml/2006/main" xmlns:r="http://schemas.openxmlformats.org/officeDocument/2006/relationships" xmlns:p="http://schemas.openxmlformats.org/presentationml/2006/main">
   <p:cSld>
     <p:spTree>
@@ -14501,6 +13951,376 @@
     <p:extLst>
       <p:ext uri="{BB962C8B-B14F-4D97-AF65-F5344CB8AC3E}">
         <p14:creationId xmlns:p14="http://schemas.microsoft.com/office/powerpoint/2010/main" val="3528280995"/>
+      </p:ext>
+    </p:extLst>
+  </p:cSld>
+  <p:clrMapOvr>
+    <a:masterClrMapping/>
+  </p:clrMapOvr>
+  <p:timing>
+    <p:tnLst>
+      <p:par>
+        <p:cTn id="1" dur="indefinite" restart="never" nodeType="tmRoot"/>
+      </p:par>
+    </p:tnLst>
+  </p:timing>
+</p:sld>
+</file>
+
+<file path=ppt/slides/slide19.xml><?xml version="1.0" encoding="utf-8"?>
+<p:sld xmlns:a="http://schemas.openxmlformats.org/drawingml/2006/main" xmlns:r="http://schemas.openxmlformats.org/officeDocument/2006/relationships" xmlns:p="http://schemas.openxmlformats.org/presentationml/2006/main">
+  <p:cSld>
+    <p:spTree>
+      <p:nvGrpSpPr>
+        <p:cNvPr id="1" name=""/>
+        <p:cNvGrpSpPr/>
+        <p:nvPr/>
+      </p:nvGrpSpPr>
+      <p:grpSpPr>
+        <a:xfrm>
+          <a:off x="0" y="0"/>
+          <a:ext cx="0" cy="0"/>
+          <a:chOff x="0" y="0"/>
+          <a:chExt cx="0" cy="0"/>
+        </a:xfrm>
+      </p:grpSpPr>
+      <p:sp>
+        <p:nvSpPr>
+          <p:cNvPr id="2" name="Titel 1"/>
+          <p:cNvSpPr>
+            <a:spLocks noGrp="1"/>
+          </p:cNvSpPr>
+          <p:nvPr>
+            <p:ph type="title"/>
+          </p:nvPr>
+        </p:nvSpPr>
+        <p:spPr>
+          <a:xfrm>
+            <a:off x="810915" y="691116"/>
+            <a:ext cx="10018713" cy="1752599"/>
+          </a:xfrm>
+        </p:spPr>
+        <p:txBody>
+          <a:bodyPr/>
+          <a:lstStyle/>
+          <a:p>
+            <a:r>
+              <a:rPr lang="de-DE" dirty="0" err="1" smtClean="0"/>
+              <a:t>Good</a:t>
+            </a:r>
+            <a:r>
+              <a:rPr lang="de-DE" dirty="0" smtClean="0"/>
+              <a:t> </a:t>
+            </a:r>
+            <a:r>
+              <a:rPr lang="de-DE" dirty="0" err="1" smtClean="0"/>
+              <a:t>code</a:t>
+            </a:r>
+            <a:endParaRPr lang="de-DE" dirty="0"/>
+          </a:p>
+        </p:txBody>
+      </p:sp>
+      <p:sp>
+        <p:nvSpPr>
+          <p:cNvPr id="6" name="Inhaltsplatzhalter 2"/>
+          <p:cNvSpPr txBox="1">
+            <a:spLocks/>
+          </p:cNvSpPr>
+          <p:nvPr/>
+        </p:nvSpPr>
+        <p:spPr>
+          <a:xfrm>
+            <a:off x="8137451" y="-41565"/>
+            <a:ext cx="4054549" cy="370610"/>
+          </a:xfrm>
+          <a:prstGeom prst="rect">
+            <a:avLst/>
+          </a:prstGeom>
+        </p:spPr>
+        <p:txBody>
+          <a:bodyPr vert="horz" lIns="91440" tIns="45720" rIns="91440" bIns="45720" rtlCol="0" anchor="ctr">
+            <a:normAutofit/>
+          </a:bodyPr>
+          <a:lstStyle>
+            <a:lvl1pPr marL="285750" indent="-285750" algn="l" defTabSz="457200" rtl="0" eaLnBrk="1" latinLnBrk="0" hangingPunct="1">
+              <a:spcBef>
+                <a:spcPct val="20000"/>
+              </a:spcBef>
+              <a:spcAft>
+                <a:spcPts val="600"/>
+              </a:spcAft>
+              <a:buClr>
+                <a:schemeClr val="accent1">
+                  <a:lumMod val="75000"/>
+                </a:schemeClr>
+              </a:buClr>
+              <a:buSzPct val="145000"/>
+              <a:buFont typeface="Arial"/>
+              <a:buChar char="•"/>
+              <a:defRPr sz="2400" kern="1200" cap="none">
+                <a:solidFill>
+                  <a:schemeClr val="tx1"/>
+                </a:solidFill>
+                <a:effectLst/>
+                <a:latin typeface="+mn-lt"/>
+                <a:ea typeface="+mn-ea"/>
+                <a:cs typeface="+mn-cs"/>
+              </a:defRPr>
+            </a:lvl1pPr>
+            <a:lvl2pPr marL="742950" indent="-285750" algn="l" defTabSz="457200" rtl="0" eaLnBrk="1" latinLnBrk="0" hangingPunct="1">
+              <a:spcBef>
+                <a:spcPct val="20000"/>
+              </a:spcBef>
+              <a:spcAft>
+                <a:spcPts val="600"/>
+              </a:spcAft>
+              <a:buClr>
+                <a:schemeClr val="accent1">
+                  <a:lumMod val="75000"/>
+                </a:schemeClr>
+              </a:buClr>
+              <a:buSzPct val="145000"/>
+              <a:buFont typeface="Arial"/>
+              <a:buChar char="•"/>
+              <a:defRPr sz="2000" kern="1200" cap="none">
+                <a:solidFill>
+                  <a:schemeClr val="tx1"/>
+                </a:solidFill>
+                <a:effectLst/>
+                <a:latin typeface="+mn-lt"/>
+                <a:ea typeface="+mn-ea"/>
+                <a:cs typeface="+mn-cs"/>
+              </a:defRPr>
+            </a:lvl2pPr>
+            <a:lvl3pPr marL="1200150" indent="-285750" algn="l" defTabSz="457200" rtl="0" eaLnBrk="1" latinLnBrk="0" hangingPunct="1">
+              <a:spcBef>
+                <a:spcPct val="20000"/>
+              </a:spcBef>
+              <a:spcAft>
+                <a:spcPts val="600"/>
+              </a:spcAft>
+              <a:buClr>
+                <a:schemeClr val="accent1">
+                  <a:lumMod val="75000"/>
+                </a:schemeClr>
+              </a:buClr>
+              <a:buSzPct val="145000"/>
+              <a:buFont typeface="Arial"/>
+              <a:buChar char="•"/>
+              <a:defRPr sz="1800" kern="1200" cap="none">
+                <a:solidFill>
+                  <a:schemeClr val="tx1"/>
+                </a:solidFill>
+                <a:effectLst/>
+                <a:latin typeface="+mn-lt"/>
+                <a:ea typeface="+mn-ea"/>
+                <a:cs typeface="+mn-cs"/>
+              </a:defRPr>
+            </a:lvl3pPr>
+            <a:lvl4pPr marL="1543050" indent="-171450" algn="l" defTabSz="457200" rtl="0" eaLnBrk="1" latinLnBrk="0" hangingPunct="1">
+              <a:spcBef>
+                <a:spcPct val="20000"/>
+              </a:spcBef>
+              <a:spcAft>
+                <a:spcPts val="600"/>
+              </a:spcAft>
+              <a:buClr>
+                <a:schemeClr val="accent1">
+                  <a:lumMod val="75000"/>
+                </a:schemeClr>
+              </a:buClr>
+              <a:buSzPct val="145000"/>
+              <a:buFont typeface="Arial"/>
+              <a:buChar char="•"/>
+              <a:defRPr sz="1600" kern="1200" cap="none">
+                <a:solidFill>
+                  <a:schemeClr val="tx1"/>
+                </a:solidFill>
+                <a:effectLst/>
+                <a:latin typeface="+mn-lt"/>
+                <a:ea typeface="+mn-ea"/>
+                <a:cs typeface="+mn-cs"/>
+              </a:defRPr>
+            </a:lvl4pPr>
+            <a:lvl5pPr marL="2000250" indent="-171450" algn="l" defTabSz="457200" rtl="0" eaLnBrk="1" latinLnBrk="0" hangingPunct="1">
+              <a:spcBef>
+                <a:spcPct val="20000"/>
+              </a:spcBef>
+              <a:spcAft>
+                <a:spcPts val="600"/>
+              </a:spcAft>
+              <a:buClr>
+                <a:schemeClr val="accent1">
+                  <a:lumMod val="75000"/>
+                </a:schemeClr>
+              </a:buClr>
+              <a:buSzPct val="145000"/>
+              <a:buFont typeface="Arial"/>
+              <a:buChar char="•"/>
+              <a:defRPr sz="1400" kern="1200" cap="none">
+                <a:solidFill>
+                  <a:schemeClr val="tx1"/>
+                </a:solidFill>
+                <a:effectLst/>
+                <a:latin typeface="+mn-lt"/>
+                <a:ea typeface="+mn-ea"/>
+                <a:cs typeface="+mn-cs"/>
+              </a:defRPr>
+            </a:lvl5pPr>
+            <a:lvl6pPr marL="2514600" indent="-228600" algn="l" defTabSz="457200" rtl="0" eaLnBrk="1" latinLnBrk="0" hangingPunct="1">
+              <a:spcBef>
+                <a:spcPct val="20000"/>
+              </a:spcBef>
+              <a:spcAft>
+                <a:spcPts val="600"/>
+              </a:spcAft>
+              <a:buClr>
+                <a:schemeClr val="accent1">
+                  <a:lumMod val="75000"/>
+                </a:schemeClr>
+              </a:buClr>
+              <a:buSzPct val="145000"/>
+              <a:buFont typeface="Arial"/>
+              <a:buChar char="•"/>
+              <a:defRPr sz="1400" kern="1200" cap="none">
+                <a:solidFill>
+                  <a:schemeClr val="tx1"/>
+                </a:solidFill>
+                <a:effectLst/>
+                <a:latin typeface="+mn-lt"/>
+                <a:ea typeface="+mn-ea"/>
+                <a:cs typeface="+mn-cs"/>
+              </a:defRPr>
+            </a:lvl6pPr>
+            <a:lvl7pPr marL="2971800" indent="-228600" algn="l" defTabSz="457200" rtl="0" eaLnBrk="1" latinLnBrk="0" hangingPunct="1">
+              <a:spcBef>
+                <a:spcPct val="20000"/>
+              </a:spcBef>
+              <a:spcAft>
+                <a:spcPts val="600"/>
+              </a:spcAft>
+              <a:buClr>
+                <a:schemeClr val="accent1">
+                  <a:lumMod val="75000"/>
+                </a:schemeClr>
+              </a:buClr>
+              <a:buSzPct val="145000"/>
+              <a:buFont typeface="Arial"/>
+              <a:buChar char="•"/>
+              <a:defRPr sz="1400" kern="1200" cap="none">
+                <a:solidFill>
+                  <a:schemeClr val="tx1"/>
+                </a:solidFill>
+                <a:effectLst/>
+                <a:latin typeface="+mn-lt"/>
+                <a:ea typeface="+mn-ea"/>
+                <a:cs typeface="+mn-cs"/>
+              </a:defRPr>
+            </a:lvl7pPr>
+            <a:lvl8pPr marL="3429000" indent="-228600" algn="l" defTabSz="457200" rtl="0" eaLnBrk="1" latinLnBrk="0" hangingPunct="1">
+              <a:spcBef>
+                <a:spcPct val="20000"/>
+              </a:spcBef>
+              <a:spcAft>
+                <a:spcPts val="600"/>
+              </a:spcAft>
+              <a:buClr>
+                <a:schemeClr val="accent1">
+                  <a:lumMod val="75000"/>
+                </a:schemeClr>
+              </a:buClr>
+              <a:buSzPct val="145000"/>
+              <a:buFont typeface="Arial"/>
+              <a:buChar char="•"/>
+              <a:defRPr sz="1400" kern="1200" cap="none">
+                <a:solidFill>
+                  <a:schemeClr val="tx1"/>
+                </a:solidFill>
+                <a:effectLst/>
+                <a:latin typeface="+mn-lt"/>
+                <a:ea typeface="+mn-ea"/>
+                <a:cs typeface="+mn-cs"/>
+              </a:defRPr>
+            </a:lvl8pPr>
+            <a:lvl9pPr marL="3886200" indent="-228600" algn="l" defTabSz="457200" rtl="0" eaLnBrk="1" latinLnBrk="0" hangingPunct="1">
+              <a:spcBef>
+                <a:spcPct val="20000"/>
+              </a:spcBef>
+              <a:spcAft>
+                <a:spcPts val="600"/>
+              </a:spcAft>
+              <a:buClr>
+                <a:schemeClr val="accent1">
+                  <a:lumMod val="75000"/>
+                </a:schemeClr>
+              </a:buClr>
+              <a:buSzPct val="145000"/>
+              <a:buFont typeface="Arial"/>
+              <a:buChar char="•"/>
+              <a:defRPr sz="1400" kern="1200" cap="none">
+                <a:solidFill>
+                  <a:schemeClr val="tx1"/>
+                </a:solidFill>
+                <a:effectLst/>
+                <a:latin typeface="+mn-lt"/>
+                <a:ea typeface="+mn-ea"/>
+                <a:cs typeface="+mn-cs"/>
+              </a:defRPr>
+            </a:lvl9pPr>
+          </a:lstStyle>
+          <a:p>
+            <a:pPr marL="0" indent="0">
+              <a:buNone/>
+            </a:pPr>
+            <a:r>
+              <a:rPr lang="de-DE" sz="1000" dirty="0" smtClean="0"/>
+              <a:t>Rem0 Röthlisberger, Eric </a:t>
+            </a:r>
+            <a:r>
+              <a:rPr lang="de-DE" sz="1000" dirty="0" err="1" smtClean="0"/>
+              <a:t>Lagger</a:t>
+            </a:r>
+            <a:r>
+              <a:rPr lang="de-DE" sz="1000" dirty="0" smtClean="0"/>
+              <a:t>, Vincent Hofer, Dean Klopsch, Aebi Ryan</a:t>
+            </a:r>
+            <a:endParaRPr lang="de-DE" sz="1000" dirty="0"/>
+          </a:p>
+        </p:txBody>
+      </p:sp>
+      <p:pic>
+        <p:nvPicPr>
+          <p:cNvPr id="8" name="Inhaltsplatzhalter 7"/>
+          <p:cNvPicPr>
+            <a:picLocks noGrp="1" noChangeAspect="1"/>
+          </p:cNvPicPr>
+          <p:nvPr>
+            <p:ph idx="1"/>
+          </p:nvPr>
+        </p:nvPicPr>
+        <p:blipFill>
+          <a:blip r:embed="rId3">
+            <a:extLst>
+              <a:ext uri="{28A0092B-C50C-407E-A947-70E740481C1C}">
+                <a14:useLocalDpi xmlns:a14="http://schemas.microsoft.com/office/drawing/2010/main" val="0"/>
+              </a:ext>
+            </a:extLst>
+          </a:blip>
+          <a:stretch>
+            <a:fillRect/>
+          </a:stretch>
+        </p:blipFill>
+        <p:spPr>
+          <a:xfrm>
+            <a:off x="1916024" y="1945172"/>
+            <a:ext cx="7808494" cy="4407501"/>
+          </a:xfrm>
+        </p:spPr>
+      </p:pic>
+    </p:spTree>
+    <p:extLst>
+      <p:ext uri="{BB962C8B-B14F-4D97-AF65-F5344CB8AC3E}">
+        <p14:creationId xmlns:p14="http://schemas.microsoft.com/office/powerpoint/2010/main" val="896141722"/>
       </p:ext>
     </p:extLst>
   </p:cSld>
@@ -15005,7 +14825,7 @@
           <a:p>
             <a:r>
               <a:rPr lang="de-DE" dirty="0" err="1" smtClean="0"/>
-              <a:t>Good</a:t>
+              <a:t>Why</a:t>
             </a:r>
             <a:r>
               <a:rPr lang="de-DE" dirty="0" smtClean="0"/>
@@ -15013,7 +14833,11 @@
             </a:r>
             <a:r>
               <a:rPr lang="de-DE" dirty="0" err="1" smtClean="0"/>
-              <a:t>code</a:t>
+              <a:t>us</a:t>
+            </a:r>
+            <a:r>
+              <a:rPr lang="de-DE" dirty="0" smtClean="0"/>
+              <a:t>?</a:t>
             </a:r>
             <a:endParaRPr lang="de-DE" dirty="0"/>
           </a:p>
@@ -15287,39 +15111,129 @@
           </a:p>
         </p:txBody>
       </p:sp>
-      <p:pic>
-        <p:nvPicPr>
-          <p:cNvPr id="8" name="Inhaltsplatzhalter 7"/>
-          <p:cNvPicPr>
-            <a:picLocks noGrp="1" noChangeAspect="1"/>
-          </p:cNvPicPr>
+      <p:sp>
+        <p:nvSpPr>
+          <p:cNvPr id="7" name="Inhaltsplatzhalter 2"/>
+          <p:cNvSpPr>
+            <a:spLocks noGrp="1"/>
+          </p:cNvSpPr>
           <p:nvPr>
             <p:ph idx="1"/>
           </p:nvPr>
-        </p:nvPicPr>
-        <p:blipFill>
-          <a:blip r:embed="rId3">
-            <a:extLst>
-              <a:ext uri="{28A0092B-C50C-407E-A947-70E740481C1C}">
-                <a14:useLocalDpi xmlns:a14="http://schemas.microsoft.com/office/drawing/2010/main" val="0"/>
-              </a:ext>
-            </a:extLst>
-          </a:blip>
-          <a:stretch>
-            <a:fillRect/>
-          </a:stretch>
-        </p:blipFill>
+        </p:nvSpPr>
         <p:spPr>
           <a:xfrm>
-            <a:off x="1916024" y="1945172"/>
-            <a:ext cx="7808494" cy="4407501"/>
+            <a:off x="762552" y="2065420"/>
+            <a:ext cx="10115438" cy="3937001"/>
           </a:xfrm>
         </p:spPr>
-      </p:pic>
+        <p:txBody>
+          <a:bodyPr>
+            <a:normAutofit/>
+          </a:bodyPr>
+          <a:lstStyle/>
+          <a:p>
+            <a:pPr algn="ctr"/>
+            <a:r>
+              <a:rPr lang="de-DE" sz="3200" dirty="0" err="1" smtClean="0"/>
+              <a:t>Our</a:t>
+            </a:r>
+            <a:r>
+              <a:rPr lang="de-DE" sz="3200" dirty="0" smtClean="0"/>
+              <a:t> </a:t>
+            </a:r>
+            <a:r>
+              <a:rPr lang="de-DE" sz="3200" dirty="0" err="1" smtClean="0"/>
+              <a:t>team</a:t>
+            </a:r>
+            <a:endParaRPr lang="de-DE" sz="3200" dirty="0" smtClean="0"/>
+          </a:p>
+          <a:p>
+            <a:pPr algn="ctr"/>
+            <a:r>
+              <a:rPr lang="de-DE" sz="3200" dirty="0" smtClean="0"/>
+              <a:t>The </a:t>
+            </a:r>
+            <a:r>
+              <a:rPr lang="de-DE" sz="3200" dirty="0" err="1" smtClean="0"/>
+              <a:t>products</a:t>
+            </a:r>
+            <a:r>
+              <a:rPr lang="de-DE" sz="3200" dirty="0" smtClean="0"/>
+              <a:t/>
+            </a:r>
+            <a:br>
+              <a:rPr lang="de-DE" sz="3200" dirty="0" smtClean="0"/>
+            </a:br>
+            <a:r>
+              <a:rPr lang="de-DE" sz="3200" dirty="0" smtClean="0"/>
+              <a:t>-&gt; The </a:t>
+            </a:r>
+            <a:r>
+              <a:rPr lang="de-DE" sz="3200" dirty="0" err="1" smtClean="0"/>
+              <a:t>client</a:t>
+            </a:r>
+            <a:r>
+              <a:rPr lang="de-DE" sz="3200" dirty="0" smtClean="0"/>
+              <a:t/>
+            </a:r>
+            <a:br>
+              <a:rPr lang="de-DE" sz="3200" dirty="0" smtClean="0"/>
+            </a:br>
+            <a:r>
+              <a:rPr lang="de-DE" sz="3200" dirty="0" smtClean="0"/>
+              <a:t>-&gt; The </a:t>
+            </a:r>
+            <a:r>
+              <a:rPr lang="de-DE" sz="3200" dirty="0" err="1" smtClean="0"/>
+              <a:t>developers</a:t>
+            </a:r>
+            <a:endParaRPr lang="de-DE" sz="3200" dirty="0" smtClean="0"/>
+          </a:p>
+          <a:p>
+            <a:pPr algn="ctr"/>
+            <a:r>
+              <a:rPr lang="de-DE" sz="3200" dirty="0" err="1" smtClean="0"/>
+              <a:t>Ask</a:t>
+            </a:r>
+            <a:r>
+              <a:rPr lang="de-DE" sz="3200" dirty="0" smtClean="0"/>
+              <a:t> </a:t>
+            </a:r>
+            <a:r>
+              <a:rPr lang="de-DE" sz="3200" dirty="0" err="1" smtClean="0"/>
+              <a:t>us</a:t>
+            </a:r>
+            <a:r>
+              <a:rPr lang="de-DE" sz="3200" dirty="0" smtClean="0"/>
+              <a:t>!</a:t>
+            </a:r>
+          </a:p>
+          <a:p>
+            <a:pPr algn="ctr"/>
+            <a:r>
+              <a:rPr lang="de-DE" sz="3200" dirty="0" err="1" smtClean="0"/>
+              <a:t>Contact</a:t>
+            </a:r>
+            <a:r>
+              <a:rPr lang="de-DE" sz="3200" dirty="0" smtClean="0"/>
+              <a:t> </a:t>
+            </a:r>
+            <a:r>
+              <a:rPr lang="de-DE" sz="3200" dirty="0" err="1" smtClean="0"/>
+              <a:t>us</a:t>
+            </a:r>
+            <a:r>
+              <a:rPr lang="de-DE" sz="3200" dirty="0" smtClean="0"/>
+              <a:t>!</a:t>
+            </a:r>
+          </a:p>
+        </p:txBody>
+      </p:sp>
     </p:spTree>
     <p:extLst>
       <p:ext uri="{BB962C8B-B14F-4D97-AF65-F5344CB8AC3E}">
-        <p14:creationId xmlns:p14="http://schemas.microsoft.com/office/powerpoint/2010/main" val="896141722"/>
+        <p14:creationId xmlns:p14="http://schemas.microsoft.com/office/powerpoint/2010/main" val="1459151704"/>
       </p:ext>
     </p:extLst>
   </p:cSld>
@@ -15374,470 +15288,6 @@
           <a:lstStyle/>
           <a:p>
             <a:r>
-              <a:rPr lang="de-DE" dirty="0" err="1" smtClean="0"/>
-              <a:t>Why</a:t>
-            </a:r>
-            <a:r>
-              <a:rPr lang="de-DE" dirty="0" smtClean="0"/>
-              <a:t> </a:t>
-            </a:r>
-            <a:r>
-              <a:rPr lang="de-DE" dirty="0" err="1" smtClean="0"/>
-              <a:t>us</a:t>
-            </a:r>
-            <a:r>
-              <a:rPr lang="de-DE" dirty="0" smtClean="0"/>
-              <a:t>?</a:t>
-            </a:r>
-            <a:endParaRPr lang="de-DE" dirty="0"/>
-          </a:p>
-        </p:txBody>
-      </p:sp>
-      <p:sp>
-        <p:nvSpPr>
-          <p:cNvPr id="6" name="Inhaltsplatzhalter 2"/>
-          <p:cNvSpPr txBox="1">
-            <a:spLocks/>
-          </p:cNvSpPr>
-          <p:nvPr/>
-        </p:nvSpPr>
-        <p:spPr>
-          <a:xfrm>
-            <a:off x="8137451" y="-41565"/>
-            <a:ext cx="4054549" cy="370610"/>
-          </a:xfrm>
-          <a:prstGeom prst="rect">
-            <a:avLst/>
-          </a:prstGeom>
-        </p:spPr>
-        <p:txBody>
-          <a:bodyPr vert="horz" lIns="91440" tIns="45720" rIns="91440" bIns="45720" rtlCol="0" anchor="ctr">
-            <a:normAutofit/>
-          </a:bodyPr>
-          <a:lstStyle>
-            <a:lvl1pPr marL="285750" indent="-285750" algn="l" defTabSz="457200" rtl="0" eaLnBrk="1" latinLnBrk="0" hangingPunct="1">
-              <a:spcBef>
-                <a:spcPct val="20000"/>
-              </a:spcBef>
-              <a:spcAft>
-                <a:spcPts val="600"/>
-              </a:spcAft>
-              <a:buClr>
-                <a:schemeClr val="accent1">
-                  <a:lumMod val="75000"/>
-                </a:schemeClr>
-              </a:buClr>
-              <a:buSzPct val="145000"/>
-              <a:buFont typeface="Arial"/>
-              <a:buChar char="•"/>
-              <a:defRPr sz="2400" kern="1200" cap="none">
-                <a:solidFill>
-                  <a:schemeClr val="tx1"/>
-                </a:solidFill>
-                <a:effectLst/>
-                <a:latin typeface="+mn-lt"/>
-                <a:ea typeface="+mn-ea"/>
-                <a:cs typeface="+mn-cs"/>
-              </a:defRPr>
-            </a:lvl1pPr>
-            <a:lvl2pPr marL="742950" indent="-285750" algn="l" defTabSz="457200" rtl="0" eaLnBrk="1" latinLnBrk="0" hangingPunct="1">
-              <a:spcBef>
-                <a:spcPct val="20000"/>
-              </a:spcBef>
-              <a:spcAft>
-                <a:spcPts val="600"/>
-              </a:spcAft>
-              <a:buClr>
-                <a:schemeClr val="accent1">
-                  <a:lumMod val="75000"/>
-                </a:schemeClr>
-              </a:buClr>
-              <a:buSzPct val="145000"/>
-              <a:buFont typeface="Arial"/>
-              <a:buChar char="•"/>
-              <a:defRPr sz="2000" kern="1200" cap="none">
-                <a:solidFill>
-                  <a:schemeClr val="tx1"/>
-                </a:solidFill>
-                <a:effectLst/>
-                <a:latin typeface="+mn-lt"/>
-                <a:ea typeface="+mn-ea"/>
-                <a:cs typeface="+mn-cs"/>
-              </a:defRPr>
-            </a:lvl2pPr>
-            <a:lvl3pPr marL="1200150" indent="-285750" algn="l" defTabSz="457200" rtl="0" eaLnBrk="1" latinLnBrk="0" hangingPunct="1">
-              <a:spcBef>
-                <a:spcPct val="20000"/>
-              </a:spcBef>
-              <a:spcAft>
-                <a:spcPts val="600"/>
-              </a:spcAft>
-              <a:buClr>
-                <a:schemeClr val="accent1">
-                  <a:lumMod val="75000"/>
-                </a:schemeClr>
-              </a:buClr>
-              <a:buSzPct val="145000"/>
-              <a:buFont typeface="Arial"/>
-              <a:buChar char="•"/>
-              <a:defRPr sz="1800" kern="1200" cap="none">
-                <a:solidFill>
-                  <a:schemeClr val="tx1"/>
-                </a:solidFill>
-                <a:effectLst/>
-                <a:latin typeface="+mn-lt"/>
-                <a:ea typeface="+mn-ea"/>
-                <a:cs typeface="+mn-cs"/>
-              </a:defRPr>
-            </a:lvl3pPr>
-            <a:lvl4pPr marL="1543050" indent="-171450" algn="l" defTabSz="457200" rtl="0" eaLnBrk="1" latinLnBrk="0" hangingPunct="1">
-              <a:spcBef>
-                <a:spcPct val="20000"/>
-              </a:spcBef>
-              <a:spcAft>
-                <a:spcPts val="600"/>
-              </a:spcAft>
-              <a:buClr>
-                <a:schemeClr val="accent1">
-                  <a:lumMod val="75000"/>
-                </a:schemeClr>
-              </a:buClr>
-              <a:buSzPct val="145000"/>
-              <a:buFont typeface="Arial"/>
-              <a:buChar char="•"/>
-              <a:defRPr sz="1600" kern="1200" cap="none">
-                <a:solidFill>
-                  <a:schemeClr val="tx1"/>
-                </a:solidFill>
-                <a:effectLst/>
-                <a:latin typeface="+mn-lt"/>
-                <a:ea typeface="+mn-ea"/>
-                <a:cs typeface="+mn-cs"/>
-              </a:defRPr>
-            </a:lvl4pPr>
-            <a:lvl5pPr marL="2000250" indent="-171450" algn="l" defTabSz="457200" rtl="0" eaLnBrk="1" latinLnBrk="0" hangingPunct="1">
-              <a:spcBef>
-                <a:spcPct val="20000"/>
-              </a:spcBef>
-              <a:spcAft>
-                <a:spcPts val="600"/>
-              </a:spcAft>
-              <a:buClr>
-                <a:schemeClr val="accent1">
-                  <a:lumMod val="75000"/>
-                </a:schemeClr>
-              </a:buClr>
-              <a:buSzPct val="145000"/>
-              <a:buFont typeface="Arial"/>
-              <a:buChar char="•"/>
-              <a:defRPr sz="1400" kern="1200" cap="none">
-                <a:solidFill>
-                  <a:schemeClr val="tx1"/>
-                </a:solidFill>
-                <a:effectLst/>
-                <a:latin typeface="+mn-lt"/>
-                <a:ea typeface="+mn-ea"/>
-                <a:cs typeface="+mn-cs"/>
-              </a:defRPr>
-            </a:lvl5pPr>
-            <a:lvl6pPr marL="2514600" indent="-228600" algn="l" defTabSz="457200" rtl="0" eaLnBrk="1" latinLnBrk="0" hangingPunct="1">
-              <a:spcBef>
-                <a:spcPct val="20000"/>
-              </a:spcBef>
-              <a:spcAft>
-                <a:spcPts val="600"/>
-              </a:spcAft>
-              <a:buClr>
-                <a:schemeClr val="accent1">
-                  <a:lumMod val="75000"/>
-                </a:schemeClr>
-              </a:buClr>
-              <a:buSzPct val="145000"/>
-              <a:buFont typeface="Arial"/>
-              <a:buChar char="•"/>
-              <a:defRPr sz="1400" kern="1200" cap="none">
-                <a:solidFill>
-                  <a:schemeClr val="tx1"/>
-                </a:solidFill>
-                <a:effectLst/>
-                <a:latin typeface="+mn-lt"/>
-                <a:ea typeface="+mn-ea"/>
-                <a:cs typeface="+mn-cs"/>
-              </a:defRPr>
-            </a:lvl6pPr>
-            <a:lvl7pPr marL="2971800" indent="-228600" algn="l" defTabSz="457200" rtl="0" eaLnBrk="1" latinLnBrk="0" hangingPunct="1">
-              <a:spcBef>
-                <a:spcPct val="20000"/>
-              </a:spcBef>
-              <a:spcAft>
-                <a:spcPts val="600"/>
-              </a:spcAft>
-              <a:buClr>
-                <a:schemeClr val="accent1">
-                  <a:lumMod val="75000"/>
-                </a:schemeClr>
-              </a:buClr>
-              <a:buSzPct val="145000"/>
-              <a:buFont typeface="Arial"/>
-              <a:buChar char="•"/>
-              <a:defRPr sz="1400" kern="1200" cap="none">
-                <a:solidFill>
-                  <a:schemeClr val="tx1"/>
-                </a:solidFill>
-                <a:effectLst/>
-                <a:latin typeface="+mn-lt"/>
-                <a:ea typeface="+mn-ea"/>
-                <a:cs typeface="+mn-cs"/>
-              </a:defRPr>
-            </a:lvl7pPr>
-            <a:lvl8pPr marL="3429000" indent="-228600" algn="l" defTabSz="457200" rtl="0" eaLnBrk="1" latinLnBrk="0" hangingPunct="1">
-              <a:spcBef>
-                <a:spcPct val="20000"/>
-              </a:spcBef>
-              <a:spcAft>
-                <a:spcPts val="600"/>
-              </a:spcAft>
-              <a:buClr>
-                <a:schemeClr val="accent1">
-                  <a:lumMod val="75000"/>
-                </a:schemeClr>
-              </a:buClr>
-              <a:buSzPct val="145000"/>
-              <a:buFont typeface="Arial"/>
-              <a:buChar char="•"/>
-              <a:defRPr sz="1400" kern="1200" cap="none">
-                <a:solidFill>
-                  <a:schemeClr val="tx1"/>
-                </a:solidFill>
-                <a:effectLst/>
-                <a:latin typeface="+mn-lt"/>
-                <a:ea typeface="+mn-ea"/>
-                <a:cs typeface="+mn-cs"/>
-              </a:defRPr>
-            </a:lvl8pPr>
-            <a:lvl9pPr marL="3886200" indent="-228600" algn="l" defTabSz="457200" rtl="0" eaLnBrk="1" latinLnBrk="0" hangingPunct="1">
-              <a:spcBef>
-                <a:spcPct val="20000"/>
-              </a:spcBef>
-              <a:spcAft>
-                <a:spcPts val="600"/>
-              </a:spcAft>
-              <a:buClr>
-                <a:schemeClr val="accent1">
-                  <a:lumMod val="75000"/>
-                </a:schemeClr>
-              </a:buClr>
-              <a:buSzPct val="145000"/>
-              <a:buFont typeface="Arial"/>
-              <a:buChar char="•"/>
-              <a:defRPr sz="1400" kern="1200" cap="none">
-                <a:solidFill>
-                  <a:schemeClr val="tx1"/>
-                </a:solidFill>
-                <a:effectLst/>
-                <a:latin typeface="+mn-lt"/>
-                <a:ea typeface="+mn-ea"/>
-                <a:cs typeface="+mn-cs"/>
-              </a:defRPr>
-            </a:lvl9pPr>
-          </a:lstStyle>
-          <a:p>
-            <a:pPr marL="0" indent="0">
-              <a:buNone/>
-            </a:pPr>
-            <a:r>
-              <a:rPr lang="de-DE" sz="1000" dirty="0" smtClean="0"/>
-              <a:t>Rem0 Röthlisberger, Eric </a:t>
-            </a:r>
-            <a:r>
-              <a:rPr lang="de-DE" sz="1000" dirty="0" err="1" smtClean="0"/>
-              <a:t>Lagger</a:t>
-            </a:r>
-            <a:r>
-              <a:rPr lang="de-DE" sz="1000" dirty="0" smtClean="0"/>
-              <a:t>, Vincent Hofer, Dean Klopsch, Aebi Ryan</a:t>
-            </a:r>
-            <a:endParaRPr lang="de-DE" sz="1000" dirty="0"/>
-          </a:p>
-        </p:txBody>
-      </p:sp>
-      <p:sp>
-        <p:nvSpPr>
-          <p:cNvPr id="7" name="Inhaltsplatzhalter 2"/>
-          <p:cNvSpPr>
-            <a:spLocks noGrp="1"/>
-          </p:cNvSpPr>
-          <p:nvPr>
-            <p:ph idx="1"/>
-          </p:nvPr>
-        </p:nvSpPr>
-        <p:spPr>
-          <a:xfrm>
-            <a:off x="762552" y="2065420"/>
-            <a:ext cx="10115438" cy="3937001"/>
-          </a:xfrm>
-        </p:spPr>
-        <p:txBody>
-          <a:bodyPr>
-            <a:normAutofit/>
-          </a:bodyPr>
-          <a:lstStyle/>
-          <a:p>
-            <a:pPr algn="ctr"/>
-            <a:r>
-              <a:rPr lang="de-DE" sz="3200" dirty="0" err="1" smtClean="0"/>
-              <a:t>Our</a:t>
-            </a:r>
-            <a:r>
-              <a:rPr lang="de-DE" sz="3200" dirty="0" smtClean="0"/>
-              <a:t> </a:t>
-            </a:r>
-            <a:r>
-              <a:rPr lang="de-DE" sz="3200" dirty="0" err="1" smtClean="0"/>
-              <a:t>team</a:t>
-            </a:r>
-            <a:endParaRPr lang="de-DE" sz="3200" dirty="0" smtClean="0"/>
-          </a:p>
-          <a:p>
-            <a:pPr algn="ctr"/>
-            <a:r>
-              <a:rPr lang="de-DE" sz="3200" dirty="0" smtClean="0"/>
-              <a:t>The </a:t>
-            </a:r>
-            <a:r>
-              <a:rPr lang="de-DE" sz="3200" dirty="0" err="1" smtClean="0"/>
-              <a:t>products</a:t>
-            </a:r>
-            <a:r>
-              <a:rPr lang="de-DE" sz="3200" dirty="0" smtClean="0"/>
-              <a:t/>
-            </a:r>
-            <a:br>
-              <a:rPr lang="de-DE" sz="3200" dirty="0" smtClean="0"/>
-            </a:br>
-            <a:r>
-              <a:rPr lang="de-DE" sz="3200" dirty="0" smtClean="0"/>
-              <a:t>-&gt; The </a:t>
-            </a:r>
-            <a:r>
-              <a:rPr lang="de-DE" sz="3200" dirty="0" err="1" smtClean="0"/>
-              <a:t>client</a:t>
-            </a:r>
-            <a:r>
-              <a:rPr lang="de-DE" sz="3200" dirty="0" smtClean="0"/>
-              <a:t/>
-            </a:r>
-            <a:br>
-              <a:rPr lang="de-DE" sz="3200" dirty="0" smtClean="0"/>
-            </a:br>
-            <a:r>
-              <a:rPr lang="de-DE" sz="3200" dirty="0" smtClean="0"/>
-              <a:t>-&gt; The </a:t>
-            </a:r>
-            <a:r>
-              <a:rPr lang="de-DE" sz="3200" dirty="0" err="1" smtClean="0"/>
-              <a:t>developers</a:t>
-            </a:r>
-            <a:endParaRPr lang="de-DE" sz="3200" dirty="0" smtClean="0"/>
-          </a:p>
-          <a:p>
-            <a:pPr algn="ctr"/>
-            <a:r>
-              <a:rPr lang="de-DE" sz="3200" dirty="0" err="1" smtClean="0"/>
-              <a:t>Ask</a:t>
-            </a:r>
-            <a:r>
-              <a:rPr lang="de-DE" sz="3200" dirty="0" smtClean="0"/>
-              <a:t> </a:t>
-            </a:r>
-            <a:r>
-              <a:rPr lang="de-DE" sz="3200" dirty="0" err="1" smtClean="0"/>
-              <a:t>us</a:t>
-            </a:r>
-            <a:r>
-              <a:rPr lang="de-DE" sz="3200" dirty="0" smtClean="0"/>
-              <a:t>!</a:t>
-            </a:r>
-          </a:p>
-          <a:p>
-            <a:pPr algn="ctr"/>
-            <a:r>
-              <a:rPr lang="de-DE" sz="3200" dirty="0" err="1" smtClean="0"/>
-              <a:t>Contact</a:t>
-            </a:r>
-            <a:r>
-              <a:rPr lang="de-DE" sz="3200" dirty="0" smtClean="0"/>
-              <a:t> </a:t>
-            </a:r>
-            <a:r>
-              <a:rPr lang="de-DE" sz="3200" dirty="0" err="1" smtClean="0"/>
-              <a:t>us</a:t>
-            </a:r>
-            <a:r>
-              <a:rPr lang="de-DE" sz="3200" dirty="0" smtClean="0"/>
-              <a:t>!</a:t>
-            </a:r>
-          </a:p>
-        </p:txBody>
-      </p:sp>
-    </p:spTree>
-    <p:extLst>
-      <p:ext uri="{BB962C8B-B14F-4D97-AF65-F5344CB8AC3E}">
-        <p14:creationId xmlns:p14="http://schemas.microsoft.com/office/powerpoint/2010/main" val="1459151704"/>
-      </p:ext>
-    </p:extLst>
-  </p:cSld>
-  <p:clrMapOvr>
-    <a:masterClrMapping/>
-  </p:clrMapOvr>
-  <p:timing>
-    <p:tnLst>
-      <p:par>
-        <p:cTn id="1" dur="indefinite" restart="never" nodeType="tmRoot"/>
-      </p:par>
-    </p:tnLst>
-  </p:timing>
-</p:sld>
-</file>
-
-<file path=ppt/slides/slide22.xml><?xml version="1.0" encoding="utf-8"?>
-<p:sld xmlns:a="http://schemas.openxmlformats.org/drawingml/2006/main" xmlns:r="http://schemas.openxmlformats.org/officeDocument/2006/relationships" xmlns:p="http://schemas.openxmlformats.org/presentationml/2006/main">
-  <p:cSld>
-    <p:spTree>
-      <p:nvGrpSpPr>
-        <p:cNvPr id="1" name=""/>
-        <p:cNvGrpSpPr/>
-        <p:nvPr/>
-      </p:nvGrpSpPr>
-      <p:grpSpPr>
-        <a:xfrm>
-          <a:off x="0" y="0"/>
-          <a:ext cx="0" cy="0"/>
-          <a:chOff x="0" y="0"/>
-          <a:chExt cx="0" cy="0"/>
-        </a:xfrm>
-      </p:grpSpPr>
-      <p:sp>
-        <p:nvSpPr>
-          <p:cNvPr id="2" name="Titel 1"/>
-          <p:cNvSpPr>
-            <a:spLocks noGrp="1"/>
-          </p:cNvSpPr>
-          <p:nvPr>
-            <p:ph type="title"/>
-          </p:nvPr>
-        </p:nvSpPr>
-        <p:spPr>
-          <a:xfrm>
-            <a:off x="810915" y="691116"/>
-            <a:ext cx="10018713" cy="1752599"/>
-          </a:xfrm>
-        </p:spPr>
-        <p:txBody>
-          <a:bodyPr/>
-          <a:lstStyle/>
-          <a:p>
-            <a:r>
               <a:rPr lang="de-DE" dirty="0" err="1"/>
               <a:t>Questions</a:t>
             </a:r>
@@ -15877,7 +15327,7 @@
           <a:noFill/>
           <a:extLst>
             <a:ext uri="{909E8E84-426E-40dd-AFC4-6F175D3DCCD1}">
-              <a14:hiddenFill xmlns="" xmlns:a14="http://schemas.microsoft.com/office/drawing/2010/main">
+              <a14:hiddenFill xmlns:a14="http://schemas.microsoft.com/office/drawing/2010/main" xmlns="">
                 <a:solidFill>
                   <a:srgbClr val="FFFFFF"/>
                 </a:solidFill>
@@ -15918,7 +15368,7 @@
           <a:noFill/>
           <a:extLst>
             <a:ext uri="{909E8E84-426E-40dd-AFC4-6F175D3DCCD1}">
-              <a14:hiddenFill xmlns="" xmlns:a14="http://schemas.microsoft.com/office/drawing/2010/main">
+              <a14:hiddenFill xmlns:a14="http://schemas.microsoft.com/office/drawing/2010/main" xmlns="">
                 <a:solidFill>
                   <a:srgbClr val="FFFFFF"/>
                 </a:solidFill>

</xml_diff>

<commit_message>
minor presentation modifications of the titles
</commit_message>
<xml_diff>
--- a/baseProject/presentation/Presentation-Team8.pptx
+++ b/baseProject/presentation/Presentation-Team8.pptx
@@ -12525,16 +12525,12 @@
           <a:lstStyle/>
           <a:p>
             <a:r>
+              <a:rPr lang="de-DE" dirty="0" smtClean="0"/>
+              <a:t>Code </a:t>
+            </a:r>
+            <a:r>
               <a:rPr lang="de-DE" dirty="0" err="1" smtClean="0"/>
-              <a:t>Good</a:t>
-            </a:r>
-            <a:r>
-              <a:rPr lang="de-DE" dirty="0" smtClean="0"/>
-              <a:t> </a:t>
-            </a:r>
-            <a:r>
-              <a:rPr lang="de-DE" dirty="0" err="1" smtClean="0"/>
-              <a:t>code</a:t>
+              <a:t>quality</a:t>
             </a:r>
             <a:endParaRPr lang="de-DE" dirty="0"/>
           </a:p>
@@ -12895,16 +12891,12 @@
           <a:lstStyle/>
           <a:p>
             <a:r>
-              <a:rPr lang="de-DE" dirty="0" err="1" smtClean="0"/>
-              <a:t>Good</a:t>
-            </a:r>
-            <a:r>
-              <a:rPr lang="de-DE" dirty="0" smtClean="0"/>
-              <a:t> </a:t>
-            </a:r>
-            <a:r>
-              <a:rPr lang="de-DE" dirty="0" err="1" smtClean="0"/>
-              <a:t>code</a:t>
+              <a:rPr lang="de-DE" dirty="0"/>
+              <a:t>Code </a:t>
+            </a:r>
+            <a:r>
+              <a:rPr lang="de-DE" dirty="0" err="1"/>
+              <a:t>quality</a:t>
             </a:r>
             <a:endParaRPr lang="de-DE" dirty="0"/>
           </a:p>
@@ -13265,16 +13257,12 @@
           <a:lstStyle/>
           <a:p>
             <a:r>
-              <a:rPr lang="de-DE" dirty="0" err="1" smtClean="0"/>
-              <a:t>Good</a:t>
-            </a:r>
-            <a:r>
-              <a:rPr lang="de-DE" dirty="0" smtClean="0"/>
-              <a:t> </a:t>
-            </a:r>
-            <a:r>
-              <a:rPr lang="de-DE" dirty="0" err="1" smtClean="0"/>
-              <a:t>code</a:t>
+              <a:rPr lang="de-DE" dirty="0"/>
+              <a:t>Code </a:t>
+            </a:r>
+            <a:r>
+              <a:rPr lang="de-DE" dirty="0" err="1"/>
+              <a:t>quality</a:t>
             </a:r>
             <a:endParaRPr lang="de-DE" dirty="0"/>
           </a:p>
@@ -13635,16 +13623,12 @@
           <a:lstStyle/>
           <a:p>
             <a:r>
-              <a:rPr lang="de-DE" dirty="0" err="1" smtClean="0"/>
-              <a:t>Good</a:t>
-            </a:r>
-            <a:r>
-              <a:rPr lang="de-DE" dirty="0" smtClean="0"/>
-              <a:t> </a:t>
-            </a:r>
-            <a:r>
-              <a:rPr lang="de-DE" dirty="0" err="1" smtClean="0"/>
-              <a:t>code</a:t>
+              <a:rPr lang="de-DE" dirty="0"/>
+              <a:t>Code </a:t>
+            </a:r>
+            <a:r>
+              <a:rPr lang="de-DE" dirty="0" err="1"/>
+              <a:t>quality</a:t>
             </a:r>
             <a:endParaRPr lang="de-DE" dirty="0"/>
           </a:p>
@@ -14005,16 +13989,12 @@
           <a:lstStyle/>
           <a:p>
             <a:r>
-              <a:rPr lang="de-DE" dirty="0" err="1" smtClean="0"/>
-              <a:t>Good</a:t>
-            </a:r>
-            <a:r>
-              <a:rPr lang="de-DE" dirty="0" smtClean="0"/>
-              <a:t> </a:t>
-            </a:r>
-            <a:r>
-              <a:rPr lang="de-DE" dirty="0" err="1" smtClean="0"/>
-              <a:t>code</a:t>
+              <a:rPr lang="de-DE" dirty="0"/>
+              <a:t>Code </a:t>
+            </a:r>
+            <a:r>
+              <a:rPr lang="de-DE"/>
+              <a:t>quality</a:t>
             </a:r>
             <a:endParaRPr lang="de-DE" dirty="0"/>
           </a:p>
@@ -15327,7 +15307,7 @@
           <a:noFill/>
           <a:extLst>
             <a:ext uri="{909E8E84-426E-40dd-AFC4-6F175D3DCCD1}">
-              <a14:hiddenFill xmlns:a14="http://schemas.microsoft.com/office/drawing/2010/main" xmlns="">
+              <a14:hiddenFill xmlns="" xmlns:a14="http://schemas.microsoft.com/office/drawing/2010/main">
                 <a:solidFill>
                   <a:srgbClr val="FFFFFF"/>
                 </a:solidFill>
@@ -15368,7 +15348,7 @@
           <a:noFill/>
           <a:extLst>
             <a:ext uri="{909E8E84-426E-40dd-AFC4-6F175D3DCCD1}">
-              <a14:hiddenFill xmlns:a14="http://schemas.microsoft.com/office/drawing/2010/main" xmlns="">
+              <a14:hiddenFill xmlns="" xmlns:a14="http://schemas.microsoft.com/office/drawing/2010/main">
                 <a:solidFill>
                   <a:srgbClr val="FFFFFF"/>
                 </a:solidFill>

</xml_diff>

<commit_message>
another few modifications for the presentation
</commit_message>
<xml_diff>
--- a/baseProject/presentation/Presentation-Team8.pptx
+++ b/baseProject/presentation/Presentation-Team8.pptx
@@ -5,7 +5,7 @@
     <p:sldMasterId id="2147483648" r:id="rId1"/>
   </p:sldMasterIdLst>
   <p:notesMasterIdLst>
-    <p:notesMasterId r:id="rId23"/>
+    <p:notesMasterId r:id="rId24"/>
   </p:notesMasterIdLst>
   <p:sldIdLst>
     <p:sldId id="256" r:id="rId2"/>
@@ -27,8 +27,9 @@
     <p:sldId id="288" r:id="rId18"/>
     <p:sldId id="289" r:id="rId19"/>
     <p:sldId id="290" r:id="rId20"/>
-    <p:sldId id="286" r:id="rId21"/>
-    <p:sldId id="263" r:id="rId22"/>
+    <p:sldId id="291" r:id="rId21"/>
+    <p:sldId id="286" r:id="rId22"/>
+    <p:sldId id="263" r:id="rId23"/>
   </p:sldIdLst>
   <p:sldSz cx="12192000" cy="6858000"/>
   <p:notesSz cx="6858000" cy="9144000"/>
@@ -171,6 +172,7 @@
             <p14:sldId id="288"/>
             <p14:sldId id="289"/>
             <p14:sldId id="290"/>
+            <p14:sldId id="291"/>
             <p14:sldId id="286"/>
           </p14:sldIdLst>
         </p14:section>
@@ -1035,6 +1037,90 @@
             <a:fld id="{2F2847E0-1D0A-0F4B-99C8-E51199A5987D}" type="slidenum">
               <a:rPr lang="de-DE" smtClean="0"/>
               <a:t>20</a:t>
+            </a:fld>
+            <a:endParaRPr lang="de-DE"/>
+          </a:p>
+        </p:txBody>
+      </p:sp>
+    </p:spTree>
+    <p:extLst>
+      <p:ext uri="{BB962C8B-B14F-4D97-AF65-F5344CB8AC3E}">
+        <p14:creationId xmlns:p14="http://schemas.microsoft.com/office/powerpoint/2010/main" val="1140863112"/>
+      </p:ext>
+    </p:extLst>
+  </p:cSld>
+  <p:clrMapOvr>
+    <a:masterClrMapping/>
+  </p:clrMapOvr>
+</p:notes>
+</file>
+
+<file path=ppt/notesSlides/notesSlide15.xml><?xml version="1.0" encoding="utf-8"?>
+<p:notes xmlns:a="http://schemas.openxmlformats.org/drawingml/2006/main" xmlns:r="http://schemas.openxmlformats.org/officeDocument/2006/relationships" xmlns:p="http://schemas.openxmlformats.org/presentationml/2006/main">
+  <p:cSld>
+    <p:spTree>
+      <p:nvGrpSpPr>
+        <p:cNvPr id="1" name=""/>
+        <p:cNvGrpSpPr/>
+        <p:nvPr/>
+      </p:nvGrpSpPr>
+      <p:grpSpPr>
+        <a:xfrm>
+          <a:off x="0" y="0"/>
+          <a:ext cx="0" cy="0"/>
+          <a:chOff x="0" y="0"/>
+          <a:chExt cx="0" cy="0"/>
+        </a:xfrm>
+      </p:grpSpPr>
+      <p:sp>
+        <p:nvSpPr>
+          <p:cNvPr id="2" name="Folienbildplatzhalter 1"/>
+          <p:cNvSpPr>
+            <a:spLocks noGrp="1" noRot="1" noChangeAspect="1"/>
+          </p:cNvSpPr>
+          <p:nvPr>
+            <p:ph type="sldImg"/>
+          </p:nvPr>
+        </p:nvSpPr>
+        <p:spPr/>
+      </p:sp>
+      <p:sp>
+        <p:nvSpPr>
+          <p:cNvPr id="3" name="Notizenplatzhalter 2"/>
+          <p:cNvSpPr>
+            <a:spLocks noGrp="1"/>
+          </p:cNvSpPr>
+          <p:nvPr>
+            <p:ph type="body" idx="1"/>
+          </p:nvPr>
+        </p:nvSpPr>
+        <p:spPr/>
+        <p:txBody>
+          <a:bodyPr/>
+          <a:lstStyle/>
+          <a:p>
+            <a:endParaRPr lang="de-CH" dirty="0"/>
+          </a:p>
+        </p:txBody>
+      </p:sp>
+      <p:sp>
+        <p:nvSpPr>
+          <p:cNvPr id="4" name="Foliennummernplatzhalter 3"/>
+          <p:cNvSpPr>
+            <a:spLocks noGrp="1"/>
+          </p:cNvSpPr>
+          <p:nvPr>
+            <p:ph type="sldNum" sz="quarter" idx="10"/>
+          </p:nvPr>
+        </p:nvSpPr>
+        <p:spPr/>
+        <p:txBody>
+          <a:bodyPr/>
+          <a:lstStyle/>
+          <a:p>
+            <a:fld id="{2F2847E0-1D0A-0F4B-99C8-E51199A5987D}" type="slidenum">
+              <a:rPr lang="de-DE" smtClean="0"/>
+              <a:t>21</a:t>
             </a:fld>
             <a:endParaRPr lang="de-DE"/>
           </a:p>
@@ -14804,8 +14890,12 @@
           <a:lstStyle/>
           <a:p>
             <a:r>
+              <a:rPr lang="de-DE" dirty="0" smtClean="0"/>
+              <a:t>Good </a:t>
+            </a:r>
+            <a:r>
               <a:rPr lang="de-DE" dirty="0" err="1" smtClean="0"/>
-              <a:t>Why</a:t>
+              <a:t>code</a:t>
             </a:r>
             <a:r>
               <a:rPr lang="de-DE" dirty="0" smtClean="0"/>
@@ -14813,11 +14903,35 @@
             </a:r>
             <a:r>
               <a:rPr lang="de-DE" dirty="0" err="1" smtClean="0"/>
-              <a:t>us</a:t>
+              <a:t>pays</a:t>
             </a:r>
             <a:r>
               <a:rPr lang="de-DE" dirty="0" smtClean="0"/>
-              <a:t>?</a:t>
+              <a:t> off in </a:t>
+            </a:r>
+            <a:r>
+              <a:rPr lang="de-DE" dirty="0" err="1" smtClean="0"/>
+              <a:t>the</a:t>
+            </a:r>
+            <a:r>
+              <a:rPr lang="de-DE" dirty="0" smtClean="0"/>
+              <a:t> </a:t>
+            </a:r>
+            <a:r>
+              <a:rPr lang="de-DE" dirty="0" err="1" smtClean="0"/>
+              <a:t>long</a:t>
+            </a:r>
+            <a:r>
+              <a:rPr lang="de-DE" dirty="0" smtClean="0"/>
+              <a:t> </a:t>
+            </a:r>
+            <a:r>
+              <a:rPr lang="de-DE" dirty="0" err="1" smtClean="0"/>
+              <a:t>run</a:t>
+            </a:r>
+            <a:r>
+              <a:rPr lang="de-CH" dirty="0" smtClean="0"/>
+              <a:t>!</a:t>
             </a:r>
             <a:endParaRPr lang="de-DE" dirty="0"/>
           </a:p>
@@ -15091,129 +15205,39 @@
           </a:p>
         </p:txBody>
       </p:sp>
-      <p:sp>
-        <p:nvSpPr>
-          <p:cNvPr id="7" name="Inhaltsplatzhalter 2"/>
-          <p:cNvSpPr>
-            <a:spLocks noGrp="1"/>
-          </p:cNvSpPr>
+      <p:pic>
+        <p:nvPicPr>
+          <p:cNvPr id="8" name="Inhaltsplatzhalter 7"/>
+          <p:cNvPicPr>
+            <a:picLocks noGrp="1" noChangeAspect="1"/>
+          </p:cNvPicPr>
           <p:nvPr>
             <p:ph idx="1"/>
           </p:nvPr>
-        </p:nvSpPr>
+        </p:nvPicPr>
+        <p:blipFill>
+          <a:blip r:embed="rId3">
+            <a:extLst>
+              <a:ext uri="{28A0092B-C50C-407E-A947-70E740481C1C}">
+                <a14:useLocalDpi xmlns:a14="http://schemas.microsoft.com/office/drawing/2010/main" val="0"/>
+              </a:ext>
+            </a:extLst>
+          </a:blip>
+          <a:stretch>
+            <a:fillRect/>
+          </a:stretch>
+        </p:blipFill>
         <p:spPr>
           <a:xfrm>
-            <a:off x="762552" y="2065420"/>
-            <a:ext cx="10115438" cy="3937001"/>
+            <a:off x="1916024" y="1945172"/>
+            <a:ext cx="7808494" cy="4407501"/>
           </a:xfrm>
         </p:spPr>
-        <p:txBody>
-          <a:bodyPr>
-            <a:normAutofit/>
-          </a:bodyPr>
-          <a:lstStyle/>
-          <a:p>
-            <a:pPr algn="ctr"/>
-            <a:r>
-              <a:rPr lang="de-DE" sz="3200" dirty="0" err="1" smtClean="0"/>
-              <a:t>Our</a:t>
-            </a:r>
-            <a:r>
-              <a:rPr lang="de-DE" sz="3200" dirty="0" smtClean="0"/>
-              <a:t> </a:t>
-            </a:r>
-            <a:r>
-              <a:rPr lang="de-DE" sz="3200" dirty="0" err="1" smtClean="0"/>
-              <a:t>team</a:t>
-            </a:r>
-            <a:endParaRPr lang="de-DE" sz="3200" dirty="0" smtClean="0"/>
-          </a:p>
-          <a:p>
-            <a:pPr algn="ctr"/>
-            <a:r>
-              <a:rPr lang="de-DE" sz="3200" dirty="0" smtClean="0"/>
-              <a:t>The </a:t>
-            </a:r>
-            <a:r>
-              <a:rPr lang="de-DE" sz="3200" dirty="0" err="1" smtClean="0"/>
-              <a:t>products</a:t>
-            </a:r>
-            <a:r>
-              <a:rPr lang="de-DE" sz="3200" dirty="0" smtClean="0"/>
-              <a:t/>
-            </a:r>
-            <a:br>
-              <a:rPr lang="de-DE" sz="3200" dirty="0" smtClean="0"/>
-            </a:br>
-            <a:r>
-              <a:rPr lang="de-DE" sz="3200" dirty="0" smtClean="0"/>
-              <a:t>-&gt; The </a:t>
-            </a:r>
-            <a:r>
-              <a:rPr lang="de-DE" sz="3200" dirty="0" err="1" smtClean="0"/>
-              <a:t>client</a:t>
-            </a:r>
-            <a:r>
-              <a:rPr lang="de-DE" sz="3200" dirty="0" smtClean="0"/>
-              <a:t/>
-            </a:r>
-            <a:br>
-              <a:rPr lang="de-DE" sz="3200" dirty="0" smtClean="0"/>
-            </a:br>
-            <a:r>
-              <a:rPr lang="de-DE" sz="3200" dirty="0" smtClean="0"/>
-              <a:t>-&gt; The </a:t>
-            </a:r>
-            <a:r>
-              <a:rPr lang="de-DE" sz="3200" dirty="0" err="1" smtClean="0"/>
-              <a:t>developers</a:t>
-            </a:r>
-            <a:endParaRPr lang="de-DE" sz="3200" dirty="0" smtClean="0"/>
-          </a:p>
-          <a:p>
-            <a:pPr algn="ctr"/>
-            <a:r>
-              <a:rPr lang="de-DE" sz="3200" dirty="0" err="1" smtClean="0"/>
-              <a:t>Ask</a:t>
-            </a:r>
-            <a:r>
-              <a:rPr lang="de-DE" sz="3200" dirty="0" smtClean="0"/>
-              <a:t> </a:t>
-            </a:r>
-            <a:r>
-              <a:rPr lang="de-DE" sz="3200" dirty="0" err="1" smtClean="0"/>
-              <a:t>us</a:t>
-            </a:r>
-            <a:r>
-              <a:rPr lang="de-DE" sz="3200" dirty="0" smtClean="0"/>
-              <a:t>!</a:t>
-            </a:r>
-          </a:p>
-          <a:p>
-            <a:pPr algn="ctr"/>
-            <a:r>
-              <a:rPr lang="de-DE" sz="3200" dirty="0" err="1" smtClean="0"/>
-              <a:t>Contact</a:t>
-            </a:r>
-            <a:r>
-              <a:rPr lang="de-DE" sz="3200" dirty="0" smtClean="0"/>
-              <a:t> </a:t>
-            </a:r>
-            <a:r>
-              <a:rPr lang="de-DE" sz="3200" dirty="0" err="1" smtClean="0"/>
-              <a:t>us</a:t>
-            </a:r>
-            <a:r>
-              <a:rPr lang="de-DE" sz="3200" dirty="0" smtClean="0"/>
-              <a:t>!</a:t>
-            </a:r>
-          </a:p>
-        </p:txBody>
-      </p:sp>
+      </p:pic>
     </p:spTree>
     <p:extLst>
       <p:ext uri="{BB962C8B-B14F-4D97-AF65-F5344CB8AC3E}">
-        <p14:creationId xmlns:p14="http://schemas.microsoft.com/office/powerpoint/2010/main" val="1459151704"/>
+        <p14:creationId xmlns:p14="http://schemas.microsoft.com/office/powerpoint/2010/main" val="2308596320"/>
       </p:ext>
     </p:extLst>
   </p:cSld>
@@ -15268,6 +15292,470 @@
           <a:lstStyle/>
           <a:p>
             <a:r>
+              <a:rPr lang="de-DE" dirty="0" err="1" smtClean="0"/>
+              <a:t>Why</a:t>
+            </a:r>
+            <a:r>
+              <a:rPr lang="de-DE" dirty="0" smtClean="0"/>
+              <a:t> </a:t>
+            </a:r>
+            <a:r>
+              <a:rPr lang="de-DE" dirty="0" err="1" smtClean="0"/>
+              <a:t>us</a:t>
+            </a:r>
+            <a:r>
+              <a:rPr lang="de-DE" dirty="0" smtClean="0"/>
+              <a:t>?</a:t>
+            </a:r>
+            <a:endParaRPr lang="de-DE" dirty="0"/>
+          </a:p>
+        </p:txBody>
+      </p:sp>
+      <p:sp>
+        <p:nvSpPr>
+          <p:cNvPr id="6" name="Inhaltsplatzhalter 2"/>
+          <p:cNvSpPr txBox="1">
+            <a:spLocks/>
+          </p:cNvSpPr>
+          <p:nvPr/>
+        </p:nvSpPr>
+        <p:spPr>
+          <a:xfrm>
+            <a:off x="8137451" y="-41565"/>
+            <a:ext cx="4054549" cy="370610"/>
+          </a:xfrm>
+          <a:prstGeom prst="rect">
+            <a:avLst/>
+          </a:prstGeom>
+        </p:spPr>
+        <p:txBody>
+          <a:bodyPr vert="horz" lIns="91440" tIns="45720" rIns="91440" bIns="45720" rtlCol="0" anchor="ctr">
+            <a:normAutofit/>
+          </a:bodyPr>
+          <a:lstStyle>
+            <a:lvl1pPr marL="285750" indent="-285750" algn="l" defTabSz="457200" rtl="0" eaLnBrk="1" latinLnBrk="0" hangingPunct="1">
+              <a:spcBef>
+                <a:spcPct val="20000"/>
+              </a:spcBef>
+              <a:spcAft>
+                <a:spcPts val="600"/>
+              </a:spcAft>
+              <a:buClr>
+                <a:schemeClr val="accent1">
+                  <a:lumMod val="75000"/>
+                </a:schemeClr>
+              </a:buClr>
+              <a:buSzPct val="145000"/>
+              <a:buFont typeface="Arial"/>
+              <a:buChar char="•"/>
+              <a:defRPr sz="2400" kern="1200" cap="none">
+                <a:solidFill>
+                  <a:schemeClr val="tx1"/>
+                </a:solidFill>
+                <a:effectLst/>
+                <a:latin typeface="+mn-lt"/>
+                <a:ea typeface="+mn-ea"/>
+                <a:cs typeface="+mn-cs"/>
+              </a:defRPr>
+            </a:lvl1pPr>
+            <a:lvl2pPr marL="742950" indent="-285750" algn="l" defTabSz="457200" rtl="0" eaLnBrk="1" latinLnBrk="0" hangingPunct="1">
+              <a:spcBef>
+                <a:spcPct val="20000"/>
+              </a:spcBef>
+              <a:spcAft>
+                <a:spcPts val="600"/>
+              </a:spcAft>
+              <a:buClr>
+                <a:schemeClr val="accent1">
+                  <a:lumMod val="75000"/>
+                </a:schemeClr>
+              </a:buClr>
+              <a:buSzPct val="145000"/>
+              <a:buFont typeface="Arial"/>
+              <a:buChar char="•"/>
+              <a:defRPr sz="2000" kern="1200" cap="none">
+                <a:solidFill>
+                  <a:schemeClr val="tx1"/>
+                </a:solidFill>
+                <a:effectLst/>
+                <a:latin typeface="+mn-lt"/>
+                <a:ea typeface="+mn-ea"/>
+                <a:cs typeface="+mn-cs"/>
+              </a:defRPr>
+            </a:lvl2pPr>
+            <a:lvl3pPr marL="1200150" indent="-285750" algn="l" defTabSz="457200" rtl="0" eaLnBrk="1" latinLnBrk="0" hangingPunct="1">
+              <a:spcBef>
+                <a:spcPct val="20000"/>
+              </a:spcBef>
+              <a:spcAft>
+                <a:spcPts val="600"/>
+              </a:spcAft>
+              <a:buClr>
+                <a:schemeClr val="accent1">
+                  <a:lumMod val="75000"/>
+                </a:schemeClr>
+              </a:buClr>
+              <a:buSzPct val="145000"/>
+              <a:buFont typeface="Arial"/>
+              <a:buChar char="•"/>
+              <a:defRPr sz="1800" kern="1200" cap="none">
+                <a:solidFill>
+                  <a:schemeClr val="tx1"/>
+                </a:solidFill>
+                <a:effectLst/>
+                <a:latin typeface="+mn-lt"/>
+                <a:ea typeface="+mn-ea"/>
+                <a:cs typeface="+mn-cs"/>
+              </a:defRPr>
+            </a:lvl3pPr>
+            <a:lvl4pPr marL="1543050" indent="-171450" algn="l" defTabSz="457200" rtl="0" eaLnBrk="1" latinLnBrk="0" hangingPunct="1">
+              <a:spcBef>
+                <a:spcPct val="20000"/>
+              </a:spcBef>
+              <a:spcAft>
+                <a:spcPts val="600"/>
+              </a:spcAft>
+              <a:buClr>
+                <a:schemeClr val="accent1">
+                  <a:lumMod val="75000"/>
+                </a:schemeClr>
+              </a:buClr>
+              <a:buSzPct val="145000"/>
+              <a:buFont typeface="Arial"/>
+              <a:buChar char="•"/>
+              <a:defRPr sz="1600" kern="1200" cap="none">
+                <a:solidFill>
+                  <a:schemeClr val="tx1"/>
+                </a:solidFill>
+                <a:effectLst/>
+                <a:latin typeface="+mn-lt"/>
+                <a:ea typeface="+mn-ea"/>
+                <a:cs typeface="+mn-cs"/>
+              </a:defRPr>
+            </a:lvl4pPr>
+            <a:lvl5pPr marL="2000250" indent="-171450" algn="l" defTabSz="457200" rtl="0" eaLnBrk="1" latinLnBrk="0" hangingPunct="1">
+              <a:spcBef>
+                <a:spcPct val="20000"/>
+              </a:spcBef>
+              <a:spcAft>
+                <a:spcPts val="600"/>
+              </a:spcAft>
+              <a:buClr>
+                <a:schemeClr val="accent1">
+                  <a:lumMod val="75000"/>
+                </a:schemeClr>
+              </a:buClr>
+              <a:buSzPct val="145000"/>
+              <a:buFont typeface="Arial"/>
+              <a:buChar char="•"/>
+              <a:defRPr sz="1400" kern="1200" cap="none">
+                <a:solidFill>
+                  <a:schemeClr val="tx1"/>
+                </a:solidFill>
+                <a:effectLst/>
+                <a:latin typeface="+mn-lt"/>
+                <a:ea typeface="+mn-ea"/>
+                <a:cs typeface="+mn-cs"/>
+              </a:defRPr>
+            </a:lvl5pPr>
+            <a:lvl6pPr marL="2514600" indent="-228600" algn="l" defTabSz="457200" rtl="0" eaLnBrk="1" latinLnBrk="0" hangingPunct="1">
+              <a:spcBef>
+                <a:spcPct val="20000"/>
+              </a:spcBef>
+              <a:spcAft>
+                <a:spcPts val="600"/>
+              </a:spcAft>
+              <a:buClr>
+                <a:schemeClr val="accent1">
+                  <a:lumMod val="75000"/>
+                </a:schemeClr>
+              </a:buClr>
+              <a:buSzPct val="145000"/>
+              <a:buFont typeface="Arial"/>
+              <a:buChar char="•"/>
+              <a:defRPr sz="1400" kern="1200" cap="none">
+                <a:solidFill>
+                  <a:schemeClr val="tx1"/>
+                </a:solidFill>
+                <a:effectLst/>
+                <a:latin typeface="+mn-lt"/>
+                <a:ea typeface="+mn-ea"/>
+                <a:cs typeface="+mn-cs"/>
+              </a:defRPr>
+            </a:lvl6pPr>
+            <a:lvl7pPr marL="2971800" indent="-228600" algn="l" defTabSz="457200" rtl="0" eaLnBrk="1" latinLnBrk="0" hangingPunct="1">
+              <a:spcBef>
+                <a:spcPct val="20000"/>
+              </a:spcBef>
+              <a:spcAft>
+                <a:spcPts val="600"/>
+              </a:spcAft>
+              <a:buClr>
+                <a:schemeClr val="accent1">
+                  <a:lumMod val="75000"/>
+                </a:schemeClr>
+              </a:buClr>
+              <a:buSzPct val="145000"/>
+              <a:buFont typeface="Arial"/>
+              <a:buChar char="•"/>
+              <a:defRPr sz="1400" kern="1200" cap="none">
+                <a:solidFill>
+                  <a:schemeClr val="tx1"/>
+                </a:solidFill>
+                <a:effectLst/>
+                <a:latin typeface="+mn-lt"/>
+                <a:ea typeface="+mn-ea"/>
+                <a:cs typeface="+mn-cs"/>
+              </a:defRPr>
+            </a:lvl7pPr>
+            <a:lvl8pPr marL="3429000" indent="-228600" algn="l" defTabSz="457200" rtl="0" eaLnBrk="1" latinLnBrk="0" hangingPunct="1">
+              <a:spcBef>
+                <a:spcPct val="20000"/>
+              </a:spcBef>
+              <a:spcAft>
+                <a:spcPts val="600"/>
+              </a:spcAft>
+              <a:buClr>
+                <a:schemeClr val="accent1">
+                  <a:lumMod val="75000"/>
+                </a:schemeClr>
+              </a:buClr>
+              <a:buSzPct val="145000"/>
+              <a:buFont typeface="Arial"/>
+              <a:buChar char="•"/>
+              <a:defRPr sz="1400" kern="1200" cap="none">
+                <a:solidFill>
+                  <a:schemeClr val="tx1"/>
+                </a:solidFill>
+                <a:effectLst/>
+                <a:latin typeface="+mn-lt"/>
+                <a:ea typeface="+mn-ea"/>
+                <a:cs typeface="+mn-cs"/>
+              </a:defRPr>
+            </a:lvl8pPr>
+            <a:lvl9pPr marL="3886200" indent="-228600" algn="l" defTabSz="457200" rtl="0" eaLnBrk="1" latinLnBrk="0" hangingPunct="1">
+              <a:spcBef>
+                <a:spcPct val="20000"/>
+              </a:spcBef>
+              <a:spcAft>
+                <a:spcPts val="600"/>
+              </a:spcAft>
+              <a:buClr>
+                <a:schemeClr val="accent1">
+                  <a:lumMod val="75000"/>
+                </a:schemeClr>
+              </a:buClr>
+              <a:buSzPct val="145000"/>
+              <a:buFont typeface="Arial"/>
+              <a:buChar char="•"/>
+              <a:defRPr sz="1400" kern="1200" cap="none">
+                <a:solidFill>
+                  <a:schemeClr val="tx1"/>
+                </a:solidFill>
+                <a:effectLst/>
+                <a:latin typeface="+mn-lt"/>
+                <a:ea typeface="+mn-ea"/>
+                <a:cs typeface="+mn-cs"/>
+              </a:defRPr>
+            </a:lvl9pPr>
+          </a:lstStyle>
+          <a:p>
+            <a:pPr marL="0" indent="0">
+              <a:buNone/>
+            </a:pPr>
+            <a:r>
+              <a:rPr lang="de-DE" sz="1000" dirty="0" smtClean="0"/>
+              <a:t>Rem0 Röthlisberger, Eric </a:t>
+            </a:r>
+            <a:r>
+              <a:rPr lang="de-DE" sz="1000" dirty="0" err="1" smtClean="0"/>
+              <a:t>Lagger</a:t>
+            </a:r>
+            <a:r>
+              <a:rPr lang="de-DE" sz="1000" dirty="0" smtClean="0"/>
+              <a:t>, Vincent Hofer, Dean Klopsch, Aebi Ryan</a:t>
+            </a:r>
+            <a:endParaRPr lang="de-DE" sz="1000" dirty="0"/>
+          </a:p>
+        </p:txBody>
+      </p:sp>
+      <p:sp>
+        <p:nvSpPr>
+          <p:cNvPr id="7" name="Inhaltsplatzhalter 2"/>
+          <p:cNvSpPr>
+            <a:spLocks noGrp="1"/>
+          </p:cNvSpPr>
+          <p:nvPr>
+            <p:ph idx="1"/>
+          </p:nvPr>
+        </p:nvSpPr>
+        <p:spPr>
+          <a:xfrm>
+            <a:off x="762552" y="2065420"/>
+            <a:ext cx="10115438" cy="3937001"/>
+          </a:xfrm>
+        </p:spPr>
+        <p:txBody>
+          <a:bodyPr>
+            <a:normAutofit/>
+          </a:bodyPr>
+          <a:lstStyle/>
+          <a:p>
+            <a:pPr algn="ctr"/>
+            <a:r>
+              <a:rPr lang="de-DE" sz="3200" dirty="0" err="1" smtClean="0"/>
+              <a:t>Our</a:t>
+            </a:r>
+            <a:r>
+              <a:rPr lang="de-DE" sz="3200" dirty="0" smtClean="0"/>
+              <a:t> </a:t>
+            </a:r>
+            <a:r>
+              <a:rPr lang="de-DE" sz="3200" dirty="0" err="1" smtClean="0"/>
+              <a:t>team</a:t>
+            </a:r>
+            <a:endParaRPr lang="de-DE" sz="3200" dirty="0" smtClean="0"/>
+          </a:p>
+          <a:p>
+            <a:pPr algn="ctr"/>
+            <a:r>
+              <a:rPr lang="de-DE" sz="3200" dirty="0" smtClean="0"/>
+              <a:t>The </a:t>
+            </a:r>
+            <a:r>
+              <a:rPr lang="de-DE" sz="3200" dirty="0" err="1" smtClean="0"/>
+              <a:t>products</a:t>
+            </a:r>
+            <a:r>
+              <a:rPr lang="de-DE" sz="3200" dirty="0" smtClean="0"/>
+              <a:t/>
+            </a:r>
+            <a:br>
+              <a:rPr lang="de-DE" sz="3200" dirty="0" smtClean="0"/>
+            </a:br>
+            <a:r>
+              <a:rPr lang="de-DE" sz="3200" dirty="0" smtClean="0"/>
+              <a:t>-&gt; The </a:t>
+            </a:r>
+            <a:r>
+              <a:rPr lang="de-DE" sz="3200" dirty="0" err="1" smtClean="0"/>
+              <a:t>client</a:t>
+            </a:r>
+            <a:r>
+              <a:rPr lang="de-DE" sz="3200" dirty="0" smtClean="0"/>
+              <a:t/>
+            </a:r>
+            <a:br>
+              <a:rPr lang="de-DE" sz="3200" dirty="0" smtClean="0"/>
+            </a:br>
+            <a:r>
+              <a:rPr lang="de-DE" sz="3200" dirty="0" smtClean="0"/>
+              <a:t>-&gt; The </a:t>
+            </a:r>
+            <a:r>
+              <a:rPr lang="de-DE" sz="3200" dirty="0" err="1" smtClean="0"/>
+              <a:t>developers</a:t>
+            </a:r>
+            <a:endParaRPr lang="de-DE" sz="3200" dirty="0" smtClean="0"/>
+          </a:p>
+          <a:p>
+            <a:pPr algn="ctr"/>
+            <a:r>
+              <a:rPr lang="de-DE" sz="3200" dirty="0" err="1" smtClean="0"/>
+              <a:t>Ask</a:t>
+            </a:r>
+            <a:r>
+              <a:rPr lang="de-DE" sz="3200" dirty="0" smtClean="0"/>
+              <a:t> </a:t>
+            </a:r>
+            <a:r>
+              <a:rPr lang="de-DE" sz="3200" dirty="0" err="1" smtClean="0"/>
+              <a:t>us</a:t>
+            </a:r>
+            <a:r>
+              <a:rPr lang="de-DE" sz="3200" dirty="0" smtClean="0"/>
+              <a:t>!</a:t>
+            </a:r>
+          </a:p>
+          <a:p>
+            <a:pPr algn="ctr"/>
+            <a:r>
+              <a:rPr lang="de-DE" sz="3200" dirty="0" err="1" smtClean="0"/>
+              <a:t>Contact</a:t>
+            </a:r>
+            <a:r>
+              <a:rPr lang="de-DE" sz="3200" dirty="0" smtClean="0"/>
+              <a:t> </a:t>
+            </a:r>
+            <a:r>
+              <a:rPr lang="de-DE" sz="3200" dirty="0" err="1" smtClean="0"/>
+              <a:t>us</a:t>
+            </a:r>
+            <a:r>
+              <a:rPr lang="de-DE" sz="3200" dirty="0" smtClean="0"/>
+              <a:t>!</a:t>
+            </a:r>
+          </a:p>
+        </p:txBody>
+      </p:sp>
+    </p:spTree>
+    <p:extLst>
+      <p:ext uri="{BB962C8B-B14F-4D97-AF65-F5344CB8AC3E}">
+        <p14:creationId xmlns:p14="http://schemas.microsoft.com/office/powerpoint/2010/main" val="1459151704"/>
+      </p:ext>
+    </p:extLst>
+  </p:cSld>
+  <p:clrMapOvr>
+    <a:masterClrMapping/>
+  </p:clrMapOvr>
+  <p:timing>
+    <p:tnLst>
+      <p:par>
+        <p:cTn id="1" dur="indefinite" restart="never" nodeType="tmRoot"/>
+      </p:par>
+    </p:tnLst>
+  </p:timing>
+</p:sld>
+</file>
+
+<file path=ppt/slides/slide22.xml><?xml version="1.0" encoding="utf-8"?>
+<p:sld xmlns:a="http://schemas.openxmlformats.org/drawingml/2006/main" xmlns:r="http://schemas.openxmlformats.org/officeDocument/2006/relationships" xmlns:p="http://schemas.openxmlformats.org/presentationml/2006/main">
+  <p:cSld>
+    <p:spTree>
+      <p:nvGrpSpPr>
+        <p:cNvPr id="1" name=""/>
+        <p:cNvGrpSpPr/>
+        <p:nvPr/>
+      </p:nvGrpSpPr>
+      <p:grpSpPr>
+        <a:xfrm>
+          <a:off x="0" y="0"/>
+          <a:ext cx="0" cy="0"/>
+          <a:chOff x="0" y="0"/>
+          <a:chExt cx="0" cy="0"/>
+        </a:xfrm>
+      </p:grpSpPr>
+      <p:sp>
+        <p:nvSpPr>
+          <p:cNvPr id="2" name="Titel 1"/>
+          <p:cNvSpPr>
+            <a:spLocks noGrp="1"/>
+          </p:cNvSpPr>
+          <p:nvPr>
+            <p:ph type="title"/>
+          </p:nvPr>
+        </p:nvSpPr>
+        <p:spPr>
+          <a:xfrm>
+            <a:off x="810915" y="691116"/>
+            <a:ext cx="10018713" cy="1752599"/>
+          </a:xfrm>
+        </p:spPr>
+        <p:txBody>
+          <a:bodyPr/>
+          <a:lstStyle/>
+          <a:p>
+            <a:r>
               <a:rPr lang="de-DE" dirty="0" err="1"/>
               <a:t>Questions</a:t>
             </a:r>
@@ -15307,7 +15795,7 @@
           <a:noFill/>
           <a:extLst>
             <a:ext uri="{909E8E84-426E-40dd-AFC4-6F175D3DCCD1}">
-              <a14:hiddenFill xmlns="" xmlns:a14="http://schemas.microsoft.com/office/drawing/2010/main">
+              <a14:hiddenFill xmlns:a14="http://schemas.microsoft.com/office/drawing/2010/main" xmlns="">
                 <a:solidFill>
                   <a:srgbClr val="FFFFFF"/>
                 </a:solidFill>
@@ -15348,7 +15836,7 @@
           <a:noFill/>
           <a:extLst>
             <a:ext uri="{909E8E84-426E-40dd-AFC4-6F175D3DCCD1}">
-              <a14:hiddenFill xmlns="" xmlns:a14="http://schemas.microsoft.com/office/drawing/2010/main">
+              <a14:hiddenFill xmlns:a14="http://schemas.microsoft.com/office/drawing/2010/main" xmlns="">
                 <a:solidFill>
                   <a:srgbClr val="FFFFFF"/>
                 </a:solidFill>

</xml_diff>

<commit_message>
quality of the name-mindmap hugely improved
</commit_message>
<xml_diff>
--- a/baseProject/presentation/Presentation-Team8.pptx
+++ b/baseProject/presentation/Presentation-Team8.pptx
@@ -184,7 +184,7 @@
       </p14:sectionLst>
     </p:ext>
     <p:ext uri="{EFAFB233-063F-42B5-8137-9DF3F51BA10A}">
-      <p15:sldGuideLst xmlns:p15="http://schemas.microsoft.com/office/powerpoint/2012/main">
+      <p15:sldGuideLst xmlns:p15="http://schemas.microsoft.com/office/powerpoint/2012/main" xmlns="">
         <p15:guide id="1" orient="horz" pos="2160">
           <p15:clr>
             <a:srgbClr val="A4A3A4"/>
@@ -442,7 +442,7 @@
           <a:p>
             <a:fld id="{2F2847E0-1D0A-0F4B-99C8-E51199A5987D}" type="slidenum">
               <a:rPr lang="de-DE" smtClean="0"/>
-              <a:t>‹Nr.›</a:t>
+              <a:t>‹#›</a:t>
             </a:fld>
             <a:endParaRPr lang="de-DE"/>
           </a:p>
@@ -3110,7 +3110,7 @@
             <a:fld id="{D57F1E4F-1CFF-5643-939E-217C01CDF565}" type="slidenum">
               <a:rPr lang="en-US" dirty="0"/>
               <a:pPr/>
-              <a:t>‹Nr.›</a:t>
+              <a:t>‹#›</a:t>
             </a:fld>
             <a:endParaRPr lang="en-US" dirty="0"/>
           </a:p>
@@ -3398,7 +3398,7 @@
             <a:fld id="{D57F1E4F-1CFF-5643-939E-217C01CDF565}" type="slidenum">
               <a:rPr lang="en-US" dirty="0"/>
               <a:pPr/>
-              <a:t>‹Nr.›</a:t>
+              <a:t>‹#›</a:t>
             </a:fld>
             <a:endParaRPr lang="en-US" dirty="0"/>
           </a:p>
@@ -3643,7 +3643,7 @@
             <a:fld id="{D57F1E4F-1CFF-5643-939E-217C01CDF565}" type="slidenum">
               <a:rPr lang="en-US" dirty="0"/>
               <a:pPr/>
-              <a:t>‹Nr.›</a:t>
+              <a:t>‹#›</a:t>
             </a:fld>
             <a:endParaRPr lang="en-US" dirty="0"/>
           </a:p>
@@ -4180,7 +4180,7 @@
             <a:fld id="{D57F1E4F-1CFF-5643-939E-217C01CDF565}" type="slidenum">
               <a:rPr lang="en-US" dirty="0"/>
               <a:pPr/>
-              <a:t>‹Nr.›</a:t>
+              <a:t>‹#›</a:t>
             </a:fld>
             <a:endParaRPr lang="en-US" dirty="0"/>
           </a:p>
@@ -4425,7 +4425,7 @@
             <a:fld id="{D57F1E4F-1CFF-5643-939E-217C01CDF565}" type="slidenum">
               <a:rPr lang="en-US" dirty="0"/>
               <a:pPr/>
-              <a:t>‹Nr.›</a:t>
+              <a:t>‹#›</a:t>
             </a:fld>
             <a:endParaRPr lang="en-US" dirty="0"/>
           </a:p>
@@ -4954,7 +4954,7 @@
             <a:fld id="{D57F1E4F-1CFF-5643-939E-217C01CDF565}" type="slidenum">
               <a:rPr lang="en-US" dirty="0"/>
               <a:pPr/>
-              <a:t>‹Nr.›</a:t>
+              <a:t>‹#›</a:t>
             </a:fld>
             <a:endParaRPr lang="en-US" dirty="0"/>
           </a:p>
@@ -5248,7 +5248,7 @@
             <a:fld id="{D57F1E4F-1CFF-5643-939E-217C01CDF565}" type="slidenum">
               <a:rPr lang="en-US" dirty="0"/>
               <a:pPr/>
-              <a:t>‹Nr.›</a:t>
+              <a:t>‹#›</a:t>
             </a:fld>
             <a:endParaRPr lang="en-US" dirty="0"/>
           </a:p>
@@ -5419,7 +5419,7 @@
             <a:fld id="{D57F1E4F-1CFF-5643-939E-217C01CDF565}" type="slidenum">
               <a:rPr lang="en-US" dirty="0"/>
               <a:pPr/>
-              <a:t>‹Nr.›</a:t>
+              <a:t>‹#›</a:t>
             </a:fld>
             <a:endParaRPr lang="en-US" dirty="0"/>
           </a:p>
@@ -5596,7 +5596,7 @@
             <a:fld id="{D57F1E4F-1CFF-5643-939E-217C01CDF565}" type="slidenum">
               <a:rPr lang="en-US" dirty="0"/>
               <a:pPr/>
-              <a:t>‹Nr.›</a:t>
+              <a:t>‹#›</a:t>
             </a:fld>
             <a:endParaRPr lang="en-US" dirty="0"/>
           </a:p>
@@ -5768,7 +5768,7 @@
             <a:fld id="{D57F1E4F-1CFF-5643-939E-217C01CDF565}" type="slidenum">
               <a:rPr lang="en-US" dirty="0"/>
               <a:pPr/>
-              <a:t>‹Nr.›</a:t>
+              <a:t>‹#›</a:t>
             </a:fld>
             <a:endParaRPr lang="en-US" dirty="0"/>
           </a:p>
@@ -6011,7 +6011,7 @@
             <a:fld id="{D57F1E4F-1CFF-5643-939E-217C01CDF565}" type="slidenum">
               <a:rPr lang="en-US" dirty="0"/>
               <a:pPr/>
-              <a:t>‹Nr.›</a:t>
+              <a:t>‹#›</a:t>
             </a:fld>
             <a:endParaRPr lang="en-US" dirty="0"/>
           </a:p>
@@ -6305,7 +6305,7 @@
             <a:fld id="{D57F1E4F-1CFF-5643-939E-217C01CDF565}" type="slidenum">
               <a:rPr lang="en-US" dirty="0"/>
               <a:pPr/>
-              <a:t>‹Nr.›</a:t>
+              <a:t>‹#›</a:t>
             </a:fld>
             <a:endParaRPr lang="en-US" dirty="0"/>
           </a:p>
@@ -6744,7 +6744,7 @@
             <a:fld id="{D57F1E4F-1CFF-5643-939E-217C01CDF565}" type="slidenum">
               <a:rPr lang="en-US" dirty="0"/>
               <a:pPr/>
-              <a:t>‹Nr.›</a:t>
+              <a:t>‹#›</a:t>
             </a:fld>
             <a:endParaRPr lang="en-US" dirty="0"/>
           </a:p>
@@ -6859,7 +6859,7 @@
             <a:fld id="{D57F1E4F-1CFF-5643-939E-217C01CDF565}" type="slidenum">
               <a:rPr lang="en-US" dirty="0"/>
               <a:pPr/>
-              <a:t>‹Nr.›</a:t>
+              <a:t>‹#›</a:t>
             </a:fld>
             <a:endParaRPr lang="en-US" dirty="0"/>
           </a:p>
@@ -6951,7 +6951,7 @@
             <a:fld id="{D57F1E4F-1CFF-5643-939E-217C01CDF565}" type="slidenum">
               <a:rPr lang="en-US" dirty="0"/>
               <a:pPr/>
-              <a:t>‹Nr.›</a:t>
+              <a:t>‹#›</a:t>
             </a:fld>
             <a:endParaRPr lang="en-US" dirty="0"/>
           </a:p>
@@ -7231,7 +7231,7 @@
             <a:fld id="{D57F1E4F-1CFF-5643-939E-217C01CDF565}" type="slidenum">
               <a:rPr lang="en-US" dirty="0"/>
               <a:pPr/>
-              <a:t>‹Nr.›</a:t>
+              <a:t>‹#›</a:t>
             </a:fld>
             <a:endParaRPr lang="en-US" dirty="0"/>
           </a:p>
@@ -7519,7 +7519,7 @@
             <a:fld id="{D57F1E4F-1CFF-5643-939E-217C01CDF565}" type="slidenum">
               <a:rPr lang="en-US" dirty="0"/>
               <a:pPr/>
-              <a:t>‹Nr.›</a:t>
+              <a:t>‹#›</a:t>
             </a:fld>
             <a:endParaRPr lang="en-US" dirty="0"/>
           </a:p>
@@ -8082,7 +8082,7 @@
             <a:fld id="{D57F1E4F-1CFF-5643-939E-217C01CDF565}" type="slidenum">
               <a:rPr lang="en-US" dirty="0"/>
               <a:pPr/>
-              <a:t>‹Nr.›</a:t>
+              <a:t>‹#›</a:t>
             </a:fld>
             <a:endParaRPr lang="en-US" dirty="0"/>
           </a:p>
@@ -15794,8 +15794,8 @@
           </a:prstGeom>
           <a:noFill/>
           <a:extLst>
-            <a:ext uri="{909E8E84-426E-40dd-AFC4-6F175D3DCCD1}">
-              <a14:hiddenFill xmlns:a14="http://schemas.microsoft.com/office/drawing/2010/main" xmlns="">
+            <a:ext uri="{909E8E84-426E-40DD-AFC4-6F175D3DCCD1}">
+              <a14:hiddenFill xmlns:a14="http://schemas.microsoft.com/office/drawing/2010/main">
                 <a:solidFill>
                   <a:srgbClr val="FFFFFF"/>
                 </a:solidFill>
@@ -15835,8 +15835,8 @@
           </a:prstGeom>
           <a:noFill/>
           <a:extLst>
-            <a:ext uri="{909E8E84-426E-40dd-AFC4-6F175D3DCCD1}">
-              <a14:hiddenFill xmlns:a14="http://schemas.microsoft.com/office/drawing/2010/main" xmlns="">
+            <a:ext uri="{909E8E84-426E-40DD-AFC4-6F175D3DCCD1}">
+              <a14:hiddenFill xmlns:a14="http://schemas.microsoft.com/office/drawing/2010/main">
                 <a:solidFill>
                   <a:srgbClr val="FFFFFF"/>
                 </a:solidFill>
@@ -16598,15 +16598,21 @@
           </p:nvPr>
         </p:nvPicPr>
         <p:blipFill>
-          <a:blip r:embed="rId3"/>
+          <a:blip r:embed="rId3">
+            <a:extLst>
+              <a:ext uri="{28A0092B-C50C-407E-A947-70E740481C1C}">
+                <a14:useLocalDpi xmlns:a14="http://schemas.microsoft.com/office/drawing/2010/main" val="0"/>
+              </a:ext>
+            </a:extLst>
+          </a:blip>
           <a:stretch>
             <a:fillRect/>
           </a:stretch>
         </p:blipFill>
         <p:spPr>
           <a:xfrm>
-            <a:off x="-155576" y="0"/>
-            <a:ext cx="12401550" cy="6975873"/>
+            <a:off x="-442446" y="-53340"/>
+            <a:ext cx="12401550" cy="6975871"/>
           </a:xfrm>
         </p:spPr>
       </p:pic>
@@ -17779,7 +17785,7 @@
   <a:extraClrSchemeLst/>
   <a:extLst>
     <a:ext uri="{05A4C25C-085E-4340-85A3-A5531E510DB2}">
-      <thm15:themeFamily xmlns:thm15="http://schemas.microsoft.com/office/thememl/2012/main" name="Parallax" id="{3388167B-A2EB-4685-9635-1831D9AEF8C4}" vid="{4F7A876A-7598-49CA-AFC8-8EDA2551E4A7}"/>
+      <thm15:themeFamily xmlns:thm15="http://schemas.microsoft.com/office/thememl/2012/main" xmlns="" name="Parallax" id="{3388167B-A2EB-4685-9635-1831D9AEF8C4}" vid="{4F7A876A-7598-49CA-AFC8-8EDA2551E4A7}"/>
     </a:ext>
   </a:extLst>
 </a:theme>

</xml_diff>

<commit_message>
minor changes to presentation.pptx
</commit_message>
<xml_diff>
--- a/baseProject/presentation/Presentation-Team8.pptx
+++ b/baseProject/presentation/Presentation-Team8.pptx
@@ -186,7 +186,7 @@
       </p14:sectionLst>
     </p:ext>
     <p:ext uri="{EFAFB233-063F-42B5-8137-9DF3F51BA10A}">
-      <p15:sldGuideLst xmlns="" xmlns:p15="http://schemas.microsoft.com/office/powerpoint/2012/main">
+      <p15:sldGuideLst xmlns:p15="http://schemas.microsoft.com/office/powerpoint/2012/main" xmlns="">
         <p15:guide id="1" orient="horz" pos="2160">
           <p15:clr>
             <a:srgbClr val="A4A3A4"/>
@@ -285,7 +285,7 @@
           <a:p>
             <a:fld id="{AD788536-914B-4640-862E-1D3DAE36BE3D}" type="datetimeFigureOut">
               <a:rPr lang="de-DE" smtClean="0"/>
-              <a:t>14.12.16</a:t>
+              <a:t>14.12.2016</a:t>
             </a:fld>
             <a:endParaRPr lang="de-DE"/>
           </a:p>
@@ -444,7 +444,7 @@
           <a:p>
             <a:fld id="{2F2847E0-1D0A-0F4B-99C8-E51199A5987D}" type="slidenum">
               <a:rPr lang="de-DE" smtClean="0"/>
-              <a:t>‹Nr.›</a:t>
+              <a:t>‹#›</a:t>
             </a:fld>
             <a:endParaRPr lang="de-DE"/>
           </a:p>
@@ -3200,7 +3200,7 @@
             <a:fld id="{B61BEF0D-F0BB-DE4B-95CE-6DB70DBA9567}" type="datetimeFigureOut">
               <a:rPr lang="en-US" dirty="0"/>
               <a:pPr/>
-              <a:t>14.12.16</a:t>
+              <a:t>12/14/2016</a:t>
             </a:fld>
             <a:endParaRPr lang="en-US" dirty="0"/>
           </a:p>
@@ -3248,7 +3248,7 @@
             <a:fld id="{D57F1E4F-1CFF-5643-939E-217C01CDF565}" type="slidenum">
               <a:rPr lang="en-US" dirty="0"/>
               <a:pPr/>
-              <a:t>‹Nr.›</a:t>
+              <a:t>‹#›</a:t>
             </a:fld>
             <a:endParaRPr lang="en-US" dirty="0"/>
           </a:p>
@@ -3493,7 +3493,7 @@
             <a:fld id="{B61BEF0D-F0BB-DE4B-95CE-6DB70DBA9567}" type="datetimeFigureOut">
               <a:rPr lang="en-US" dirty="0"/>
               <a:pPr/>
-              <a:t>14.12.16</a:t>
+              <a:t>12/14/2016</a:t>
             </a:fld>
             <a:endParaRPr lang="en-US" dirty="0"/>
           </a:p>
@@ -3536,7 +3536,7 @@
             <a:fld id="{D57F1E4F-1CFF-5643-939E-217C01CDF565}" type="slidenum">
               <a:rPr lang="en-US" dirty="0"/>
               <a:pPr/>
-              <a:t>‹Nr.›</a:t>
+              <a:t>‹#›</a:t>
             </a:fld>
             <a:endParaRPr lang="en-US" dirty="0"/>
           </a:p>
@@ -3738,7 +3738,7 @@
             <a:fld id="{B61BEF0D-F0BB-DE4B-95CE-6DB70DBA9567}" type="datetimeFigureOut">
               <a:rPr lang="en-US" dirty="0"/>
               <a:pPr/>
-              <a:t>14.12.16</a:t>
+              <a:t>12/14/2016</a:t>
             </a:fld>
             <a:endParaRPr lang="en-US" dirty="0"/>
           </a:p>
@@ -3781,7 +3781,7 @@
             <a:fld id="{D57F1E4F-1CFF-5643-939E-217C01CDF565}" type="slidenum">
               <a:rPr lang="en-US" dirty="0"/>
               <a:pPr/>
-              <a:t>‹Nr.›</a:t>
+              <a:t>‹#›</a:t>
             </a:fld>
             <a:endParaRPr lang="en-US" dirty="0"/>
           </a:p>
@@ -4275,7 +4275,7 @@
             <a:fld id="{B61BEF0D-F0BB-DE4B-95CE-6DB70DBA9567}" type="datetimeFigureOut">
               <a:rPr lang="en-US" dirty="0"/>
               <a:pPr/>
-              <a:t>14.12.16</a:t>
+              <a:t>12/14/2016</a:t>
             </a:fld>
             <a:endParaRPr lang="en-US" dirty="0"/>
           </a:p>
@@ -4318,7 +4318,7 @@
             <a:fld id="{D57F1E4F-1CFF-5643-939E-217C01CDF565}" type="slidenum">
               <a:rPr lang="en-US" dirty="0"/>
               <a:pPr/>
-              <a:t>‹Nr.›</a:t>
+              <a:t>‹#›</a:t>
             </a:fld>
             <a:endParaRPr lang="en-US" dirty="0"/>
           </a:p>
@@ -4520,7 +4520,7 @@
             <a:fld id="{B61BEF0D-F0BB-DE4B-95CE-6DB70DBA9567}" type="datetimeFigureOut">
               <a:rPr lang="en-US" dirty="0"/>
               <a:pPr/>
-              <a:t>14.12.16</a:t>
+              <a:t>12/14/2016</a:t>
             </a:fld>
             <a:endParaRPr lang="en-US" dirty="0"/>
           </a:p>
@@ -4563,7 +4563,7 @@
             <a:fld id="{D57F1E4F-1CFF-5643-939E-217C01CDF565}" type="slidenum">
               <a:rPr lang="en-US" dirty="0"/>
               <a:pPr/>
-              <a:t>‹Nr.›</a:t>
+              <a:t>‹#›</a:t>
             </a:fld>
             <a:endParaRPr lang="en-US" dirty="0"/>
           </a:p>
@@ -5049,7 +5049,7 @@
             <a:fld id="{B61BEF0D-F0BB-DE4B-95CE-6DB70DBA9567}" type="datetimeFigureOut">
               <a:rPr lang="en-US" dirty="0"/>
               <a:pPr/>
-              <a:t>14.12.16</a:t>
+              <a:t>12/14/2016</a:t>
             </a:fld>
             <a:endParaRPr lang="en-US" dirty="0"/>
           </a:p>
@@ -5092,7 +5092,7 @@
             <a:fld id="{D57F1E4F-1CFF-5643-939E-217C01CDF565}" type="slidenum">
               <a:rPr lang="en-US" dirty="0"/>
               <a:pPr/>
-              <a:t>‹Nr.›</a:t>
+              <a:t>‹#›</a:t>
             </a:fld>
             <a:endParaRPr lang="en-US" dirty="0"/>
           </a:p>
@@ -5343,7 +5343,7 @@
             <a:fld id="{B61BEF0D-F0BB-DE4B-95CE-6DB70DBA9567}" type="datetimeFigureOut">
               <a:rPr lang="en-US" dirty="0"/>
               <a:pPr/>
-              <a:t>14.12.16</a:t>
+              <a:t>12/14/2016</a:t>
             </a:fld>
             <a:endParaRPr lang="en-US" dirty="0"/>
           </a:p>
@@ -5386,7 +5386,7 @@
             <a:fld id="{D57F1E4F-1CFF-5643-939E-217C01CDF565}" type="slidenum">
               <a:rPr lang="en-US" dirty="0"/>
               <a:pPr/>
-              <a:t>‹Nr.›</a:t>
+              <a:t>‹#›</a:t>
             </a:fld>
             <a:endParaRPr lang="en-US" dirty="0"/>
           </a:p>
@@ -5514,7 +5514,7 @@
             <a:fld id="{B61BEF0D-F0BB-DE4B-95CE-6DB70DBA9567}" type="datetimeFigureOut">
               <a:rPr lang="en-US" dirty="0"/>
               <a:pPr/>
-              <a:t>14.12.16</a:t>
+              <a:t>12/14/2016</a:t>
             </a:fld>
             <a:endParaRPr lang="en-US" dirty="0"/>
           </a:p>
@@ -5557,7 +5557,7 @@
             <a:fld id="{D57F1E4F-1CFF-5643-939E-217C01CDF565}" type="slidenum">
               <a:rPr lang="en-US" dirty="0"/>
               <a:pPr/>
-              <a:t>‹Nr.›</a:t>
+              <a:t>‹#›</a:t>
             </a:fld>
             <a:endParaRPr lang="en-US" dirty="0"/>
           </a:p>
@@ -5691,7 +5691,7 @@
             <a:fld id="{B61BEF0D-F0BB-DE4B-95CE-6DB70DBA9567}" type="datetimeFigureOut">
               <a:rPr lang="en-US" dirty="0"/>
               <a:pPr/>
-              <a:t>14.12.16</a:t>
+              <a:t>12/14/2016</a:t>
             </a:fld>
             <a:endParaRPr lang="en-US" dirty="0"/>
           </a:p>
@@ -5734,7 +5734,7 @@
             <a:fld id="{D57F1E4F-1CFF-5643-939E-217C01CDF565}" type="slidenum">
               <a:rPr lang="en-US" dirty="0"/>
               <a:pPr/>
-              <a:t>‹Nr.›</a:t>
+              <a:t>‹#›</a:t>
             </a:fld>
             <a:endParaRPr lang="en-US" dirty="0"/>
           </a:p>
@@ -5858,7 +5858,7 @@
             <a:fld id="{B61BEF0D-F0BB-DE4B-95CE-6DB70DBA9567}" type="datetimeFigureOut">
               <a:rPr lang="en-US" dirty="0"/>
               <a:pPr/>
-              <a:t>14.12.16</a:t>
+              <a:t>12/14/2016</a:t>
             </a:fld>
             <a:endParaRPr lang="en-US" dirty="0"/>
           </a:p>
@@ -5906,7 +5906,7 @@
             <a:fld id="{D57F1E4F-1CFF-5643-939E-217C01CDF565}" type="slidenum">
               <a:rPr lang="en-US" dirty="0"/>
               <a:pPr/>
-              <a:t>‹Nr.›</a:t>
+              <a:t>‹#›</a:t>
             </a:fld>
             <a:endParaRPr lang="en-US" dirty="0"/>
           </a:p>
@@ -6106,7 +6106,7 @@
             <a:fld id="{B61BEF0D-F0BB-DE4B-95CE-6DB70DBA9567}" type="datetimeFigureOut">
               <a:rPr lang="en-US" dirty="0"/>
               <a:pPr/>
-              <a:t>14.12.16</a:t>
+              <a:t>12/14/2016</a:t>
             </a:fld>
             <a:endParaRPr lang="en-US" dirty="0"/>
           </a:p>
@@ -6149,7 +6149,7 @@
             <a:fld id="{D57F1E4F-1CFF-5643-939E-217C01CDF565}" type="slidenum">
               <a:rPr lang="en-US" dirty="0"/>
               <a:pPr/>
-              <a:t>‹Nr.›</a:t>
+              <a:t>‹#›</a:t>
             </a:fld>
             <a:endParaRPr lang="en-US" dirty="0"/>
           </a:p>
@@ -6400,7 +6400,7 @@
             <a:fld id="{B61BEF0D-F0BB-DE4B-95CE-6DB70DBA9567}" type="datetimeFigureOut">
               <a:rPr lang="en-US" dirty="0"/>
               <a:pPr/>
-              <a:t>14.12.16</a:t>
+              <a:t>12/14/2016</a:t>
             </a:fld>
             <a:endParaRPr lang="en-US" dirty="0"/>
           </a:p>
@@ -6443,7 +6443,7 @@
             <a:fld id="{D57F1E4F-1CFF-5643-939E-217C01CDF565}" type="slidenum">
               <a:rPr lang="en-US" dirty="0"/>
               <a:pPr/>
-              <a:t>‹Nr.›</a:t>
+              <a:t>‹#›</a:t>
             </a:fld>
             <a:endParaRPr lang="en-US" dirty="0"/>
           </a:p>
@@ -6839,7 +6839,7 @@
             <a:fld id="{B61BEF0D-F0BB-DE4B-95CE-6DB70DBA9567}" type="datetimeFigureOut">
               <a:rPr lang="en-US" dirty="0"/>
               <a:pPr/>
-              <a:t>14.12.16</a:t>
+              <a:t>12/14/2016</a:t>
             </a:fld>
             <a:endParaRPr lang="en-US" dirty="0"/>
           </a:p>
@@ -6882,7 +6882,7 @@
             <a:fld id="{D57F1E4F-1CFF-5643-939E-217C01CDF565}" type="slidenum">
               <a:rPr lang="en-US" dirty="0"/>
               <a:pPr/>
-              <a:t>‹Nr.›</a:t>
+              <a:t>‹#›</a:t>
             </a:fld>
             <a:endParaRPr lang="en-US" dirty="0"/>
           </a:p>
@@ -6954,7 +6954,7 @@
             <a:fld id="{B61BEF0D-F0BB-DE4B-95CE-6DB70DBA9567}" type="datetimeFigureOut">
               <a:rPr lang="en-US" dirty="0"/>
               <a:pPr/>
-              <a:t>14.12.16</a:t>
+              <a:t>12/14/2016</a:t>
             </a:fld>
             <a:endParaRPr lang="en-US" dirty="0"/>
           </a:p>
@@ -6997,7 +6997,7 @@
             <a:fld id="{D57F1E4F-1CFF-5643-939E-217C01CDF565}" type="slidenum">
               <a:rPr lang="en-US" dirty="0"/>
               <a:pPr/>
-              <a:t>‹Nr.›</a:t>
+              <a:t>‹#›</a:t>
             </a:fld>
             <a:endParaRPr lang="en-US" dirty="0"/>
           </a:p>
@@ -7046,7 +7046,7 @@
             <a:fld id="{B61BEF0D-F0BB-DE4B-95CE-6DB70DBA9567}" type="datetimeFigureOut">
               <a:rPr lang="en-US" dirty="0"/>
               <a:pPr/>
-              <a:t>14.12.16</a:t>
+              <a:t>12/14/2016</a:t>
             </a:fld>
             <a:endParaRPr lang="en-US" dirty="0"/>
           </a:p>
@@ -7089,7 +7089,7 @@
             <a:fld id="{D57F1E4F-1CFF-5643-939E-217C01CDF565}" type="slidenum">
               <a:rPr lang="en-US" dirty="0"/>
               <a:pPr/>
-              <a:t>‹Nr.›</a:t>
+              <a:t>‹#›</a:t>
             </a:fld>
             <a:endParaRPr lang="en-US" dirty="0"/>
           </a:p>
@@ -7326,7 +7326,7 @@
             <a:fld id="{B61BEF0D-F0BB-DE4B-95CE-6DB70DBA9567}" type="datetimeFigureOut">
               <a:rPr lang="en-US" dirty="0"/>
               <a:pPr/>
-              <a:t>14.12.16</a:t>
+              <a:t>12/14/2016</a:t>
             </a:fld>
             <a:endParaRPr lang="en-US" dirty="0"/>
           </a:p>
@@ -7369,7 +7369,7 @@
             <a:fld id="{D57F1E4F-1CFF-5643-939E-217C01CDF565}" type="slidenum">
               <a:rPr lang="en-US" dirty="0"/>
               <a:pPr/>
-              <a:t>‹Nr.›</a:t>
+              <a:t>‹#›</a:t>
             </a:fld>
             <a:endParaRPr lang="en-US" dirty="0"/>
           </a:p>
@@ -7614,7 +7614,7 @@
             <a:fld id="{B61BEF0D-F0BB-DE4B-95CE-6DB70DBA9567}" type="datetimeFigureOut">
               <a:rPr lang="en-US" dirty="0"/>
               <a:pPr/>
-              <a:t>14.12.16</a:t>
+              <a:t>12/14/2016</a:t>
             </a:fld>
             <a:endParaRPr lang="en-US" dirty="0"/>
           </a:p>
@@ -7657,7 +7657,7 @@
             <a:fld id="{D57F1E4F-1CFF-5643-939E-217C01CDF565}" type="slidenum">
               <a:rPr lang="en-US" dirty="0"/>
               <a:pPr/>
-              <a:t>‹Nr.›</a:t>
+              <a:t>‹#›</a:t>
             </a:fld>
             <a:endParaRPr lang="en-US" dirty="0"/>
           </a:p>
@@ -8141,7 +8141,7 @@
             <a:fld id="{B61BEF0D-F0BB-DE4B-95CE-6DB70DBA9567}" type="datetimeFigureOut">
               <a:rPr lang="en-US" dirty="0"/>
               <a:pPr/>
-              <a:t>14.12.16</a:t>
+              <a:t>12/14/2016</a:t>
             </a:fld>
             <a:endParaRPr lang="en-US" dirty="0"/>
           </a:p>
@@ -8220,7 +8220,7 @@
             <a:fld id="{D57F1E4F-1CFF-5643-939E-217C01CDF565}" type="slidenum">
               <a:rPr lang="en-US" dirty="0"/>
               <a:pPr/>
-              <a:t>‹Nr.›</a:t>
+              <a:t>‹#›</a:t>
             </a:fld>
             <a:endParaRPr lang="en-US" dirty="0"/>
           </a:p>
@@ -8680,7 +8680,7 @@
         </p:nvSpPr>
         <p:spPr>
           <a:xfrm>
-            <a:off x="0" y="7089"/>
+            <a:off x="0" y="730989"/>
             <a:ext cx="12192000" cy="6850911"/>
           </a:xfrm>
         </p:spPr>
@@ -8692,16 +8692,10 @@
           <a:p>
             <a:pPr algn="ctr"/>
             <a:r>
-              <a:rPr lang="de-DE" sz="10000" dirty="0" err="1">
+              <a:rPr lang="de-DE" sz="10000" dirty="0">
                 <a:latin typeface="Monotype Corsiva" panose="03010101010201010101" pitchFamily="66" charset="0"/>
               </a:rPr>
               <a:t>Flatbook</a:t>
-            </a:r>
-            <a:r>
-              <a:rPr lang="de-DE" sz="10000" dirty="0">
-                <a:latin typeface="Monotype Corsiva" panose="03010101010201010101" pitchFamily="66" charset="0"/>
-              </a:rPr>
-              <a:t/>
             </a:r>
             <a:br>
               <a:rPr lang="de-DE" sz="10000" dirty="0">
@@ -8709,79 +8703,59 @@
               </a:rPr>
             </a:br>
             <a:r>
-              <a:rPr lang="de-DE" sz="2400" dirty="0" err="1" smtClean="0">
-                <a:latin typeface="Monotype Corsiva" panose="03010101010201010101" pitchFamily="66" charset="0"/>
-              </a:rPr>
-              <a:t>the</a:t>
-            </a:r>
-            <a:r>
               <a:rPr lang="de-DE" sz="2400" dirty="0" smtClean="0">
                 <a:latin typeface="Monotype Corsiva" panose="03010101010201010101" pitchFamily="66" charset="0"/>
               </a:rPr>
-              <a:t> </a:t>
-            </a:r>
-            <a:r>
-              <a:rPr lang="de-DE" sz="2400" dirty="0" err="1" smtClean="0">
-                <a:latin typeface="Monotype Corsiva" panose="03010101010201010101" pitchFamily="66" charset="0"/>
-              </a:rPr>
-              <a:t>realest</a:t>
+              <a:t>the realest real </a:t>
             </a:r>
             <a:r>
               <a:rPr lang="de-DE" sz="2400" dirty="0" smtClean="0">
                 <a:latin typeface="Monotype Corsiva" panose="03010101010201010101" pitchFamily="66" charset="0"/>
               </a:rPr>
-              <a:t> real </a:t>
-            </a:r>
-            <a:r>
-              <a:rPr lang="de-DE" sz="2400" dirty="0" err="1" smtClean="0">
-                <a:latin typeface="Monotype Corsiva" panose="03010101010201010101" pitchFamily="66" charset="0"/>
-              </a:rPr>
               <a:t>estate</a:t>
             </a:r>
-            <a:r>
+            <a:br>
               <a:rPr lang="de-DE" sz="2400" dirty="0" smtClean="0">
                 <a:latin typeface="Monotype Corsiva" panose="03010101010201010101" pitchFamily="66" charset="0"/>
               </a:rPr>
-              <a:t>! A </a:t>
-            </a:r>
-            <a:r>
-              <a:rPr lang="de-DE" sz="2400" dirty="0" err="1" smtClean="0">
+            </a:br>
+            <a:r>
+              <a:rPr lang="de-DE" sz="2400" dirty="0">
                 <a:latin typeface="Monotype Corsiva" panose="03010101010201010101" pitchFamily="66" charset="0"/>
               </a:rPr>
-              <a:t>presentation</a:t>
-            </a:r>
+              <a:t/>
+            </a:r>
+            <a:br>
+              <a:rPr lang="de-DE" sz="2400" dirty="0">
+                <a:latin typeface="Monotype Corsiva" panose="03010101010201010101" pitchFamily="66" charset="0"/>
+              </a:rPr>
+            </a:br>
             <a:r>
               <a:rPr lang="de-DE" sz="2400" dirty="0" smtClean="0">
                 <a:latin typeface="Monotype Corsiva" panose="03010101010201010101" pitchFamily="66" charset="0"/>
               </a:rPr>
-              <a:t> </a:t>
-            </a:r>
-            <a:r>
-              <a:rPr lang="de-DE" sz="2400" dirty="0" err="1">
+              <a:t>A </a:t>
+            </a:r>
+            <a:r>
+              <a:rPr lang="de-DE" sz="2400" dirty="0" smtClean="0">
                 <a:latin typeface="Monotype Corsiva" panose="03010101010201010101" pitchFamily="66" charset="0"/>
               </a:rPr>
-              <a:t>of</a:t>
+              <a:t>presentation </a:t>
             </a:r>
             <a:r>
               <a:rPr lang="de-DE" sz="2400" dirty="0">
                 <a:latin typeface="Monotype Corsiva" panose="03010101010201010101" pitchFamily="66" charset="0"/>
               </a:rPr>
-              <a:t> </a:t>
-            </a:r>
-            <a:r>
-              <a:rPr lang="de-DE" sz="2400" dirty="0" err="1">
+              <a:t>of team </a:t>
+            </a:r>
+            <a:r>
+              <a:rPr lang="de-DE" sz="2400" dirty="0" smtClean="0">
                 <a:latin typeface="Monotype Corsiva" panose="03010101010201010101" pitchFamily="66" charset="0"/>
               </a:rPr>
-              <a:t>team</a:t>
-            </a:r>
-            <a:r>
-              <a:rPr lang="de-DE" sz="2400" dirty="0">
-                <a:latin typeface="Monotype Corsiva" panose="03010101010201010101" pitchFamily="66" charset="0"/>
-              </a:rPr>
-              <a:t> 8</a:t>
+              <a:t>8</a:t>
             </a:r>
             <a:br>
-              <a:rPr lang="de-DE" sz="2400" dirty="0">
+              <a:rPr lang="de-DE" sz="2400" dirty="0" smtClean="0">
                 <a:latin typeface="Monotype Corsiva" panose="03010101010201010101" pitchFamily="66" charset="0"/>
               </a:rPr>
             </a:br>
@@ -9112,7 +9086,7 @@
   <p:timing>
     <p:tnLst>
       <p:par>
-        <p:cTn xmlns:p14="http://schemas.microsoft.com/office/powerpoint/2010/main" id="1" dur="indefinite" restart="never" nodeType="tmRoot"/>
+        <p:cTn id="1" dur="indefinite" restart="never" nodeType="tmRoot"/>
       </p:par>
     </p:tnLst>
   </p:timing>
@@ -9897,7 +9871,7 @@
   <p:timing>
     <p:tnLst>
       <p:par>
-        <p:cTn xmlns:p14="http://schemas.microsoft.com/office/powerpoint/2010/main" id="1" dur="indefinite" restart="never" nodeType="tmRoot"/>
+        <p:cTn id="1" dur="indefinite" restart="never" nodeType="tmRoot"/>
       </p:par>
     </p:tnLst>
   </p:timing>
@@ -10664,7 +10638,7 @@
   <p:timing>
     <p:tnLst>
       <p:par>
-        <p:cTn xmlns:p14="http://schemas.microsoft.com/office/powerpoint/2010/main" id="1" dur="indefinite" restart="never" nodeType="tmRoot"/>
+        <p:cTn id="1" dur="indefinite" restart="never" nodeType="tmRoot"/>
       </p:par>
     </p:tnLst>
   </p:timing>
@@ -11424,7 +11398,7 @@
   <p:timing>
     <p:tnLst>
       <p:par>
-        <p:cTn xmlns:p14="http://schemas.microsoft.com/office/powerpoint/2010/main" id="1" dur="indefinite" restart="never" nodeType="tmRoot"/>
+        <p:cTn id="1" dur="indefinite" restart="never" nodeType="tmRoot"/>
       </p:par>
     </p:tnLst>
   </p:timing>
@@ -12272,7 +12246,7 @@
   <p:timing>
     <p:tnLst>
       <p:par>
-        <p:cTn xmlns:p14="http://schemas.microsoft.com/office/powerpoint/2010/main" id="1" dur="indefinite" restart="never" nodeType="tmRoot"/>
+        <p:cTn id="1" dur="indefinite" restart="never" nodeType="tmRoot"/>
       </p:par>
     </p:tnLst>
   </p:timing>
@@ -12634,7 +12608,7 @@
   <p:timing>
     <p:tnLst>
       <p:par>
-        <p:cTn xmlns:p14="http://schemas.microsoft.com/office/powerpoint/2010/main" id="1" dur="indefinite" restart="never" nodeType="tmRoot"/>
+        <p:cTn id="1" dur="indefinite" restart="never" nodeType="tmRoot"/>
       </p:par>
     </p:tnLst>
   </p:timing>
@@ -13096,7 +13070,7 @@
   <p:timing>
     <p:tnLst>
       <p:par>
-        <p:cTn xmlns:p14="http://schemas.microsoft.com/office/powerpoint/2010/main" id="1" dur="indefinite" restart="never" nodeType="tmRoot"/>
+        <p:cTn id="1" dur="indefinite" restart="never" nodeType="tmRoot"/>
       </p:par>
     </p:tnLst>
   </p:timing>
@@ -13462,7 +13436,7 @@
   <p:timing>
     <p:tnLst>
       <p:par>
-        <p:cTn xmlns:p14="http://schemas.microsoft.com/office/powerpoint/2010/main" id="1" dur="indefinite" restart="never" nodeType="tmRoot"/>
+        <p:cTn id="1" dur="indefinite" restart="never" nodeType="tmRoot"/>
       </p:par>
     </p:tnLst>
   </p:timing>
@@ -13828,7 +13802,7 @@
   <p:timing>
     <p:tnLst>
       <p:par>
-        <p:cTn xmlns:p14="http://schemas.microsoft.com/office/powerpoint/2010/main" id="1" dur="indefinite" restart="never" nodeType="tmRoot"/>
+        <p:cTn id="1" dur="indefinite" restart="never" nodeType="tmRoot"/>
       </p:par>
     </p:tnLst>
   </p:timing>
@@ -14194,7 +14168,7 @@
   <p:timing>
     <p:tnLst>
       <p:par>
-        <p:cTn xmlns:p14="http://schemas.microsoft.com/office/powerpoint/2010/main" id="1" dur="indefinite" restart="never" nodeType="tmRoot"/>
+        <p:cTn id="1" dur="indefinite" restart="never" nodeType="tmRoot"/>
       </p:par>
     </p:tnLst>
   </p:timing>
@@ -14560,7 +14534,7 @@
   <p:timing>
     <p:tnLst>
       <p:par>
-        <p:cTn xmlns:p14="http://schemas.microsoft.com/office/powerpoint/2010/main" id="1" dur="indefinite" restart="never" nodeType="tmRoot"/>
+        <p:cTn id="1" dur="indefinite" restart="never" nodeType="tmRoot"/>
       </p:par>
     </p:tnLst>
   </p:timing>
@@ -15009,7 +14983,7 @@
   <p:timing>
     <p:tnLst>
       <p:par>
-        <p:cTn xmlns:p14="http://schemas.microsoft.com/office/powerpoint/2010/main" id="1" dur="indefinite" restart="never" nodeType="tmRoot"/>
+        <p:cTn id="1" dur="indefinite" restart="never" nodeType="tmRoot"/>
       </p:par>
     </p:tnLst>
   </p:timing>
@@ -15375,7 +15349,7 @@
   <p:timing>
     <p:tnLst>
       <p:par>
-        <p:cTn xmlns:p14="http://schemas.microsoft.com/office/powerpoint/2010/main" id="1" dur="indefinite" restart="never" nodeType="tmRoot"/>
+        <p:cTn id="1" dur="indefinite" restart="never" nodeType="tmRoot"/>
       </p:par>
     </p:tnLst>
   </p:timing>
@@ -15777,7 +15751,7 @@
   <p:timing>
     <p:tnLst>
       <p:par>
-        <p:cTn xmlns:p14="http://schemas.microsoft.com/office/powerpoint/2010/main" id="1" dur="indefinite" restart="never" nodeType="tmRoot"/>
+        <p:cTn id="1" dur="indefinite" restart="never" nodeType="tmRoot"/>
       </p:par>
     </p:tnLst>
   </p:timing>
@@ -16241,7 +16215,7 @@
   <p:timing>
     <p:tnLst>
       <p:par>
-        <p:cTn xmlns:p14="http://schemas.microsoft.com/office/powerpoint/2010/main" id="1" dur="indefinite" restart="never" nodeType="tmRoot"/>
+        <p:cTn id="1" dur="indefinite" restart="never" nodeType="tmRoot"/>
       </p:par>
     </p:tnLst>
   </p:timing>
@@ -16328,7 +16302,7 @@
           </a:prstGeom>
           <a:noFill/>
           <a:extLst>
-            <a:ext uri="{909E8E84-426E-40dd-AFC4-6F175D3DCCD1}">
+            <a:ext uri="{909E8E84-426E-40DD-AFC4-6F175D3DCCD1}">
               <a14:hiddenFill xmlns:a14="http://schemas.microsoft.com/office/drawing/2010/main">
                 <a:solidFill>
                   <a:srgbClr val="FFFFFF"/>
@@ -16369,7 +16343,7 @@
           </a:prstGeom>
           <a:noFill/>
           <a:extLst>
-            <a:ext uri="{909E8E84-426E-40dd-AFC4-6F175D3DCCD1}">
+            <a:ext uri="{909E8E84-426E-40DD-AFC4-6F175D3DCCD1}">
               <a14:hiddenFill xmlns:a14="http://schemas.microsoft.com/office/drawing/2010/main">
                 <a:solidFill>
                   <a:srgbClr val="FFFFFF"/>
@@ -16659,7 +16633,7 @@
   <p:timing>
     <p:tnLst>
       <p:par>
-        <p:cTn xmlns:p14="http://schemas.microsoft.com/office/powerpoint/2010/main" id="1" dur="indefinite" restart="never" nodeType="tmRoot"/>
+        <p:cTn id="1" dur="indefinite" restart="never" nodeType="tmRoot"/>
       </p:par>
     </p:tnLst>
   </p:timing>
@@ -17057,7 +17031,7 @@
   <p:timing>
     <p:tnLst>
       <p:par>
-        <p:cTn xmlns:p14="http://schemas.microsoft.com/office/powerpoint/2010/main" id="1" dur="indefinite" restart="never" nodeType="tmRoot"/>
+        <p:cTn id="1" dur="indefinite" restart="never" nodeType="tmRoot"/>
       </p:par>
     </p:tnLst>
   </p:timing>
@@ -17481,7 +17455,7 @@
   <p:timing>
     <p:tnLst>
       <p:par>
-        <p:cTn xmlns:p14="http://schemas.microsoft.com/office/powerpoint/2010/main" id="1" dur="indefinite" restart="never" nodeType="tmRoot"/>
+        <p:cTn id="1" dur="indefinite" restart="never" nodeType="tmRoot"/>
       </p:par>
     </p:tnLst>
   </p:timing>
@@ -17879,7 +17853,7 @@
   <p:timing>
     <p:tnLst>
       <p:par>
-        <p:cTn xmlns:p14="http://schemas.microsoft.com/office/powerpoint/2010/main" id="1" dur="indefinite" restart="never" nodeType="tmRoot"/>
+        <p:cTn id="1" dur="indefinite" restart="never" nodeType="tmRoot"/>
       </p:par>
     </p:tnLst>
   </p:timing>
@@ -17964,7 +17938,7 @@
   <p:timing>
     <p:tnLst>
       <p:par>
-        <p:cTn xmlns:p14="http://schemas.microsoft.com/office/powerpoint/2010/main" id="1" dur="indefinite" restart="never" nodeType="tmRoot"/>
+        <p:cTn id="1" dur="indefinite" restart="never" nodeType="tmRoot"/>
       </p:par>
     </p:tnLst>
   </p:timing>
@@ -18039,119 +18013,14 @@
           <a:lstStyle/>
           <a:p>
             <a:r>
-              <a:rPr lang="de-DE" dirty="0" err="1"/>
-              <a:t>Implemented</a:t>
-            </a:r>
-            <a:r>
-              <a:rPr lang="de-DE" dirty="0"/>
-              <a:t> </a:t>
-            </a:r>
-            <a:r>
-              <a:rPr lang="de-DE" dirty="0" err="1"/>
-              <a:t>the</a:t>
-            </a:r>
-            <a:r>
-              <a:rPr lang="de-DE" dirty="0"/>
-              <a:t> same </a:t>
-            </a:r>
-            <a:r>
-              <a:rPr lang="de-DE" dirty="0" err="1"/>
-              <a:t>functionality</a:t>
-            </a:r>
-            <a:r>
-              <a:rPr lang="de-DE" dirty="0"/>
-              <a:t> </a:t>
-            </a:r>
-            <a:r>
-              <a:rPr lang="de-DE" dirty="0" err="1"/>
-              <a:t>as</a:t>
-            </a:r>
-            <a:r>
-              <a:rPr lang="de-DE" dirty="0"/>
-              <a:t> </a:t>
-            </a:r>
-            <a:r>
-              <a:rPr lang="de-DE" dirty="0" err="1"/>
-              <a:t>you</a:t>
-            </a:r>
-            <a:r>
-              <a:rPr lang="de-DE" dirty="0"/>
-              <a:t> </a:t>
-            </a:r>
-            <a:r>
-              <a:rPr lang="de-DE" dirty="0" err="1"/>
-              <a:t>did</a:t>
-            </a:r>
-            <a:endParaRPr lang="de-DE" dirty="0"/>
-          </a:p>
-          <a:p>
-            <a:r>
-              <a:rPr lang="de-DE" dirty="0" err="1"/>
-              <a:t>Depending</a:t>
-            </a:r>
-            <a:r>
-              <a:rPr lang="de-DE" dirty="0"/>
-              <a:t> on </a:t>
-            </a:r>
-            <a:r>
-              <a:rPr lang="de-DE" dirty="0" err="1"/>
-              <a:t>your</a:t>
-            </a:r>
-            <a:r>
-              <a:rPr lang="de-DE" dirty="0"/>
-              <a:t> </a:t>
-            </a:r>
-            <a:r>
-              <a:rPr lang="de-DE" dirty="0" err="1"/>
-              <a:t>role</a:t>
-            </a:r>
-            <a:r>
-              <a:rPr lang="de-DE" dirty="0"/>
-              <a:t>, </a:t>
-            </a:r>
-            <a:r>
-              <a:rPr lang="de-DE" dirty="0" err="1"/>
-              <a:t>you</a:t>
-            </a:r>
-            <a:r>
-              <a:rPr lang="de-DE" dirty="0"/>
-              <a:t> </a:t>
-            </a:r>
-            <a:r>
-              <a:rPr lang="de-DE" dirty="0" err="1"/>
-              <a:t>may</a:t>
-            </a:r>
-            <a:r>
-              <a:rPr lang="de-DE" dirty="0"/>
-              <a:t> </a:t>
-            </a:r>
-            <a:r>
-              <a:rPr lang="de-DE" dirty="0" err="1"/>
-              <a:t>have</a:t>
-            </a:r>
-            <a:r>
-              <a:rPr lang="de-DE" dirty="0"/>
-              <a:t> different </a:t>
-            </a:r>
-            <a:r>
-              <a:rPr lang="de-DE" dirty="0" err="1"/>
-              <a:t>views</a:t>
-            </a:r>
-            <a:r>
-              <a:rPr lang="de-DE" dirty="0"/>
-              <a:t> </a:t>
-            </a:r>
-            <a:r>
-              <a:rPr lang="de-DE" dirty="0" err="1"/>
-              <a:t>and</a:t>
-            </a:r>
-            <a:r>
-              <a:rPr lang="de-DE" dirty="0"/>
-              <a:t> </a:t>
-            </a:r>
-            <a:r>
-              <a:rPr lang="de-DE" dirty="0" err="1"/>
-              <a:t>functionality</a:t>
+              <a:rPr lang="de-DE" dirty="0" smtClean="0"/>
+              <a:t>Implemented requested functionality</a:t>
+            </a:r>
+          </a:p>
+          <a:p>
+            <a:r>
+              <a:rPr lang="de-DE" dirty="0" smtClean="0"/>
+              <a:t>Based on the FlatFindr project</a:t>
             </a:r>
             <a:endParaRPr lang="de-DE" dirty="0"/>
           </a:p>
@@ -18472,7 +18341,7 @@
   <p:timing>
     <p:tnLst>
       <p:par>
-        <p:cTn xmlns:p14="http://schemas.microsoft.com/office/powerpoint/2010/main" id="1" dur="indefinite" restart="never" nodeType="tmRoot"/>
+        <p:cTn id="1" dur="indefinite" restart="never" nodeType="tmRoot"/>
       </p:par>
     </p:tnLst>
   </p:timing>
@@ -18806,7 +18675,7 @@
   <p:timing>
     <p:tnLst>
       <p:par>
-        <p:cTn xmlns:p14="http://schemas.microsoft.com/office/powerpoint/2010/main" id="1" dur="indefinite" restart="never" nodeType="tmRoot"/>
+        <p:cTn id="1" dur="indefinite" restart="never" nodeType="tmRoot"/>
       </p:par>
     </p:tnLst>
   </p:timing>
@@ -19397,7 +19266,7 @@
   <p:timing>
     <p:tnLst>
       <p:par>
-        <p:cTn xmlns:p14="http://schemas.microsoft.com/office/powerpoint/2010/main" id="1" dur="indefinite" restart="never" nodeType="tmRoot"/>
+        <p:cTn id="1" dur="indefinite" restart="never" nodeType="tmRoot"/>
       </p:par>
     </p:tnLst>
   </p:timing>
@@ -19654,7 +19523,7 @@
   <a:extraClrSchemeLst/>
   <a:extLst>
     <a:ext uri="{05A4C25C-085E-4340-85A3-A5531E510DB2}">
-      <thm15:themeFamily xmlns="" xmlns:thm15="http://schemas.microsoft.com/office/thememl/2012/main" name="Parallax" id="{3388167B-A2EB-4685-9635-1831D9AEF8C4}" vid="{4F7A876A-7598-49CA-AFC8-8EDA2551E4A7}"/>
+      <thm15:themeFamily xmlns:thm15="http://schemas.microsoft.com/office/thememl/2012/main" xmlns="" name="Parallax" id="{3388167B-A2EB-4685-9635-1831D9AEF8C4}" vid="{4F7A876A-7598-49CA-AFC8-8EDA2551E4A7}"/>
     </a:ext>
   </a:extLst>
 </a:theme>

</xml_diff>

<commit_message>
added why us to the roadmap
</commit_message>
<xml_diff>
--- a/baseProject/presentation/Presentation-Team8.pptx
+++ b/baseProject/presentation/Presentation-Team8.pptx
@@ -184,7 +184,7 @@
       </p14:sectionLst>
     </p:ext>
     <p:ext uri="{EFAFB233-063F-42B5-8137-9DF3F51BA10A}">
-      <p15:sldGuideLst xmlns:p15="http://schemas.microsoft.com/office/powerpoint/2012/main" xmlns="">
+      <p15:sldGuideLst xmlns:p15="http://schemas.microsoft.com/office/powerpoint/2012/main">
         <p15:guide id="1" orient="horz" pos="2160">
           <p15:clr>
             <a:srgbClr val="A4A3A4"/>
@@ -283,7 +283,7 @@
           <a:p>
             <a:fld id="{AD788536-914B-4640-862E-1D3DAE36BE3D}" type="datetimeFigureOut">
               <a:rPr lang="de-DE" smtClean="0"/>
-              <a:t>13.12.2016</a:t>
+              <a:t>14.12.2016</a:t>
             </a:fld>
             <a:endParaRPr lang="de-DE"/>
           </a:p>
@@ -442,7 +442,7 @@
           <a:p>
             <a:fld id="{2F2847E0-1D0A-0F4B-99C8-E51199A5987D}" type="slidenum">
               <a:rPr lang="de-DE" smtClean="0"/>
-              <a:t>‹#›</a:t>
+              <a:t>‹Nr.›</a:t>
             </a:fld>
             <a:endParaRPr lang="de-DE"/>
           </a:p>
@@ -3062,7 +3062,7 @@
             <a:fld id="{B61BEF0D-F0BB-DE4B-95CE-6DB70DBA9567}" type="datetimeFigureOut">
               <a:rPr lang="en-US" dirty="0"/>
               <a:pPr/>
-              <a:t>12/13/2016</a:t>
+              <a:t>12/14/2016</a:t>
             </a:fld>
             <a:endParaRPr lang="en-US" dirty="0"/>
           </a:p>
@@ -3110,7 +3110,7 @@
             <a:fld id="{D57F1E4F-1CFF-5643-939E-217C01CDF565}" type="slidenum">
               <a:rPr lang="en-US" dirty="0"/>
               <a:pPr/>
-              <a:t>‹#›</a:t>
+              <a:t>‹Nr.›</a:t>
             </a:fld>
             <a:endParaRPr lang="en-US" dirty="0"/>
           </a:p>
@@ -3355,7 +3355,7 @@
             <a:fld id="{B61BEF0D-F0BB-DE4B-95CE-6DB70DBA9567}" type="datetimeFigureOut">
               <a:rPr lang="en-US" dirty="0"/>
               <a:pPr/>
-              <a:t>12/13/2016</a:t>
+              <a:t>12/14/2016</a:t>
             </a:fld>
             <a:endParaRPr lang="en-US" dirty="0"/>
           </a:p>
@@ -3398,7 +3398,7 @@
             <a:fld id="{D57F1E4F-1CFF-5643-939E-217C01CDF565}" type="slidenum">
               <a:rPr lang="en-US" dirty="0"/>
               <a:pPr/>
-              <a:t>‹#›</a:t>
+              <a:t>‹Nr.›</a:t>
             </a:fld>
             <a:endParaRPr lang="en-US" dirty="0"/>
           </a:p>
@@ -3600,7 +3600,7 @@
             <a:fld id="{B61BEF0D-F0BB-DE4B-95CE-6DB70DBA9567}" type="datetimeFigureOut">
               <a:rPr lang="en-US" dirty="0"/>
               <a:pPr/>
-              <a:t>12/13/2016</a:t>
+              <a:t>12/14/2016</a:t>
             </a:fld>
             <a:endParaRPr lang="en-US" dirty="0"/>
           </a:p>
@@ -3643,7 +3643,7 @@
             <a:fld id="{D57F1E4F-1CFF-5643-939E-217C01CDF565}" type="slidenum">
               <a:rPr lang="en-US" dirty="0"/>
               <a:pPr/>
-              <a:t>‹#›</a:t>
+              <a:t>‹Nr.›</a:t>
             </a:fld>
             <a:endParaRPr lang="en-US" dirty="0"/>
           </a:p>
@@ -4137,7 +4137,7 @@
             <a:fld id="{B61BEF0D-F0BB-DE4B-95CE-6DB70DBA9567}" type="datetimeFigureOut">
               <a:rPr lang="en-US" dirty="0"/>
               <a:pPr/>
-              <a:t>12/13/2016</a:t>
+              <a:t>12/14/2016</a:t>
             </a:fld>
             <a:endParaRPr lang="en-US" dirty="0"/>
           </a:p>
@@ -4180,7 +4180,7 @@
             <a:fld id="{D57F1E4F-1CFF-5643-939E-217C01CDF565}" type="slidenum">
               <a:rPr lang="en-US" dirty="0"/>
               <a:pPr/>
-              <a:t>‹#›</a:t>
+              <a:t>‹Nr.›</a:t>
             </a:fld>
             <a:endParaRPr lang="en-US" dirty="0"/>
           </a:p>
@@ -4382,7 +4382,7 @@
             <a:fld id="{B61BEF0D-F0BB-DE4B-95CE-6DB70DBA9567}" type="datetimeFigureOut">
               <a:rPr lang="en-US" dirty="0"/>
               <a:pPr/>
-              <a:t>12/13/2016</a:t>
+              <a:t>12/14/2016</a:t>
             </a:fld>
             <a:endParaRPr lang="en-US" dirty="0"/>
           </a:p>
@@ -4425,7 +4425,7 @@
             <a:fld id="{D57F1E4F-1CFF-5643-939E-217C01CDF565}" type="slidenum">
               <a:rPr lang="en-US" dirty="0"/>
               <a:pPr/>
-              <a:t>‹#›</a:t>
+              <a:t>‹Nr.›</a:t>
             </a:fld>
             <a:endParaRPr lang="en-US" dirty="0"/>
           </a:p>
@@ -4911,7 +4911,7 @@
             <a:fld id="{B61BEF0D-F0BB-DE4B-95CE-6DB70DBA9567}" type="datetimeFigureOut">
               <a:rPr lang="en-US" dirty="0"/>
               <a:pPr/>
-              <a:t>12/13/2016</a:t>
+              <a:t>12/14/2016</a:t>
             </a:fld>
             <a:endParaRPr lang="en-US" dirty="0"/>
           </a:p>
@@ -4954,7 +4954,7 @@
             <a:fld id="{D57F1E4F-1CFF-5643-939E-217C01CDF565}" type="slidenum">
               <a:rPr lang="en-US" dirty="0"/>
               <a:pPr/>
-              <a:t>‹#›</a:t>
+              <a:t>‹Nr.›</a:t>
             </a:fld>
             <a:endParaRPr lang="en-US" dirty="0"/>
           </a:p>
@@ -5205,7 +5205,7 @@
             <a:fld id="{B61BEF0D-F0BB-DE4B-95CE-6DB70DBA9567}" type="datetimeFigureOut">
               <a:rPr lang="en-US" dirty="0"/>
               <a:pPr/>
-              <a:t>12/13/2016</a:t>
+              <a:t>12/14/2016</a:t>
             </a:fld>
             <a:endParaRPr lang="en-US" dirty="0"/>
           </a:p>
@@ -5248,7 +5248,7 @@
             <a:fld id="{D57F1E4F-1CFF-5643-939E-217C01CDF565}" type="slidenum">
               <a:rPr lang="en-US" dirty="0"/>
               <a:pPr/>
-              <a:t>‹#›</a:t>
+              <a:t>‹Nr.›</a:t>
             </a:fld>
             <a:endParaRPr lang="en-US" dirty="0"/>
           </a:p>
@@ -5376,7 +5376,7 @@
             <a:fld id="{B61BEF0D-F0BB-DE4B-95CE-6DB70DBA9567}" type="datetimeFigureOut">
               <a:rPr lang="en-US" dirty="0"/>
               <a:pPr/>
-              <a:t>12/13/2016</a:t>
+              <a:t>12/14/2016</a:t>
             </a:fld>
             <a:endParaRPr lang="en-US" dirty="0"/>
           </a:p>
@@ -5419,7 +5419,7 @@
             <a:fld id="{D57F1E4F-1CFF-5643-939E-217C01CDF565}" type="slidenum">
               <a:rPr lang="en-US" dirty="0"/>
               <a:pPr/>
-              <a:t>‹#›</a:t>
+              <a:t>‹Nr.›</a:t>
             </a:fld>
             <a:endParaRPr lang="en-US" dirty="0"/>
           </a:p>
@@ -5553,7 +5553,7 @@
             <a:fld id="{B61BEF0D-F0BB-DE4B-95CE-6DB70DBA9567}" type="datetimeFigureOut">
               <a:rPr lang="en-US" dirty="0"/>
               <a:pPr/>
-              <a:t>12/13/2016</a:t>
+              <a:t>12/14/2016</a:t>
             </a:fld>
             <a:endParaRPr lang="en-US" dirty="0"/>
           </a:p>
@@ -5596,7 +5596,7 @@
             <a:fld id="{D57F1E4F-1CFF-5643-939E-217C01CDF565}" type="slidenum">
               <a:rPr lang="en-US" dirty="0"/>
               <a:pPr/>
-              <a:t>‹#›</a:t>
+              <a:t>‹Nr.›</a:t>
             </a:fld>
             <a:endParaRPr lang="en-US" dirty="0"/>
           </a:p>
@@ -5720,7 +5720,7 @@
             <a:fld id="{B61BEF0D-F0BB-DE4B-95CE-6DB70DBA9567}" type="datetimeFigureOut">
               <a:rPr lang="en-US" dirty="0"/>
               <a:pPr/>
-              <a:t>12/13/2016</a:t>
+              <a:t>12/14/2016</a:t>
             </a:fld>
             <a:endParaRPr lang="en-US" dirty="0"/>
           </a:p>
@@ -5768,7 +5768,7 @@
             <a:fld id="{D57F1E4F-1CFF-5643-939E-217C01CDF565}" type="slidenum">
               <a:rPr lang="en-US" dirty="0"/>
               <a:pPr/>
-              <a:t>‹#›</a:t>
+              <a:t>‹Nr.›</a:t>
             </a:fld>
             <a:endParaRPr lang="en-US" dirty="0"/>
           </a:p>
@@ -5968,7 +5968,7 @@
             <a:fld id="{B61BEF0D-F0BB-DE4B-95CE-6DB70DBA9567}" type="datetimeFigureOut">
               <a:rPr lang="en-US" dirty="0"/>
               <a:pPr/>
-              <a:t>12/13/2016</a:t>
+              <a:t>12/14/2016</a:t>
             </a:fld>
             <a:endParaRPr lang="en-US" dirty="0"/>
           </a:p>
@@ -6011,7 +6011,7 @@
             <a:fld id="{D57F1E4F-1CFF-5643-939E-217C01CDF565}" type="slidenum">
               <a:rPr lang="en-US" dirty="0"/>
               <a:pPr/>
-              <a:t>‹#›</a:t>
+              <a:t>‹Nr.›</a:t>
             </a:fld>
             <a:endParaRPr lang="en-US" dirty="0"/>
           </a:p>
@@ -6262,7 +6262,7 @@
             <a:fld id="{B61BEF0D-F0BB-DE4B-95CE-6DB70DBA9567}" type="datetimeFigureOut">
               <a:rPr lang="en-US" dirty="0"/>
               <a:pPr/>
-              <a:t>12/13/2016</a:t>
+              <a:t>12/14/2016</a:t>
             </a:fld>
             <a:endParaRPr lang="en-US" dirty="0"/>
           </a:p>
@@ -6305,7 +6305,7 @@
             <a:fld id="{D57F1E4F-1CFF-5643-939E-217C01CDF565}" type="slidenum">
               <a:rPr lang="en-US" dirty="0"/>
               <a:pPr/>
-              <a:t>‹#›</a:t>
+              <a:t>‹Nr.›</a:t>
             </a:fld>
             <a:endParaRPr lang="en-US" dirty="0"/>
           </a:p>
@@ -6701,7 +6701,7 @@
             <a:fld id="{B61BEF0D-F0BB-DE4B-95CE-6DB70DBA9567}" type="datetimeFigureOut">
               <a:rPr lang="en-US" dirty="0"/>
               <a:pPr/>
-              <a:t>12/13/2016</a:t>
+              <a:t>12/14/2016</a:t>
             </a:fld>
             <a:endParaRPr lang="en-US" dirty="0"/>
           </a:p>
@@ -6744,7 +6744,7 @@
             <a:fld id="{D57F1E4F-1CFF-5643-939E-217C01CDF565}" type="slidenum">
               <a:rPr lang="en-US" dirty="0"/>
               <a:pPr/>
-              <a:t>‹#›</a:t>
+              <a:t>‹Nr.›</a:t>
             </a:fld>
             <a:endParaRPr lang="en-US" dirty="0"/>
           </a:p>
@@ -6816,7 +6816,7 @@
             <a:fld id="{B61BEF0D-F0BB-DE4B-95CE-6DB70DBA9567}" type="datetimeFigureOut">
               <a:rPr lang="en-US" dirty="0"/>
               <a:pPr/>
-              <a:t>12/13/2016</a:t>
+              <a:t>12/14/2016</a:t>
             </a:fld>
             <a:endParaRPr lang="en-US" dirty="0"/>
           </a:p>
@@ -6859,7 +6859,7 @@
             <a:fld id="{D57F1E4F-1CFF-5643-939E-217C01CDF565}" type="slidenum">
               <a:rPr lang="en-US" dirty="0"/>
               <a:pPr/>
-              <a:t>‹#›</a:t>
+              <a:t>‹Nr.›</a:t>
             </a:fld>
             <a:endParaRPr lang="en-US" dirty="0"/>
           </a:p>
@@ -6908,7 +6908,7 @@
             <a:fld id="{B61BEF0D-F0BB-DE4B-95CE-6DB70DBA9567}" type="datetimeFigureOut">
               <a:rPr lang="en-US" dirty="0"/>
               <a:pPr/>
-              <a:t>12/13/2016</a:t>
+              <a:t>12/14/2016</a:t>
             </a:fld>
             <a:endParaRPr lang="en-US" dirty="0"/>
           </a:p>
@@ -6951,7 +6951,7 @@
             <a:fld id="{D57F1E4F-1CFF-5643-939E-217C01CDF565}" type="slidenum">
               <a:rPr lang="en-US" dirty="0"/>
               <a:pPr/>
-              <a:t>‹#›</a:t>
+              <a:t>‹Nr.›</a:t>
             </a:fld>
             <a:endParaRPr lang="en-US" dirty="0"/>
           </a:p>
@@ -7188,7 +7188,7 @@
             <a:fld id="{B61BEF0D-F0BB-DE4B-95CE-6DB70DBA9567}" type="datetimeFigureOut">
               <a:rPr lang="en-US" dirty="0"/>
               <a:pPr/>
-              <a:t>12/13/2016</a:t>
+              <a:t>12/14/2016</a:t>
             </a:fld>
             <a:endParaRPr lang="en-US" dirty="0"/>
           </a:p>
@@ -7231,7 +7231,7 @@
             <a:fld id="{D57F1E4F-1CFF-5643-939E-217C01CDF565}" type="slidenum">
               <a:rPr lang="en-US" dirty="0"/>
               <a:pPr/>
-              <a:t>‹#›</a:t>
+              <a:t>‹Nr.›</a:t>
             </a:fld>
             <a:endParaRPr lang="en-US" dirty="0"/>
           </a:p>
@@ -7476,7 +7476,7 @@
             <a:fld id="{B61BEF0D-F0BB-DE4B-95CE-6DB70DBA9567}" type="datetimeFigureOut">
               <a:rPr lang="en-US" dirty="0"/>
               <a:pPr/>
-              <a:t>12/13/2016</a:t>
+              <a:t>12/14/2016</a:t>
             </a:fld>
             <a:endParaRPr lang="en-US" dirty="0"/>
           </a:p>
@@ -7519,7 +7519,7 @@
             <a:fld id="{D57F1E4F-1CFF-5643-939E-217C01CDF565}" type="slidenum">
               <a:rPr lang="en-US" dirty="0"/>
               <a:pPr/>
-              <a:t>‹#›</a:t>
+              <a:t>‹Nr.›</a:t>
             </a:fld>
             <a:endParaRPr lang="en-US" dirty="0"/>
           </a:p>
@@ -8003,7 +8003,7 @@
             <a:fld id="{B61BEF0D-F0BB-DE4B-95CE-6DB70DBA9567}" type="datetimeFigureOut">
               <a:rPr lang="en-US" dirty="0"/>
               <a:pPr/>
-              <a:t>12/13/2016</a:t>
+              <a:t>12/14/2016</a:t>
             </a:fld>
             <a:endParaRPr lang="en-US" dirty="0"/>
           </a:p>
@@ -8082,7 +8082,7 @@
             <a:fld id="{D57F1E4F-1CFF-5643-939E-217C01CDF565}" type="slidenum">
               <a:rPr lang="en-US" dirty="0"/>
               <a:pPr/>
-              <a:t>‹#›</a:t>
+              <a:t>‹Nr.›</a:t>
             </a:fld>
             <a:endParaRPr lang="en-US" dirty="0"/>
           </a:p>
@@ -14522,13 +14522,36 @@
           </a:p>
           <a:p>
             <a:r>
-              <a:rPr lang="de-CH" sz="3200" dirty="0"/>
+              <a:rPr lang="de-CH" sz="3200" dirty="0" smtClean="0"/>
               <a:t>Scenario</a:t>
             </a:r>
           </a:p>
           <a:p>
             <a:r>
-              <a:rPr lang="de-CH" sz="3200" dirty="0" err="1"/>
+              <a:rPr lang="de-CH" sz="3200" dirty="0" err="1" smtClean="0"/>
+              <a:t>Why</a:t>
+            </a:r>
+            <a:r>
+              <a:rPr lang="de-CH" sz="3200" dirty="0" smtClean="0"/>
+              <a:t> </a:t>
+            </a:r>
+            <a:r>
+              <a:rPr lang="de-CH" sz="3200" dirty="0" err="1" smtClean="0"/>
+              <a:t>us</a:t>
+            </a:r>
+            <a:endParaRPr lang="de-CH" sz="3200" dirty="0"/>
+          </a:p>
+          <a:p>
+            <a:r>
+              <a:rPr lang="de-CH" sz="3200" dirty="0" err="1" smtClean="0"/>
+              <a:t>Questions</a:t>
+            </a:r>
+            <a:r>
+              <a:rPr lang="de-CH" sz="3200" dirty="0" smtClean="0"/>
+              <a:t> / </a:t>
+            </a:r>
+            <a:r>
+              <a:rPr lang="de-CH" sz="3200" dirty="0" err="1" smtClean="0"/>
               <a:t>Discussion</a:t>
             </a:r>
             <a:endParaRPr lang="de-CH" sz="3200" dirty="0"/>
@@ -17785,7 +17808,7 @@
   <a:extraClrSchemeLst/>
   <a:extLst>
     <a:ext uri="{05A4C25C-085E-4340-85A3-A5531E510DB2}">
-      <thm15:themeFamily xmlns:thm15="http://schemas.microsoft.com/office/thememl/2012/main" xmlns="" name="Parallax" id="{3388167B-A2EB-4685-9635-1831D9AEF8C4}" vid="{4F7A876A-7598-49CA-AFC8-8EDA2551E4A7}"/>
+      <thm15:themeFamily xmlns:thm15="http://schemas.microsoft.com/office/thememl/2012/main" name="Parallax" id="{3388167B-A2EB-4685-9635-1831D9AEF8C4}" vid="{4F7A876A-7598-49CA-AFC8-8EDA2551E4A7}"/>
     </a:ext>
   </a:extLst>
 </a:theme>

</xml_diff>

<commit_message>
added parts to the roadmap
</commit_message>
<xml_diff>
--- a/baseProject/presentation/Presentation-Team8.pptx
+++ b/baseProject/presentation/Presentation-Team8.pptx
@@ -186,7 +186,7 @@
       </p14:sectionLst>
     </p:ext>
     <p:ext uri="{EFAFB233-063F-42B5-8137-9DF3F51BA10A}">
-      <p15:sldGuideLst xmlns:p15="http://schemas.microsoft.com/office/powerpoint/2012/main" xmlns="">
+      <p15:sldGuideLst xmlns:p15="http://schemas.microsoft.com/office/powerpoint/2012/main">
         <p15:guide id="1" orient="horz" pos="2160">
           <p15:clr>
             <a:srgbClr val="A4A3A4"/>
@@ -444,7 +444,7 @@
           <a:p>
             <a:fld id="{2F2847E0-1D0A-0F4B-99C8-E51199A5987D}" type="slidenum">
               <a:rPr lang="de-DE" smtClean="0"/>
-              <a:t>‹#›</a:t>
+              <a:t>‹Nr.›</a:t>
             </a:fld>
             <a:endParaRPr lang="de-DE"/>
           </a:p>
@@ -3248,7 +3248,7 @@
             <a:fld id="{D57F1E4F-1CFF-5643-939E-217C01CDF565}" type="slidenum">
               <a:rPr lang="en-US" dirty="0"/>
               <a:pPr/>
-              <a:t>‹#›</a:t>
+              <a:t>‹Nr.›</a:t>
             </a:fld>
             <a:endParaRPr lang="en-US" dirty="0"/>
           </a:p>
@@ -3536,7 +3536,7 @@
             <a:fld id="{D57F1E4F-1CFF-5643-939E-217C01CDF565}" type="slidenum">
               <a:rPr lang="en-US" dirty="0"/>
               <a:pPr/>
-              <a:t>‹#›</a:t>
+              <a:t>‹Nr.›</a:t>
             </a:fld>
             <a:endParaRPr lang="en-US" dirty="0"/>
           </a:p>
@@ -3781,7 +3781,7 @@
             <a:fld id="{D57F1E4F-1CFF-5643-939E-217C01CDF565}" type="slidenum">
               <a:rPr lang="en-US" dirty="0"/>
               <a:pPr/>
-              <a:t>‹#›</a:t>
+              <a:t>‹Nr.›</a:t>
             </a:fld>
             <a:endParaRPr lang="en-US" dirty="0"/>
           </a:p>
@@ -4318,7 +4318,7 @@
             <a:fld id="{D57F1E4F-1CFF-5643-939E-217C01CDF565}" type="slidenum">
               <a:rPr lang="en-US" dirty="0"/>
               <a:pPr/>
-              <a:t>‹#›</a:t>
+              <a:t>‹Nr.›</a:t>
             </a:fld>
             <a:endParaRPr lang="en-US" dirty="0"/>
           </a:p>
@@ -4563,7 +4563,7 @@
             <a:fld id="{D57F1E4F-1CFF-5643-939E-217C01CDF565}" type="slidenum">
               <a:rPr lang="en-US" dirty="0"/>
               <a:pPr/>
-              <a:t>‹#›</a:t>
+              <a:t>‹Nr.›</a:t>
             </a:fld>
             <a:endParaRPr lang="en-US" dirty="0"/>
           </a:p>
@@ -5092,7 +5092,7 @@
             <a:fld id="{D57F1E4F-1CFF-5643-939E-217C01CDF565}" type="slidenum">
               <a:rPr lang="en-US" dirty="0"/>
               <a:pPr/>
-              <a:t>‹#›</a:t>
+              <a:t>‹Nr.›</a:t>
             </a:fld>
             <a:endParaRPr lang="en-US" dirty="0"/>
           </a:p>
@@ -5386,7 +5386,7 @@
             <a:fld id="{D57F1E4F-1CFF-5643-939E-217C01CDF565}" type="slidenum">
               <a:rPr lang="en-US" dirty="0"/>
               <a:pPr/>
-              <a:t>‹#›</a:t>
+              <a:t>‹Nr.›</a:t>
             </a:fld>
             <a:endParaRPr lang="en-US" dirty="0"/>
           </a:p>
@@ -5557,7 +5557,7 @@
             <a:fld id="{D57F1E4F-1CFF-5643-939E-217C01CDF565}" type="slidenum">
               <a:rPr lang="en-US" dirty="0"/>
               <a:pPr/>
-              <a:t>‹#›</a:t>
+              <a:t>‹Nr.›</a:t>
             </a:fld>
             <a:endParaRPr lang="en-US" dirty="0"/>
           </a:p>
@@ -5734,7 +5734,7 @@
             <a:fld id="{D57F1E4F-1CFF-5643-939E-217C01CDF565}" type="slidenum">
               <a:rPr lang="en-US" dirty="0"/>
               <a:pPr/>
-              <a:t>‹#›</a:t>
+              <a:t>‹Nr.›</a:t>
             </a:fld>
             <a:endParaRPr lang="en-US" dirty="0"/>
           </a:p>
@@ -5906,7 +5906,7 @@
             <a:fld id="{D57F1E4F-1CFF-5643-939E-217C01CDF565}" type="slidenum">
               <a:rPr lang="en-US" dirty="0"/>
               <a:pPr/>
-              <a:t>‹#›</a:t>
+              <a:t>‹Nr.›</a:t>
             </a:fld>
             <a:endParaRPr lang="en-US" dirty="0"/>
           </a:p>
@@ -6149,7 +6149,7 @@
             <a:fld id="{D57F1E4F-1CFF-5643-939E-217C01CDF565}" type="slidenum">
               <a:rPr lang="en-US" dirty="0"/>
               <a:pPr/>
-              <a:t>‹#›</a:t>
+              <a:t>‹Nr.›</a:t>
             </a:fld>
             <a:endParaRPr lang="en-US" dirty="0"/>
           </a:p>
@@ -6443,7 +6443,7 @@
             <a:fld id="{D57F1E4F-1CFF-5643-939E-217C01CDF565}" type="slidenum">
               <a:rPr lang="en-US" dirty="0"/>
               <a:pPr/>
-              <a:t>‹#›</a:t>
+              <a:t>‹Nr.›</a:t>
             </a:fld>
             <a:endParaRPr lang="en-US" dirty="0"/>
           </a:p>
@@ -6882,7 +6882,7 @@
             <a:fld id="{D57F1E4F-1CFF-5643-939E-217C01CDF565}" type="slidenum">
               <a:rPr lang="en-US" dirty="0"/>
               <a:pPr/>
-              <a:t>‹#›</a:t>
+              <a:t>‹Nr.›</a:t>
             </a:fld>
             <a:endParaRPr lang="en-US" dirty="0"/>
           </a:p>
@@ -6997,7 +6997,7 @@
             <a:fld id="{D57F1E4F-1CFF-5643-939E-217C01CDF565}" type="slidenum">
               <a:rPr lang="en-US" dirty="0"/>
               <a:pPr/>
-              <a:t>‹#›</a:t>
+              <a:t>‹Nr.›</a:t>
             </a:fld>
             <a:endParaRPr lang="en-US" dirty="0"/>
           </a:p>
@@ -7089,7 +7089,7 @@
             <a:fld id="{D57F1E4F-1CFF-5643-939E-217C01CDF565}" type="slidenum">
               <a:rPr lang="en-US" dirty="0"/>
               <a:pPr/>
-              <a:t>‹#›</a:t>
+              <a:t>‹Nr.›</a:t>
             </a:fld>
             <a:endParaRPr lang="en-US" dirty="0"/>
           </a:p>
@@ -7369,7 +7369,7 @@
             <a:fld id="{D57F1E4F-1CFF-5643-939E-217C01CDF565}" type="slidenum">
               <a:rPr lang="en-US" dirty="0"/>
               <a:pPr/>
-              <a:t>‹#›</a:t>
+              <a:t>‹Nr.›</a:t>
             </a:fld>
             <a:endParaRPr lang="en-US" dirty="0"/>
           </a:p>
@@ -7657,7 +7657,7 @@
             <a:fld id="{D57F1E4F-1CFF-5643-939E-217C01CDF565}" type="slidenum">
               <a:rPr lang="en-US" dirty="0"/>
               <a:pPr/>
-              <a:t>‹#›</a:t>
+              <a:t>‹Nr.›</a:t>
             </a:fld>
             <a:endParaRPr lang="en-US" dirty="0"/>
           </a:p>
@@ -8220,7 +8220,7 @@
             <a:fld id="{D57F1E4F-1CFF-5643-939E-217C01CDF565}" type="slidenum">
               <a:rPr lang="en-US" dirty="0"/>
               <a:pPr/>
-              <a:t>‹#›</a:t>
+              <a:t>‹Nr.›</a:t>
             </a:fld>
             <a:endParaRPr lang="en-US" dirty="0"/>
           </a:p>
@@ -8706,13 +8706,7 @@
               <a:rPr lang="de-DE" sz="2400" dirty="0" smtClean="0">
                 <a:latin typeface="Monotype Corsiva" panose="03010101010201010101" pitchFamily="66" charset="0"/>
               </a:rPr>
-              <a:t>the realest real </a:t>
-            </a:r>
-            <a:r>
-              <a:rPr lang="de-DE" sz="2400" dirty="0" smtClean="0">
-                <a:latin typeface="Monotype Corsiva" panose="03010101010201010101" pitchFamily="66" charset="0"/>
-              </a:rPr>
-              <a:t>estate</a:t>
+              <a:t>the realest real estate</a:t>
             </a:r>
             <a:br>
               <a:rPr lang="de-DE" sz="2400" dirty="0" smtClean="0">
@@ -8734,13 +8728,7 @@
               <a:rPr lang="de-DE" sz="2400" dirty="0" smtClean="0">
                 <a:latin typeface="Monotype Corsiva" panose="03010101010201010101" pitchFamily="66" charset="0"/>
               </a:rPr>
-              <a:t>A </a:t>
-            </a:r>
-            <a:r>
-              <a:rPr lang="de-DE" sz="2400" dirty="0" smtClean="0">
-                <a:latin typeface="Monotype Corsiva" panose="03010101010201010101" pitchFamily="66" charset="0"/>
-              </a:rPr>
-              <a:t>presentation </a:t>
+              <a:t>A presentation </a:t>
             </a:r>
             <a:r>
               <a:rPr lang="de-DE" sz="2400" dirty="0">
@@ -14660,14 +14648,33 @@
           </a:p>
           <a:p>
             <a:r>
-              <a:rPr lang="de-CH" sz="3200" dirty="0"/>
+              <a:rPr lang="de-CH" sz="3200" dirty="0" smtClean="0"/>
               <a:t>Scenario</a:t>
             </a:r>
           </a:p>
           <a:p>
             <a:r>
-              <a:rPr lang="de-CH" sz="3200" dirty="0" err="1"/>
-              <a:t>Discussion</a:t>
+              <a:rPr lang="de-CH" sz="3200" dirty="0" err="1" smtClean="0"/>
+              <a:t>Why</a:t>
+            </a:r>
+            <a:r>
+              <a:rPr lang="de-CH" sz="3200" dirty="0" smtClean="0"/>
+              <a:t> </a:t>
+            </a:r>
+            <a:r>
+              <a:rPr lang="de-CH" sz="3200" dirty="0" err="1" smtClean="0"/>
+              <a:t>us</a:t>
+            </a:r>
+            <a:endParaRPr lang="de-CH" sz="3200" dirty="0"/>
+          </a:p>
+          <a:p>
+            <a:r>
+              <a:rPr lang="de-CH" sz="3200" dirty="0" err="1" smtClean="0"/>
+              <a:t>Questions</a:t>
+            </a:r>
+            <a:r>
+              <a:rPr lang="de-CH" sz="3200" smtClean="0"/>
+              <a:t> / Discussion</a:t>
             </a:r>
             <a:endParaRPr lang="de-CH" sz="3200" dirty="0"/>
           </a:p>
@@ -19523,7 +19530,7 @@
   <a:extraClrSchemeLst/>
   <a:extLst>
     <a:ext uri="{05A4C25C-085E-4340-85A3-A5531E510DB2}">
-      <thm15:themeFamily xmlns:thm15="http://schemas.microsoft.com/office/thememl/2012/main" xmlns="" name="Parallax" id="{3388167B-A2EB-4685-9635-1831D9AEF8C4}" vid="{4F7A876A-7598-49CA-AFC8-8EDA2551E4A7}"/>
+      <thm15:themeFamily xmlns:thm15="http://schemas.microsoft.com/office/thememl/2012/main" name="Parallax" id="{3388167B-A2EB-4685-9635-1831D9AEF8C4}" vid="{4F7A876A-7598-49CA-AFC8-8EDA2551E4A7}"/>
     </a:ext>
   </a:extLst>
 </a:theme>

</xml_diff>